<commit_message>
Improved the road map of the thesis
</commit_message>
<xml_diff>
--- a/chapter_01/figures/thesis_roadmap.pptx
+++ b/chapter_01/figures/thesis_roadmap.pptx
@@ -125,12 +125,12 @@
   <pc:docChgLst>
     <pc:chgData name="Fatima Pillosu" userId="a6295d4dc9e22643" providerId="LiveId" clId="{C7909C26-7110-4B46-8F1C-97658D5207FA}"/>
     <pc:docChg chg="custSel modSld">
-      <pc:chgData name="Fatima Pillosu" userId="a6295d4dc9e22643" providerId="LiveId" clId="{C7909C26-7110-4B46-8F1C-97658D5207FA}" dt="2025-06-03T14:33:04.351" v="350" actId="207"/>
+      <pc:chgData name="Fatima Pillosu" userId="a6295d4dc9e22643" providerId="LiveId" clId="{C7909C26-7110-4B46-8F1C-97658D5207FA}" dt="2025-06-03T14:51:07.992" v="357" actId="693"/>
       <pc:docMkLst>
         <pc:docMk/>
       </pc:docMkLst>
       <pc:sldChg chg="addSp delSp modSp mod">
-        <pc:chgData name="Fatima Pillosu" userId="a6295d4dc9e22643" providerId="LiveId" clId="{C7909C26-7110-4B46-8F1C-97658D5207FA}" dt="2025-06-03T14:33:04.351" v="350" actId="207"/>
+        <pc:chgData name="Fatima Pillosu" userId="a6295d4dc9e22643" providerId="LiveId" clId="{C7909C26-7110-4B46-8F1C-97658D5207FA}" dt="2025-06-03T14:51:07.992" v="357" actId="693"/>
         <pc:sldMkLst>
           <pc:docMk/>
           <pc:sldMk cId="3354384854" sldId="256"/>
@@ -216,7 +216,7 @@
           </ac:spMkLst>
         </pc:spChg>
         <pc:spChg chg="add mod">
-          <ac:chgData name="Fatima Pillosu" userId="a6295d4dc9e22643" providerId="LiveId" clId="{C7909C26-7110-4B46-8F1C-97658D5207FA}" dt="2025-06-03T14:29:55.721" v="195"/>
+          <ac:chgData name="Fatima Pillosu" userId="a6295d4dc9e22643" providerId="LiveId" clId="{C7909C26-7110-4B46-8F1C-97658D5207FA}" dt="2025-06-03T14:50:20.664" v="353" actId="1582"/>
           <ac:spMkLst>
             <pc:docMk/>
             <pc:sldMk cId="3354384854" sldId="256"/>
@@ -224,7 +224,7 @@
           </ac:spMkLst>
         </pc:spChg>
         <pc:spChg chg="add mod">
-          <ac:chgData name="Fatima Pillosu" userId="a6295d4dc9e22643" providerId="LiveId" clId="{C7909C26-7110-4B46-8F1C-97658D5207FA}" dt="2025-06-03T14:29:55.721" v="195"/>
+          <ac:chgData name="Fatima Pillosu" userId="a6295d4dc9e22643" providerId="LiveId" clId="{C7909C26-7110-4B46-8F1C-97658D5207FA}" dt="2025-06-03T14:50:20.664" v="353" actId="1582"/>
           <ac:spMkLst>
             <pc:docMk/>
             <pc:sldMk cId="3354384854" sldId="256"/>
@@ -232,7 +232,7 @@
           </ac:spMkLst>
         </pc:spChg>
         <pc:spChg chg="add mod">
-          <ac:chgData name="Fatima Pillosu" userId="a6295d4dc9e22643" providerId="LiveId" clId="{C7909C26-7110-4B46-8F1C-97658D5207FA}" dt="2025-06-03T14:29:55.721" v="195"/>
+          <ac:chgData name="Fatima Pillosu" userId="a6295d4dc9e22643" providerId="LiveId" clId="{C7909C26-7110-4B46-8F1C-97658D5207FA}" dt="2025-06-03T14:50:20.664" v="353" actId="1582"/>
           <ac:spMkLst>
             <pc:docMk/>
             <pc:sldMk cId="3354384854" sldId="256"/>
@@ -240,7 +240,7 @@
           </ac:spMkLst>
         </pc:spChg>
         <pc:spChg chg="add mod">
-          <ac:chgData name="Fatima Pillosu" userId="a6295d4dc9e22643" providerId="LiveId" clId="{C7909C26-7110-4B46-8F1C-97658D5207FA}" dt="2025-06-03T14:29:55.721" v="195"/>
+          <ac:chgData name="Fatima Pillosu" userId="a6295d4dc9e22643" providerId="LiveId" clId="{C7909C26-7110-4B46-8F1C-97658D5207FA}" dt="2025-06-03T14:50:20.664" v="353" actId="1582"/>
           <ac:spMkLst>
             <pc:docMk/>
             <pc:sldMk cId="3354384854" sldId="256"/>
@@ -248,7 +248,7 @@
           </ac:spMkLst>
         </pc:spChg>
         <pc:spChg chg="add mod">
-          <ac:chgData name="Fatima Pillosu" userId="a6295d4dc9e22643" providerId="LiveId" clId="{C7909C26-7110-4B46-8F1C-97658D5207FA}" dt="2025-06-03T14:29:55.721" v="195"/>
+          <ac:chgData name="Fatima Pillosu" userId="a6295d4dc9e22643" providerId="LiveId" clId="{C7909C26-7110-4B46-8F1C-97658D5207FA}" dt="2025-06-03T14:50:09.302" v="352" actId="1582"/>
           <ac:spMkLst>
             <pc:docMk/>
             <pc:sldMk cId="3354384854" sldId="256"/>
@@ -256,7 +256,7 @@
           </ac:spMkLst>
         </pc:spChg>
         <pc:spChg chg="add mod">
-          <ac:chgData name="Fatima Pillosu" userId="a6295d4dc9e22643" providerId="LiveId" clId="{C7909C26-7110-4B46-8F1C-97658D5207FA}" dt="2025-06-03T14:29:55.721" v="195"/>
+          <ac:chgData name="Fatima Pillosu" userId="a6295d4dc9e22643" providerId="LiveId" clId="{C7909C26-7110-4B46-8F1C-97658D5207FA}" dt="2025-06-03T14:50:09.302" v="352" actId="1582"/>
           <ac:spMkLst>
             <pc:docMk/>
             <pc:sldMk cId="3354384854" sldId="256"/>
@@ -768,7 +768,7 @@
           </ac:cxnSpMkLst>
         </pc:cxnChg>
         <pc:cxnChg chg="add mod">
-          <ac:chgData name="Fatima Pillosu" userId="a6295d4dc9e22643" providerId="LiveId" clId="{C7909C26-7110-4B46-8F1C-97658D5207FA}" dt="2025-06-03T14:29:55.721" v="195"/>
+          <ac:chgData name="Fatima Pillosu" userId="a6295d4dc9e22643" providerId="LiveId" clId="{C7909C26-7110-4B46-8F1C-97658D5207FA}" dt="2025-06-03T14:51:02.344" v="356" actId="1582"/>
           <ac:cxnSpMkLst>
             <pc:docMk/>
             <pc:sldMk cId="3354384854" sldId="256"/>
@@ -776,7 +776,7 @@
           </ac:cxnSpMkLst>
         </pc:cxnChg>
         <pc:cxnChg chg="add mod">
-          <ac:chgData name="Fatima Pillosu" userId="a6295d4dc9e22643" providerId="LiveId" clId="{C7909C26-7110-4B46-8F1C-97658D5207FA}" dt="2025-06-03T14:29:55.721" v="195"/>
+          <ac:chgData name="Fatima Pillosu" userId="a6295d4dc9e22643" providerId="LiveId" clId="{C7909C26-7110-4B46-8F1C-97658D5207FA}" dt="2025-06-03T14:51:02.344" v="356" actId="1582"/>
           <ac:cxnSpMkLst>
             <pc:docMk/>
             <pc:sldMk cId="3354384854" sldId="256"/>
@@ -784,7 +784,7 @@
           </ac:cxnSpMkLst>
         </pc:cxnChg>
         <pc:cxnChg chg="add mod">
-          <ac:chgData name="Fatima Pillosu" userId="a6295d4dc9e22643" providerId="LiveId" clId="{C7909C26-7110-4B46-8F1C-97658D5207FA}" dt="2025-06-03T14:29:55.721" v="195"/>
+          <ac:chgData name="Fatima Pillosu" userId="a6295d4dc9e22643" providerId="LiveId" clId="{C7909C26-7110-4B46-8F1C-97658D5207FA}" dt="2025-06-03T14:51:02.344" v="356" actId="1582"/>
           <ac:cxnSpMkLst>
             <pc:docMk/>
             <pc:sldMk cId="3354384854" sldId="256"/>
@@ -792,7 +792,7 @@
           </ac:cxnSpMkLst>
         </pc:cxnChg>
         <pc:cxnChg chg="add mod">
-          <ac:chgData name="Fatima Pillosu" userId="a6295d4dc9e22643" providerId="LiveId" clId="{C7909C26-7110-4B46-8F1C-97658D5207FA}" dt="2025-06-03T14:29:55.721" v="195"/>
+          <ac:chgData name="Fatima Pillosu" userId="a6295d4dc9e22643" providerId="LiveId" clId="{C7909C26-7110-4B46-8F1C-97658D5207FA}" dt="2025-06-03T14:50:48.624" v="354" actId="1582"/>
           <ac:cxnSpMkLst>
             <pc:docMk/>
             <pc:sldMk cId="3354384854" sldId="256"/>
@@ -800,7 +800,7 @@
           </ac:cxnSpMkLst>
         </pc:cxnChg>
         <pc:cxnChg chg="add mod">
-          <ac:chgData name="Fatima Pillosu" userId="a6295d4dc9e22643" providerId="LiveId" clId="{C7909C26-7110-4B46-8F1C-97658D5207FA}" dt="2025-06-03T14:29:55.721" v="195"/>
+          <ac:chgData name="Fatima Pillosu" userId="a6295d4dc9e22643" providerId="LiveId" clId="{C7909C26-7110-4B46-8F1C-97658D5207FA}" dt="2025-06-03T14:50:48.624" v="354" actId="1582"/>
           <ac:cxnSpMkLst>
             <pc:docMk/>
             <pc:sldMk cId="3354384854" sldId="256"/>
@@ -808,7 +808,7 @@
           </ac:cxnSpMkLst>
         </pc:cxnChg>
         <pc:cxnChg chg="add mod">
-          <ac:chgData name="Fatima Pillosu" userId="a6295d4dc9e22643" providerId="LiveId" clId="{C7909C26-7110-4B46-8F1C-97658D5207FA}" dt="2025-06-03T14:29:55.721" v="195"/>
+          <ac:chgData name="Fatima Pillosu" userId="a6295d4dc9e22643" providerId="LiveId" clId="{C7909C26-7110-4B46-8F1C-97658D5207FA}" dt="2025-06-03T14:50:48.624" v="354" actId="1582"/>
           <ac:cxnSpMkLst>
             <pc:docMk/>
             <pc:sldMk cId="3354384854" sldId="256"/>
@@ -816,7 +816,7 @@
           </ac:cxnSpMkLst>
         </pc:cxnChg>
         <pc:cxnChg chg="add mod">
-          <ac:chgData name="Fatima Pillosu" userId="a6295d4dc9e22643" providerId="LiveId" clId="{C7909C26-7110-4B46-8F1C-97658D5207FA}" dt="2025-06-03T14:29:55.721" v="195"/>
+          <ac:chgData name="Fatima Pillosu" userId="a6295d4dc9e22643" providerId="LiveId" clId="{C7909C26-7110-4B46-8F1C-97658D5207FA}" dt="2025-06-03T14:50:48.624" v="354" actId="1582"/>
           <ac:cxnSpMkLst>
             <pc:docMk/>
             <pc:sldMk cId="3354384854" sldId="256"/>
@@ -824,7 +824,7 @@
           </ac:cxnSpMkLst>
         </pc:cxnChg>
         <pc:cxnChg chg="add mod">
-          <ac:chgData name="Fatima Pillosu" userId="a6295d4dc9e22643" providerId="LiveId" clId="{C7909C26-7110-4B46-8F1C-97658D5207FA}" dt="2025-06-03T14:29:55.721" v="195"/>
+          <ac:chgData name="Fatima Pillosu" userId="a6295d4dc9e22643" providerId="LiveId" clId="{C7909C26-7110-4B46-8F1C-97658D5207FA}" dt="2025-06-03T14:50:48.624" v="354" actId="1582"/>
           <ac:cxnSpMkLst>
             <pc:docMk/>
             <pc:sldMk cId="3354384854" sldId="256"/>
@@ -832,7 +832,7 @@
           </ac:cxnSpMkLst>
         </pc:cxnChg>
         <pc:cxnChg chg="add mod">
-          <ac:chgData name="Fatima Pillosu" userId="a6295d4dc9e22643" providerId="LiveId" clId="{C7909C26-7110-4B46-8F1C-97658D5207FA}" dt="2025-06-03T14:29:55.721" v="195"/>
+          <ac:chgData name="Fatima Pillosu" userId="a6295d4dc9e22643" providerId="LiveId" clId="{C7909C26-7110-4B46-8F1C-97658D5207FA}" dt="2025-06-03T14:50:48.624" v="354" actId="1582"/>
           <ac:cxnSpMkLst>
             <pc:docMk/>
             <pc:sldMk cId="3354384854" sldId="256"/>
@@ -840,7 +840,7 @@
           </ac:cxnSpMkLst>
         </pc:cxnChg>
         <pc:cxnChg chg="add mod">
-          <ac:chgData name="Fatima Pillosu" userId="a6295d4dc9e22643" providerId="LiveId" clId="{C7909C26-7110-4B46-8F1C-97658D5207FA}" dt="2025-06-03T14:29:55.721" v="195"/>
+          <ac:chgData name="Fatima Pillosu" userId="a6295d4dc9e22643" providerId="LiveId" clId="{C7909C26-7110-4B46-8F1C-97658D5207FA}" dt="2025-06-03T14:50:48.624" v="354" actId="1582"/>
           <ac:cxnSpMkLst>
             <pc:docMk/>
             <pc:sldMk cId="3354384854" sldId="256"/>
@@ -848,7 +848,7 @@
           </ac:cxnSpMkLst>
         </pc:cxnChg>
         <pc:cxnChg chg="add mod">
-          <ac:chgData name="Fatima Pillosu" userId="a6295d4dc9e22643" providerId="LiveId" clId="{C7909C26-7110-4B46-8F1C-97658D5207FA}" dt="2025-06-03T14:29:55.721" v="195"/>
+          <ac:chgData name="Fatima Pillosu" userId="a6295d4dc9e22643" providerId="LiveId" clId="{C7909C26-7110-4B46-8F1C-97658D5207FA}" dt="2025-06-03T14:50:48.624" v="354" actId="1582"/>
           <ac:cxnSpMkLst>
             <pc:docMk/>
             <pc:sldMk cId="3354384854" sldId="256"/>
@@ -856,7 +856,7 @@
           </ac:cxnSpMkLst>
         </pc:cxnChg>
         <pc:cxnChg chg="add mod">
-          <ac:chgData name="Fatima Pillosu" userId="a6295d4dc9e22643" providerId="LiveId" clId="{C7909C26-7110-4B46-8F1C-97658D5207FA}" dt="2025-06-03T14:29:55.721" v="195"/>
+          <ac:chgData name="Fatima Pillosu" userId="a6295d4dc9e22643" providerId="LiveId" clId="{C7909C26-7110-4B46-8F1C-97658D5207FA}" dt="2025-06-03T14:50:48.624" v="354" actId="1582"/>
           <ac:cxnSpMkLst>
             <pc:docMk/>
             <pc:sldMk cId="3354384854" sldId="256"/>
@@ -864,7 +864,7 @@
           </ac:cxnSpMkLst>
         </pc:cxnChg>
         <pc:cxnChg chg="add mod">
-          <ac:chgData name="Fatima Pillosu" userId="a6295d4dc9e22643" providerId="LiveId" clId="{C7909C26-7110-4B46-8F1C-97658D5207FA}" dt="2025-06-03T14:29:55.721" v="195"/>
+          <ac:chgData name="Fatima Pillosu" userId="a6295d4dc9e22643" providerId="LiveId" clId="{C7909C26-7110-4B46-8F1C-97658D5207FA}" dt="2025-06-03T14:50:48.624" v="354" actId="1582"/>
           <ac:cxnSpMkLst>
             <pc:docMk/>
             <pc:sldMk cId="3354384854" sldId="256"/>
@@ -872,7 +872,7 @@
           </ac:cxnSpMkLst>
         </pc:cxnChg>
         <pc:cxnChg chg="add mod">
-          <ac:chgData name="Fatima Pillosu" userId="a6295d4dc9e22643" providerId="LiveId" clId="{C7909C26-7110-4B46-8F1C-97658D5207FA}" dt="2025-06-03T14:29:55.721" v="195"/>
+          <ac:chgData name="Fatima Pillosu" userId="a6295d4dc9e22643" providerId="LiveId" clId="{C7909C26-7110-4B46-8F1C-97658D5207FA}" dt="2025-06-03T14:50:48.624" v="354" actId="1582"/>
           <ac:cxnSpMkLst>
             <pc:docMk/>
             <pc:sldMk cId="3354384854" sldId="256"/>
@@ -880,7 +880,7 @@
           </ac:cxnSpMkLst>
         </pc:cxnChg>
         <pc:cxnChg chg="add mod">
-          <ac:chgData name="Fatima Pillosu" userId="a6295d4dc9e22643" providerId="LiveId" clId="{C7909C26-7110-4B46-8F1C-97658D5207FA}" dt="2025-06-03T14:29:55.721" v="195"/>
+          <ac:chgData name="Fatima Pillosu" userId="a6295d4dc9e22643" providerId="LiveId" clId="{C7909C26-7110-4B46-8F1C-97658D5207FA}" dt="2025-06-03T14:50:48.624" v="354" actId="1582"/>
           <ac:cxnSpMkLst>
             <pc:docMk/>
             <pc:sldMk cId="3354384854" sldId="256"/>
@@ -888,7 +888,7 @@
           </ac:cxnSpMkLst>
         </pc:cxnChg>
         <pc:cxnChg chg="add mod">
-          <ac:chgData name="Fatima Pillosu" userId="a6295d4dc9e22643" providerId="LiveId" clId="{C7909C26-7110-4B46-8F1C-97658D5207FA}" dt="2025-06-03T14:29:55.721" v="195"/>
+          <ac:chgData name="Fatima Pillosu" userId="a6295d4dc9e22643" providerId="LiveId" clId="{C7909C26-7110-4B46-8F1C-97658D5207FA}" dt="2025-06-03T14:50:48.624" v="354" actId="1582"/>
           <ac:cxnSpMkLst>
             <pc:docMk/>
             <pc:sldMk cId="3354384854" sldId="256"/>
@@ -904,7 +904,7 @@
           </ac:cxnSpMkLst>
         </pc:cxnChg>
         <pc:cxnChg chg="add mod">
-          <ac:chgData name="Fatima Pillosu" userId="a6295d4dc9e22643" providerId="LiveId" clId="{C7909C26-7110-4B46-8F1C-97658D5207FA}" dt="2025-06-03T14:29:55.721" v="195"/>
+          <ac:chgData name="Fatima Pillosu" userId="a6295d4dc9e22643" providerId="LiveId" clId="{C7909C26-7110-4B46-8F1C-97658D5207FA}" dt="2025-06-03T14:51:07.992" v="357" actId="693"/>
           <ac:cxnSpMkLst>
             <pc:docMk/>
             <pc:sldMk cId="3354384854" sldId="256"/>
@@ -912,7 +912,7 @@
           </ac:cxnSpMkLst>
         </pc:cxnChg>
         <pc:cxnChg chg="add mod">
-          <ac:chgData name="Fatima Pillosu" userId="a6295d4dc9e22643" providerId="LiveId" clId="{C7909C26-7110-4B46-8F1C-97658D5207FA}" dt="2025-06-03T14:29:55.721" v="195"/>
+          <ac:chgData name="Fatima Pillosu" userId="a6295d4dc9e22643" providerId="LiveId" clId="{C7909C26-7110-4B46-8F1C-97658D5207FA}" dt="2025-06-03T14:51:02.344" v="356" actId="1582"/>
           <ac:cxnSpMkLst>
             <pc:docMk/>
             <pc:sldMk cId="3354384854" sldId="256"/>
@@ -920,7 +920,7 @@
           </ac:cxnSpMkLst>
         </pc:cxnChg>
         <pc:cxnChg chg="add mod">
-          <ac:chgData name="Fatima Pillosu" userId="a6295d4dc9e22643" providerId="LiveId" clId="{C7909C26-7110-4B46-8F1C-97658D5207FA}" dt="2025-06-03T14:29:55.721" v="195"/>
+          <ac:chgData name="Fatima Pillosu" userId="a6295d4dc9e22643" providerId="LiveId" clId="{C7909C26-7110-4B46-8F1C-97658D5207FA}" dt="2025-06-03T14:51:02.344" v="356" actId="1582"/>
           <ac:cxnSpMkLst>
             <pc:docMk/>
             <pc:sldMk cId="3354384854" sldId="256"/>
@@ -928,7 +928,7 @@
           </ac:cxnSpMkLst>
         </pc:cxnChg>
         <pc:cxnChg chg="add mod">
-          <ac:chgData name="Fatima Pillosu" userId="a6295d4dc9e22643" providerId="LiveId" clId="{C7909C26-7110-4B46-8F1C-97658D5207FA}" dt="2025-06-03T14:29:55.721" v="195"/>
+          <ac:chgData name="Fatima Pillosu" userId="a6295d4dc9e22643" providerId="LiveId" clId="{C7909C26-7110-4B46-8F1C-97658D5207FA}" dt="2025-06-03T14:51:02.344" v="356" actId="1582"/>
           <ac:cxnSpMkLst>
             <pc:docMk/>
             <pc:sldMk cId="3354384854" sldId="256"/>
@@ -936,7 +936,7 @@
           </ac:cxnSpMkLst>
         </pc:cxnChg>
         <pc:cxnChg chg="add mod">
-          <ac:chgData name="Fatima Pillosu" userId="a6295d4dc9e22643" providerId="LiveId" clId="{C7909C26-7110-4B46-8F1C-97658D5207FA}" dt="2025-06-03T14:29:55.721" v="195"/>
+          <ac:chgData name="Fatima Pillosu" userId="a6295d4dc9e22643" providerId="LiveId" clId="{C7909C26-7110-4B46-8F1C-97658D5207FA}" dt="2025-06-03T14:51:02.344" v="356" actId="1582"/>
           <ac:cxnSpMkLst>
             <pc:docMk/>
             <pc:sldMk cId="3354384854" sldId="256"/>
@@ -944,7 +944,7 @@
           </ac:cxnSpMkLst>
         </pc:cxnChg>
         <pc:cxnChg chg="add mod">
-          <ac:chgData name="Fatima Pillosu" userId="a6295d4dc9e22643" providerId="LiveId" clId="{C7909C26-7110-4B46-8F1C-97658D5207FA}" dt="2025-06-03T14:29:55.721" v="195"/>
+          <ac:chgData name="Fatima Pillosu" userId="a6295d4dc9e22643" providerId="LiveId" clId="{C7909C26-7110-4B46-8F1C-97658D5207FA}" dt="2025-06-03T14:51:02.344" v="356" actId="1582"/>
           <ac:cxnSpMkLst>
             <pc:docMk/>
             <pc:sldMk cId="3354384854" sldId="256"/>
@@ -952,7 +952,7 @@
           </ac:cxnSpMkLst>
         </pc:cxnChg>
         <pc:cxnChg chg="add mod">
-          <ac:chgData name="Fatima Pillosu" userId="a6295d4dc9e22643" providerId="LiveId" clId="{C7909C26-7110-4B46-8F1C-97658D5207FA}" dt="2025-06-03T14:29:55.721" v="195"/>
+          <ac:chgData name="Fatima Pillosu" userId="a6295d4dc9e22643" providerId="LiveId" clId="{C7909C26-7110-4B46-8F1C-97658D5207FA}" dt="2025-06-03T14:51:02.344" v="356" actId="1582"/>
           <ac:cxnSpMkLst>
             <pc:docMk/>
             <pc:sldMk cId="3354384854" sldId="256"/>
@@ -5094,7 +5094,7 @@
             <a:avLst/>
           </a:prstGeom>
           <a:noFill/>
-          <a:ln w="3175">
+          <a:ln w="6350">
             <a:solidFill>
               <a:schemeClr val="tx1">
                 <a:lumMod val="75000"/>
@@ -5158,7 +5158,7 @@
             <a:avLst/>
           </a:prstGeom>
           <a:noFill/>
-          <a:ln w="3175">
+          <a:ln w="6350">
             <a:solidFill>
               <a:schemeClr val="tx1">
                 <a:lumMod val="75000"/>
@@ -5222,7 +5222,7 @@
             <a:avLst/>
           </a:prstGeom>
           <a:noFill/>
-          <a:ln w="3175">
+          <a:ln w="6350">
             <a:solidFill>
               <a:schemeClr val="tx1">
                 <a:lumMod val="75000"/>
@@ -5286,7 +5286,7 @@
             <a:avLst/>
           </a:prstGeom>
           <a:noFill/>
-          <a:ln w="3175">
+          <a:ln w="6350">
             <a:solidFill>
               <a:schemeClr val="tx1">
                 <a:lumMod val="75000"/>
@@ -5350,7 +5350,7 @@
             <a:avLst/>
           </a:prstGeom>
           <a:noFill/>
-          <a:ln w="3175">
+          <a:ln w="6350">
             <a:solidFill>
               <a:schemeClr val="tx1">
                 <a:lumMod val="75000"/>
@@ -5414,7 +5414,7 @@
             <a:avLst/>
           </a:prstGeom>
           <a:noFill/>
-          <a:ln w="3175">
+          <a:ln w="6350">
             <a:solidFill>
               <a:schemeClr val="tx1">
                 <a:lumMod val="75000"/>
@@ -6013,14 +6013,14 @@
           <a:prstGeom prst="line">
             <a:avLst/>
           </a:prstGeom>
-          <a:ln w="12700">
+          <a:ln w="9525">
             <a:solidFill>
               <a:schemeClr val="tx1">
                 <a:lumMod val="75000"/>
                 <a:lumOff val="25000"/>
               </a:schemeClr>
             </a:solidFill>
-            <a:prstDash val="sysDot"/>
+            <a:prstDash val="dash"/>
           </a:ln>
         </p:spPr>
         <p:style>
@@ -6060,14 +6060,14 @@
           <a:prstGeom prst="line">
             <a:avLst/>
           </a:prstGeom>
-          <a:ln w="12700">
+          <a:ln w="9525">
             <a:solidFill>
               <a:schemeClr val="tx1">
                 <a:lumMod val="75000"/>
                 <a:lumOff val="25000"/>
               </a:schemeClr>
             </a:solidFill>
-            <a:prstDash val="sysDot"/>
+            <a:prstDash val="dash"/>
           </a:ln>
         </p:spPr>
         <p:style>
@@ -6107,14 +6107,14 @@
           <a:prstGeom prst="line">
             <a:avLst/>
           </a:prstGeom>
-          <a:ln w="12700">
+          <a:ln w="9525">
             <a:solidFill>
               <a:schemeClr val="tx1">
                 <a:lumMod val="75000"/>
                 <a:lumOff val="25000"/>
               </a:schemeClr>
             </a:solidFill>
-            <a:prstDash val="sysDot"/>
+            <a:prstDash val="dash"/>
             <a:headEnd type="triangle" w="sm" len="sm"/>
             <a:tailEnd type="none" w="med" len="med"/>
           </a:ln>
@@ -6156,7 +6156,7 @@
           <a:prstGeom prst="straightConnector1">
             <a:avLst/>
           </a:prstGeom>
-          <a:ln w="3175">
+          <a:ln w="6350">
             <a:solidFill>
               <a:schemeClr val="tx1">
                 <a:lumMod val="50000"/>
@@ -6203,7 +6203,7 @@
           <a:prstGeom prst="straightConnector1">
             <a:avLst/>
           </a:prstGeom>
-          <a:ln w="3175">
+          <a:ln w="6350">
             <a:solidFill>
               <a:schemeClr val="tx1">
                 <a:lumMod val="50000"/>
@@ -6250,7 +6250,7 @@
           <a:prstGeom prst="straightConnector1">
             <a:avLst/>
           </a:prstGeom>
-          <a:ln w="3175">
+          <a:ln w="6350">
             <a:solidFill>
               <a:schemeClr val="tx1">
                 <a:lumMod val="50000"/>
@@ -6295,7 +6295,7 @@
           <a:prstGeom prst="straightConnector1">
             <a:avLst/>
           </a:prstGeom>
-          <a:ln w="3175">
+          <a:ln w="6350">
             <a:solidFill>
               <a:schemeClr val="tx1">
                 <a:lumMod val="50000"/>
@@ -6342,7 +6342,7 @@
           <a:prstGeom prst="straightConnector1">
             <a:avLst/>
           </a:prstGeom>
-          <a:ln w="3175">
+          <a:ln w="6350">
             <a:solidFill>
               <a:schemeClr val="tx1">
                 <a:lumMod val="50000"/>
@@ -6389,7 +6389,7 @@
           <a:prstGeom prst="straightConnector1">
             <a:avLst/>
           </a:prstGeom>
-          <a:ln w="3175">
+          <a:ln w="6350">
             <a:solidFill>
               <a:schemeClr val="tx1">
                 <a:lumMod val="50000"/>
@@ -6436,7 +6436,7 @@
           <a:prstGeom prst="straightConnector1">
             <a:avLst/>
           </a:prstGeom>
-          <a:ln w="3175">
+          <a:ln w="6350">
             <a:solidFill>
               <a:schemeClr val="tx1">
                 <a:lumMod val="50000"/>
@@ -6483,7 +6483,7 @@
           <a:prstGeom prst="straightConnector1">
             <a:avLst/>
           </a:prstGeom>
-          <a:ln w="3175">
+          <a:ln w="6350">
             <a:solidFill>
               <a:schemeClr val="tx1">
                 <a:lumMod val="50000"/>
@@ -6528,7 +6528,7 @@
           <a:prstGeom prst="line">
             <a:avLst/>
           </a:prstGeom>
-          <a:ln w="3175">
+          <a:ln w="6350">
             <a:solidFill>
               <a:schemeClr val="tx1">
                 <a:lumMod val="75000"/>
@@ -6574,7 +6574,7 @@
           <a:prstGeom prst="line">
             <a:avLst/>
           </a:prstGeom>
-          <a:ln w="3175">
+          <a:ln w="6350">
             <a:solidFill>
               <a:schemeClr val="tx1">
                 <a:lumMod val="75000"/>
@@ -6620,7 +6620,7 @@
           <a:prstGeom prst="line">
             <a:avLst/>
           </a:prstGeom>
-          <a:ln w="3175">
+          <a:ln w="6350">
             <a:solidFill>
               <a:schemeClr val="tx1">
                 <a:lumMod val="75000"/>
@@ -6666,7 +6666,7 @@
           <a:prstGeom prst="line">
             <a:avLst/>
           </a:prstGeom>
-          <a:ln w="3175">
+          <a:ln w="6350">
             <a:solidFill>
               <a:schemeClr val="tx1">
                 <a:lumMod val="75000"/>
@@ -6712,7 +6712,7 @@
           <a:prstGeom prst="straightConnector1">
             <a:avLst/>
           </a:prstGeom>
-          <a:ln w="3175">
+          <a:ln w="6350">
             <a:solidFill>
               <a:schemeClr val="tx1">
                 <a:lumMod val="50000"/>
@@ -6940,7 +6940,7 @@
                 <a:lumOff val="25000"/>
               </a:schemeClr>
             </a:solidFill>
-            <a:prstDash val="sysDot"/>
+            <a:prstDash val="dash"/>
             <a:headEnd type="triangle" w="med" len="med"/>
             <a:tailEnd type="none" w="med" len="med"/>
           </a:ln>
@@ -7573,14 +7573,14 @@
           <a:prstGeom prst="line">
             <a:avLst/>
           </a:prstGeom>
-          <a:ln w="12700">
+          <a:ln w="9525">
             <a:solidFill>
               <a:schemeClr val="tx1">
                 <a:lumMod val="75000"/>
                 <a:lumOff val="25000"/>
               </a:schemeClr>
             </a:solidFill>
-            <a:prstDash val="sysDot"/>
+            <a:prstDash val="dash"/>
           </a:ln>
         </p:spPr>
         <p:style>
@@ -7620,14 +7620,14 @@
           <a:prstGeom prst="line">
             <a:avLst/>
           </a:prstGeom>
-          <a:ln w="12700">
+          <a:ln w="9525">
             <a:solidFill>
               <a:schemeClr val="tx1">
                 <a:lumMod val="75000"/>
                 <a:lumOff val="25000"/>
               </a:schemeClr>
             </a:solidFill>
-            <a:prstDash val="sysDot"/>
+            <a:prstDash val="dash"/>
           </a:ln>
         </p:spPr>
         <p:style>
@@ -7667,14 +7667,14 @@
           <a:prstGeom prst="line">
             <a:avLst/>
           </a:prstGeom>
-          <a:ln w="12700">
+          <a:ln w="9525">
             <a:solidFill>
               <a:schemeClr val="tx1">
                 <a:lumMod val="75000"/>
                 <a:lumOff val="25000"/>
               </a:schemeClr>
             </a:solidFill>
-            <a:prstDash val="sysDot"/>
+            <a:prstDash val="dash"/>
             <a:headEnd type="triangle" w="sm" len="sm"/>
             <a:tailEnd type="none" w="med" len="med"/>
           </a:ln>
@@ -7716,14 +7716,14 @@
           <a:prstGeom prst="line">
             <a:avLst/>
           </a:prstGeom>
-          <a:ln w="12700">
+          <a:ln w="9525">
             <a:solidFill>
               <a:schemeClr val="tx1">
                 <a:lumMod val="75000"/>
                 <a:lumOff val="25000"/>
               </a:schemeClr>
             </a:solidFill>
-            <a:prstDash val="sysDot"/>
+            <a:prstDash val="dash"/>
           </a:ln>
         </p:spPr>
         <p:style>
@@ -7763,14 +7763,14 @@
           <a:prstGeom prst="line">
             <a:avLst/>
           </a:prstGeom>
-          <a:ln w="12700">
+          <a:ln w="9525">
             <a:solidFill>
               <a:schemeClr val="tx1">
                 <a:lumMod val="75000"/>
                 <a:lumOff val="25000"/>
               </a:schemeClr>
             </a:solidFill>
-            <a:prstDash val="sysDot"/>
+            <a:prstDash val="dash"/>
           </a:ln>
         </p:spPr>
         <p:style>
@@ -7810,14 +7810,14 @@
           <a:prstGeom prst="line">
             <a:avLst/>
           </a:prstGeom>
-          <a:ln w="12700">
+          <a:ln w="9525">
             <a:solidFill>
               <a:schemeClr val="tx1">
                 <a:lumMod val="75000"/>
                 <a:lumOff val="25000"/>
               </a:schemeClr>
             </a:solidFill>
-            <a:prstDash val="sysDot"/>
+            <a:prstDash val="dash"/>
             <a:headEnd type="triangle" w="sm" len="sm"/>
             <a:tailEnd type="none" w="med" len="med"/>
           </a:ln>

</xml_diff>

<commit_message>
Improved road map for thesis
</commit_message>
<xml_diff>
--- a/chapter_01/figures/thesis_roadmap.pptx
+++ b/chapter_01/figures/thesis_roadmap.pptx
@@ -115,7 +115,7 @@
 <file path=ppt/revisionInfo.xml><?xml version="1.0" encoding="utf-8"?>
 <p1510:revInfo xmlns:a="http://schemas.openxmlformats.org/drawingml/2006/main" xmlns:r="http://schemas.openxmlformats.org/officeDocument/2006/relationships" xmlns:p1510="http://schemas.microsoft.com/office/powerpoint/2015/10/main">
   <p1510:revLst>
-    <p1510:client id="{C7909C26-7110-4B46-8F1C-97658D5207FA}" v="8" dt="2025-06-03T15:30:18.539"/>
+    <p1510:client id="{C7909C26-7110-4B46-8F1C-97658D5207FA}" v="10" dt="2025-06-03T15:34:15.181"/>
   </p1510:revLst>
 </p1510:revInfo>
 </file>
@@ -125,12 +125,12 @@
   <pc:docChgLst>
     <pc:chgData name="Fatima Pillosu" userId="a6295d4dc9e22643" providerId="LiveId" clId="{C7909C26-7110-4B46-8F1C-97658D5207FA}"/>
     <pc:docChg chg="undo custSel modSld">
-      <pc:chgData name="Fatima Pillosu" userId="a6295d4dc9e22643" providerId="LiveId" clId="{C7909C26-7110-4B46-8F1C-97658D5207FA}" dt="2025-06-03T15:30:59.122" v="1118" actId="20577"/>
+      <pc:chgData name="Fatima Pillosu" userId="a6295d4dc9e22643" providerId="LiveId" clId="{C7909C26-7110-4B46-8F1C-97658D5207FA}" dt="2025-06-03T15:34:39.035" v="1133" actId="1035"/>
       <pc:docMkLst>
         <pc:docMk/>
       </pc:docMkLst>
       <pc:sldChg chg="addSp delSp modSp mod">
-        <pc:chgData name="Fatima Pillosu" userId="a6295d4dc9e22643" providerId="LiveId" clId="{C7909C26-7110-4B46-8F1C-97658D5207FA}" dt="2025-06-03T15:30:59.122" v="1118" actId="20577"/>
+        <pc:chgData name="Fatima Pillosu" userId="a6295d4dc9e22643" providerId="LiveId" clId="{C7909C26-7110-4B46-8F1C-97658D5207FA}" dt="2025-06-03T15:34:39.035" v="1133" actId="1035"/>
         <pc:sldMkLst>
           <pc:docMk/>
           <pc:sldMk cId="3354384854" sldId="256"/>
@@ -1304,11 +1304,19 @@
           </ac:spMkLst>
         </pc:spChg>
         <pc:spChg chg="add mod">
-          <ac:chgData name="Fatima Pillosu" userId="a6295d4dc9e22643" providerId="LiveId" clId="{C7909C26-7110-4B46-8F1C-97658D5207FA}" dt="2025-06-03T15:30:18.539" v="1116"/>
+          <ac:chgData name="Fatima Pillosu" userId="a6295d4dc9e22643" providerId="LiveId" clId="{C7909C26-7110-4B46-8F1C-97658D5207FA}" dt="2025-06-03T15:33:34.535" v="1120" actId="12789"/>
           <ac:spMkLst>
             <pc:docMk/>
             <pc:sldMk cId="3354384854" sldId="256"/>
             <ac:spMk id="588" creationId="{BBB0BE85-86B1-0751-AF3F-838269DDC230}"/>
+          </ac:spMkLst>
+        </pc:spChg>
+        <pc:spChg chg="add mod">
+          <ac:chgData name="Fatima Pillosu" userId="a6295d4dc9e22643" providerId="LiveId" clId="{C7909C26-7110-4B46-8F1C-97658D5207FA}" dt="2025-06-03T15:33:40.932" v="1121" actId="12789"/>
+          <ac:spMkLst>
+            <pc:docMk/>
+            <pc:sldMk cId="3354384854" sldId="256"/>
+            <ac:spMk id="589" creationId="{99B61BA9-5A6C-532C-7917-89D64FACAECA}"/>
           </ac:spMkLst>
         </pc:spChg>
         <pc:spChg chg="add mod">
@@ -1316,7 +1324,7 @@
           <ac:spMkLst>
             <pc:docMk/>
             <pc:sldMk cId="3354384854" sldId="256"/>
-            <ac:spMk id="589" creationId="{99B61BA9-5A6C-532C-7917-89D64FACAECA}"/>
+            <ac:spMk id="590" creationId="{CAE0B206-AF54-54F2-0C06-284B40BCBB6F}"/>
           </ac:spMkLst>
         </pc:spChg>
         <pc:spChg chg="add mod">
@@ -1324,7 +1332,7 @@
           <ac:spMkLst>
             <pc:docMk/>
             <pc:sldMk cId="3354384854" sldId="256"/>
-            <ac:spMk id="590" creationId="{CAE0B206-AF54-54F2-0C06-284B40BCBB6F}"/>
+            <ac:spMk id="591" creationId="{8AAEA69B-D0DC-C7F0-7B11-C6A20FF94F80}"/>
           </ac:spMkLst>
         </pc:spChg>
         <pc:spChg chg="add mod">
@@ -1332,7 +1340,7 @@
           <ac:spMkLst>
             <pc:docMk/>
             <pc:sldMk cId="3354384854" sldId="256"/>
-            <ac:spMk id="591" creationId="{8AAEA69B-D0DC-C7F0-7B11-C6A20FF94F80}"/>
+            <ac:spMk id="592" creationId="{2699F84C-B158-D9B1-8BAF-E590BCED4FB6}"/>
           </ac:spMkLst>
         </pc:spChg>
         <pc:spChg chg="add mod">
@@ -1340,7 +1348,23 @@
           <ac:spMkLst>
             <pc:docMk/>
             <pc:sldMk cId="3354384854" sldId="256"/>
-            <ac:spMk id="592" creationId="{2699F84C-B158-D9B1-8BAF-E590BCED4FB6}"/>
+            <ac:spMk id="593" creationId="{8A2E91B1-BBB4-1F54-4FCE-C1F6724BE292}"/>
+          </ac:spMkLst>
+        </pc:spChg>
+        <pc:spChg chg="add mod">
+          <ac:chgData name="Fatima Pillosu" userId="a6295d4dc9e22643" providerId="LiveId" clId="{C7909C26-7110-4B46-8F1C-97658D5207FA}" dt="2025-06-03T15:33:34.535" v="1120" actId="12789"/>
+          <ac:spMkLst>
+            <pc:docMk/>
+            <pc:sldMk cId="3354384854" sldId="256"/>
+            <ac:spMk id="594" creationId="{E60B5C00-F1F7-FD1D-ABEF-8F5EF5D717FE}"/>
+          </ac:spMkLst>
+        </pc:spChg>
+        <pc:spChg chg="add mod">
+          <ac:chgData name="Fatima Pillosu" userId="a6295d4dc9e22643" providerId="LiveId" clId="{C7909C26-7110-4B46-8F1C-97658D5207FA}" dt="2025-06-03T15:33:40.932" v="1121" actId="12789"/>
+          <ac:spMkLst>
+            <pc:docMk/>
+            <pc:sldMk cId="3354384854" sldId="256"/>
+            <ac:spMk id="595" creationId="{19EA9AC9-6E95-FB84-F5C5-ADD045519CA4}"/>
           </ac:spMkLst>
         </pc:spChg>
         <pc:spChg chg="add mod">
@@ -1348,7 +1372,7 @@
           <ac:spMkLst>
             <pc:docMk/>
             <pc:sldMk cId="3354384854" sldId="256"/>
-            <ac:spMk id="593" creationId="{8A2E91B1-BBB4-1F54-4FCE-C1F6724BE292}"/>
+            <ac:spMk id="596" creationId="{71BBF894-591D-8866-B2B1-0C8C1F6E802C}"/>
           </ac:spMkLst>
         </pc:spChg>
         <pc:spChg chg="add mod">
@@ -1356,7 +1380,7 @@
           <ac:spMkLst>
             <pc:docMk/>
             <pc:sldMk cId="3354384854" sldId="256"/>
-            <ac:spMk id="594" creationId="{E60B5C00-F1F7-FD1D-ABEF-8F5EF5D717FE}"/>
+            <ac:spMk id="597" creationId="{A9A7A549-413C-B305-70B8-0753E06B399D}"/>
           </ac:spMkLst>
         </pc:spChg>
         <pc:spChg chg="add mod">
@@ -1364,7 +1388,7 @@
           <ac:spMkLst>
             <pc:docMk/>
             <pc:sldMk cId="3354384854" sldId="256"/>
-            <ac:spMk id="595" creationId="{19EA9AC9-6E95-FB84-F5C5-ADD045519CA4}"/>
+            <ac:spMk id="598" creationId="{6BE65441-4EEE-E468-5441-5FEB4D450CFE}"/>
           </ac:spMkLst>
         </pc:spChg>
         <pc:spChg chg="add mod">
@@ -1372,7 +1396,7 @@
           <ac:spMkLst>
             <pc:docMk/>
             <pc:sldMk cId="3354384854" sldId="256"/>
-            <ac:spMk id="596" creationId="{71BBF894-591D-8866-B2B1-0C8C1F6E802C}"/>
+            <ac:spMk id="600" creationId="{1146D79A-EC07-3CEF-454B-CD796D474073}"/>
           </ac:spMkLst>
         </pc:spChg>
         <pc:spChg chg="add mod">
@@ -1380,7 +1404,7 @@
           <ac:spMkLst>
             <pc:docMk/>
             <pc:sldMk cId="3354384854" sldId="256"/>
-            <ac:spMk id="597" creationId="{A9A7A549-413C-B305-70B8-0753E06B399D}"/>
+            <ac:spMk id="602" creationId="{AD491ADF-E96D-E422-C79F-9D802C0D8C5C}"/>
           </ac:spMkLst>
         </pc:spChg>
         <pc:spChg chg="add mod">
@@ -1388,7 +1412,31 @@
           <ac:spMkLst>
             <pc:docMk/>
             <pc:sldMk cId="3354384854" sldId="256"/>
-            <ac:spMk id="598" creationId="{6BE65441-4EEE-E468-5441-5FEB4D450CFE}"/>
+            <ac:spMk id="604" creationId="{B5AD376D-9072-BDE5-112F-1804EA806BB6}"/>
+          </ac:spMkLst>
+        </pc:spChg>
+        <pc:spChg chg="add del mod">
+          <ac:chgData name="Fatima Pillosu" userId="a6295d4dc9e22643" providerId="LiveId" clId="{C7909C26-7110-4B46-8F1C-97658D5207FA}" dt="2025-06-03T15:33:05.405" v="1119" actId="478"/>
+          <ac:spMkLst>
+            <pc:docMk/>
+            <pc:sldMk cId="3354384854" sldId="256"/>
+            <ac:spMk id="621" creationId="{44B43C6B-856A-F735-F6AD-A1D88D172028}"/>
+          </ac:spMkLst>
+        </pc:spChg>
+        <pc:spChg chg="add mod">
+          <ac:chgData name="Fatima Pillosu" userId="a6295d4dc9e22643" providerId="LiveId" clId="{C7909C26-7110-4B46-8F1C-97658D5207FA}" dt="2025-06-03T15:34:39.035" v="1133" actId="1035"/>
+          <ac:spMkLst>
+            <pc:docMk/>
+            <pc:sldMk cId="3354384854" sldId="256"/>
+            <ac:spMk id="623" creationId="{B1334220-28E2-C9A1-20DB-0960856A01C1}"/>
+          </ac:spMkLst>
+        </pc:spChg>
+        <pc:spChg chg="add mod">
+          <ac:chgData name="Fatima Pillosu" userId="a6295d4dc9e22643" providerId="LiveId" clId="{C7909C26-7110-4B46-8F1C-97658D5207FA}" dt="2025-06-03T15:34:39.035" v="1133" actId="1035"/>
+          <ac:spMkLst>
+            <pc:docMk/>
+            <pc:sldMk cId="3354384854" sldId="256"/>
+            <ac:spMk id="625" creationId="{163F56E9-414E-9452-9860-C8D28A72FBE6}"/>
           </ac:spMkLst>
         </pc:spChg>
         <pc:spChg chg="add mod">
@@ -1396,7 +1444,7 @@
           <ac:spMkLst>
             <pc:docMk/>
             <pc:sldMk cId="3354384854" sldId="256"/>
-            <ac:spMk id="600" creationId="{1146D79A-EC07-3CEF-454B-CD796D474073}"/>
+            <ac:spMk id="626" creationId="{45A669CA-93F7-26B4-4327-1BF3D3C31A5A}"/>
           </ac:spMkLst>
         </pc:spChg>
         <pc:spChg chg="add mod">
@@ -1404,7 +1452,7 @@
           <ac:spMkLst>
             <pc:docMk/>
             <pc:sldMk cId="3354384854" sldId="256"/>
-            <ac:spMk id="602" creationId="{AD491ADF-E96D-E422-C79F-9D802C0D8C5C}"/>
+            <ac:spMk id="627" creationId="{F7316CE7-8C2E-BB48-C6B9-2CA089A07966}"/>
           </ac:spMkLst>
         </pc:spChg>
         <pc:spChg chg="add mod">
@@ -1412,7 +1460,7 @@
           <ac:spMkLst>
             <pc:docMk/>
             <pc:sldMk cId="3354384854" sldId="256"/>
-            <ac:spMk id="604" creationId="{B5AD376D-9072-BDE5-112F-1804EA806BB6}"/>
+            <ac:spMk id="628" creationId="{2574031C-A47A-178A-A062-EA116F8846DD}"/>
           </ac:spMkLst>
         </pc:spChg>
         <pc:spChg chg="add mod">
@@ -1420,7 +1468,7 @@
           <ac:spMkLst>
             <pc:docMk/>
             <pc:sldMk cId="3354384854" sldId="256"/>
-            <ac:spMk id="621" creationId="{44B43C6B-856A-F735-F6AD-A1D88D172028}"/>
+            <ac:spMk id="629" creationId="{A113BE4A-E9EA-9093-C6C1-3A906173B618}"/>
           </ac:spMkLst>
         </pc:spChg>
         <pc:spChg chg="add mod">
@@ -1428,7 +1476,7 @@
           <ac:spMkLst>
             <pc:docMk/>
             <pc:sldMk cId="3354384854" sldId="256"/>
-            <ac:spMk id="623" creationId="{B1334220-28E2-C9A1-20DB-0960856A01C1}"/>
+            <ac:spMk id="630" creationId="{8AF39566-0332-086B-0C44-7819D8974EBD}"/>
           </ac:spMkLst>
         </pc:spChg>
         <pc:spChg chg="add mod">
@@ -1436,7 +1484,7 @@
           <ac:spMkLst>
             <pc:docMk/>
             <pc:sldMk cId="3354384854" sldId="256"/>
-            <ac:spMk id="625" creationId="{163F56E9-414E-9452-9860-C8D28A72FBE6}"/>
+            <ac:spMk id="631" creationId="{FAC45779-73B6-302A-19A8-FAE3737E50E7}"/>
           </ac:spMkLst>
         </pc:spChg>
         <pc:spChg chg="add mod">
@@ -1444,73 +1492,41 @@
           <ac:spMkLst>
             <pc:docMk/>
             <pc:sldMk cId="3354384854" sldId="256"/>
-            <ac:spMk id="626" creationId="{45A669CA-93F7-26B4-4327-1BF3D3C31A5A}"/>
+            <ac:spMk id="632" creationId="{0FF3C3A6-BA87-1DE0-8CFA-1EB270D68A54}"/>
           </ac:spMkLst>
         </pc:spChg>
         <pc:spChg chg="add mod">
-          <ac:chgData name="Fatima Pillosu" userId="a6295d4dc9e22643" providerId="LiveId" clId="{C7909C26-7110-4B46-8F1C-97658D5207FA}" dt="2025-06-03T15:30:18.539" v="1116"/>
-          <ac:spMkLst>
-            <pc:docMk/>
-            <pc:sldMk cId="3354384854" sldId="256"/>
-            <ac:spMk id="627" creationId="{F7316CE7-8C2E-BB48-C6B9-2CA089A07966}"/>
+          <ac:chgData name="Fatima Pillosu" userId="a6295d4dc9e22643" providerId="LiveId" clId="{C7909C26-7110-4B46-8F1C-97658D5207FA}" dt="2025-06-03T15:33:34.535" v="1120" actId="12789"/>
+          <ac:spMkLst>
+            <pc:docMk/>
+            <pc:sldMk cId="3354384854" sldId="256"/>
+            <ac:spMk id="633" creationId="{9DA24193-322E-D46A-6095-515BAD183A85}"/>
           </ac:spMkLst>
         </pc:spChg>
         <pc:spChg chg="add mod">
-          <ac:chgData name="Fatima Pillosu" userId="a6295d4dc9e22643" providerId="LiveId" clId="{C7909C26-7110-4B46-8F1C-97658D5207FA}" dt="2025-06-03T15:30:18.539" v="1116"/>
-          <ac:spMkLst>
-            <pc:docMk/>
-            <pc:sldMk cId="3354384854" sldId="256"/>
-            <ac:spMk id="628" creationId="{2574031C-A47A-178A-A062-EA116F8846DD}"/>
-          </ac:spMkLst>
-        </pc:spChg>
-        <pc:spChg chg="add mod">
-          <ac:chgData name="Fatima Pillosu" userId="a6295d4dc9e22643" providerId="LiveId" clId="{C7909C26-7110-4B46-8F1C-97658D5207FA}" dt="2025-06-03T15:30:18.539" v="1116"/>
-          <ac:spMkLst>
-            <pc:docMk/>
-            <pc:sldMk cId="3354384854" sldId="256"/>
-            <ac:spMk id="629" creationId="{A113BE4A-E9EA-9093-C6C1-3A906173B618}"/>
-          </ac:spMkLst>
-        </pc:spChg>
-        <pc:spChg chg="add mod">
-          <ac:chgData name="Fatima Pillosu" userId="a6295d4dc9e22643" providerId="LiveId" clId="{C7909C26-7110-4B46-8F1C-97658D5207FA}" dt="2025-06-03T15:30:18.539" v="1116"/>
-          <ac:spMkLst>
-            <pc:docMk/>
-            <pc:sldMk cId="3354384854" sldId="256"/>
-            <ac:spMk id="630" creationId="{8AF39566-0332-086B-0C44-7819D8974EBD}"/>
-          </ac:spMkLst>
-        </pc:spChg>
-        <pc:spChg chg="add mod">
-          <ac:chgData name="Fatima Pillosu" userId="a6295d4dc9e22643" providerId="LiveId" clId="{C7909C26-7110-4B46-8F1C-97658D5207FA}" dt="2025-06-03T15:30:18.539" v="1116"/>
-          <ac:spMkLst>
-            <pc:docMk/>
-            <pc:sldMk cId="3354384854" sldId="256"/>
-            <ac:spMk id="631" creationId="{FAC45779-73B6-302A-19A8-FAE3737E50E7}"/>
-          </ac:spMkLst>
-        </pc:spChg>
-        <pc:spChg chg="add mod">
-          <ac:chgData name="Fatima Pillosu" userId="a6295d4dc9e22643" providerId="LiveId" clId="{C7909C26-7110-4B46-8F1C-97658D5207FA}" dt="2025-06-03T15:30:18.539" v="1116"/>
-          <ac:spMkLst>
-            <pc:docMk/>
-            <pc:sldMk cId="3354384854" sldId="256"/>
-            <ac:spMk id="632" creationId="{0FF3C3A6-BA87-1DE0-8CFA-1EB270D68A54}"/>
-          </ac:spMkLst>
-        </pc:spChg>
-        <pc:spChg chg="add mod">
-          <ac:chgData name="Fatima Pillosu" userId="a6295d4dc9e22643" providerId="LiveId" clId="{C7909C26-7110-4B46-8F1C-97658D5207FA}" dt="2025-06-03T15:30:18.539" v="1116"/>
-          <ac:spMkLst>
-            <pc:docMk/>
-            <pc:sldMk cId="3354384854" sldId="256"/>
-            <ac:spMk id="633" creationId="{9DA24193-322E-D46A-6095-515BAD183A85}"/>
-          </ac:spMkLst>
-        </pc:spChg>
-        <pc:spChg chg="add mod">
-          <ac:chgData name="Fatima Pillosu" userId="a6295d4dc9e22643" providerId="LiveId" clId="{C7909C26-7110-4B46-8F1C-97658D5207FA}" dt="2025-06-03T15:30:18.539" v="1116"/>
+          <ac:chgData name="Fatima Pillosu" userId="a6295d4dc9e22643" providerId="LiveId" clId="{C7909C26-7110-4B46-8F1C-97658D5207FA}" dt="2025-06-03T15:33:40.932" v="1121" actId="12789"/>
           <ac:spMkLst>
             <pc:docMk/>
             <pc:sldMk cId="3354384854" sldId="256"/>
             <ac:spMk id="634" creationId="{166EA424-2B97-DBF1-1D22-87CF3A64C146}"/>
           </ac:spMkLst>
         </pc:spChg>
+        <pc:cxnChg chg="add mod">
+          <ac:chgData name="Fatima Pillosu" userId="a6295d4dc9e22643" providerId="LiveId" clId="{C7909C26-7110-4B46-8F1C-97658D5207FA}" dt="2025-06-03T15:34:13.914" v="1126" actId="1582"/>
+          <ac:cxnSpMkLst>
+            <pc:docMk/>
+            <pc:sldMk cId="3354384854" sldId="256"/>
+            <ac:cxnSpMk id="2" creationId="{C3617998-F352-C21B-76BA-7CE607336375}"/>
+          </ac:cxnSpMkLst>
+        </pc:cxnChg>
+        <pc:cxnChg chg="add mod">
+          <ac:chgData name="Fatima Pillosu" userId="a6295d4dc9e22643" providerId="LiveId" clId="{C7909C26-7110-4B46-8F1C-97658D5207FA}" dt="2025-06-03T15:34:24.664" v="1130" actId="14100"/>
+          <ac:cxnSpMkLst>
+            <pc:docMk/>
+            <pc:sldMk cId="3354384854" sldId="256"/>
+            <ac:cxnSpMk id="4" creationId="{019FE13D-B077-2A14-975A-4A5BD5828F54}"/>
+          </ac:cxnSpMkLst>
+        </pc:cxnChg>
         <pc:cxnChg chg="del mod">
           <ac:chgData name="Fatima Pillosu" userId="a6295d4dc9e22643" providerId="LiveId" clId="{C7909C26-7110-4B46-8F1C-97658D5207FA}" dt="2025-06-03T14:29:40.527" v="194" actId="21"/>
           <ac:cxnSpMkLst>
@@ -2552,7 +2568,7 @@
           </ac:cxnSpMkLst>
         </pc:cxnChg>
         <pc:cxnChg chg="add mod">
-          <ac:chgData name="Fatima Pillosu" userId="a6295d4dc9e22643" providerId="LiveId" clId="{C7909C26-7110-4B46-8F1C-97658D5207FA}" dt="2025-06-03T15:30:18.539" v="1116"/>
+          <ac:chgData name="Fatima Pillosu" userId="a6295d4dc9e22643" providerId="LiveId" clId="{C7909C26-7110-4B46-8F1C-97658D5207FA}" dt="2025-06-03T15:34:39.035" v="1133" actId="1035"/>
           <ac:cxnSpMkLst>
             <pc:docMk/>
             <pc:sldMk cId="3354384854" sldId="256"/>
@@ -2560,7 +2576,7 @@
           </ac:cxnSpMkLst>
         </pc:cxnChg>
         <pc:cxnChg chg="add mod">
-          <ac:chgData name="Fatima Pillosu" userId="a6295d4dc9e22643" providerId="LiveId" clId="{C7909C26-7110-4B46-8F1C-97658D5207FA}" dt="2025-06-03T15:30:18.539" v="1116"/>
+          <ac:chgData name="Fatima Pillosu" userId="a6295d4dc9e22643" providerId="LiveId" clId="{C7909C26-7110-4B46-8F1C-97658D5207FA}" dt="2025-06-03T15:34:39.035" v="1133" actId="1035"/>
           <ac:cxnSpMkLst>
             <pc:docMk/>
             <pc:sldMk cId="3354384854" sldId="256"/>
@@ -8204,63 +8220,6 @@
           </a:fontRef>
         </p:style>
       </p:cxnSp>
-      <p:sp>
-        <p:nvSpPr>
-          <p:cNvPr id="621" name="Rectangle 620">
-            <a:extLst>
-              <a:ext uri="{FF2B5EF4-FFF2-40B4-BE49-F238E27FC236}">
-                <a16:creationId xmlns:a16="http://schemas.microsoft.com/office/drawing/2014/main" id="{44B43C6B-856A-F735-F6AD-A1D88D172028}"/>
-              </a:ext>
-            </a:extLst>
-          </p:cNvPr>
-          <p:cNvSpPr/>
-          <p:nvPr/>
-        </p:nvSpPr>
-        <p:spPr>
-          <a:xfrm>
-            <a:off x="2856121" y="26699"/>
-            <a:ext cx="1247503" cy="1081915"/>
-          </a:xfrm>
-          <a:prstGeom prst="rect">
-            <a:avLst/>
-          </a:prstGeom>
-          <a:noFill/>
-          <a:ln w="28575"/>
-        </p:spPr>
-        <p:style>
-          <a:lnRef idx="2">
-            <a:schemeClr val="accent1">
-              <a:shade val="15000"/>
-            </a:schemeClr>
-          </a:lnRef>
-          <a:fillRef idx="1">
-            <a:schemeClr val="accent1"/>
-          </a:fillRef>
-          <a:effectRef idx="0">
-            <a:schemeClr val="accent1"/>
-          </a:effectRef>
-          <a:fontRef idx="minor">
-            <a:schemeClr val="lt1"/>
-          </a:fontRef>
-        </p:style>
-        <p:txBody>
-          <a:bodyPr rtlCol="0" anchor="ctr"/>
-          <a:lstStyle/>
-          <a:p>
-            <a:pPr algn="ctr"/>
-            <a:endParaRPr lang="en-GB" sz="1000">
-              <a:solidFill>
-                <a:schemeClr val="tx1">
-                  <a:lumMod val="75000"/>
-                  <a:lumOff val="25000"/>
-                </a:schemeClr>
-              </a:solidFill>
-              <a:latin typeface="Calibri Light" panose="020F0302020204030204" pitchFamily="34" charset="0"/>
-              <a:cs typeface="Calibri Light" panose="020F0302020204030204" pitchFamily="34" charset="0"/>
-            </a:endParaRPr>
-          </a:p>
-        </p:txBody>
-      </p:sp>
       <p:cxnSp>
         <p:nvCxnSpPr>
           <p:cNvPr id="622" name="Straight Arrow Connector 621">
@@ -8277,7 +8236,7 @@
         </p:nvCxnSpPr>
         <p:spPr>
           <a:xfrm rot="16200000">
-            <a:off x="3074481" y="160308"/>
+            <a:off x="3074481" y="138876"/>
             <a:ext cx="0" cy="288000"/>
           </a:xfrm>
           <a:prstGeom prst="straightConnector1">
@@ -8322,7 +8281,7 @@
         </p:nvSpPr>
         <p:spPr>
           <a:xfrm>
-            <a:off x="3226937" y="27309"/>
+            <a:off x="3226937" y="5877"/>
             <a:ext cx="898427" cy="553998"/>
           </a:xfrm>
           <a:prstGeom prst="rect">
@@ -8393,7 +8352,7 @@
         </p:nvCxnSpPr>
         <p:spPr>
           <a:xfrm rot="5400000">
-            <a:off x="3074481" y="687617"/>
+            <a:off x="3074481" y="666185"/>
             <a:ext cx="0" cy="288000"/>
           </a:xfrm>
           <a:prstGeom prst="line">
@@ -8440,7 +8399,7 @@
         </p:nvSpPr>
         <p:spPr>
           <a:xfrm>
-            <a:off x="3226937" y="554618"/>
+            <a:off x="3226937" y="533186"/>
             <a:ext cx="944823" cy="553998"/>
           </a:xfrm>
           <a:prstGeom prst="rect">
@@ -8915,7 +8874,7 @@
         </p:nvSpPr>
         <p:spPr>
           <a:xfrm>
-            <a:off x="1041343" y="4520238"/>
+            <a:off x="1041343" y="4543878"/>
             <a:ext cx="694422" cy="246221"/>
           </a:xfrm>
           <a:prstGeom prst="rect">
@@ -8973,7 +8932,7 @@
         </p:nvSpPr>
         <p:spPr>
           <a:xfrm>
-            <a:off x="1041343" y="5159174"/>
+            <a:off x="1041343" y="5181150"/>
             <a:ext cx="694422" cy="246221"/>
           </a:xfrm>
           <a:prstGeom prst="rect">
@@ -9285,6 +9244,102 @@
             </a:solidFill>
             <a:prstDash val="dash"/>
             <a:headEnd type="triangle" w="sm" len="sm"/>
+            <a:tailEnd type="none" w="med" len="med"/>
+          </a:ln>
+        </p:spPr>
+        <p:style>
+          <a:lnRef idx="2">
+            <a:schemeClr val="accent1"/>
+          </a:lnRef>
+          <a:fillRef idx="0">
+            <a:schemeClr val="accent1"/>
+          </a:fillRef>
+          <a:effectRef idx="1">
+            <a:schemeClr val="accent1"/>
+          </a:effectRef>
+          <a:fontRef idx="minor">
+            <a:schemeClr val="tx1"/>
+          </a:fontRef>
+        </p:style>
+      </p:cxnSp>
+      <p:cxnSp>
+        <p:nvCxnSpPr>
+          <p:cNvPr id="2" name="Straight Arrow Connector 1">
+            <a:extLst>
+              <a:ext uri="{FF2B5EF4-FFF2-40B4-BE49-F238E27FC236}">
+                <a16:creationId xmlns:a16="http://schemas.microsoft.com/office/drawing/2014/main" id="{C3617998-F352-C21B-76BA-7CE607336375}"/>
+              </a:ext>
+            </a:extLst>
+          </p:cNvPr>
+          <p:cNvCxnSpPr>
+            <a:cxnSpLocks/>
+          </p:cNvCxnSpPr>
+          <p:nvPr/>
+        </p:nvCxnSpPr>
+        <p:spPr>
+          <a:xfrm>
+            <a:off x="2842115" y="13098"/>
+            <a:ext cx="0" cy="1095518"/>
+          </a:xfrm>
+          <a:prstGeom prst="straightConnector1">
+            <a:avLst/>
+          </a:prstGeom>
+          <a:ln w="19050">
+            <a:solidFill>
+              <a:schemeClr val="tx1">
+                <a:lumMod val="50000"/>
+                <a:lumOff val="50000"/>
+              </a:schemeClr>
+            </a:solidFill>
+            <a:headEnd type="none" w="med" len="med"/>
+            <a:tailEnd type="none" w="med" len="med"/>
+          </a:ln>
+        </p:spPr>
+        <p:style>
+          <a:lnRef idx="2">
+            <a:schemeClr val="accent1"/>
+          </a:lnRef>
+          <a:fillRef idx="0">
+            <a:schemeClr val="accent1"/>
+          </a:fillRef>
+          <a:effectRef idx="1">
+            <a:schemeClr val="accent1"/>
+          </a:effectRef>
+          <a:fontRef idx="minor">
+            <a:schemeClr val="tx1"/>
+          </a:fontRef>
+        </p:style>
+      </p:cxnSp>
+      <p:cxnSp>
+        <p:nvCxnSpPr>
+          <p:cNvPr id="4" name="Straight Arrow Connector 3">
+            <a:extLst>
+              <a:ext uri="{FF2B5EF4-FFF2-40B4-BE49-F238E27FC236}">
+                <a16:creationId xmlns:a16="http://schemas.microsoft.com/office/drawing/2014/main" id="{019FE13D-B077-2A14-975A-4A5BD5828F54}"/>
+              </a:ext>
+            </a:extLst>
+          </p:cNvPr>
+          <p:cNvCxnSpPr>
+            <a:cxnSpLocks/>
+          </p:cNvCxnSpPr>
+          <p:nvPr/>
+        </p:nvCxnSpPr>
+        <p:spPr>
+          <a:xfrm flipH="1">
+            <a:off x="2842115" y="1108616"/>
+            <a:ext cx="1281017" cy="0"/>
+          </a:xfrm>
+          <a:prstGeom prst="straightConnector1">
+            <a:avLst/>
+          </a:prstGeom>
+          <a:ln w="19050">
+            <a:solidFill>
+              <a:schemeClr val="tx1">
+                <a:lumMod val="50000"/>
+                <a:lumOff val="50000"/>
+              </a:schemeClr>
+            </a:solidFill>
+            <a:headEnd type="none" w="med" len="med"/>
             <a:tailEnd type="none" w="med" len="med"/>
           </a:ln>
         </p:spPr>

</xml_diff>

<commit_message>
Added what research questions are considered in each main analysis chapter
</commit_message>
<xml_diff>
--- a/chapter_01/figures/thesis_roadmap.pptx
+++ b/chapter_01/figures/thesis_roadmap.pptx
@@ -2,12 +2,12 @@
 <file path=ppt/presentation.xml><?xml version="1.0" encoding="utf-8"?>
 <p:presentation xmlns:a="http://schemas.openxmlformats.org/drawingml/2006/main" xmlns:r="http://schemas.openxmlformats.org/officeDocument/2006/relationships" xmlns:p="http://schemas.openxmlformats.org/presentationml/2006/main" saveSubsetFonts="1">
   <p:sldMasterIdLst>
-    <p:sldMasterId id="2147483804" r:id="rId1"/>
+    <p:sldMasterId id="2147483828" r:id="rId1"/>
   </p:sldMasterIdLst>
   <p:sldIdLst>
     <p:sldId id="256" r:id="rId2"/>
   </p:sldIdLst>
-  <p:sldSz cx="4140200" cy="5543550"/>
+  <p:sldSz cx="4140200" cy="5688013"/>
   <p:notesSz cx="6858000" cy="9144000"/>
   <p:defaultTextStyle>
     <a:defPPr>
@@ -115,7 +115,7 @@
 <file path=ppt/revisionInfo.xml><?xml version="1.0" encoding="utf-8"?>
 <p1510:revInfo xmlns:a="http://schemas.openxmlformats.org/drawingml/2006/main" xmlns:r="http://schemas.openxmlformats.org/officeDocument/2006/relationships" xmlns:p1510="http://schemas.microsoft.com/office/powerpoint/2015/10/main">
   <p1510:revLst>
-    <p1510:client id="{C7909C26-7110-4B46-8F1C-97658D5207FA}" v="10" dt="2025-06-03T15:34:15.181"/>
+    <p1510:client id="{C7909C26-7110-4B46-8F1C-97658D5207FA}" v="14" dt="2025-06-05T08:58:05.880"/>
   </p1510:revLst>
 </p1510:revInfo>
 </file>
@@ -125,12 +125,12 @@
   <pc:docChgLst>
     <pc:chgData name="Fatima Pillosu" userId="a6295d4dc9e22643" providerId="LiveId" clId="{C7909C26-7110-4B46-8F1C-97658D5207FA}"/>
     <pc:docChg chg="undo custSel modSld">
-      <pc:chgData name="Fatima Pillosu" userId="a6295d4dc9e22643" providerId="LiveId" clId="{C7909C26-7110-4B46-8F1C-97658D5207FA}" dt="2025-06-03T15:38:23.307" v="1137" actId="1036"/>
+      <pc:chgData name="Fatima Pillosu" userId="a6295d4dc9e22643" providerId="LiveId" clId="{C7909C26-7110-4B46-8F1C-97658D5207FA}" dt="2025-06-05T08:58:19.872" v="1238" actId="14100"/>
       <pc:docMkLst>
         <pc:docMk/>
       </pc:docMkLst>
       <pc:sldChg chg="addSp delSp modSp mod">
-        <pc:chgData name="Fatima Pillosu" userId="a6295d4dc9e22643" providerId="LiveId" clId="{C7909C26-7110-4B46-8F1C-97658D5207FA}" dt="2025-06-03T15:38:23.307" v="1137" actId="1036"/>
+        <pc:chgData name="Fatima Pillosu" userId="a6295d4dc9e22643" providerId="LiveId" clId="{C7909C26-7110-4B46-8F1C-97658D5207FA}" dt="2025-06-05T08:58:19.872" v="1238" actId="14100"/>
         <pc:sldMkLst>
           <pc:docMk/>
           <pc:sldMk cId="3354384854" sldId="256"/>
@@ -144,6 +144,14 @@
           </ac:spMkLst>
         </pc:spChg>
         <pc:spChg chg="add del mod">
+          <ac:chgData name="Fatima Pillosu" userId="a6295d4dc9e22643" providerId="LiveId" clId="{C7909C26-7110-4B46-8F1C-97658D5207FA}" dt="2025-06-05T08:57:51.731" v="1235" actId="21"/>
+          <ac:spMkLst>
+            <pc:docMk/>
+            <pc:sldMk cId="3354384854" sldId="256"/>
+            <ac:spMk id="3" creationId="{3509C7A6-19BB-0D05-A5A4-F3A89DE28DD3}"/>
+          </ac:spMkLst>
+        </pc:spChg>
+        <pc:spChg chg="add del mod">
           <ac:chgData name="Fatima Pillosu" userId="a6295d4dc9e22643" providerId="LiveId" clId="{C7909C26-7110-4B46-8F1C-97658D5207FA}" dt="2025-06-03T15:29:55.184" v="1113" actId="21"/>
           <ac:spMkLst>
             <pc:docMk/>
@@ -160,6 +168,14 @@
           </ac:spMkLst>
         </pc:spChg>
         <pc:spChg chg="add del mod">
+          <ac:chgData name="Fatima Pillosu" userId="a6295d4dc9e22643" providerId="LiveId" clId="{C7909C26-7110-4B46-8F1C-97658D5207FA}" dt="2025-06-05T08:57:51.731" v="1235" actId="21"/>
+          <ac:spMkLst>
+            <pc:docMk/>
+            <pc:sldMk cId="3354384854" sldId="256"/>
+            <ac:spMk id="5" creationId="{5913F005-4A98-D3BE-F4F2-E95D954B1D06}"/>
+          </ac:spMkLst>
+        </pc:spChg>
+        <pc:spChg chg="add del mod">
           <ac:chgData name="Fatima Pillosu" userId="a6295d4dc9e22643" providerId="LiveId" clId="{C7909C26-7110-4B46-8F1C-97658D5207FA}" dt="2025-06-03T15:29:55.184" v="1113" actId="21"/>
           <ac:spMkLst>
             <pc:docMk/>
@@ -168,6 +184,14 @@
           </ac:spMkLst>
         </pc:spChg>
         <pc:spChg chg="add del mod">
+          <ac:chgData name="Fatima Pillosu" userId="a6295d4dc9e22643" providerId="LiveId" clId="{C7909C26-7110-4B46-8F1C-97658D5207FA}" dt="2025-06-05T08:57:51.731" v="1235" actId="21"/>
+          <ac:spMkLst>
+            <pc:docMk/>
+            <pc:sldMk cId="3354384854" sldId="256"/>
+            <ac:spMk id="6" creationId="{16DF997E-4CBC-E352-4297-C2765FF9BADA}"/>
+          </ac:spMkLst>
+        </pc:spChg>
+        <pc:spChg chg="add del mod">
           <ac:chgData name="Fatima Pillosu" userId="a6295d4dc9e22643" providerId="LiveId" clId="{C7909C26-7110-4B46-8F1C-97658D5207FA}" dt="2025-06-03T15:29:55.184" v="1113" actId="21"/>
           <ac:spMkLst>
             <pc:docMk/>
@@ -184,6 +208,22 @@
           </ac:spMkLst>
         </pc:spChg>
         <pc:spChg chg="add del mod">
+          <ac:chgData name="Fatima Pillosu" userId="a6295d4dc9e22643" providerId="LiveId" clId="{C7909C26-7110-4B46-8F1C-97658D5207FA}" dt="2025-06-05T08:57:51.731" v="1235" actId="21"/>
+          <ac:spMkLst>
+            <pc:docMk/>
+            <pc:sldMk cId="3354384854" sldId="256"/>
+            <ac:spMk id="7" creationId="{A16AC61C-9655-BE59-0E1D-62859D87AEA1}"/>
+          </ac:spMkLst>
+        </pc:spChg>
+        <pc:spChg chg="add del mod">
+          <ac:chgData name="Fatima Pillosu" userId="a6295d4dc9e22643" providerId="LiveId" clId="{C7909C26-7110-4B46-8F1C-97658D5207FA}" dt="2025-06-05T08:57:51.731" v="1235" actId="21"/>
+          <ac:spMkLst>
+            <pc:docMk/>
+            <pc:sldMk cId="3354384854" sldId="256"/>
+            <ac:spMk id="8" creationId="{8CC79328-8D0D-D627-FD71-57CFC2D2B5DC}"/>
+          </ac:spMkLst>
+        </pc:spChg>
+        <pc:spChg chg="add del mod">
           <ac:chgData name="Fatima Pillosu" userId="a6295d4dc9e22643" providerId="LiveId" clId="{C7909C26-7110-4B46-8F1C-97658D5207FA}" dt="2025-06-03T15:29:55.184" v="1113" actId="21"/>
           <ac:spMkLst>
             <pc:docMk/>
@@ -192,6 +232,14 @@
           </ac:spMkLst>
         </pc:spChg>
         <pc:spChg chg="add del mod">
+          <ac:chgData name="Fatima Pillosu" userId="a6295d4dc9e22643" providerId="LiveId" clId="{C7909C26-7110-4B46-8F1C-97658D5207FA}" dt="2025-06-05T08:57:51.731" v="1235" actId="21"/>
+          <ac:spMkLst>
+            <pc:docMk/>
+            <pc:sldMk cId="3354384854" sldId="256"/>
+            <ac:spMk id="9" creationId="{6C355D5C-47D8-7C59-C1B8-4FF2037F961E}"/>
+          </ac:spMkLst>
+        </pc:spChg>
+        <pc:spChg chg="add del mod">
           <ac:chgData name="Fatima Pillosu" userId="a6295d4dc9e22643" providerId="LiveId" clId="{C7909C26-7110-4B46-8F1C-97658D5207FA}" dt="2025-06-03T15:29:55.184" v="1113" actId="21"/>
           <ac:spMkLst>
             <pc:docMk/>
@@ -208,6 +256,22 @@
           </ac:spMkLst>
         </pc:spChg>
         <pc:spChg chg="add del mod">
+          <ac:chgData name="Fatima Pillosu" userId="a6295d4dc9e22643" providerId="LiveId" clId="{C7909C26-7110-4B46-8F1C-97658D5207FA}" dt="2025-06-05T08:57:51.731" v="1235" actId="21"/>
+          <ac:spMkLst>
+            <pc:docMk/>
+            <pc:sldMk cId="3354384854" sldId="256"/>
+            <ac:spMk id="10" creationId="{FBD9599A-5CAC-D1AB-7D3E-713DF5A5C020}"/>
+          </ac:spMkLst>
+        </pc:spChg>
+        <pc:spChg chg="add del mod">
+          <ac:chgData name="Fatima Pillosu" userId="a6295d4dc9e22643" providerId="LiveId" clId="{C7909C26-7110-4B46-8F1C-97658D5207FA}" dt="2025-06-05T08:57:51.731" v="1235" actId="21"/>
+          <ac:spMkLst>
+            <pc:docMk/>
+            <pc:sldMk cId="3354384854" sldId="256"/>
+            <ac:spMk id="11" creationId="{BBB0BE85-86B1-0751-AF3F-838269DDC230}"/>
+          </ac:spMkLst>
+        </pc:spChg>
+        <pc:spChg chg="add del mod">
           <ac:chgData name="Fatima Pillosu" userId="a6295d4dc9e22643" providerId="LiveId" clId="{C7909C26-7110-4B46-8F1C-97658D5207FA}" dt="2025-06-03T15:29:55.184" v="1113" actId="21"/>
           <ac:spMkLst>
             <pc:docMk/>
@@ -224,6 +288,14 @@
           </ac:spMkLst>
         </pc:spChg>
         <pc:spChg chg="add del mod">
+          <ac:chgData name="Fatima Pillosu" userId="a6295d4dc9e22643" providerId="LiveId" clId="{C7909C26-7110-4B46-8F1C-97658D5207FA}" dt="2025-06-05T08:57:51.731" v="1235" actId="21"/>
+          <ac:spMkLst>
+            <pc:docMk/>
+            <pc:sldMk cId="3354384854" sldId="256"/>
+            <ac:spMk id="12" creationId="{99B61BA9-5A6C-532C-7917-89D64FACAECA}"/>
+          </ac:spMkLst>
+        </pc:spChg>
+        <pc:spChg chg="add del mod">
           <ac:chgData name="Fatima Pillosu" userId="a6295d4dc9e22643" providerId="LiveId" clId="{C7909C26-7110-4B46-8F1C-97658D5207FA}" dt="2025-06-03T15:29:55.184" v="1113" actId="21"/>
           <ac:spMkLst>
             <pc:docMk/>
@@ -232,11 +304,27 @@
           </ac:spMkLst>
         </pc:spChg>
         <pc:spChg chg="add del mod">
+          <ac:chgData name="Fatima Pillosu" userId="a6295d4dc9e22643" providerId="LiveId" clId="{C7909C26-7110-4B46-8F1C-97658D5207FA}" dt="2025-06-05T08:57:51.731" v="1235" actId="21"/>
+          <ac:spMkLst>
+            <pc:docMk/>
+            <pc:sldMk cId="3354384854" sldId="256"/>
+            <ac:spMk id="13" creationId="{CAE0B206-AF54-54F2-0C06-284B40BCBB6F}"/>
+          </ac:spMkLst>
+        </pc:spChg>
+        <pc:spChg chg="add del mod">
           <ac:chgData name="Fatima Pillosu" userId="a6295d4dc9e22643" providerId="LiveId" clId="{C7909C26-7110-4B46-8F1C-97658D5207FA}" dt="2025-06-03T15:29:55.184" v="1113" actId="21"/>
           <ac:spMkLst>
             <pc:docMk/>
             <pc:sldMk cId="3354384854" sldId="256"/>
             <ac:spMk id="14" creationId="{8A2E91B1-BBB4-1F54-4FCE-C1F6724BE292}"/>
+          </ac:spMkLst>
+        </pc:spChg>
+        <pc:spChg chg="add del mod">
+          <ac:chgData name="Fatima Pillosu" userId="a6295d4dc9e22643" providerId="LiveId" clId="{C7909C26-7110-4B46-8F1C-97658D5207FA}" dt="2025-06-05T08:57:51.731" v="1235" actId="21"/>
+          <ac:spMkLst>
+            <pc:docMk/>
+            <pc:sldMk cId="3354384854" sldId="256"/>
+            <ac:spMk id="14" creationId="{8AAEA69B-D0DC-C7F0-7B11-C6A20FF94F80}"/>
           </ac:spMkLst>
         </pc:spChg>
         <pc:spChg chg="add del">
@@ -248,6 +336,14 @@
           </ac:spMkLst>
         </pc:spChg>
         <pc:spChg chg="add del mod">
+          <ac:chgData name="Fatima Pillosu" userId="a6295d4dc9e22643" providerId="LiveId" clId="{C7909C26-7110-4B46-8F1C-97658D5207FA}" dt="2025-06-05T08:57:51.731" v="1235" actId="21"/>
+          <ac:spMkLst>
+            <pc:docMk/>
+            <pc:sldMk cId="3354384854" sldId="256"/>
+            <ac:spMk id="15" creationId="{2699F84C-B158-D9B1-8BAF-E590BCED4FB6}"/>
+          </ac:spMkLst>
+        </pc:spChg>
+        <pc:spChg chg="add del mod">
           <ac:chgData name="Fatima Pillosu" userId="a6295d4dc9e22643" providerId="LiveId" clId="{C7909C26-7110-4B46-8F1C-97658D5207FA}" dt="2025-06-03T14:53:19.515" v="360" actId="21"/>
           <ac:spMkLst>
             <pc:docMk/>
@@ -264,6 +360,14 @@
           </ac:spMkLst>
         </pc:spChg>
         <pc:spChg chg="add del mod">
+          <ac:chgData name="Fatima Pillosu" userId="a6295d4dc9e22643" providerId="LiveId" clId="{C7909C26-7110-4B46-8F1C-97658D5207FA}" dt="2025-06-05T08:57:51.731" v="1235" actId="21"/>
+          <ac:spMkLst>
+            <pc:docMk/>
+            <pc:sldMk cId="3354384854" sldId="256"/>
+            <ac:spMk id="16" creationId="{8A2E91B1-BBB4-1F54-4FCE-C1F6724BE292}"/>
+          </ac:spMkLst>
+        </pc:spChg>
+        <pc:spChg chg="add del mod">
           <ac:chgData name="Fatima Pillosu" userId="a6295d4dc9e22643" providerId="LiveId" clId="{C7909C26-7110-4B46-8F1C-97658D5207FA}" dt="2025-06-03T14:53:19.515" v="360" actId="21"/>
           <ac:spMkLst>
             <pc:docMk/>
@@ -272,6 +376,22 @@
           </ac:spMkLst>
         </pc:spChg>
         <pc:spChg chg="add del mod">
+          <ac:chgData name="Fatima Pillosu" userId="a6295d4dc9e22643" providerId="LiveId" clId="{C7909C26-7110-4B46-8F1C-97658D5207FA}" dt="2025-06-05T08:57:51.731" v="1235" actId="21"/>
+          <ac:spMkLst>
+            <pc:docMk/>
+            <pc:sldMk cId="3354384854" sldId="256"/>
+            <ac:spMk id="17" creationId="{E60B5C00-F1F7-FD1D-ABEF-8F5EF5D717FE}"/>
+          </ac:spMkLst>
+        </pc:spChg>
+        <pc:spChg chg="add del mod">
+          <ac:chgData name="Fatima Pillosu" userId="a6295d4dc9e22643" providerId="LiveId" clId="{C7909C26-7110-4B46-8F1C-97658D5207FA}" dt="2025-06-05T08:57:51.731" v="1235" actId="21"/>
+          <ac:spMkLst>
+            <pc:docMk/>
+            <pc:sldMk cId="3354384854" sldId="256"/>
+            <ac:spMk id="18" creationId="{19EA9AC9-6E95-FB84-F5C5-ADD045519CA4}"/>
+          </ac:spMkLst>
+        </pc:spChg>
+        <pc:spChg chg="add del mod">
           <ac:chgData name="Fatima Pillosu" userId="a6295d4dc9e22643" providerId="LiveId" clId="{C7909C26-7110-4B46-8F1C-97658D5207FA}" dt="2025-06-03T14:53:19.515" v="360" actId="21"/>
           <ac:spMkLst>
             <pc:docMk/>
@@ -280,6 +400,14 @@
           </ac:spMkLst>
         </pc:spChg>
         <pc:spChg chg="add del mod">
+          <ac:chgData name="Fatima Pillosu" userId="a6295d4dc9e22643" providerId="LiveId" clId="{C7909C26-7110-4B46-8F1C-97658D5207FA}" dt="2025-06-05T08:57:51.731" v="1235" actId="21"/>
+          <ac:spMkLst>
+            <pc:docMk/>
+            <pc:sldMk cId="3354384854" sldId="256"/>
+            <ac:spMk id="19" creationId="{71BBF894-591D-8866-B2B1-0C8C1F6E802C}"/>
+          </ac:spMkLst>
+        </pc:spChg>
+        <pc:spChg chg="add del mod">
           <ac:chgData name="Fatima Pillosu" userId="a6295d4dc9e22643" providerId="LiveId" clId="{C7909C26-7110-4B46-8F1C-97658D5207FA}" dt="2025-06-03T14:53:19.515" v="360" actId="21"/>
           <ac:spMkLst>
             <pc:docMk/>
@@ -296,6 +424,22 @@
           </ac:spMkLst>
         </pc:spChg>
         <pc:spChg chg="add del mod">
+          <ac:chgData name="Fatima Pillosu" userId="a6295d4dc9e22643" providerId="LiveId" clId="{C7909C26-7110-4B46-8F1C-97658D5207FA}" dt="2025-06-05T08:57:51.731" v="1235" actId="21"/>
+          <ac:spMkLst>
+            <pc:docMk/>
+            <pc:sldMk cId="3354384854" sldId="256"/>
+            <ac:spMk id="20" creationId="{A9A7A549-413C-B305-70B8-0753E06B399D}"/>
+          </ac:spMkLst>
+        </pc:spChg>
+        <pc:spChg chg="add del mod">
+          <ac:chgData name="Fatima Pillosu" userId="a6295d4dc9e22643" providerId="LiveId" clId="{C7909C26-7110-4B46-8F1C-97658D5207FA}" dt="2025-06-05T08:57:51.731" v="1235" actId="21"/>
+          <ac:spMkLst>
+            <pc:docMk/>
+            <pc:sldMk cId="3354384854" sldId="256"/>
+            <ac:spMk id="21" creationId="{6BE65441-4EEE-E468-5441-5FEB4D450CFE}"/>
+          </ac:spMkLst>
+        </pc:spChg>
+        <pc:spChg chg="add del mod">
           <ac:chgData name="Fatima Pillosu" userId="a6295d4dc9e22643" providerId="LiveId" clId="{C7909C26-7110-4B46-8F1C-97658D5207FA}" dt="2025-06-03T14:53:19.515" v="360" actId="21"/>
           <ac:spMkLst>
             <pc:docMk/>
@@ -312,6 +456,14 @@
           </ac:spMkLst>
         </pc:spChg>
         <pc:spChg chg="add del mod">
+          <ac:chgData name="Fatima Pillosu" userId="a6295d4dc9e22643" providerId="LiveId" clId="{C7909C26-7110-4B46-8F1C-97658D5207FA}" dt="2025-06-05T08:57:51.731" v="1235" actId="21"/>
+          <ac:spMkLst>
+            <pc:docMk/>
+            <pc:sldMk cId="3354384854" sldId="256"/>
+            <ac:spMk id="23" creationId="{1146D79A-EC07-3CEF-454B-CD796D474073}"/>
+          </ac:spMkLst>
+        </pc:spChg>
+        <pc:spChg chg="add del mod">
           <ac:chgData name="Fatima Pillosu" userId="a6295d4dc9e22643" providerId="LiveId" clId="{C7909C26-7110-4B46-8F1C-97658D5207FA}" dt="2025-06-03T14:53:19.515" v="360" actId="21"/>
           <ac:spMkLst>
             <pc:docMk/>
@@ -336,6 +488,14 @@
           </ac:spMkLst>
         </pc:spChg>
         <pc:spChg chg="add del mod">
+          <ac:chgData name="Fatima Pillosu" userId="a6295d4dc9e22643" providerId="LiveId" clId="{C7909C26-7110-4B46-8F1C-97658D5207FA}" dt="2025-06-05T08:57:51.731" v="1235" actId="21"/>
+          <ac:spMkLst>
+            <pc:docMk/>
+            <pc:sldMk cId="3354384854" sldId="256"/>
+            <ac:spMk id="25" creationId="{AD491ADF-E96D-E422-C79F-9D802C0D8C5C}"/>
+          </ac:spMkLst>
+        </pc:spChg>
+        <pc:spChg chg="add del mod">
           <ac:chgData name="Fatima Pillosu" userId="a6295d4dc9e22643" providerId="LiveId" clId="{C7909C26-7110-4B46-8F1C-97658D5207FA}" dt="2025-06-03T14:53:19.515" v="360" actId="21"/>
           <ac:spMkLst>
             <pc:docMk/>
@@ -352,6 +512,14 @@
           </ac:spMkLst>
         </pc:spChg>
         <pc:spChg chg="add del mod">
+          <ac:chgData name="Fatima Pillosu" userId="a6295d4dc9e22643" providerId="LiveId" clId="{C7909C26-7110-4B46-8F1C-97658D5207FA}" dt="2025-06-05T08:57:51.731" v="1235" actId="21"/>
+          <ac:spMkLst>
+            <pc:docMk/>
+            <pc:sldMk cId="3354384854" sldId="256"/>
+            <ac:spMk id="27" creationId="{B5AD376D-9072-BDE5-112F-1804EA806BB6}"/>
+          </ac:spMkLst>
+        </pc:spChg>
+        <pc:spChg chg="add del mod">
           <ac:chgData name="Fatima Pillosu" userId="a6295d4dc9e22643" providerId="LiveId" clId="{C7909C26-7110-4B46-8F1C-97658D5207FA}" dt="2025-06-03T14:53:19.515" v="360" actId="21"/>
           <ac:spMkLst>
             <pc:docMk/>
@@ -416,11 +584,99 @@
           </ac:spMkLst>
         </pc:spChg>
         <pc:spChg chg="add del mod">
+          <ac:chgData name="Fatima Pillosu" userId="a6295d4dc9e22643" providerId="LiveId" clId="{C7909C26-7110-4B46-8F1C-97658D5207FA}" dt="2025-06-05T08:57:51.731" v="1235" actId="21"/>
+          <ac:spMkLst>
+            <pc:docMk/>
+            <pc:sldMk cId="3354384854" sldId="256"/>
+            <ac:spMk id="45" creationId="{B1334220-28E2-C9A1-20DB-0960856A01C1}"/>
+          </ac:spMkLst>
+        </pc:spChg>
+        <pc:spChg chg="add del mod">
+          <ac:chgData name="Fatima Pillosu" userId="a6295d4dc9e22643" providerId="LiveId" clId="{C7909C26-7110-4B46-8F1C-97658D5207FA}" dt="2025-06-05T08:57:51.731" v="1235" actId="21"/>
+          <ac:spMkLst>
+            <pc:docMk/>
+            <pc:sldMk cId="3354384854" sldId="256"/>
+            <ac:spMk id="47" creationId="{163F56E9-414E-9452-9860-C8D28A72FBE6}"/>
+          </ac:spMkLst>
+        </pc:spChg>
+        <pc:spChg chg="add del mod">
+          <ac:chgData name="Fatima Pillosu" userId="a6295d4dc9e22643" providerId="LiveId" clId="{C7909C26-7110-4B46-8F1C-97658D5207FA}" dt="2025-06-05T08:57:51.731" v="1235" actId="21"/>
+          <ac:spMkLst>
+            <pc:docMk/>
+            <pc:sldMk cId="3354384854" sldId="256"/>
+            <ac:spMk id="48" creationId="{45A669CA-93F7-26B4-4327-1BF3D3C31A5A}"/>
+          </ac:spMkLst>
+        </pc:spChg>
+        <pc:spChg chg="add del mod">
+          <ac:chgData name="Fatima Pillosu" userId="a6295d4dc9e22643" providerId="LiveId" clId="{C7909C26-7110-4B46-8F1C-97658D5207FA}" dt="2025-06-05T08:57:51.731" v="1235" actId="21"/>
+          <ac:spMkLst>
+            <pc:docMk/>
+            <pc:sldMk cId="3354384854" sldId="256"/>
+            <ac:spMk id="49" creationId="{F7316CE7-8C2E-BB48-C6B9-2CA089A07966}"/>
+          </ac:spMkLst>
+        </pc:spChg>
+        <pc:spChg chg="add del mod">
+          <ac:chgData name="Fatima Pillosu" userId="a6295d4dc9e22643" providerId="LiveId" clId="{C7909C26-7110-4B46-8F1C-97658D5207FA}" dt="2025-06-05T08:57:51.731" v="1235" actId="21"/>
+          <ac:spMkLst>
+            <pc:docMk/>
+            <pc:sldMk cId="3354384854" sldId="256"/>
+            <ac:spMk id="50" creationId="{2574031C-A47A-178A-A062-EA116F8846DD}"/>
+          </ac:spMkLst>
+        </pc:spChg>
+        <pc:spChg chg="add del mod">
+          <ac:chgData name="Fatima Pillosu" userId="a6295d4dc9e22643" providerId="LiveId" clId="{C7909C26-7110-4B46-8F1C-97658D5207FA}" dt="2025-06-05T08:57:51.731" v="1235" actId="21"/>
+          <ac:spMkLst>
+            <pc:docMk/>
+            <pc:sldMk cId="3354384854" sldId="256"/>
+            <ac:spMk id="51" creationId="{A113BE4A-E9EA-9093-C6C1-3A906173B618}"/>
+          </ac:spMkLst>
+        </pc:spChg>
+        <pc:spChg chg="add del mod">
+          <ac:chgData name="Fatima Pillosu" userId="a6295d4dc9e22643" providerId="LiveId" clId="{C7909C26-7110-4B46-8F1C-97658D5207FA}" dt="2025-06-05T08:57:51.731" v="1235" actId="21"/>
+          <ac:spMkLst>
+            <pc:docMk/>
+            <pc:sldMk cId="3354384854" sldId="256"/>
+            <ac:spMk id="52" creationId="{8AF39566-0332-086B-0C44-7819D8974EBD}"/>
+          </ac:spMkLst>
+        </pc:spChg>
+        <pc:spChg chg="add del mod">
+          <ac:chgData name="Fatima Pillosu" userId="a6295d4dc9e22643" providerId="LiveId" clId="{C7909C26-7110-4B46-8F1C-97658D5207FA}" dt="2025-06-05T08:57:51.731" v="1235" actId="21"/>
+          <ac:spMkLst>
+            <pc:docMk/>
+            <pc:sldMk cId="3354384854" sldId="256"/>
+            <ac:spMk id="53" creationId="{FAC45779-73B6-302A-19A8-FAE3737E50E7}"/>
+          </ac:spMkLst>
+        </pc:spChg>
+        <pc:spChg chg="add del mod">
+          <ac:chgData name="Fatima Pillosu" userId="a6295d4dc9e22643" providerId="LiveId" clId="{C7909C26-7110-4B46-8F1C-97658D5207FA}" dt="2025-06-05T08:57:51.731" v="1235" actId="21"/>
+          <ac:spMkLst>
+            <pc:docMk/>
+            <pc:sldMk cId="3354384854" sldId="256"/>
+            <ac:spMk id="54" creationId="{0FF3C3A6-BA87-1DE0-8CFA-1EB270D68A54}"/>
+          </ac:spMkLst>
+        </pc:spChg>
+        <pc:spChg chg="add del mod">
           <ac:chgData name="Fatima Pillosu" userId="a6295d4dc9e22643" providerId="LiveId" clId="{C7909C26-7110-4B46-8F1C-97658D5207FA}" dt="2025-06-03T14:53:19.515" v="360" actId="21"/>
           <ac:spMkLst>
             <pc:docMk/>
             <pc:sldMk cId="3354384854" sldId="256"/>
             <ac:spMk id="55" creationId="{44B43C6B-856A-F735-F6AD-A1D88D172028}"/>
+          </ac:spMkLst>
+        </pc:spChg>
+        <pc:spChg chg="add del mod">
+          <ac:chgData name="Fatima Pillosu" userId="a6295d4dc9e22643" providerId="LiveId" clId="{C7909C26-7110-4B46-8F1C-97658D5207FA}" dt="2025-06-05T08:57:51.731" v="1235" actId="21"/>
+          <ac:spMkLst>
+            <pc:docMk/>
+            <pc:sldMk cId="3354384854" sldId="256"/>
+            <ac:spMk id="55" creationId="{9DA24193-322E-D46A-6095-515BAD183A85}"/>
+          </ac:spMkLst>
+        </pc:spChg>
+        <pc:spChg chg="add del mod">
+          <ac:chgData name="Fatima Pillosu" userId="a6295d4dc9e22643" providerId="LiveId" clId="{C7909C26-7110-4B46-8F1C-97658D5207FA}" dt="2025-06-05T08:57:51.731" v="1235" actId="21"/>
+          <ac:spMkLst>
+            <pc:docMk/>
+            <pc:sldMk cId="3354384854" sldId="256"/>
+            <ac:spMk id="56" creationId="{166EA424-2B97-DBF1-1D22-87CF3A64C146}"/>
           </ac:spMkLst>
         </pc:spChg>
         <pc:spChg chg="add del mod">
@@ -1247,280 +1503,544 @@
             <ac:spMk id="576" creationId="{4E739DA6-1D58-55DE-FDA4-FBB1EF3C2549}"/>
           </ac:spMkLst>
         </pc:spChg>
+        <pc:spChg chg="add del">
+          <ac:chgData name="Fatima Pillosu" userId="a6295d4dc9e22643" providerId="LiveId" clId="{C7909C26-7110-4B46-8F1C-97658D5207FA}" dt="2025-06-05T08:57:49.246" v="1234" actId="478"/>
+          <ac:spMkLst>
+            <pc:docMk/>
+            <pc:sldMk cId="3354384854" sldId="256"/>
+            <ac:spMk id="580" creationId="{CEAE78A1-93D6-9D9D-F176-0BEF174A3F09}"/>
+          </ac:spMkLst>
+        </pc:spChg>
+        <pc:spChg chg="add del mod">
+          <ac:chgData name="Fatima Pillosu" userId="a6295d4dc9e22643" providerId="LiveId" clId="{C7909C26-7110-4B46-8F1C-97658D5207FA}" dt="2025-06-05T08:54:49.448" v="1144" actId="21"/>
+          <ac:spMkLst>
+            <pc:docMk/>
+            <pc:sldMk cId="3354384854" sldId="256"/>
+            <ac:spMk id="581" creationId="{3509C7A6-19BB-0D05-A5A4-F3A89DE28DD3}"/>
+          </ac:spMkLst>
+        </pc:spChg>
+        <pc:spChg chg="add del mod">
+          <ac:chgData name="Fatima Pillosu" userId="a6295d4dc9e22643" providerId="LiveId" clId="{C7909C26-7110-4B46-8F1C-97658D5207FA}" dt="2025-06-05T08:54:49.448" v="1144" actId="21"/>
+          <ac:spMkLst>
+            <pc:docMk/>
+            <pc:sldMk cId="3354384854" sldId="256"/>
+            <ac:spMk id="582" creationId="{5913F005-4A98-D3BE-F4F2-E95D954B1D06}"/>
+          </ac:spMkLst>
+        </pc:spChg>
+        <pc:spChg chg="add del mod">
+          <ac:chgData name="Fatima Pillosu" userId="a6295d4dc9e22643" providerId="LiveId" clId="{C7909C26-7110-4B46-8F1C-97658D5207FA}" dt="2025-06-05T08:54:49.448" v="1144" actId="21"/>
+          <ac:spMkLst>
+            <pc:docMk/>
+            <pc:sldMk cId="3354384854" sldId="256"/>
+            <ac:spMk id="583" creationId="{16DF997E-4CBC-E352-4297-C2765FF9BADA}"/>
+          </ac:spMkLst>
+        </pc:spChg>
+        <pc:spChg chg="add del mod">
+          <ac:chgData name="Fatima Pillosu" userId="a6295d4dc9e22643" providerId="LiveId" clId="{C7909C26-7110-4B46-8F1C-97658D5207FA}" dt="2025-06-05T08:54:49.448" v="1144" actId="21"/>
+          <ac:spMkLst>
+            <pc:docMk/>
+            <pc:sldMk cId="3354384854" sldId="256"/>
+            <ac:spMk id="584" creationId="{A16AC61C-9655-BE59-0E1D-62859D87AEA1}"/>
+          </ac:spMkLst>
+        </pc:spChg>
+        <pc:spChg chg="add del mod">
+          <ac:chgData name="Fatima Pillosu" userId="a6295d4dc9e22643" providerId="LiveId" clId="{C7909C26-7110-4B46-8F1C-97658D5207FA}" dt="2025-06-05T08:54:49.448" v="1144" actId="21"/>
+          <ac:spMkLst>
+            <pc:docMk/>
+            <pc:sldMk cId="3354384854" sldId="256"/>
+            <ac:spMk id="585" creationId="{8CC79328-8D0D-D627-FD71-57CFC2D2B5DC}"/>
+          </ac:spMkLst>
+        </pc:spChg>
+        <pc:spChg chg="add del mod">
+          <ac:chgData name="Fatima Pillosu" userId="a6295d4dc9e22643" providerId="LiveId" clId="{C7909C26-7110-4B46-8F1C-97658D5207FA}" dt="2025-06-05T08:54:49.448" v="1144" actId="21"/>
+          <ac:spMkLst>
+            <pc:docMk/>
+            <pc:sldMk cId="3354384854" sldId="256"/>
+            <ac:spMk id="586" creationId="{6C355D5C-47D8-7C59-C1B8-4FF2037F961E}"/>
+          </ac:spMkLst>
+        </pc:spChg>
+        <pc:spChg chg="add del mod">
+          <ac:chgData name="Fatima Pillosu" userId="a6295d4dc9e22643" providerId="LiveId" clId="{C7909C26-7110-4B46-8F1C-97658D5207FA}" dt="2025-06-05T08:54:49.448" v="1144" actId="21"/>
+          <ac:spMkLst>
+            <pc:docMk/>
+            <pc:sldMk cId="3354384854" sldId="256"/>
+            <ac:spMk id="587" creationId="{FBD9599A-5CAC-D1AB-7D3E-713DF5A5C020}"/>
+          </ac:spMkLst>
+        </pc:spChg>
+        <pc:spChg chg="add del mod">
+          <ac:chgData name="Fatima Pillosu" userId="a6295d4dc9e22643" providerId="LiveId" clId="{C7909C26-7110-4B46-8F1C-97658D5207FA}" dt="2025-06-05T08:54:49.448" v="1144" actId="21"/>
+          <ac:spMkLst>
+            <pc:docMk/>
+            <pc:sldMk cId="3354384854" sldId="256"/>
+            <ac:spMk id="588" creationId="{BBB0BE85-86B1-0751-AF3F-838269DDC230}"/>
+          </ac:spMkLst>
+        </pc:spChg>
+        <pc:spChg chg="add del mod">
+          <ac:chgData name="Fatima Pillosu" userId="a6295d4dc9e22643" providerId="LiveId" clId="{C7909C26-7110-4B46-8F1C-97658D5207FA}" dt="2025-06-05T08:54:49.448" v="1144" actId="21"/>
+          <ac:spMkLst>
+            <pc:docMk/>
+            <pc:sldMk cId="3354384854" sldId="256"/>
+            <ac:spMk id="589" creationId="{99B61BA9-5A6C-532C-7917-89D64FACAECA}"/>
+          </ac:spMkLst>
+        </pc:spChg>
+        <pc:spChg chg="add del mod">
+          <ac:chgData name="Fatima Pillosu" userId="a6295d4dc9e22643" providerId="LiveId" clId="{C7909C26-7110-4B46-8F1C-97658D5207FA}" dt="2025-06-05T08:54:49.448" v="1144" actId="21"/>
+          <ac:spMkLst>
+            <pc:docMk/>
+            <pc:sldMk cId="3354384854" sldId="256"/>
+            <ac:spMk id="590" creationId="{CAE0B206-AF54-54F2-0C06-284B40BCBB6F}"/>
+          </ac:spMkLst>
+        </pc:spChg>
+        <pc:spChg chg="add del mod">
+          <ac:chgData name="Fatima Pillosu" userId="a6295d4dc9e22643" providerId="LiveId" clId="{C7909C26-7110-4B46-8F1C-97658D5207FA}" dt="2025-06-05T08:54:49.448" v="1144" actId="21"/>
+          <ac:spMkLst>
+            <pc:docMk/>
+            <pc:sldMk cId="3354384854" sldId="256"/>
+            <ac:spMk id="591" creationId="{8AAEA69B-D0DC-C7F0-7B11-C6A20FF94F80}"/>
+          </ac:spMkLst>
+        </pc:spChg>
+        <pc:spChg chg="add del mod">
+          <ac:chgData name="Fatima Pillosu" userId="a6295d4dc9e22643" providerId="LiveId" clId="{C7909C26-7110-4B46-8F1C-97658D5207FA}" dt="2025-06-05T08:54:49.448" v="1144" actId="21"/>
+          <ac:spMkLst>
+            <pc:docMk/>
+            <pc:sldMk cId="3354384854" sldId="256"/>
+            <ac:spMk id="592" creationId="{2699F84C-B158-D9B1-8BAF-E590BCED4FB6}"/>
+          </ac:spMkLst>
+        </pc:spChg>
+        <pc:spChg chg="add del mod">
+          <ac:chgData name="Fatima Pillosu" userId="a6295d4dc9e22643" providerId="LiveId" clId="{C7909C26-7110-4B46-8F1C-97658D5207FA}" dt="2025-06-05T08:54:49.448" v="1144" actId="21"/>
+          <ac:spMkLst>
+            <pc:docMk/>
+            <pc:sldMk cId="3354384854" sldId="256"/>
+            <ac:spMk id="593" creationId="{8A2E91B1-BBB4-1F54-4FCE-C1F6724BE292}"/>
+          </ac:spMkLst>
+        </pc:spChg>
+        <pc:spChg chg="add del mod">
+          <ac:chgData name="Fatima Pillosu" userId="a6295d4dc9e22643" providerId="LiveId" clId="{C7909C26-7110-4B46-8F1C-97658D5207FA}" dt="2025-06-05T08:54:49.448" v="1144" actId="21"/>
+          <ac:spMkLst>
+            <pc:docMk/>
+            <pc:sldMk cId="3354384854" sldId="256"/>
+            <ac:spMk id="594" creationId="{E60B5C00-F1F7-FD1D-ABEF-8F5EF5D717FE}"/>
+          </ac:spMkLst>
+        </pc:spChg>
+        <pc:spChg chg="add del mod">
+          <ac:chgData name="Fatima Pillosu" userId="a6295d4dc9e22643" providerId="LiveId" clId="{C7909C26-7110-4B46-8F1C-97658D5207FA}" dt="2025-06-05T08:54:49.448" v="1144" actId="21"/>
+          <ac:spMkLst>
+            <pc:docMk/>
+            <pc:sldMk cId="3354384854" sldId="256"/>
+            <ac:spMk id="595" creationId="{19EA9AC9-6E95-FB84-F5C5-ADD045519CA4}"/>
+          </ac:spMkLst>
+        </pc:spChg>
+        <pc:spChg chg="add del mod">
+          <ac:chgData name="Fatima Pillosu" userId="a6295d4dc9e22643" providerId="LiveId" clId="{C7909C26-7110-4B46-8F1C-97658D5207FA}" dt="2025-06-05T08:54:49.448" v="1144" actId="21"/>
+          <ac:spMkLst>
+            <pc:docMk/>
+            <pc:sldMk cId="3354384854" sldId="256"/>
+            <ac:spMk id="596" creationId="{71BBF894-591D-8866-B2B1-0C8C1F6E802C}"/>
+          </ac:spMkLst>
+        </pc:spChg>
+        <pc:spChg chg="add del mod">
+          <ac:chgData name="Fatima Pillosu" userId="a6295d4dc9e22643" providerId="LiveId" clId="{C7909C26-7110-4B46-8F1C-97658D5207FA}" dt="2025-06-05T08:54:49.448" v="1144" actId="21"/>
+          <ac:spMkLst>
+            <pc:docMk/>
+            <pc:sldMk cId="3354384854" sldId="256"/>
+            <ac:spMk id="597" creationId="{A9A7A549-413C-B305-70B8-0753E06B399D}"/>
+          </ac:spMkLst>
+        </pc:spChg>
+        <pc:spChg chg="add del mod">
+          <ac:chgData name="Fatima Pillosu" userId="a6295d4dc9e22643" providerId="LiveId" clId="{C7909C26-7110-4B46-8F1C-97658D5207FA}" dt="2025-06-05T08:54:49.448" v="1144" actId="21"/>
+          <ac:spMkLst>
+            <pc:docMk/>
+            <pc:sldMk cId="3354384854" sldId="256"/>
+            <ac:spMk id="598" creationId="{6BE65441-4EEE-E468-5441-5FEB4D450CFE}"/>
+          </ac:spMkLst>
+        </pc:spChg>
+        <pc:spChg chg="add del mod">
+          <ac:chgData name="Fatima Pillosu" userId="a6295d4dc9e22643" providerId="LiveId" clId="{C7909C26-7110-4B46-8F1C-97658D5207FA}" dt="2025-06-05T08:54:49.448" v="1144" actId="21"/>
+          <ac:spMkLst>
+            <pc:docMk/>
+            <pc:sldMk cId="3354384854" sldId="256"/>
+            <ac:spMk id="600" creationId="{1146D79A-EC07-3CEF-454B-CD796D474073}"/>
+          </ac:spMkLst>
+        </pc:spChg>
+        <pc:spChg chg="add del mod">
+          <ac:chgData name="Fatima Pillosu" userId="a6295d4dc9e22643" providerId="LiveId" clId="{C7909C26-7110-4B46-8F1C-97658D5207FA}" dt="2025-06-05T08:54:49.448" v="1144" actId="21"/>
+          <ac:spMkLst>
+            <pc:docMk/>
+            <pc:sldMk cId="3354384854" sldId="256"/>
+            <ac:spMk id="602" creationId="{AD491ADF-E96D-E422-C79F-9D802C0D8C5C}"/>
+          </ac:spMkLst>
+        </pc:spChg>
+        <pc:spChg chg="add del mod">
+          <ac:chgData name="Fatima Pillosu" userId="a6295d4dc9e22643" providerId="LiveId" clId="{C7909C26-7110-4B46-8F1C-97658D5207FA}" dt="2025-06-05T08:54:49.448" v="1144" actId="21"/>
+          <ac:spMkLst>
+            <pc:docMk/>
+            <pc:sldMk cId="3354384854" sldId="256"/>
+            <ac:spMk id="604" creationId="{B5AD376D-9072-BDE5-112F-1804EA806BB6}"/>
+          </ac:spMkLst>
+        </pc:spChg>
         <pc:spChg chg="add mod">
-          <ac:chgData name="Fatima Pillosu" userId="a6295d4dc9e22643" providerId="LiveId" clId="{C7909C26-7110-4B46-8F1C-97658D5207FA}" dt="2025-06-03T15:30:18.539" v="1116"/>
-          <ac:spMkLst>
-            <pc:docMk/>
-            <pc:sldMk cId="3354384854" sldId="256"/>
-            <ac:spMk id="581" creationId="{3509C7A6-19BB-0D05-A5A4-F3A89DE28DD3}"/>
+          <ac:chgData name="Fatima Pillosu" userId="a6295d4dc9e22643" providerId="LiveId" clId="{C7909C26-7110-4B46-8F1C-97658D5207FA}" dt="2025-06-05T08:58:05.880" v="1236"/>
+          <ac:spMkLst>
+            <pc:docMk/>
+            <pc:sldMk cId="3354384854" sldId="256"/>
+            <ac:spMk id="621" creationId="{3509C7A6-19BB-0D05-A5A4-F3A89DE28DD3}"/>
+          </ac:spMkLst>
+        </pc:spChg>
+        <pc:spChg chg="add del mod">
+          <ac:chgData name="Fatima Pillosu" userId="a6295d4dc9e22643" providerId="LiveId" clId="{C7909C26-7110-4B46-8F1C-97658D5207FA}" dt="2025-06-03T15:33:05.405" v="1119" actId="478"/>
+          <ac:spMkLst>
+            <pc:docMk/>
+            <pc:sldMk cId="3354384854" sldId="256"/>
+            <ac:spMk id="621" creationId="{44B43C6B-856A-F735-F6AD-A1D88D172028}"/>
+          </ac:spMkLst>
+        </pc:spChg>
+        <pc:spChg chg="add del mod">
+          <ac:chgData name="Fatima Pillosu" userId="a6295d4dc9e22643" providerId="LiveId" clId="{C7909C26-7110-4B46-8F1C-97658D5207FA}" dt="2025-06-05T08:54:49.448" v="1144" actId="21"/>
+          <ac:spMkLst>
+            <pc:docMk/>
+            <pc:sldMk cId="3354384854" sldId="256"/>
+            <ac:spMk id="623" creationId="{B1334220-28E2-C9A1-20DB-0960856A01C1}"/>
+          </ac:spMkLst>
+        </pc:spChg>
+        <pc:spChg chg="add del mod">
+          <ac:chgData name="Fatima Pillosu" userId="a6295d4dc9e22643" providerId="LiveId" clId="{C7909C26-7110-4B46-8F1C-97658D5207FA}" dt="2025-06-05T08:54:49.448" v="1144" actId="21"/>
+          <ac:spMkLst>
+            <pc:docMk/>
+            <pc:sldMk cId="3354384854" sldId="256"/>
+            <ac:spMk id="625" creationId="{163F56E9-414E-9452-9860-C8D28A72FBE6}"/>
+          </ac:spMkLst>
+        </pc:spChg>
+        <pc:spChg chg="add del mod">
+          <ac:chgData name="Fatima Pillosu" userId="a6295d4dc9e22643" providerId="LiveId" clId="{C7909C26-7110-4B46-8F1C-97658D5207FA}" dt="2025-06-05T08:54:49.448" v="1144" actId="21"/>
+          <ac:spMkLst>
+            <pc:docMk/>
+            <pc:sldMk cId="3354384854" sldId="256"/>
+            <ac:spMk id="626" creationId="{45A669CA-93F7-26B4-4327-1BF3D3C31A5A}"/>
+          </ac:spMkLst>
+        </pc:spChg>
+        <pc:spChg chg="add del mod">
+          <ac:chgData name="Fatima Pillosu" userId="a6295d4dc9e22643" providerId="LiveId" clId="{C7909C26-7110-4B46-8F1C-97658D5207FA}" dt="2025-06-05T08:54:49.448" v="1144" actId="21"/>
+          <ac:spMkLst>
+            <pc:docMk/>
+            <pc:sldMk cId="3354384854" sldId="256"/>
+            <ac:spMk id="627" creationId="{F7316CE7-8C2E-BB48-C6B9-2CA089A07966}"/>
+          </ac:spMkLst>
+        </pc:spChg>
+        <pc:spChg chg="add del mod">
+          <ac:chgData name="Fatima Pillosu" userId="a6295d4dc9e22643" providerId="LiveId" clId="{C7909C26-7110-4B46-8F1C-97658D5207FA}" dt="2025-06-05T08:54:49.448" v="1144" actId="21"/>
+          <ac:spMkLst>
+            <pc:docMk/>
+            <pc:sldMk cId="3354384854" sldId="256"/>
+            <ac:spMk id="628" creationId="{2574031C-A47A-178A-A062-EA116F8846DD}"/>
+          </ac:spMkLst>
+        </pc:spChg>
+        <pc:spChg chg="add del mod">
+          <ac:chgData name="Fatima Pillosu" userId="a6295d4dc9e22643" providerId="LiveId" clId="{C7909C26-7110-4B46-8F1C-97658D5207FA}" dt="2025-06-05T08:54:49.448" v="1144" actId="21"/>
+          <ac:spMkLst>
+            <pc:docMk/>
+            <pc:sldMk cId="3354384854" sldId="256"/>
+            <ac:spMk id="629" creationId="{A113BE4A-E9EA-9093-C6C1-3A906173B618}"/>
+          </ac:spMkLst>
+        </pc:spChg>
+        <pc:spChg chg="add del mod">
+          <ac:chgData name="Fatima Pillosu" userId="a6295d4dc9e22643" providerId="LiveId" clId="{C7909C26-7110-4B46-8F1C-97658D5207FA}" dt="2025-06-05T08:54:49.448" v="1144" actId="21"/>
+          <ac:spMkLst>
+            <pc:docMk/>
+            <pc:sldMk cId="3354384854" sldId="256"/>
+            <ac:spMk id="630" creationId="{8AF39566-0332-086B-0C44-7819D8974EBD}"/>
+          </ac:spMkLst>
+        </pc:spChg>
+        <pc:spChg chg="add del mod">
+          <ac:chgData name="Fatima Pillosu" userId="a6295d4dc9e22643" providerId="LiveId" clId="{C7909C26-7110-4B46-8F1C-97658D5207FA}" dt="2025-06-05T08:54:49.448" v="1144" actId="21"/>
+          <ac:spMkLst>
+            <pc:docMk/>
+            <pc:sldMk cId="3354384854" sldId="256"/>
+            <ac:spMk id="631" creationId="{FAC45779-73B6-302A-19A8-FAE3737E50E7}"/>
+          </ac:spMkLst>
+        </pc:spChg>
+        <pc:spChg chg="add del mod">
+          <ac:chgData name="Fatima Pillosu" userId="a6295d4dc9e22643" providerId="LiveId" clId="{C7909C26-7110-4B46-8F1C-97658D5207FA}" dt="2025-06-05T08:54:49.448" v="1144" actId="21"/>
+          <ac:spMkLst>
+            <pc:docMk/>
+            <pc:sldMk cId="3354384854" sldId="256"/>
+            <ac:spMk id="632" creationId="{0FF3C3A6-BA87-1DE0-8CFA-1EB270D68A54}"/>
+          </ac:spMkLst>
+        </pc:spChg>
+        <pc:spChg chg="add del mod">
+          <ac:chgData name="Fatima Pillosu" userId="a6295d4dc9e22643" providerId="LiveId" clId="{C7909C26-7110-4B46-8F1C-97658D5207FA}" dt="2025-06-05T08:54:49.448" v="1144" actId="21"/>
+          <ac:spMkLst>
+            <pc:docMk/>
+            <pc:sldMk cId="3354384854" sldId="256"/>
+            <ac:spMk id="633" creationId="{9DA24193-322E-D46A-6095-515BAD183A85}"/>
+          </ac:spMkLst>
+        </pc:spChg>
+        <pc:spChg chg="add del mod">
+          <ac:chgData name="Fatima Pillosu" userId="a6295d4dc9e22643" providerId="LiveId" clId="{C7909C26-7110-4B46-8F1C-97658D5207FA}" dt="2025-06-05T08:54:49.448" v="1144" actId="21"/>
+          <ac:spMkLst>
+            <pc:docMk/>
+            <pc:sldMk cId="3354384854" sldId="256"/>
+            <ac:spMk id="634" creationId="{166EA424-2B97-DBF1-1D22-87CF3A64C146}"/>
           </ac:spMkLst>
         </pc:spChg>
         <pc:spChg chg="add mod">
-          <ac:chgData name="Fatima Pillosu" userId="a6295d4dc9e22643" providerId="LiveId" clId="{C7909C26-7110-4B46-8F1C-97658D5207FA}" dt="2025-06-03T15:30:18.539" v="1116"/>
-          <ac:spMkLst>
-            <pc:docMk/>
-            <pc:sldMk cId="3354384854" sldId="256"/>
-            <ac:spMk id="582" creationId="{5913F005-4A98-D3BE-F4F2-E95D954B1D06}"/>
+          <ac:chgData name="Fatima Pillosu" userId="a6295d4dc9e22643" providerId="LiveId" clId="{C7909C26-7110-4B46-8F1C-97658D5207FA}" dt="2025-06-05T08:58:05.880" v="1236"/>
+          <ac:spMkLst>
+            <pc:docMk/>
+            <pc:sldMk cId="3354384854" sldId="256"/>
+            <ac:spMk id="641" creationId="{5913F005-4A98-D3BE-F4F2-E95D954B1D06}"/>
           </ac:spMkLst>
         </pc:spChg>
         <pc:spChg chg="add mod">
-          <ac:chgData name="Fatima Pillosu" userId="a6295d4dc9e22643" providerId="LiveId" clId="{C7909C26-7110-4B46-8F1C-97658D5207FA}" dt="2025-06-03T15:30:18.539" v="1116"/>
-          <ac:spMkLst>
-            <pc:docMk/>
-            <pc:sldMk cId="3354384854" sldId="256"/>
-            <ac:spMk id="583" creationId="{16DF997E-4CBC-E352-4297-C2765FF9BADA}"/>
+          <ac:chgData name="Fatima Pillosu" userId="a6295d4dc9e22643" providerId="LiveId" clId="{C7909C26-7110-4B46-8F1C-97658D5207FA}" dt="2025-06-05T08:58:05.880" v="1236"/>
+          <ac:spMkLst>
+            <pc:docMk/>
+            <pc:sldMk cId="3354384854" sldId="256"/>
+            <ac:spMk id="642" creationId="{16DF997E-4CBC-E352-4297-C2765FF9BADA}"/>
           </ac:spMkLst>
         </pc:spChg>
         <pc:spChg chg="add mod">
-          <ac:chgData name="Fatima Pillosu" userId="a6295d4dc9e22643" providerId="LiveId" clId="{C7909C26-7110-4B46-8F1C-97658D5207FA}" dt="2025-06-03T15:30:59.122" v="1118" actId="20577"/>
-          <ac:spMkLst>
-            <pc:docMk/>
-            <pc:sldMk cId="3354384854" sldId="256"/>
-            <ac:spMk id="584" creationId="{A16AC61C-9655-BE59-0E1D-62859D87AEA1}"/>
+          <ac:chgData name="Fatima Pillosu" userId="a6295d4dc9e22643" providerId="LiveId" clId="{C7909C26-7110-4B46-8F1C-97658D5207FA}" dt="2025-06-05T08:58:05.880" v="1236"/>
+          <ac:spMkLst>
+            <pc:docMk/>
+            <pc:sldMk cId="3354384854" sldId="256"/>
+            <ac:spMk id="643" creationId="{A16AC61C-9655-BE59-0E1D-62859D87AEA1}"/>
           </ac:spMkLst>
         </pc:spChg>
         <pc:spChg chg="add mod">
-          <ac:chgData name="Fatima Pillosu" userId="a6295d4dc9e22643" providerId="LiveId" clId="{C7909C26-7110-4B46-8F1C-97658D5207FA}" dt="2025-06-03T15:38:23.307" v="1137" actId="1036"/>
-          <ac:spMkLst>
-            <pc:docMk/>
-            <pc:sldMk cId="3354384854" sldId="256"/>
-            <ac:spMk id="585" creationId="{8CC79328-8D0D-D627-FD71-57CFC2D2B5DC}"/>
+          <ac:chgData name="Fatima Pillosu" userId="a6295d4dc9e22643" providerId="LiveId" clId="{C7909C26-7110-4B46-8F1C-97658D5207FA}" dt="2025-06-05T08:58:05.880" v="1236"/>
+          <ac:spMkLst>
+            <pc:docMk/>
+            <pc:sldMk cId="3354384854" sldId="256"/>
+            <ac:spMk id="644" creationId="{8CC79328-8D0D-D627-FD71-57CFC2D2B5DC}"/>
           </ac:spMkLst>
         </pc:spChg>
         <pc:spChg chg="add mod">
-          <ac:chgData name="Fatima Pillosu" userId="a6295d4dc9e22643" providerId="LiveId" clId="{C7909C26-7110-4B46-8F1C-97658D5207FA}" dt="2025-06-03T15:38:23.307" v="1137" actId="1036"/>
-          <ac:spMkLst>
-            <pc:docMk/>
-            <pc:sldMk cId="3354384854" sldId="256"/>
-            <ac:spMk id="586" creationId="{6C355D5C-47D8-7C59-C1B8-4FF2037F961E}"/>
+          <ac:chgData name="Fatima Pillosu" userId="a6295d4dc9e22643" providerId="LiveId" clId="{C7909C26-7110-4B46-8F1C-97658D5207FA}" dt="2025-06-05T08:58:05.880" v="1236"/>
+          <ac:spMkLst>
+            <pc:docMk/>
+            <pc:sldMk cId="3354384854" sldId="256"/>
+            <ac:spMk id="645" creationId="{6C355D5C-47D8-7C59-C1B8-4FF2037F961E}"/>
           </ac:spMkLst>
         </pc:spChg>
         <pc:spChg chg="add mod">
-          <ac:chgData name="Fatima Pillosu" userId="a6295d4dc9e22643" providerId="LiveId" clId="{C7909C26-7110-4B46-8F1C-97658D5207FA}" dt="2025-06-03T15:38:23.307" v="1137" actId="1036"/>
-          <ac:spMkLst>
-            <pc:docMk/>
-            <pc:sldMk cId="3354384854" sldId="256"/>
-            <ac:spMk id="587" creationId="{FBD9599A-5CAC-D1AB-7D3E-713DF5A5C020}"/>
+          <ac:chgData name="Fatima Pillosu" userId="a6295d4dc9e22643" providerId="LiveId" clId="{C7909C26-7110-4B46-8F1C-97658D5207FA}" dt="2025-06-05T08:58:05.880" v="1236"/>
+          <ac:spMkLst>
+            <pc:docMk/>
+            <pc:sldMk cId="3354384854" sldId="256"/>
+            <ac:spMk id="646" creationId="{FBD9599A-5CAC-D1AB-7D3E-713DF5A5C020}"/>
           </ac:spMkLst>
         </pc:spChg>
         <pc:spChg chg="add mod">
-          <ac:chgData name="Fatima Pillosu" userId="a6295d4dc9e22643" providerId="LiveId" clId="{C7909C26-7110-4B46-8F1C-97658D5207FA}" dt="2025-06-03T15:33:34.535" v="1120" actId="12789"/>
-          <ac:spMkLst>
-            <pc:docMk/>
-            <pc:sldMk cId="3354384854" sldId="256"/>
-            <ac:spMk id="588" creationId="{BBB0BE85-86B1-0751-AF3F-838269DDC230}"/>
+          <ac:chgData name="Fatima Pillosu" userId="a6295d4dc9e22643" providerId="LiveId" clId="{C7909C26-7110-4B46-8F1C-97658D5207FA}" dt="2025-06-05T08:58:05.880" v="1236"/>
+          <ac:spMkLst>
+            <pc:docMk/>
+            <pc:sldMk cId="3354384854" sldId="256"/>
+            <ac:spMk id="647" creationId="{BBB0BE85-86B1-0751-AF3F-838269DDC230}"/>
           </ac:spMkLst>
         </pc:spChg>
         <pc:spChg chg="add mod">
-          <ac:chgData name="Fatima Pillosu" userId="a6295d4dc9e22643" providerId="LiveId" clId="{C7909C26-7110-4B46-8F1C-97658D5207FA}" dt="2025-06-03T15:33:40.932" v="1121" actId="12789"/>
-          <ac:spMkLst>
-            <pc:docMk/>
-            <pc:sldMk cId="3354384854" sldId="256"/>
-            <ac:spMk id="589" creationId="{99B61BA9-5A6C-532C-7917-89D64FACAECA}"/>
+          <ac:chgData name="Fatima Pillosu" userId="a6295d4dc9e22643" providerId="LiveId" clId="{C7909C26-7110-4B46-8F1C-97658D5207FA}" dt="2025-06-05T08:58:05.880" v="1236"/>
+          <ac:spMkLst>
+            <pc:docMk/>
+            <pc:sldMk cId="3354384854" sldId="256"/>
+            <ac:spMk id="648" creationId="{99B61BA9-5A6C-532C-7917-89D64FACAECA}"/>
           </ac:spMkLst>
         </pc:spChg>
         <pc:spChg chg="add mod">
-          <ac:chgData name="Fatima Pillosu" userId="a6295d4dc9e22643" providerId="LiveId" clId="{C7909C26-7110-4B46-8F1C-97658D5207FA}" dt="2025-06-03T15:30:18.539" v="1116"/>
-          <ac:spMkLst>
-            <pc:docMk/>
-            <pc:sldMk cId="3354384854" sldId="256"/>
-            <ac:spMk id="590" creationId="{CAE0B206-AF54-54F2-0C06-284B40BCBB6F}"/>
+          <ac:chgData name="Fatima Pillosu" userId="a6295d4dc9e22643" providerId="LiveId" clId="{C7909C26-7110-4B46-8F1C-97658D5207FA}" dt="2025-06-05T08:58:05.880" v="1236"/>
+          <ac:spMkLst>
+            <pc:docMk/>
+            <pc:sldMk cId="3354384854" sldId="256"/>
+            <ac:spMk id="649" creationId="{CAE0B206-AF54-54F2-0C06-284B40BCBB6F}"/>
           </ac:spMkLst>
         </pc:spChg>
         <pc:spChg chg="add mod">
-          <ac:chgData name="Fatima Pillosu" userId="a6295d4dc9e22643" providerId="LiveId" clId="{C7909C26-7110-4B46-8F1C-97658D5207FA}" dt="2025-06-03T15:30:18.539" v="1116"/>
-          <ac:spMkLst>
-            <pc:docMk/>
-            <pc:sldMk cId="3354384854" sldId="256"/>
-            <ac:spMk id="591" creationId="{8AAEA69B-D0DC-C7F0-7B11-C6A20FF94F80}"/>
+          <ac:chgData name="Fatima Pillosu" userId="a6295d4dc9e22643" providerId="LiveId" clId="{C7909C26-7110-4B46-8F1C-97658D5207FA}" dt="2025-06-05T08:58:05.880" v="1236"/>
+          <ac:spMkLst>
+            <pc:docMk/>
+            <pc:sldMk cId="3354384854" sldId="256"/>
+            <ac:spMk id="650" creationId="{8AAEA69B-D0DC-C7F0-7B11-C6A20FF94F80}"/>
           </ac:spMkLst>
         </pc:spChg>
         <pc:spChg chg="add mod">
-          <ac:chgData name="Fatima Pillosu" userId="a6295d4dc9e22643" providerId="LiveId" clId="{C7909C26-7110-4B46-8F1C-97658D5207FA}" dt="2025-06-03T15:30:18.539" v="1116"/>
-          <ac:spMkLst>
-            <pc:docMk/>
-            <pc:sldMk cId="3354384854" sldId="256"/>
-            <ac:spMk id="592" creationId="{2699F84C-B158-D9B1-8BAF-E590BCED4FB6}"/>
+          <ac:chgData name="Fatima Pillosu" userId="a6295d4dc9e22643" providerId="LiveId" clId="{C7909C26-7110-4B46-8F1C-97658D5207FA}" dt="2025-06-05T08:58:05.880" v="1236"/>
+          <ac:spMkLst>
+            <pc:docMk/>
+            <pc:sldMk cId="3354384854" sldId="256"/>
+            <ac:spMk id="651" creationId="{2699F84C-B158-D9B1-8BAF-E590BCED4FB6}"/>
           </ac:spMkLst>
         </pc:spChg>
         <pc:spChg chg="add mod">
-          <ac:chgData name="Fatima Pillosu" userId="a6295d4dc9e22643" providerId="LiveId" clId="{C7909C26-7110-4B46-8F1C-97658D5207FA}" dt="2025-06-03T15:30:18.539" v="1116"/>
-          <ac:spMkLst>
-            <pc:docMk/>
-            <pc:sldMk cId="3354384854" sldId="256"/>
-            <ac:spMk id="593" creationId="{8A2E91B1-BBB4-1F54-4FCE-C1F6724BE292}"/>
+          <ac:chgData name="Fatima Pillosu" userId="a6295d4dc9e22643" providerId="LiveId" clId="{C7909C26-7110-4B46-8F1C-97658D5207FA}" dt="2025-06-05T08:58:05.880" v="1236"/>
+          <ac:spMkLst>
+            <pc:docMk/>
+            <pc:sldMk cId="3354384854" sldId="256"/>
+            <ac:spMk id="652" creationId="{8A2E91B1-BBB4-1F54-4FCE-C1F6724BE292}"/>
           </ac:spMkLst>
         </pc:spChg>
         <pc:spChg chg="add mod">
-          <ac:chgData name="Fatima Pillosu" userId="a6295d4dc9e22643" providerId="LiveId" clId="{C7909C26-7110-4B46-8F1C-97658D5207FA}" dt="2025-06-03T15:33:34.535" v="1120" actId="12789"/>
-          <ac:spMkLst>
-            <pc:docMk/>
-            <pc:sldMk cId="3354384854" sldId="256"/>
-            <ac:spMk id="594" creationId="{E60B5C00-F1F7-FD1D-ABEF-8F5EF5D717FE}"/>
+          <ac:chgData name="Fatima Pillosu" userId="a6295d4dc9e22643" providerId="LiveId" clId="{C7909C26-7110-4B46-8F1C-97658D5207FA}" dt="2025-06-05T08:58:05.880" v="1236"/>
+          <ac:spMkLst>
+            <pc:docMk/>
+            <pc:sldMk cId="3354384854" sldId="256"/>
+            <ac:spMk id="653" creationId="{E60B5C00-F1F7-FD1D-ABEF-8F5EF5D717FE}"/>
           </ac:spMkLst>
         </pc:spChg>
         <pc:spChg chg="add mod">
-          <ac:chgData name="Fatima Pillosu" userId="a6295d4dc9e22643" providerId="LiveId" clId="{C7909C26-7110-4B46-8F1C-97658D5207FA}" dt="2025-06-03T15:33:40.932" v="1121" actId="12789"/>
-          <ac:spMkLst>
-            <pc:docMk/>
-            <pc:sldMk cId="3354384854" sldId="256"/>
-            <ac:spMk id="595" creationId="{19EA9AC9-6E95-FB84-F5C5-ADD045519CA4}"/>
+          <ac:chgData name="Fatima Pillosu" userId="a6295d4dc9e22643" providerId="LiveId" clId="{C7909C26-7110-4B46-8F1C-97658D5207FA}" dt="2025-06-05T08:58:05.880" v="1236"/>
+          <ac:spMkLst>
+            <pc:docMk/>
+            <pc:sldMk cId="3354384854" sldId="256"/>
+            <ac:spMk id="654" creationId="{19EA9AC9-6E95-FB84-F5C5-ADD045519CA4}"/>
           </ac:spMkLst>
         </pc:spChg>
         <pc:spChg chg="add mod">
-          <ac:chgData name="Fatima Pillosu" userId="a6295d4dc9e22643" providerId="LiveId" clId="{C7909C26-7110-4B46-8F1C-97658D5207FA}" dt="2025-06-03T15:38:23.307" v="1137" actId="1036"/>
-          <ac:spMkLst>
-            <pc:docMk/>
-            <pc:sldMk cId="3354384854" sldId="256"/>
-            <ac:spMk id="596" creationId="{71BBF894-591D-8866-B2B1-0C8C1F6E802C}"/>
+          <ac:chgData name="Fatima Pillosu" userId="a6295d4dc9e22643" providerId="LiveId" clId="{C7909C26-7110-4B46-8F1C-97658D5207FA}" dt="2025-06-05T08:58:05.880" v="1236"/>
+          <ac:spMkLst>
+            <pc:docMk/>
+            <pc:sldMk cId="3354384854" sldId="256"/>
+            <ac:spMk id="655" creationId="{71BBF894-591D-8866-B2B1-0C8C1F6E802C}"/>
           </ac:spMkLst>
         </pc:spChg>
         <pc:spChg chg="add mod">
-          <ac:chgData name="Fatima Pillosu" userId="a6295d4dc9e22643" providerId="LiveId" clId="{C7909C26-7110-4B46-8F1C-97658D5207FA}" dt="2025-06-03T15:38:23.307" v="1137" actId="1036"/>
-          <ac:spMkLst>
-            <pc:docMk/>
-            <pc:sldMk cId="3354384854" sldId="256"/>
-            <ac:spMk id="597" creationId="{A9A7A549-413C-B305-70B8-0753E06B399D}"/>
+          <ac:chgData name="Fatima Pillosu" userId="a6295d4dc9e22643" providerId="LiveId" clId="{C7909C26-7110-4B46-8F1C-97658D5207FA}" dt="2025-06-05T08:58:05.880" v="1236"/>
+          <ac:spMkLst>
+            <pc:docMk/>
+            <pc:sldMk cId="3354384854" sldId="256"/>
+            <ac:spMk id="656" creationId="{A9A7A549-413C-B305-70B8-0753E06B399D}"/>
           </ac:spMkLst>
         </pc:spChg>
         <pc:spChg chg="add mod">
-          <ac:chgData name="Fatima Pillosu" userId="a6295d4dc9e22643" providerId="LiveId" clId="{C7909C26-7110-4B46-8F1C-97658D5207FA}" dt="2025-06-03T15:38:23.307" v="1137" actId="1036"/>
-          <ac:spMkLst>
-            <pc:docMk/>
-            <pc:sldMk cId="3354384854" sldId="256"/>
-            <ac:spMk id="598" creationId="{6BE65441-4EEE-E468-5441-5FEB4D450CFE}"/>
+          <ac:chgData name="Fatima Pillosu" userId="a6295d4dc9e22643" providerId="LiveId" clId="{C7909C26-7110-4B46-8F1C-97658D5207FA}" dt="2025-06-05T08:58:05.880" v="1236"/>
+          <ac:spMkLst>
+            <pc:docMk/>
+            <pc:sldMk cId="3354384854" sldId="256"/>
+            <ac:spMk id="657" creationId="{6BE65441-4EEE-E468-5441-5FEB4D450CFE}"/>
           </ac:spMkLst>
         </pc:spChg>
         <pc:spChg chg="add mod">
-          <ac:chgData name="Fatima Pillosu" userId="a6295d4dc9e22643" providerId="LiveId" clId="{C7909C26-7110-4B46-8F1C-97658D5207FA}" dt="2025-06-03T15:30:18.539" v="1116"/>
-          <ac:spMkLst>
-            <pc:docMk/>
-            <pc:sldMk cId="3354384854" sldId="256"/>
-            <ac:spMk id="600" creationId="{1146D79A-EC07-3CEF-454B-CD796D474073}"/>
+          <ac:chgData name="Fatima Pillosu" userId="a6295d4dc9e22643" providerId="LiveId" clId="{C7909C26-7110-4B46-8F1C-97658D5207FA}" dt="2025-06-05T08:58:05.880" v="1236"/>
+          <ac:spMkLst>
+            <pc:docMk/>
+            <pc:sldMk cId="3354384854" sldId="256"/>
+            <ac:spMk id="659" creationId="{1146D79A-EC07-3CEF-454B-CD796D474073}"/>
           </ac:spMkLst>
         </pc:spChg>
         <pc:spChg chg="add mod">
-          <ac:chgData name="Fatima Pillosu" userId="a6295d4dc9e22643" providerId="LiveId" clId="{C7909C26-7110-4B46-8F1C-97658D5207FA}" dt="2025-06-03T15:30:18.539" v="1116"/>
-          <ac:spMkLst>
-            <pc:docMk/>
-            <pc:sldMk cId="3354384854" sldId="256"/>
-            <ac:spMk id="602" creationId="{AD491ADF-E96D-E422-C79F-9D802C0D8C5C}"/>
+          <ac:chgData name="Fatima Pillosu" userId="a6295d4dc9e22643" providerId="LiveId" clId="{C7909C26-7110-4B46-8F1C-97658D5207FA}" dt="2025-06-05T08:58:05.880" v="1236"/>
+          <ac:spMkLst>
+            <pc:docMk/>
+            <pc:sldMk cId="3354384854" sldId="256"/>
+            <ac:spMk id="661" creationId="{AD491ADF-E96D-E422-C79F-9D802C0D8C5C}"/>
           </ac:spMkLst>
         </pc:spChg>
         <pc:spChg chg="add mod">
-          <ac:chgData name="Fatima Pillosu" userId="a6295d4dc9e22643" providerId="LiveId" clId="{C7909C26-7110-4B46-8F1C-97658D5207FA}" dt="2025-06-03T15:30:18.539" v="1116"/>
-          <ac:spMkLst>
-            <pc:docMk/>
-            <pc:sldMk cId="3354384854" sldId="256"/>
-            <ac:spMk id="604" creationId="{B5AD376D-9072-BDE5-112F-1804EA806BB6}"/>
-          </ac:spMkLst>
-        </pc:spChg>
-        <pc:spChg chg="add del mod">
-          <ac:chgData name="Fatima Pillosu" userId="a6295d4dc9e22643" providerId="LiveId" clId="{C7909C26-7110-4B46-8F1C-97658D5207FA}" dt="2025-06-03T15:33:05.405" v="1119" actId="478"/>
-          <ac:spMkLst>
-            <pc:docMk/>
-            <pc:sldMk cId="3354384854" sldId="256"/>
-            <ac:spMk id="621" creationId="{44B43C6B-856A-F735-F6AD-A1D88D172028}"/>
+          <ac:chgData name="Fatima Pillosu" userId="a6295d4dc9e22643" providerId="LiveId" clId="{C7909C26-7110-4B46-8F1C-97658D5207FA}" dt="2025-06-05T08:58:19.872" v="1238" actId="14100"/>
+          <ac:spMkLst>
+            <pc:docMk/>
+            <pc:sldMk cId="3354384854" sldId="256"/>
+            <ac:spMk id="663" creationId="{B5AD376D-9072-BDE5-112F-1804EA806BB6}"/>
           </ac:spMkLst>
         </pc:spChg>
         <pc:spChg chg="add mod">
-          <ac:chgData name="Fatima Pillosu" userId="a6295d4dc9e22643" providerId="LiveId" clId="{C7909C26-7110-4B46-8F1C-97658D5207FA}" dt="2025-06-03T15:34:39.035" v="1133" actId="1035"/>
-          <ac:spMkLst>
-            <pc:docMk/>
-            <pc:sldMk cId="3354384854" sldId="256"/>
-            <ac:spMk id="623" creationId="{B1334220-28E2-C9A1-20DB-0960856A01C1}"/>
+          <ac:chgData name="Fatima Pillosu" userId="a6295d4dc9e22643" providerId="LiveId" clId="{C7909C26-7110-4B46-8F1C-97658D5207FA}" dt="2025-06-05T08:58:05.880" v="1236"/>
+          <ac:spMkLst>
+            <pc:docMk/>
+            <pc:sldMk cId="3354384854" sldId="256"/>
+            <ac:spMk id="681" creationId="{B1334220-28E2-C9A1-20DB-0960856A01C1}"/>
           </ac:spMkLst>
         </pc:spChg>
         <pc:spChg chg="add mod">
-          <ac:chgData name="Fatima Pillosu" userId="a6295d4dc9e22643" providerId="LiveId" clId="{C7909C26-7110-4B46-8F1C-97658D5207FA}" dt="2025-06-03T15:34:39.035" v="1133" actId="1035"/>
-          <ac:spMkLst>
-            <pc:docMk/>
-            <pc:sldMk cId="3354384854" sldId="256"/>
-            <ac:spMk id="625" creationId="{163F56E9-414E-9452-9860-C8D28A72FBE6}"/>
+          <ac:chgData name="Fatima Pillosu" userId="a6295d4dc9e22643" providerId="LiveId" clId="{C7909C26-7110-4B46-8F1C-97658D5207FA}" dt="2025-06-05T08:58:05.880" v="1236"/>
+          <ac:spMkLst>
+            <pc:docMk/>
+            <pc:sldMk cId="3354384854" sldId="256"/>
+            <ac:spMk id="683" creationId="{163F56E9-414E-9452-9860-C8D28A72FBE6}"/>
           </ac:spMkLst>
         </pc:spChg>
         <pc:spChg chg="add mod">
-          <ac:chgData name="Fatima Pillosu" userId="a6295d4dc9e22643" providerId="LiveId" clId="{C7909C26-7110-4B46-8F1C-97658D5207FA}" dt="2025-06-03T15:30:18.539" v="1116"/>
-          <ac:spMkLst>
-            <pc:docMk/>
-            <pc:sldMk cId="3354384854" sldId="256"/>
-            <ac:spMk id="626" creationId="{45A669CA-93F7-26B4-4327-1BF3D3C31A5A}"/>
+          <ac:chgData name="Fatima Pillosu" userId="a6295d4dc9e22643" providerId="LiveId" clId="{C7909C26-7110-4B46-8F1C-97658D5207FA}" dt="2025-06-05T08:58:05.880" v="1236"/>
+          <ac:spMkLst>
+            <pc:docMk/>
+            <pc:sldMk cId="3354384854" sldId="256"/>
+            <ac:spMk id="684" creationId="{45A669CA-93F7-26B4-4327-1BF3D3C31A5A}"/>
           </ac:spMkLst>
         </pc:spChg>
         <pc:spChg chg="add mod">
-          <ac:chgData name="Fatima Pillosu" userId="a6295d4dc9e22643" providerId="LiveId" clId="{C7909C26-7110-4B46-8F1C-97658D5207FA}" dt="2025-06-03T15:30:18.539" v="1116"/>
-          <ac:spMkLst>
-            <pc:docMk/>
-            <pc:sldMk cId="3354384854" sldId="256"/>
-            <ac:spMk id="627" creationId="{F7316CE7-8C2E-BB48-C6B9-2CA089A07966}"/>
+          <ac:chgData name="Fatima Pillosu" userId="a6295d4dc9e22643" providerId="LiveId" clId="{C7909C26-7110-4B46-8F1C-97658D5207FA}" dt="2025-06-05T08:58:05.880" v="1236"/>
+          <ac:spMkLst>
+            <pc:docMk/>
+            <pc:sldMk cId="3354384854" sldId="256"/>
+            <ac:spMk id="685" creationId="{F7316CE7-8C2E-BB48-C6B9-2CA089A07966}"/>
           </ac:spMkLst>
         </pc:spChg>
         <pc:spChg chg="add mod">
-          <ac:chgData name="Fatima Pillosu" userId="a6295d4dc9e22643" providerId="LiveId" clId="{C7909C26-7110-4B46-8F1C-97658D5207FA}" dt="2025-06-03T15:30:18.539" v="1116"/>
-          <ac:spMkLst>
-            <pc:docMk/>
-            <pc:sldMk cId="3354384854" sldId="256"/>
-            <ac:spMk id="628" creationId="{2574031C-A47A-178A-A062-EA116F8846DD}"/>
+          <ac:chgData name="Fatima Pillosu" userId="a6295d4dc9e22643" providerId="LiveId" clId="{C7909C26-7110-4B46-8F1C-97658D5207FA}" dt="2025-06-05T08:58:05.880" v="1236"/>
+          <ac:spMkLst>
+            <pc:docMk/>
+            <pc:sldMk cId="3354384854" sldId="256"/>
+            <ac:spMk id="686" creationId="{2574031C-A47A-178A-A062-EA116F8846DD}"/>
           </ac:spMkLst>
         </pc:spChg>
         <pc:spChg chg="add mod">
-          <ac:chgData name="Fatima Pillosu" userId="a6295d4dc9e22643" providerId="LiveId" clId="{C7909C26-7110-4B46-8F1C-97658D5207FA}" dt="2025-06-03T15:30:18.539" v="1116"/>
-          <ac:spMkLst>
-            <pc:docMk/>
-            <pc:sldMk cId="3354384854" sldId="256"/>
-            <ac:spMk id="629" creationId="{A113BE4A-E9EA-9093-C6C1-3A906173B618}"/>
+          <ac:chgData name="Fatima Pillosu" userId="a6295d4dc9e22643" providerId="LiveId" clId="{C7909C26-7110-4B46-8F1C-97658D5207FA}" dt="2025-06-05T08:58:05.880" v="1236"/>
+          <ac:spMkLst>
+            <pc:docMk/>
+            <pc:sldMk cId="3354384854" sldId="256"/>
+            <ac:spMk id="687" creationId="{A113BE4A-E9EA-9093-C6C1-3A906173B618}"/>
           </ac:spMkLst>
         </pc:spChg>
         <pc:spChg chg="add mod">
-          <ac:chgData name="Fatima Pillosu" userId="a6295d4dc9e22643" providerId="LiveId" clId="{C7909C26-7110-4B46-8F1C-97658D5207FA}" dt="2025-06-03T15:30:18.539" v="1116"/>
-          <ac:spMkLst>
-            <pc:docMk/>
-            <pc:sldMk cId="3354384854" sldId="256"/>
-            <ac:spMk id="630" creationId="{8AF39566-0332-086B-0C44-7819D8974EBD}"/>
+          <ac:chgData name="Fatima Pillosu" userId="a6295d4dc9e22643" providerId="LiveId" clId="{C7909C26-7110-4B46-8F1C-97658D5207FA}" dt="2025-06-05T08:58:05.880" v="1236"/>
+          <ac:spMkLst>
+            <pc:docMk/>
+            <pc:sldMk cId="3354384854" sldId="256"/>
+            <ac:spMk id="688" creationId="{8AF39566-0332-086B-0C44-7819D8974EBD}"/>
           </ac:spMkLst>
         </pc:spChg>
         <pc:spChg chg="add mod">
-          <ac:chgData name="Fatima Pillosu" userId="a6295d4dc9e22643" providerId="LiveId" clId="{C7909C26-7110-4B46-8F1C-97658D5207FA}" dt="2025-06-03T15:30:18.539" v="1116"/>
-          <ac:spMkLst>
-            <pc:docMk/>
-            <pc:sldMk cId="3354384854" sldId="256"/>
-            <ac:spMk id="631" creationId="{FAC45779-73B6-302A-19A8-FAE3737E50E7}"/>
+          <ac:chgData name="Fatima Pillosu" userId="a6295d4dc9e22643" providerId="LiveId" clId="{C7909C26-7110-4B46-8F1C-97658D5207FA}" dt="2025-06-05T08:58:05.880" v="1236"/>
+          <ac:spMkLst>
+            <pc:docMk/>
+            <pc:sldMk cId="3354384854" sldId="256"/>
+            <ac:spMk id="689" creationId="{FAC45779-73B6-302A-19A8-FAE3737E50E7}"/>
           </ac:spMkLst>
         </pc:spChg>
         <pc:spChg chg="add mod">
-          <ac:chgData name="Fatima Pillosu" userId="a6295d4dc9e22643" providerId="LiveId" clId="{C7909C26-7110-4B46-8F1C-97658D5207FA}" dt="2025-06-03T15:30:18.539" v="1116"/>
-          <ac:spMkLst>
-            <pc:docMk/>
-            <pc:sldMk cId="3354384854" sldId="256"/>
-            <ac:spMk id="632" creationId="{0FF3C3A6-BA87-1DE0-8CFA-1EB270D68A54}"/>
+          <ac:chgData name="Fatima Pillosu" userId="a6295d4dc9e22643" providerId="LiveId" clId="{C7909C26-7110-4B46-8F1C-97658D5207FA}" dt="2025-06-05T08:58:05.880" v="1236"/>
+          <ac:spMkLst>
+            <pc:docMk/>
+            <pc:sldMk cId="3354384854" sldId="256"/>
+            <ac:spMk id="690" creationId="{0FF3C3A6-BA87-1DE0-8CFA-1EB270D68A54}"/>
           </ac:spMkLst>
         </pc:spChg>
         <pc:spChg chg="add mod">
-          <ac:chgData name="Fatima Pillosu" userId="a6295d4dc9e22643" providerId="LiveId" clId="{C7909C26-7110-4B46-8F1C-97658D5207FA}" dt="2025-06-03T15:33:34.535" v="1120" actId="12789"/>
-          <ac:spMkLst>
-            <pc:docMk/>
-            <pc:sldMk cId="3354384854" sldId="256"/>
-            <ac:spMk id="633" creationId="{9DA24193-322E-D46A-6095-515BAD183A85}"/>
+          <ac:chgData name="Fatima Pillosu" userId="a6295d4dc9e22643" providerId="LiveId" clId="{C7909C26-7110-4B46-8F1C-97658D5207FA}" dt="2025-06-05T08:58:05.880" v="1236"/>
+          <ac:spMkLst>
+            <pc:docMk/>
+            <pc:sldMk cId="3354384854" sldId="256"/>
+            <ac:spMk id="691" creationId="{9DA24193-322E-D46A-6095-515BAD183A85}"/>
           </ac:spMkLst>
         </pc:spChg>
         <pc:spChg chg="add mod">
-          <ac:chgData name="Fatima Pillosu" userId="a6295d4dc9e22643" providerId="LiveId" clId="{C7909C26-7110-4B46-8F1C-97658D5207FA}" dt="2025-06-03T15:33:40.932" v="1121" actId="12789"/>
-          <ac:spMkLst>
-            <pc:docMk/>
-            <pc:sldMk cId="3354384854" sldId="256"/>
-            <ac:spMk id="634" creationId="{166EA424-2B97-DBF1-1D22-87CF3A64C146}"/>
-          </ac:spMkLst>
-        </pc:spChg>
-        <pc:cxnChg chg="add mod">
-          <ac:chgData name="Fatima Pillosu" userId="a6295d4dc9e22643" providerId="LiveId" clId="{C7909C26-7110-4B46-8F1C-97658D5207FA}" dt="2025-06-03T15:34:13.914" v="1126" actId="1582"/>
+          <ac:chgData name="Fatima Pillosu" userId="a6295d4dc9e22643" providerId="LiveId" clId="{C7909C26-7110-4B46-8F1C-97658D5207FA}" dt="2025-06-05T08:58:05.880" v="1236"/>
+          <ac:spMkLst>
+            <pc:docMk/>
+            <pc:sldMk cId="3354384854" sldId="256"/>
+            <ac:spMk id="692" creationId="{166EA424-2B97-DBF1-1D22-87CF3A64C146}"/>
+          </ac:spMkLst>
+        </pc:spChg>
+        <pc:cxnChg chg="add del mod">
+          <ac:chgData name="Fatima Pillosu" userId="a6295d4dc9e22643" providerId="LiveId" clId="{C7909C26-7110-4B46-8F1C-97658D5207FA}" dt="2025-06-05T08:54:49.448" v="1144" actId="21"/>
           <ac:cxnSpMkLst>
             <pc:docMk/>
             <pc:sldMk cId="3354384854" sldId="256"/>
             <ac:cxnSpMk id="2" creationId="{C3617998-F352-C21B-76BA-7CE607336375}"/>
           </ac:cxnSpMkLst>
         </pc:cxnChg>
-        <pc:cxnChg chg="add mod">
-          <ac:chgData name="Fatima Pillosu" userId="a6295d4dc9e22643" providerId="LiveId" clId="{C7909C26-7110-4B46-8F1C-97658D5207FA}" dt="2025-06-03T15:34:24.664" v="1130" actId="14100"/>
+        <pc:cxnChg chg="add del mod">
+          <ac:chgData name="Fatima Pillosu" userId="a6295d4dc9e22643" providerId="LiveId" clId="{C7909C26-7110-4B46-8F1C-97658D5207FA}" dt="2025-06-05T08:54:49.448" v="1144" actId="21"/>
           <ac:cxnSpMkLst>
             <pc:docMk/>
             <pc:sldMk cId="3354384854" sldId="256"/>
@@ -1576,6 +2096,78 @@
           </ac:cxnSpMkLst>
         </pc:cxnChg>
         <pc:cxnChg chg="add del mod">
+          <ac:chgData name="Fatima Pillosu" userId="a6295d4dc9e22643" providerId="LiveId" clId="{C7909C26-7110-4B46-8F1C-97658D5207FA}" dt="2025-06-05T08:57:51.731" v="1235" actId="21"/>
+          <ac:cxnSpMkLst>
+            <pc:docMk/>
+            <pc:sldMk cId="3354384854" sldId="256"/>
+            <ac:cxnSpMk id="22" creationId="{EE599EA5-4C3D-A45B-7B1E-B025BE9128AC}"/>
+          </ac:cxnSpMkLst>
+        </pc:cxnChg>
+        <pc:cxnChg chg="add del mod">
+          <ac:chgData name="Fatima Pillosu" userId="a6295d4dc9e22643" providerId="LiveId" clId="{C7909C26-7110-4B46-8F1C-97658D5207FA}" dt="2025-06-05T08:57:51.731" v="1235" actId="21"/>
+          <ac:cxnSpMkLst>
+            <pc:docMk/>
+            <pc:sldMk cId="3354384854" sldId="256"/>
+            <ac:cxnSpMk id="24" creationId="{00B4791E-555E-547F-8448-A1D6882390C9}"/>
+          </ac:cxnSpMkLst>
+        </pc:cxnChg>
+        <pc:cxnChg chg="add del mod">
+          <ac:chgData name="Fatima Pillosu" userId="a6295d4dc9e22643" providerId="LiveId" clId="{C7909C26-7110-4B46-8F1C-97658D5207FA}" dt="2025-06-05T08:57:51.731" v="1235" actId="21"/>
+          <ac:cxnSpMkLst>
+            <pc:docMk/>
+            <pc:sldMk cId="3354384854" sldId="256"/>
+            <ac:cxnSpMk id="26" creationId="{A5E89D36-496B-BC6E-6451-DB68F154953E}"/>
+          </ac:cxnSpMkLst>
+        </pc:cxnChg>
+        <pc:cxnChg chg="add del mod">
+          <ac:chgData name="Fatima Pillosu" userId="a6295d4dc9e22643" providerId="LiveId" clId="{C7909C26-7110-4B46-8F1C-97658D5207FA}" dt="2025-06-05T08:57:51.731" v="1235" actId="21"/>
+          <ac:cxnSpMkLst>
+            <pc:docMk/>
+            <pc:sldMk cId="3354384854" sldId="256"/>
+            <ac:cxnSpMk id="28" creationId="{55935181-890B-720D-C664-35CB54240F4E}"/>
+          </ac:cxnSpMkLst>
+        </pc:cxnChg>
+        <pc:cxnChg chg="add del mod">
+          <ac:chgData name="Fatima Pillosu" userId="a6295d4dc9e22643" providerId="LiveId" clId="{C7909C26-7110-4B46-8F1C-97658D5207FA}" dt="2025-06-05T08:57:51.731" v="1235" actId="21"/>
+          <ac:cxnSpMkLst>
+            <pc:docMk/>
+            <pc:sldMk cId="3354384854" sldId="256"/>
+            <ac:cxnSpMk id="29" creationId="{EF30C496-2771-0778-6824-2EB6BE7CEFF0}"/>
+          </ac:cxnSpMkLst>
+        </pc:cxnChg>
+        <pc:cxnChg chg="add del mod">
+          <ac:chgData name="Fatima Pillosu" userId="a6295d4dc9e22643" providerId="LiveId" clId="{C7909C26-7110-4B46-8F1C-97658D5207FA}" dt="2025-06-05T08:57:51.731" v="1235" actId="21"/>
+          <ac:cxnSpMkLst>
+            <pc:docMk/>
+            <pc:sldMk cId="3354384854" sldId="256"/>
+            <ac:cxnSpMk id="30" creationId="{C96442FF-908A-84F2-7E54-6AB7485662E5}"/>
+          </ac:cxnSpMkLst>
+        </pc:cxnChg>
+        <pc:cxnChg chg="add del mod">
+          <ac:chgData name="Fatima Pillosu" userId="a6295d4dc9e22643" providerId="LiveId" clId="{C7909C26-7110-4B46-8F1C-97658D5207FA}" dt="2025-06-05T08:57:51.731" v="1235" actId="21"/>
+          <ac:cxnSpMkLst>
+            <pc:docMk/>
+            <pc:sldMk cId="3354384854" sldId="256"/>
+            <ac:cxnSpMk id="31" creationId="{68C79158-7AC0-2089-1EB1-659E9CE9B879}"/>
+          </ac:cxnSpMkLst>
+        </pc:cxnChg>
+        <pc:cxnChg chg="add del mod">
+          <ac:chgData name="Fatima Pillosu" userId="a6295d4dc9e22643" providerId="LiveId" clId="{C7909C26-7110-4B46-8F1C-97658D5207FA}" dt="2025-06-05T08:57:51.731" v="1235" actId="21"/>
+          <ac:cxnSpMkLst>
+            <pc:docMk/>
+            <pc:sldMk cId="3354384854" sldId="256"/>
+            <ac:cxnSpMk id="32" creationId="{4EC70538-F86D-F7C9-DDDD-DA52C78765E3}"/>
+          </ac:cxnSpMkLst>
+        </pc:cxnChg>
+        <pc:cxnChg chg="add del mod">
+          <ac:chgData name="Fatima Pillosu" userId="a6295d4dc9e22643" providerId="LiveId" clId="{C7909C26-7110-4B46-8F1C-97658D5207FA}" dt="2025-06-05T08:57:51.731" v="1235" actId="21"/>
+          <ac:cxnSpMkLst>
+            <pc:docMk/>
+            <pc:sldMk cId="3354384854" sldId="256"/>
+            <ac:cxnSpMk id="33" creationId="{9F7D2FEC-C785-93BC-449F-1A0CC0B4888A}"/>
+          </ac:cxnSpMkLst>
+        </pc:cxnChg>
+        <pc:cxnChg chg="add del mod">
           <ac:chgData name="Fatima Pillosu" userId="a6295d4dc9e22643" providerId="LiveId" clId="{C7909C26-7110-4B46-8F1C-97658D5207FA}" dt="2025-06-03T14:53:19.515" v="360" actId="21"/>
           <ac:cxnSpMkLst>
             <pc:docMk/>
@@ -1584,6 +2176,14 @@
           </ac:cxnSpMkLst>
         </pc:cxnChg>
         <pc:cxnChg chg="add del mod">
+          <ac:chgData name="Fatima Pillosu" userId="a6295d4dc9e22643" providerId="LiveId" clId="{C7909C26-7110-4B46-8F1C-97658D5207FA}" dt="2025-06-05T08:57:51.731" v="1235" actId="21"/>
+          <ac:cxnSpMkLst>
+            <pc:docMk/>
+            <pc:sldMk cId="3354384854" sldId="256"/>
+            <ac:cxnSpMk id="34" creationId="{9778960E-B8BB-13B7-75CF-504745A15D25}"/>
+          </ac:cxnSpMkLst>
+        </pc:cxnChg>
+        <pc:cxnChg chg="add del mod">
           <ac:chgData name="Fatima Pillosu" userId="a6295d4dc9e22643" providerId="LiveId" clId="{C7909C26-7110-4B46-8F1C-97658D5207FA}" dt="2025-06-03T14:53:19.515" v="360" actId="21"/>
           <ac:cxnSpMkLst>
             <pc:docMk/>
@@ -1592,6 +2192,30 @@
           </ac:cxnSpMkLst>
         </pc:cxnChg>
         <pc:cxnChg chg="add del mod">
+          <ac:chgData name="Fatima Pillosu" userId="a6295d4dc9e22643" providerId="LiveId" clId="{C7909C26-7110-4B46-8F1C-97658D5207FA}" dt="2025-06-05T08:57:51.731" v="1235" actId="21"/>
+          <ac:cxnSpMkLst>
+            <pc:docMk/>
+            <pc:sldMk cId="3354384854" sldId="256"/>
+            <ac:cxnSpMk id="35" creationId="{FC730EE6-A865-F984-6BF9-922C3B75E9CB}"/>
+          </ac:cxnSpMkLst>
+        </pc:cxnChg>
+        <pc:cxnChg chg="add del mod">
+          <ac:chgData name="Fatima Pillosu" userId="a6295d4dc9e22643" providerId="LiveId" clId="{C7909C26-7110-4B46-8F1C-97658D5207FA}" dt="2025-06-05T08:57:51.731" v="1235" actId="21"/>
+          <ac:cxnSpMkLst>
+            <pc:docMk/>
+            <pc:sldMk cId="3354384854" sldId="256"/>
+            <ac:cxnSpMk id="36" creationId="{EACCC1CE-FD33-0835-95CD-4A0BE2013F80}"/>
+          </ac:cxnSpMkLst>
+        </pc:cxnChg>
+        <pc:cxnChg chg="add del mod">
+          <ac:chgData name="Fatima Pillosu" userId="a6295d4dc9e22643" providerId="LiveId" clId="{C7909C26-7110-4B46-8F1C-97658D5207FA}" dt="2025-06-05T08:57:51.731" v="1235" actId="21"/>
+          <ac:cxnSpMkLst>
+            <pc:docMk/>
+            <pc:sldMk cId="3354384854" sldId="256"/>
+            <ac:cxnSpMk id="37" creationId="{7EF61BF4-0D6D-5F88-43D7-D8C8E3B0885C}"/>
+          </ac:cxnSpMkLst>
+        </pc:cxnChg>
+        <pc:cxnChg chg="add del mod">
           <ac:chgData name="Fatima Pillosu" userId="a6295d4dc9e22643" providerId="LiveId" clId="{C7909C26-7110-4B46-8F1C-97658D5207FA}" dt="2025-06-03T14:53:19.515" v="360" actId="21"/>
           <ac:cxnSpMkLst>
             <pc:docMk/>
@@ -1600,6 +2224,14 @@
           </ac:cxnSpMkLst>
         </pc:cxnChg>
         <pc:cxnChg chg="add del mod">
+          <ac:chgData name="Fatima Pillosu" userId="a6295d4dc9e22643" providerId="LiveId" clId="{C7909C26-7110-4B46-8F1C-97658D5207FA}" dt="2025-06-05T08:57:51.731" v="1235" actId="21"/>
+          <ac:cxnSpMkLst>
+            <pc:docMk/>
+            <pc:sldMk cId="3354384854" sldId="256"/>
+            <ac:cxnSpMk id="38" creationId="{FFAE2ACE-ABDC-A2F2-DCB7-F5057E21A66D}"/>
+          </ac:cxnSpMkLst>
+        </pc:cxnChg>
+        <pc:cxnChg chg="add del mod">
           <ac:chgData name="Fatima Pillosu" userId="a6295d4dc9e22643" providerId="LiveId" clId="{C7909C26-7110-4B46-8F1C-97658D5207FA}" dt="2025-06-03T14:53:19.515" v="360" actId="21"/>
           <ac:cxnSpMkLst>
             <pc:docMk/>
@@ -1608,6 +2240,22 @@
           </ac:cxnSpMkLst>
         </pc:cxnChg>
         <pc:cxnChg chg="add del mod">
+          <ac:chgData name="Fatima Pillosu" userId="a6295d4dc9e22643" providerId="LiveId" clId="{C7909C26-7110-4B46-8F1C-97658D5207FA}" dt="2025-06-05T08:57:51.731" v="1235" actId="21"/>
+          <ac:cxnSpMkLst>
+            <pc:docMk/>
+            <pc:sldMk cId="3354384854" sldId="256"/>
+            <ac:cxnSpMk id="39" creationId="{5F6D91F5-3338-557F-0CB3-E7DC04EB077C}"/>
+          </ac:cxnSpMkLst>
+        </pc:cxnChg>
+        <pc:cxnChg chg="add del mod">
+          <ac:chgData name="Fatima Pillosu" userId="a6295d4dc9e22643" providerId="LiveId" clId="{C7909C26-7110-4B46-8F1C-97658D5207FA}" dt="2025-06-05T08:57:51.731" v="1235" actId="21"/>
+          <ac:cxnSpMkLst>
+            <pc:docMk/>
+            <pc:sldMk cId="3354384854" sldId="256"/>
+            <ac:cxnSpMk id="40" creationId="{EC6CF449-A72A-A019-7618-C21BAA994F09}"/>
+          </ac:cxnSpMkLst>
+        </pc:cxnChg>
+        <pc:cxnChg chg="add del mod">
           <ac:chgData name="Fatima Pillosu" userId="a6295d4dc9e22643" providerId="LiveId" clId="{C7909C26-7110-4B46-8F1C-97658D5207FA}" dt="2025-06-03T14:53:19.515" v="360" actId="21"/>
           <ac:cxnSpMkLst>
             <pc:docMk/>
@@ -1624,6 +2272,14 @@
           </ac:cxnSpMkLst>
         </pc:cxnChg>
         <pc:cxnChg chg="add del mod">
+          <ac:chgData name="Fatima Pillosu" userId="a6295d4dc9e22643" providerId="LiveId" clId="{C7909C26-7110-4B46-8F1C-97658D5207FA}" dt="2025-06-05T08:57:51.731" v="1235" actId="21"/>
+          <ac:cxnSpMkLst>
+            <pc:docMk/>
+            <pc:sldMk cId="3354384854" sldId="256"/>
+            <ac:cxnSpMk id="41" creationId="{CB73C3F9-D34E-5387-D738-F027F9F21D82}"/>
+          </ac:cxnSpMkLst>
+        </pc:cxnChg>
+        <pc:cxnChg chg="add del mod">
           <ac:chgData name="Fatima Pillosu" userId="a6295d4dc9e22643" providerId="LiveId" clId="{C7909C26-7110-4B46-8F1C-97658D5207FA}" dt="2025-06-03T14:53:19.515" v="360" actId="21"/>
           <ac:cxnSpMkLst>
             <pc:docMk/>
@@ -1632,6 +2288,14 @@
           </ac:cxnSpMkLst>
         </pc:cxnChg>
         <pc:cxnChg chg="add del mod">
+          <ac:chgData name="Fatima Pillosu" userId="a6295d4dc9e22643" providerId="LiveId" clId="{C7909C26-7110-4B46-8F1C-97658D5207FA}" dt="2025-06-05T08:57:51.731" v="1235" actId="21"/>
+          <ac:cxnSpMkLst>
+            <pc:docMk/>
+            <pc:sldMk cId="3354384854" sldId="256"/>
+            <ac:cxnSpMk id="42" creationId="{FB0CCEB5-3FCE-544B-3DA3-C04064EA44E6}"/>
+          </ac:cxnSpMkLst>
+        </pc:cxnChg>
+        <pc:cxnChg chg="add del mod">
           <ac:chgData name="Fatima Pillosu" userId="a6295d4dc9e22643" providerId="LiveId" clId="{C7909C26-7110-4B46-8F1C-97658D5207FA}" dt="2025-06-03T14:53:19.515" v="360" actId="21"/>
           <ac:cxnSpMkLst>
             <pc:docMk/>
@@ -1640,6 +2304,22 @@
           </ac:cxnSpMkLst>
         </pc:cxnChg>
         <pc:cxnChg chg="add del mod">
+          <ac:chgData name="Fatima Pillosu" userId="a6295d4dc9e22643" providerId="LiveId" clId="{C7909C26-7110-4B46-8F1C-97658D5207FA}" dt="2025-06-05T08:57:51.731" v="1235" actId="21"/>
+          <ac:cxnSpMkLst>
+            <pc:docMk/>
+            <pc:sldMk cId="3354384854" sldId="256"/>
+            <ac:cxnSpMk id="43" creationId="{BF7F9AE8-B09C-0594-6E08-D8E9EDCA7F9C}"/>
+          </ac:cxnSpMkLst>
+        </pc:cxnChg>
+        <pc:cxnChg chg="add del mod">
+          <ac:chgData name="Fatima Pillosu" userId="a6295d4dc9e22643" providerId="LiveId" clId="{C7909C26-7110-4B46-8F1C-97658D5207FA}" dt="2025-06-05T08:57:51.731" v="1235" actId="21"/>
+          <ac:cxnSpMkLst>
+            <pc:docMk/>
+            <pc:sldMk cId="3354384854" sldId="256"/>
+            <ac:cxnSpMk id="44" creationId="{8296C103-D665-8AB6-3B09-566D3BB7F3F9}"/>
+          </ac:cxnSpMkLst>
+        </pc:cxnChg>
+        <pc:cxnChg chg="add del mod">
           <ac:chgData name="Fatima Pillosu" userId="a6295d4dc9e22643" providerId="LiveId" clId="{C7909C26-7110-4B46-8F1C-97658D5207FA}" dt="2025-06-03T14:53:19.515" v="360" actId="21"/>
           <ac:cxnSpMkLst>
             <pc:docMk/>
@@ -1656,6 +2336,14 @@
           </ac:cxnSpMkLst>
         </pc:cxnChg>
         <pc:cxnChg chg="add del mod">
+          <ac:chgData name="Fatima Pillosu" userId="a6295d4dc9e22643" providerId="LiveId" clId="{C7909C26-7110-4B46-8F1C-97658D5207FA}" dt="2025-06-05T08:57:51.731" v="1235" actId="21"/>
+          <ac:cxnSpMkLst>
+            <pc:docMk/>
+            <pc:sldMk cId="3354384854" sldId="256"/>
+            <ac:cxnSpMk id="46" creationId="{10D6DB07-7601-5557-6A71-39B2BB89BCB8}"/>
+          </ac:cxnSpMkLst>
+        </pc:cxnChg>
+        <pc:cxnChg chg="add del mod">
           <ac:chgData name="Fatima Pillosu" userId="a6295d4dc9e22643" providerId="LiveId" clId="{C7909C26-7110-4B46-8F1C-97658D5207FA}" dt="2025-06-03T14:53:19.515" v="360" actId="21"/>
           <ac:cxnSpMkLst>
             <pc:docMk/>
@@ -1736,11 +2424,67 @@
           </ac:cxnSpMkLst>
         </pc:cxnChg>
         <pc:cxnChg chg="add del mod">
+          <ac:chgData name="Fatima Pillosu" userId="a6295d4dc9e22643" providerId="LiveId" clId="{C7909C26-7110-4B46-8F1C-97658D5207FA}" dt="2025-06-05T08:57:51.731" v="1235" actId="21"/>
+          <ac:cxnSpMkLst>
+            <pc:docMk/>
+            <pc:sldMk cId="3354384854" sldId="256"/>
+            <ac:cxnSpMk id="57" creationId="{4F6CC630-74F7-00CC-B311-8D4D17E7A697}"/>
+          </ac:cxnSpMkLst>
+        </pc:cxnChg>
+        <pc:cxnChg chg="add del mod">
           <ac:chgData name="Fatima Pillosu" userId="a6295d4dc9e22643" providerId="LiveId" clId="{C7909C26-7110-4B46-8F1C-97658D5207FA}" dt="2025-06-03T14:53:19.515" v="360" actId="21"/>
           <ac:cxnSpMkLst>
             <pc:docMk/>
             <pc:sldMk cId="3354384854" sldId="256"/>
             <ac:cxnSpMk id="58" creationId="{10D6DB07-7601-5557-6A71-39B2BB89BCB8}"/>
+          </ac:cxnSpMkLst>
+        </pc:cxnChg>
+        <pc:cxnChg chg="add del mod">
+          <ac:chgData name="Fatima Pillosu" userId="a6295d4dc9e22643" providerId="LiveId" clId="{C7909C26-7110-4B46-8F1C-97658D5207FA}" dt="2025-06-05T08:57:51.731" v="1235" actId="21"/>
+          <ac:cxnSpMkLst>
+            <pc:docMk/>
+            <pc:sldMk cId="3354384854" sldId="256"/>
+            <ac:cxnSpMk id="58" creationId="{54AC9DFC-A95D-FF43-9DA7-3F77067B5B1F}"/>
+          </ac:cxnSpMkLst>
+        </pc:cxnChg>
+        <pc:cxnChg chg="add del mod">
+          <ac:chgData name="Fatima Pillosu" userId="a6295d4dc9e22643" providerId="LiveId" clId="{C7909C26-7110-4B46-8F1C-97658D5207FA}" dt="2025-06-05T08:57:51.731" v="1235" actId="21"/>
+          <ac:cxnSpMkLst>
+            <pc:docMk/>
+            <pc:sldMk cId="3354384854" sldId="256"/>
+            <ac:cxnSpMk id="59" creationId="{536B190C-D802-668A-3A2F-EADAA9B117FB}"/>
+          </ac:cxnSpMkLst>
+        </pc:cxnChg>
+        <pc:cxnChg chg="add del mod">
+          <ac:chgData name="Fatima Pillosu" userId="a6295d4dc9e22643" providerId="LiveId" clId="{C7909C26-7110-4B46-8F1C-97658D5207FA}" dt="2025-06-05T08:57:51.731" v="1235" actId="21"/>
+          <ac:cxnSpMkLst>
+            <pc:docMk/>
+            <pc:sldMk cId="3354384854" sldId="256"/>
+            <ac:cxnSpMk id="60" creationId="{8C6DC7EB-ACC3-93EE-3F85-2D4F9582590D}"/>
+          </ac:cxnSpMkLst>
+        </pc:cxnChg>
+        <pc:cxnChg chg="add del mod">
+          <ac:chgData name="Fatima Pillosu" userId="a6295d4dc9e22643" providerId="LiveId" clId="{C7909C26-7110-4B46-8F1C-97658D5207FA}" dt="2025-06-05T08:57:51.731" v="1235" actId="21"/>
+          <ac:cxnSpMkLst>
+            <pc:docMk/>
+            <pc:sldMk cId="3354384854" sldId="256"/>
+            <ac:cxnSpMk id="61" creationId="{EDAD99B5-F84C-EE59-7063-69CAD2F7AF29}"/>
+          </ac:cxnSpMkLst>
+        </pc:cxnChg>
+        <pc:cxnChg chg="add del mod">
+          <ac:chgData name="Fatima Pillosu" userId="a6295d4dc9e22643" providerId="LiveId" clId="{C7909C26-7110-4B46-8F1C-97658D5207FA}" dt="2025-06-05T08:57:51.731" v="1235" actId="21"/>
+          <ac:cxnSpMkLst>
+            <pc:docMk/>
+            <pc:sldMk cId="3354384854" sldId="256"/>
+            <ac:cxnSpMk id="62" creationId="{A58CBC7E-E89D-229A-405A-16571F42DD04}"/>
+          </ac:cxnSpMkLst>
+        </pc:cxnChg>
+        <pc:cxnChg chg="add del mod">
+          <ac:chgData name="Fatima Pillosu" userId="a6295d4dc9e22643" providerId="LiveId" clId="{C7909C26-7110-4B46-8F1C-97658D5207FA}" dt="2025-06-05T08:57:51.731" v="1235" actId="21"/>
+          <ac:cxnSpMkLst>
+            <pc:docMk/>
+            <pc:sldMk cId="3354384854" sldId="256"/>
+            <ac:cxnSpMk id="63" creationId="{C3617998-F352-C21B-76BA-7CE607336375}"/>
           </ac:cxnSpMkLst>
         </pc:cxnChg>
         <pc:cxnChg chg="add del mod">
@@ -2376,6 +3120,14 @@
           </ac:cxnSpMkLst>
         </pc:cxnChg>
         <pc:cxnChg chg="add del mod">
+          <ac:chgData name="Fatima Pillosu" userId="a6295d4dc9e22643" providerId="LiveId" clId="{C7909C26-7110-4B46-8F1C-97658D5207FA}" dt="2025-06-05T08:57:51.731" v="1235" actId="21"/>
+          <ac:cxnSpMkLst>
+            <pc:docMk/>
+            <pc:sldMk cId="3354384854" sldId="256"/>
+            <ac:cxnSpMk id="576" creationId="{019FE13D-B077-2A14-975A-4A5BD5828F54}"/>
+          </ac:cxnSpMkLst>
+        </pc:cxnChg>
+        <pc:cxnChg chg="add del mod">
           <ac:chgData name="Fatima Pillosu" userId="a6295d4dc9e22643" providerId="LiveId" clId="{C7909C26-7110-4B46-8F1C-97658D5207FA}" dt="2025-06-03T15:30:10.494" v="1115" actId="21"/>
           <ac:cxnSpMkLst>
             <pc:docMk/>
@@ -2415,220 +3167,452 @@
             <ac:cxnSpMk id="580" creationId="{A58CBC7E-E89D-229A-405A-16571F42DD04}"/>
           </ac:cxnSpMkLst>
         </pc:cxnChg>
+        <pc:cxnChg chg="add del mod">
+          <ac:chgData name="Fatima Pillosu" userId="a6295d4dc9e22643" providerId="LiveId" clId="{C7909C26-7110-4B46-8F1C-97658D5207FA}" dt="2025-06-05T08:54:49.448" v="1144" actId="21"/>
+          <ac:cxnSpMkLst>
+            <pc:docMk/>
+            <pc:sldMk cId="3354384854" sldId="256"/>
+            <ac:cxnSpMk id="599" creationId="{EE599EA5-4C3D-A45B-7B1E-B025BE9128AC}"/>
+          </ac:cxnSpMkLst>
+        </pc:cxnChg>
+        <pc:cxnChg chg="add del mod">
+          <ac:chgData name="Fatima Pillosu" userId="a6295d4dc9e22643" providerId="LiveId" clId="{C7909C26-7110-4B46-8F1C-97658D5207FA}" dt="2025-06-05T08:54:49.448" v="1144" actId="21"/>
+          <ac:cxnSpMkLst>
+            <pc:docMk/>
+            <pc:sldMk cId="3354384854" sldId="256"/>
+            <ac:cxnSpMk id="601" creationId="{00B4791E-555E-547F-8448-A1D6882390C9}"/>
+          </ac:cxnSpMkLst>
+        </pc:cxnChg>
+        <pc:cxnChg chg="add del mod">
+          <ac:chgData name="Fatima Pillosu" userId="a6295d4dc9e22643" providerId="LiveId" clId="{C7909C26-7110-4B46-8F1C-97658D5207FA}" dt="2025-06-05T08:54:49.448" v="1144" actId="21"/>
+          <ac:cxnSpMkLst>
+            <pc:docMk/>
+            <pc:sldMk cId="3354384854" sldId="256"/>
+            <ac:cxnSpMk id="603" creationId="{A5E89D36-496B-BC6E-6451-DB68F154953E}"/>
+          </ac:cxnSpMkLst>
+        </pc:cxnChg>
+        <pc:cxnChg chg="add del mod">
+          <ac:chgData name="Fatima Pillosu" userId="a6295d4dc9e22643" providerId="LiveId" clId="{C7909C26-7110-4B46-8F1C-97658D5207FA}" dt="2025-06-05T08:54:49.448" v="1144" actId="21"/>
+          <ac:cxnSpMkLst>
+            <pc:docMk/>
+            <pc:sldMk cId="3354384854" sldId="256"/>
+            <ac:cxnSpMk id="605" creationId="{55935181-890B-720D-C664-35CB54240F4E}"/>
+          </ac:cxnSpMkLst>
+        </pc:cxnChg>
+        <pc:cxnChg chg="add del mod">
+          <ac:chgData name="Fatima Pillosu" userId="a6295d4dc9e22643" providerId="LiveId" clId="{C7909C26-7110-4B46-8F1C-97658D5207FA}" dt="2025-06-05T08:54:49.448" v="1144" actId="21"/>
+          <ac:cxnSpMkLst>
+            <pc:docMk/>
+            <pc:sldMk cId="3354384854" sldId="256"/>
+            <ac:cxnSpMk id="606" creationId="{EF30C496-2771-0778-6824-2EB6BE7CEFF0}"/>
+          </ac:cxnSpMkLst>
+        </pc:cxnChg>
+        <pc:cxnChg chg="add del mod">
+          <ac:chgData name="Fatima Pillosu" userId="a6295d4dc9e22643" providerId="LiveId" clId="{C7909C26-7110-4B46-8F1C-97658D5207FA}" dt="2025-06-05T08:54:49.448" v="1144" actId="21"/>
+          <ac:cxnSpMkLst>
+            <pc:docMk/>
+            <pc:sldMk cId="3354384854" sldId="256"/>
+            <ac:cxnSpMk id="607" creationId="{C96442FF-908A-84F2-7E54-6AB7485662E5}"/>
+          </ac:cxnSpMkLst>
+        </pc:cxnChg>
+        <pc:cxnChg chg="add del mod">
+          <ac:chgData name="Fatima Pillosu" userId="a6295d4dc9e22643" providerId="LiveId" clId="{C7909C26-7110-4B46-8F1C-97658D5207FA}" dt="2025-06-05T08:54:49.448" v="1144" actId="21"/>
+          <ac:cxnSpMkLst>
+            <pc:docMk/>
+            <pc:sldMk cId="3354384854" sldId="256"/>
+            <ac:cxnSpMk id="608" creationId="{68C79158-7AC0-2089-1EB1-659E9CE9B879}"/>
+          </ac:cxnSpMkLst>
+        </pc:cxnChg>
+        <pc:cxnChg chg="add del mod">
+          <ac:chgData name="Fatima Pillosu" userId="a6295d4dc9e22643" providerId="LiveId" clId="{C7909C26-7110-4B46-8F1C-97658D5207FA}" dt="2025-06-05T08:54:49.448" v="1144" actId="21"/>
+          <ac:cxnSpMkLst>
+            <pc:docMk/>
+            <pc:sldMk cId="3354384854" sldId="256"/>
+            <ac:cxnSpMk id="609" creationId="{4EC70538-F86D-F7C9-DDDD-DA52C78765E3}"/>
+          </ac:cxnSpMkLst>
+        </pc:cxnChg>
+        <pc:cxnChg chg="add del mod">
+          <ac:chgData name="Fatima Pillosu" userId="a6295d4dc9e22643" providerId="LiveId" clId="{C7909C26-7110-4B46-8F1C-97658D5207FA}" dt="2025-06-05T08:54:49.448" v="1144" actId="21"/>
+          <ac:cxnSpMkLst>
+            <pc:docMk/>
+            <pc:sldMk cId="3354384854" sldId="256"/>
+            <ac:cxnSpMk id="610" creationId="{9F7D2FEC-C785-93BC-449F-1A0CC0B4888A}"/>
+          </ac:cxnSpMkLst>
+        </pc:cxnChg>
+        <pc:cxnChg chg="add del mod">
+          <ac:chgData name="Fatima Pillosu" userId="a6295d4dc9e22643" providerId="LiveId" clId="{C7909C26-7110-4B46-8F1C-97658D5207FA}" dt="2025-06-05T08:54:49.448" v="1144" actId="21"/>
+          <ac:cxnSpMkLst>
+            <pc:docMk/>
+            <pc:sldMk cId="3354384854" sldId="256"/>
+            <ac:cxnSpMk id="611" creationId="{9778960E-B8BB-13B7-75CF-504745A15D25}"/>
+          </ac:cxnSpMkLst>
+        </pc:cxnChg>
+        <pc:cxnChg chg="add del mod">
+          <ac:chgData name="Fatima Pillosu" userId="a6295d4dc9e22643" providerId="LiveId" clId="{C7909C26-7110-4B46-8F1C-97658D5207FA}" dt="2025-06-05T08:54:49.448" v="1144" actId="21"/>
+          <ac:cxnSpMkLst>
+            <pc:docMk/>
+            <pc:sldMk cId="3354384854" sldId="256"/>
+            <ac:cxnSpMk id="612" creationId="{FC730EE6-A865-F984-6BF9-922C3B75E9CB}"/>
+          </ac:cxnSpMkLst>
+        </pc:cxnChg>
+        <pc:cxnChg chg="add del mod">
+          <ac:chgData name="Fatima Pillosu" userId="a6295d4dc9e22643" providerId="LiveId" clId="{C7909C26-7110-4B46-8F1C-97658D5207FA}" dt="2025-06-05T08:54:49.448" v="1144" actId="21"/>
+          <ac:cxnSpMkLst>
+            <pc:docMk/>
+            <pc:sldMk cId="3354384854" sldId="256"/>
+            <ac:cxnSpMk id="613" creationId="{EACCC1CE-FD33-0835-95CD-4A0BE2013F80}"/>
+          </ac:cxnSpMkLst>
+        </pc:cxnChg>
+        <pc:cxnChg chg="add del mod">
+          <ac:chgData name="Fatima Pillosu" userId="a6295d4dc9e22643" providerId="LiveId" clId="{C7909C26-7110-4B46-8F1C-97658D5207FA}" dt="2025-06-05T08:54:49.448" v="1144" actId="21"/>
+          <ac:cxnSpMkLst>
+            <pc:docMk/>
+            <pc:sldMk cId="3354384854" sldId="256"/>
+            <ac:cxnSpMk id="614" creationId="{7EF61BF4-0D6D-5F88-43D7-D8C8E3B0885C}"/>
+          </ac:cxnSpMkLst>
+        </pc:cxnChg>
+        <pc:cxnChg chg="add del mod">
+          <ac:chgData name="Fatima Pillosu" userId="a6295d4dc9e22643" providerId="LiveId" clId="{C7909C26-7110-4B46-8F1C-97658D5207FA}" dt="2025-06-05T08:54:49.448" v="1144" actId="21"/>
+          <ac:cxnSpMkLst>
+            <pc:docMk/>
+            <pc:sldMk cId="3354384854" sldId="256"/>
+            <ac:cxnSpMk id="615" creationId="{FFAE2ACE-ABDC-A2F2-DCB7-F5057E21A66D}"/>
+          </ac:cxnSpMkLst>
+        </pc:cxnChg>
+        <pc:cxnChg chg="add del mod">
+          <ac:chgData name="Fatima Pillosu" userId="a6295d4dc9e22643" providerId="LiveId" clId="{C7909C26-7110-4B46-8F1C-97658D5207FA}" dt="2025-06-05T08:54:49.448" v="1144" actId="21"/>
+          <ac:cxnSpMkLst>
+            <pc:docMk/>
+            <pc:sldMk cId="3354384854" sldId="256"/>
+            <ac:cxnSpMk id="616" creationId="{5F6D91F5-3338-557F-0CB3-E7DC04EB077C}"/>
+          </ac:cxnSpMkLst>
+        </pc:cxnChg>
+        <pc:cxnChg chg="add del mod">
+          <ac:chgData name="Fatima Pillosu" userId="a6295d4dc9e22643" providerId="LiveId" clId="{C7909C26-7110-4B46-8F1C-97658D5207FA}" dt="2025-06-05T08:54:49.448" v="1144" actId="21"/>
+          <ac:cxnSpMkLst>
+            <pc:docMk/>
+            <pc:sldMk cId="3354384854" sldId="256"/>
+            <ac:cxnSpMk id="617" creationId="{EC6CF449-A72A-A019-7618-C21BAA994F09}"/>
+          </ac:cxnSpMkLst>
+        </pc:cxnChg>
+        <pc:cxnChg chg="add del mod">
+          <ac:chgData name="Fatima Pillosu" userId="a6295d4dc9e22643" providerId="LiveId" clId="{C7909C26-7110-4B46-8F1C-97658D5207FA}" dt="2025-06-05T08:54:49.448" v="1144" actId="21"/>
+          <ac:cxnSpMkLst>
+            <pc:docMk/>
+            <pc:sldMk cId="3354384854" sldId="256"/>
+            <ac:cxnSpMk id="618" creationId="{CB73C3F9-D34E-5387-D738-F027F9F21D82}"/>
+          </ac:cxnSpMkLst>
+        </pc:cxnChg>
+        <pc:cxnChg chg="add del mod">
+          <ac:chgData name="Fatima Pillosu" userId="a6295d4dc9e22643" providerId="LiveId" clId="{C7909C26-7110-4B46-8F1C-97658D5207FA}" dt="2025-06-05T08:54:49.448" v="1144" actId="21"/>
+          <ac:cxnSpMkLst>
+            <pc:docMk/>
+            <pc:sldMk cId="3354384854" sldId="256"/>
+            <ac:cxnSpMk id="619" creationId="{FB0CCEB5-3FCE-544B-3DA3-C04064EA44E6}"/>
+          </ac:cxnSpMkLst>
+        </pc:cxnChg>
+        <pc:cxnChg chg="add del mod">
+          <ac:chgData name="Fatima Pillosu" userId="a6295d4dc9e22643" providerId="LiveId" clId="{C7909C26-7110-4B46-8F1C-97658D5207FA}" dt="2025-06-05T08:54:49.448" v="1144" actId="21"/>
+          <ac:cxnSpMkLst>
+            <pc:docMk/>
+            <pc:sldMk cId="3354384854" sldId="256"/>
+            <ac:cxnSpMk id="620" creationId="{BF7F9AE8-B09C-0594-6E08-D8E9EDCA7F9C}"/>
+          </ac:cxnSpMkLst>
+        </pc:cxnChg>
+        <pc:cxnChg chg="add del mod">
+          <ac:chgData name="Fatima Pillosu" userId="a6295d4dc9e22643" providerId="LiveId" clId="{C7909C26-7110-4B46-8F1C-97658D5207FA}" dt="2025-06-05T08:54:49.448" v="1144" actId="21"/>
+          <ac:cxnSpMkLst>
+            <pc:docMk/>
+            <pc:sldMk cId="3354384854" sldId="256"/>
+            <ac:cxnSpMk id="622" creationId="{8296C103-D665-8AB6-3B09-566D3BB7F3F9}"/>
+          </ac:cxnSpMkLst>
+        </pc:cxnChg>
+        <pc:cxnChg chg="add del mod">
+          <ac:chgData name="Fatima Pillosu" userId="a6295d4dc9e22643" providerId="LiveId" clId="{C7909C26-7110-4B46-8F1C-97658D5207FA}" dt="2025-06-05T08:54:49.448" v="1144" actId="21"/>
+          <ac:cxnSpMkLst>
+            <pc:docMk/>
+            <pc:sldMk cId="3354384854" sldId="256"/>
+            <ac:cxnSpMk id="624" creationId="{10D6DB07-7601-5557-6A71-39B2BB89BCB8}"/>
+          </ac:cxnSpMkLst>
+        </pc:cxnChg>
+        <pc:cxnChg chg="add del mod">
+          <ac:chgData name="Fatima Pillosu" userId="a6295d4dc9e22643" providerId="LiveId" clId="{C7909C26-7110-4B46-8F1C-97658D5207FA}" dt="2025-06-05T08:54:49.448" v="1144" actId="21"/>
+          <ac:cxnSpMkLst>
+            <pc:docMk/>
+            <pc:sldMk cId="3354384854" sldId="256"/>
+            <ac:cxnSpMk id="635" creationId="{4F6CC630-74F7-00CC-B311-8D4D17E7A697}"/>
+          </ac:cxnSpMkLst>
+        </pc:cxnChg>
+        <pc:cxnChg chg="add del mod">
+          <ac:chgData name="Fatima Pillosu" userId="a6295d4dc9e22643" providerId="LiveId" clId="{C7909C26-7110-4B46-8F1C-97658D5207FA}" dt="2025-06-05T08:54:49.448" v="1144" actId="21"/>
+          <ac:cxnSpMkLst>
+            <pc:docMk/>
+            <pc:sldMk cId="3354384854" sldId="256"/>
+            <ac:cxnSpMk id="636" creationId="{54AC9DFC-A95D-FF43-9DA7-3F77067B5B1F}"/>
+          </ac:cxnSpMkLst>
+        </pc:cxnChg>
+        <pc:cxnChg chg="add del mod">
+          <ac:chgData name="Fatima Pillosu" userId="a6295d4dc9e22643" providerId="LiveId" clId="{C7909C26-7110-4B46-8F1C-97658D5207FA}" dt="2025-06-05T08:54:49.448" v="1144" actId="21"/>
+          <ac:cxnSpMkLst>
+            <pc:docMk/>
+            <pc:sldMk cId="3354384854" sldId="256"/>
+            <ac:cxnSpMk id="637" creationId="{536B190C-D802-668A-3A2F-EADAA9B117FB}"/>
+          </ac:cxnSpMkLst>
+        </pc:cxnChg>
+        <pc:cxnChg chg="add del mod">
+          <ac:chgData name="Fatima Pillosu" userId="a6295d4dc9e22643" providerId="LiveId" clId="{C7909C26-7110-4B46-8F1C-97658D5207FA}" dt="2025-06-05T08:54:49.448" v="1144" actId="21"/>
+          <ac:cxnSpMkLst>
+            <pc:docMk/>
+            <pc:sldMk cId="3354384854" sldId="256"/>
+            <ac:cxnSpMk id="638" creationId="{8C6DC7EB-ACC3-93EE-3F85-2D4F9582590D}"/>
+          </ac:cxnSpMkLst>
+        </pc:cxnChg>
+        <pc:cxnChg chg="add del mod">
+          <ac:chgData name="Fatima Pillosu" userId="a6295d4dc9e22643" providerId="LiveId" clId="{C7909C26-7110-4B46-8F1C-97658D5207FA}" dt="2025-06-05T08:54:49.448" v="1144" actId="21"/>
+          <ac:cxnSpMkLst>
+            <pc:docMk/>
+            <pc:sldMk cId="3354384854" sldId="256"/>
+            <ac:cxnSpMk id="639" creationId="{EDAD99B5-F84C-EE59-7063-69CAD2F7AF29}"/>
+          </ac:cxnSpMkLst>
+        </pc:cxnChg>
+        <pc:cxnChg chg="add del mod">
+          <ac:chgData name="Fatima Pillosu" userId="a6295d4dc9e22643" providerId="LiveId" clId="{C7909C26-7110-4B46-8F1C-97658D5207FA}" dt="2025-06-05T08:54:49.448" v="1144" actId="21"/>
+          <ac:cxnSpMkLst>
+            <pc:docMk/>
+            <pc:sldMk cId="3354384854" sldId="256"/>
+            <ac:cxnSpMk id="640" creationId="{A58CBC7E-E89D-229A-405A-16571F42DD04}"/>
+          </ac:cxnSpMkLst>
+        </pc:cxnChg>
         <pc:cxnChg chg="add mod">
-          <ac:chgData name="Fatima Pillosu" userId="a6295d4dc9e22643" providerId="LiveId" clId="{C7909C26-7110-4B46-8F1C-97658D5207FA}" dt="2025-06-03T15:30:18.539" v="1116"/>
-          <ac:cxnSpMkLst>
-            <pc:docMk/>
-            <pc:sldMk cId="3354384854" sldId="256"/>
-            <ac:cxnSpMk id="599" creationId="{EE599EA5-4C3D-A45B-7B1E-B025BE9128AC}"/>
+          <ac:chgData name="Fatima Pillosu" userId="a6295d4dc9e22643" providerId="LiveId" clId="{C7909C26-7110-4B46-8F1C-97658D5207FA}" dt="2025-06-05T08:58:05.880" v="1236"/>
+          <ac:cxnSpMkLst>
+            <pc:docMk/>
+            <pc:sldMk cId="3354384854" sldId="256"/>
+            <ac:cxnSpMk id="658" creationId="{EE599EA5-4C3D-A45B-7B1E-B025BE9128AC}"/>
           </ac:cxnSpMkLst>
         </pc:cxnChg>
         <pc:cxnChg chg="add mod">
-          <ac:chgData name="Fatima Pillosu" userId="a6295d4dc9e22643" providerId="LiveId" clId="{C7909C26-7110-4B46-8F1C-97658D5207FA}" dt="2025-06-03T15:30:18.539" v="1116"/>
-          <ac:cxnSpMkLst>
-            <pc:docMk/>
-            <pc:sldMk cId="3354384854" sldId="256"/>
-            <ac:cxnSpMk id="601" creationId="{00B4791E-555E-547F-8448-A1D6882390C9}"/>
+          <ac:chgData name="Fatima Pillosu" userId="a6295d4dc9e22643" providerId="LiveId" clId="{C7909C26-7110-4B46-8F1C-97658D5207FA}" dt="2025-06-05T08:58:05.880" v="1236"/>
+          <ac:cxnSpMkLst>
+            <pc:docMk/>
+            <pc:sldMk cId="3354384854" sldId="256"/>
+            <ac:cxnSpMk id="660" creationId="{00B4791E-555E-547F-8448-A1D6882390C9}"/>
           </ac:cxnSpMkLst>
         </pc:cxnChg>
         <pc:cxnChg chg="add mod">
-          <ac:chgData name="Fatima Pillosu" userId="a6295d4dc9e22643" providerId="LiveId" clId="{C7909C26-7110-4B46-8F1C-97658D5207FA}" dt="2025-06-03T15:30:18.539" v="1116"/>
-          <ac:cxnSpMkLst>
-            <pc:docMk/>
-            <pc:sldMk cId="3354384854" sldId="256"/>
-            <ac:cxnSpMk id="603" creationId="{A5E89D36-496B-BC6E-6451-DB68F154953E}"/>
+          <ac:chgData name="Fatima Pillosu" userId="a6295d4dc9e22643" providerId="LiveId" clId="{C7909C26-7110-4B46-8F1C-97658D5207FA}" dt="2025-06-05T08:58:15.251" v="1237" actId="14100"/>
+          <ac:cxnSpMkLst>
+            <pc:docMk/>
+            <pc:sldMk cId="3354384854" sldId="256"/>
+            <ac:cxnSpMk id="662" creationId="{A5E89D36-496B-BC6E-6451-DB68F154953E}"/>
           </ac:cxnSpMkLst>
         </pc:cxnChg>
         <pc:cxnChg chg="add mod">
-          <ac:chgData name="Fatima Pillosu" userId="a6295d4dc9e22643" providerId="LiveId" clId="{C7909C26-7110-4B46-8F1C-97658D5207FA}" dt="2025-06-03T15:38:23.307" v="1137" actId="1036"/>
-          <ac:cxnSpMkLst>
-            <pc:docMk/>
-            <pc:sldMk cId="3354384854" sldId="256"/>
-            <ac:cxnSpMk id="605" creationId="{55935181-890B-720D-C664-35CB54240F4E}"/>
+          <ac:chgData name="Fatima Pillosu" userId="a6295d4dc9e22643" providerId="LiveId" clId="{C7909C26-7110-4B46-8F1C-97658D5207FA}" dt="2025-06-05T08:58:05.880" v="1236"/>
+          <ac:cxnSpMkLst>
+            <pc:docMk/>
+            <pc:sldMk cId="3354384854" sldId="256"/>
+            <ac:cxnSpMk id="664" creationId="{55935181-890B-720D-C664-35CB54240F4E}"/>
           </ac:cxnSpMkLst>
         </pc:cxnChg>
         <pc:cxnChg chg="add mod">
-          <ac:chgData name="Fatima Pillosu" userId="a6295d4dc9e22643" providerId="LiveId" clId="{C7909C26-7110-4B46-8F1C-97658D5207FA}" dt="2025-06-03T15:38:23.307" v="1137" actId="1036"/>
-          <ac:cxnSpMkLst>
-            <pc:docMk/>
-            <pc:sldMk cId="3354384854" sldId="256"/>
-            <ac:cxnSpMk id="606" creationId="{EF30C496-2771-0778-6824-2EB6BE7CEFF0}"/>
+          <ac:chgData name="Fatima Pillosu" userId="a6295d4dc9e22643" providerId="LiveId" clId="{C7909C26-7110-4B46-8F1C-97658D5207FA}" dt="2025-06-05T08:58:05.880" v="1236"/>
+          <ac:cxnSpMkLst>
+            <pc:docMk/>
+            <pc:sldMk cId="3354384854" sldId="256"/>
+            <ac:cxnSpMk id="665" creationId="{EF30C496-2771-0778-6824-2EB6BE7CEFF0}"/>
           </ac:cxnSpMkLst>
         </pc:cxnChg>
         <pc:cxnChg chg="add mod">
-          <ac:chgData name="Fatima Pillosu" userId="a6295d4dc9e22643" providerId="LiveId" clId="{C7909C26-7110-4B46-8F1C-97658D5207FA}" dt="2025-06-03T15:38:23.307" v="1137" actId="1036"/>
-          <ac:cxnSpMkLst>
-            <pc:docMk/>
-            <pc:sldMk cId="3354384854" sldId="256"/>
-            <ac:cxnSpMk id="607" creationId="{C96442FF-908A-84F2-7E54-6AB7485662E5}"/>
+          <ac:chgData name="Fatima Pillosu" userId="a6295d4dc9e22643" providerId="LiveId" clId="{C7909C26-7110-4B46-8F1C-97658D5207FA}" dt="2025-06-05T08:58:05.880" v="1236"/>
+          <ac:cxnSpMkLst>
+            <pc:docMk/>
+            <pc:sldMk cId="3354384854" sldId="256"/>
+            <ac:cxnSpMk id="666" creationId="{C96442FF-908A-84F2-7E54-6AB7485662E5}"/>
           </ac:cxnSpMkLst>
         </pc:cxnChg>
         <pc:cxnChg chg="add mod">
-          <ac:chgData name="Fatima Pillosu" userId="a6295d4dc9e22643" providerId="LiveId" clId="{C7909C26-7110-4B46-8F1C-97658D5207FA}" dt="2025-06-03T15:30:18.539" v="1116"/>
-          <ac:cxnSpMkLst>
-            <pc:docMk/>
-            <pc:sldMk cId="3354384854" sldId="256"/>
-            <ac:cxnSpMk id="608" creationId="{68C79158-7AC0-2089-1EB1-659E9CE9B879}"/>
+          <ac:chgData name="Fatima Pillosu" userId="a6295d4dc9e22643" providerId="LiveId" clId="{C7909C26-7110-4B46-8F1C-97658D5207FA}" dt="2025-06-05T08:58:05.880" v="1236"/>
+          <ac:cxnSpMkLst>
+            <pc:docMk/>
+            <pc:sldMk cId="3354384854" sldId="256"/>
+            <ac:cxnSpMk id="667" creationId="{68C79158-7AC0-2089-1EB1-659E9CE9B879}"/>
           </ac:cxnSpMkLst>
         </pc:cxnChg>
         <pc:cxnChg chg="add mod">
-          <ac:chgData name="Fatima Pillosu" userId="a6295d4dc9e22643" providerId="LiveId" clId="{C7909C26-7110-4B46-8F1C-97658D5207FA}" dt="2025-06-03T15:30:18.539" v="1116"/>
-          <ac:cxnSpMkLst>
-            <pc:docMk/>
-            <pc:sldMk cId="3354384854" sldId="256"/>
-            <ac:cxnSpMk id="609" creationId="{4EC70538-F86D-F7C9-DDDD-DA52C78765E3}"/>
+          <ac:chgData name="Fatima Pillosu" userId="a6295d4dc9e22643" providerId="LiveId" clId="{C7909C26-7110-4B46-8F1C-97658D5207FA}" dt="2025-06-05T08:58:05.880" v="1236"/>
+          <ac:cxnSpMkLst>
+            <pc:docMk/>
+            <pc:sldMk cId="3354384854" sldId="256"/>
+            <ac:cxnSpMk id="668" creationId="{4EC70538-F86D-F7C9-DDDD-DA52C78765E3}"/>
           </ac:cxnSpMkLst>
         </pc:cxnChg>
         <pc:cxnChg chg="add mod">
-          <ac:chgData name="Fatima Pillosu" userId="a6295d4dc9e22643" providerId="LiveId" clId="{C7909C26-7110-4B46-8F1C-97658D5207FA}" dt="2025-06-03T15:30:18.539" v="1116"/>
-          <ac:cxnSpMkLst>
-            <pc:docMk/>
-            <pc:sldMk cId="3354384854" sldId="256"/>
-            <ac:cxnSpMk id="610" creationId="{9F7D2FEC-C785-93BC-449F-1A0CC0B4888A}"/>
+          <ac:chgData name="Fatima Pillosu" userId="a6295d4dc9e22643" providerId="LiveId" clId="{C7909C26-7110-4B46-8F1C-97658D5207FA}" dt="2025-06-05T08:58:05.880" v="1236"/>
+          <ac:cxnSpMkLst>
+            <pc:docMk/>
+            <pc:sldMk cId="3354384854" sldId="256"/>
+            <ac:cxnSpMk id="669" creationId="{9F7D2FEC-C785-93BC-449F-1A0CC0B4888A}"/>
           </ac:cxnSpMkLst>
         </pc:cxnChg>
         <pc:cxnChg chg="add mod">
-          <ac:chgData name="Fatima Pillosu" userId="a6295d4dc9e22643" providerId="LiveId" clId="{C7909C26-7110-4B46-8F1C-97658D5207FA}" dt="2025-06-03T15:30:18.539" v="1116"/>
-          <ac:cxnSpMkLst>
-            <pc:docMk/>
-            <pc:sldMk cId="3354384854" sldId="256"/>
-            <ac:cxnSpMk id="611" creationId="{9778960E-B8BB-13B7-75CF-504745A15D25}"/>
+          <ac:chgData name="Fatima Pillosu" userId="a6295d4dc9e22643" providerId="LiveId" clId="{C7909C26-7110-4B46-8F1C-97658D5207FA}" dt="2025-06-05T08:58:05.880" v="1236"/>
+          <ac:cxnSpMkLst>
+            <pc:docMk/>
+            <pc:sldMk cId="3354384854" sldId="256"/>
+            <ac:cxnSpMk id="670" creationId="{9778960E-B8BB-13B7-75CF-504745A15D25}"/>
           </ac:cxnSpMkLst>
         </pc:cxnChg>
         <pc:cxnChg chg="add mod">
-          <ac:chgData name="Fatima Pillosu" userId="a6295d4dc9e22643" providerId="LiveId" clId="{C7909C26-7110-4B46-8F1C-97658D5207FA}" dt="2025-06-03T15:30:18.539" v="1116"/>
-          <ac:cxnSpMkLst>
-            <pc:docMk/>
-            <pc:sldMk cId="3354384854" sldId="256"/>
-            <ac:cxnSpMk id="612" creationId="{FC730EE6-A865-F984-6BF9-922C3B75E9CB}"/>
+          <ac:chgData name="Fatima Pillosu" userId="a6295d4dc9e22643" providerId="LiveId" clId="{C7909C26-7110-4B46-8F1C-97658D5207FA}" dt="2025-06-05T08:58:05.880" v="1236"/>
+          <ac:cxnSpMkLst>
+            <pc:docMk/>
+            <pc:sldMk cId="3354384854" sldId="256"/>
+            <ac:cxnSpMk id="671" creationId="{FC730EE6-A865-F984-6BF9-922C3B75E9CB}"/>
           </ac:cxnSpMkLst>
         </pc:cxnChg>
         <pc:cxnChg chg="add mod">
-          <ac:chgData name="Fatima Pillosu" userId="a6295d4dc9e22643" providerId="LiveId" clId="{C7909C26-7110-4B46-8F1C-97658D5207FA}" dt="2025-06-03T15:30:18.539" v="1116"/>
-          <ac:cxnSpMkLst>
-            <pc:docMk/>
-            <pc:sldMk cId="3354384854" sldId="256"/>
-            <ac:cxnSpMk id="613" creationId="{EACCC1CE-FD33-0835-95CD-4A0BE2013F80}"/>
+          <ac:chgData name="Fatima Pillosu" userId="a6295d4dc9e22643" providerId="LiveId" clId="{C7909C26-7110-4B46-8F1C-97658D5207FA}" dt="2025-06-05T08:58:05.880" v="1236"/>
+          <ac:cxnSpMkLst>
+            <pc:docMk/>
+            <pc:sldMk cId="3354384854" sldId="256"/>
+            <ac:cxnSpMk id="672" creationId="{EACCC1CE-FD33-0835-95CD-4A0BE2013F80}"/>
           </ac:cxnSpMkLst>
         </pc:cxnChg>
         <pc:cxnChg chg="add mod">
-          <ac:chgData name="Fatima Pillosu" userId="a6295d4dc9e22643" providerId="LiveId" clId="{C7909C26-7110-4B46-8F1C-97658D5207FA}" dt="2025-06-03T15:30:18.539" v="1116"/>
-          <ac:cxnSpMkLst>
-            <pc:docMk/>
-            <pc:sldMk cId="3354384854" sldId="256"/>
-            <ac:cxnSpMk id="614" creationId="{7EF61BF4-0D6D-5F88-43D7-D8C8E3B0885C}"/>
+          <ac:chgData name="Fatima Pillosu" userId="a6295d4dc9e22643" providerId="LiveId" clId="{C7909C26-7110-4B46-8F1C-97658D5207FA}" dt="2025-06-05T08:58:05.880" v="1236"/>
+          <ac:cxnSpMkLst>
+            <pc:docMk/>
+            <pc:sldMk cId="3354384854" sldId="256"/>
+            <ac:cxnSpMk id="673" creationId="{7EF61BF4-0D6D-5F88-43D7-D8C8E3B0885C}"/>
           </ac:cxnSpMkLst>
         </pc:cxnChg>
         <pc:cxnChg chg="add mod">
-          <ac:chgData name="Fatima Pillosu" userId="a6295d4dc9e22643" providerId="LiveId" clId="{C7909C26-7110-4B46-8F1C-97658D5207FA}" dt="2025-06-03T15:30:18.539" v="1116"/>
-          <ac:cxnSpMkLst>
-            <pc:docMk/>
-            <pc:sldMk cId="3354384854" sldId="256"/>
-            <ac:cxnSpMk id="615" creationId="{FFAE2ACE-ABDC-A2F2-DCB7-F5057E21A66D}"/>
+          <ac:chgData name="Fatima Pillosu" userId="a6295d4dc9e22643" providerId="LiveId" clId="{C7909C26-7110-4B46-8F1C-97658D5207FA}" dt="2025-06-05T08:58:05.880" v="1236"/>
+          <ac:cxnSpMkLst>
+            <pc:docMk/>
+            <pc:sldMk cId="3354384854" sldId="256"/>
+            <ac:cxnSpMk id="674" creationId="{FFAE2ACE-ABDC-A2F2-DCB7-F5057E21A66D}"/>
           </ac:cxnSpMkLst>
         </pc:cxnChg>
         <pc:cxnChg chg="add mod">
-          <ac:chgData name="Fatima Pillosu" userId="a6295d4dc9e22643" providerId="LiveId" clId="{C7909C26-7110-4B46-8F1C-97658D5207FA}" dt="2025-06-03T15:30:18.539" v="1116"/>
-          <ac:cxnSpMkLst>
-            <pc:docMk/>
-            <pc:sldMk cId="3354384854" sldId="256"/>
-            <ac:cxnSpMk id="616" creationId="{5F6D91F5-3338-557F-0CB3-E7DC04EB077C}"/>
+          <ac:chgData name="Fatima Pillosu" userId="a6295d4dc9e22643" providerId="LiveId" clId="{C7909C26-7110-4B46-8F1C-97658D5207FA}" dt="2025-06-05T08:58:05.880" v="1236"/>
+          <ac:cxnSpMkLst>
+            <pc:docMk/>
+            <pc:sldMk cId="3354384854" sldId="256"/>
+            <ac:cxnSpMk id="675" creationId="{5F6D91F5-3338-557F-0CB3-E7DC04EB077C}"/>
           </ac:cxnSpMkLst>
         </pc:cxnChg>
         <pc:cxnChg chg="add mod">
-          <ac:chgData name="Fatima Pillosu" userId="a6295d4dc9e22643" providerId="LiveId" clId="{C7909C26-7110-4B46-8F1C-97658D5207FA}" dt="2025-06-03T15:30:18.539" v="1116"/>
-          <ac:cxnSpMkLst>
-            <pc:docMk/>
-            <pc:sldMk cId="3354384854" sldId="256"/>
-            <ac:cxnSpMk id="617" creationId="{EC6CF449-A72A-A019-7618-C21BAA994F09}"/>
+          <ac:chgData name="Fatima Pillosu" userId="a6295d4dc9e22643" providerId="LiveId" clId="{C7909C26-7110-4B46-8F1C-97658D5207FA}" dt="2025-06-05T08:58:05.880" v="1236"/>
+          <ac:cxnSpMkLst>
+            <pc:docMk/>
+            <pc:sldMk cId="3354384854" sldId="256"/>
+            <ac:cxnSpMk id="676" creationId="{EC6CF449-A72A-A019-7618-C21BAA994F09}"/>
           </ac:cxnSpMkLst>
         </pc:cxnChg>
         <pc:cxnChg chg="add mod">
-          <ac:chgData name="Fatima Pillosu" userId="a6295d4dc9e22643" providerId="LiveId" clId="{C7909C26-7110-4B46-8F1C-97658D5207FA}" dt="2025-06-03T15:30:18.539" v="1116"/>
-          <ac:cxnSpMkLst>
-            <pc:docMk/>
-            <pc:sldMk cId="3354384854" sldId="256"/>
-            <ac:cxnSpMk id="618" creationId="{CB73C3F9-D34E-5387-D738-F027F9F21D82}"/>
+          <ac:chgData name="Fatima Pillosu" userId="a6295d4dc9e22643" providerId="LiveId" clId="{C7909C26-7110-4B46-8F1C-97658D5207FA}" dt="2025-06-05T08:58:05.880" v="1236"/>
+          <ac:cxnSpMkLst>
+            <pc:docMk/>
+            <pc:sldMk cId="3354384854" sldId="256"/>
+            <ac:cxnSpMk id="677" creationId="{CB73C3F9-D34E-5387-D738-F027F9F21D82}"/>
           </ac:cxnSpMkLst>
         </pc:cxnChg>
         <pc:cxnChg chg="add mod">
-          <ac:chgData name="Fatima Pillosu" userId="a6295d4dc9e22643" providerId="LiveId" clId="{C7909C26-7110-4B46-8F1C-97658D5207FA}" dt="2025-06-03T15:30:18.539" v="1116"/>
-          <ac:cxnSpMkLst>
-            <pc:docMk/>
-            <pc:sldMk cId="3354384854" sldId="256"/>
-            <ac:cxnSpMk id="619" creationId="{FB0CCEB5-3FCE-544B-3DA3-C04064EA44E6}"/>
+          <ac:chgData name="Fatima Pillosu" userId="a6295d4dc9e22643" providerId="LiveId" clId="{C7909C26-7110-4B46-8F1C-97658D5207FA}" dt="2025-06-05T08:58:05.880" v="1236"/>
+          <ac:cxnSpMkLst>
+            <pc:docMk/>
+            <pc:sldMk cId="3354384854" sldId="256"/>
+            <ac:cxnSpMk id="678" creationId="{FB0CCEB5-3FCE-544B-3DA3-C04064EA44E6}"/>
           </ac:cxnSpMkLst>
         </pc:cxnChg>
         <pc:cxnChg chg="add mod">
-          <ac:chgData name="Fatima Pillosu" userId="a6295d4dc9e22643" providerId="LiveId" clId="{C7909C26-7110-4B46-8F1C-97658D5207FA}" dt="2025-06-03T15:30:18.539" v="1116"/>
-          <ac:cxnSpMkLst>
-            <pc:docMk/>
-            <pc:sldMk cId="3354384854" sldId="256"/>
-            <ac:cxnSpMk id="620" creationId="{BF7F9AE8-B09C-0594-6E08-D8E9EDCA7F9C}"/>
+          <ac:chgData name="Fatima Pillosu" userId="a6295d4dc9e22643" providerId="LiveId" clId="{C7909C26-7110-4B46-8F1C-97658D5207FA}" dt="2025-06-05T08:58:05.880" v="1236"/>
+          <ac:cxnSpMkLst>
+            <pc:docMk/>
+            <pc:sldMk cId="3354384854" sldId="256"/>
+            <ac:cxnSpMk id="679" creationId="{BF7F9AE8-B09C-0594-6E08-D8E9EDCA7F9C}"/>
           </ac:cxnSpMkLst>
         </pc:cxnChg>
         <pc:cxnChg chg="add mod">
-          <ac:chgData name="Fatima Pillosu" userId="a6295d4dc9e22643" providerId="LiveId" clId="{C7909C26-7110-4B46-8F1C-97658D5207FA}" dt="2025-06-03T15:34:39.035" v="1133" actId="1035"/>
-          <ac:cxnSpMkLst>
-            <pc:docMk/>
-            <pc:sldMk cId="3354384854" sldId="256"/>
-            <ac:cxnSpMk id="622" creationId="{8296C103-D665-8AB6-3B09-566D3BB7F3F9}"/>
+          <ac:chgData name="Fatima Pillosu" userId="a6295d4dc9e22643" providerId="LiveId" clId="{C7909C26-7110-4B46-8F1C-97658D5207FA}" dt="2025-06-05T08:58:05.880" v="1236"/>
+          <ac:cxnSpMkLst>
+            <pc:docMk/>
+            <pc:sldMk cId="3354384854" sldId="256"/>
+            <ac:cxnSpMk id="680" creationId="{8296C103-D665-8AB6-3B09-566D3BB7F3F9}"/>
           </ac:cxnSpMkLst>
         </pc:cxnChg>
         <pc:cxnChg chg="add mod">
-          <ac:chgData name="Fatima Pillosu" userId="a6295d4dc9e22643" providerId="LiveId" clId="{C7909C26-7110-4B46-8F1C-97658D5207FA}" dt="2025-06-03T15:34:39.035" v="1133" actId="1035"/>
-          <ac:cxnSpMkLst>
-            <pc:docMk/>
-            <pc:sldMk cId="3354384854" sldId="256"/>
-            <ac:cxnSpMk id="624" creationId="{10D6DB07-7601-5557-6A71-39B2BB89BCB8}"/>
+          <ac:chgData name="Fatima Pillosu" userId="a6295d4dc9e22643" providerId="LiveId" clId="{C7909C26-7110-4B46-8F1C-97658D5207FA}" dt="2025-06-05T08:58:05.880" v="1236"/>
+          <ac:cxnSpMkLst>
+            <pc:docMk/>
+            <pc:sldMk cId="3354384854" sldId="256"/>
+            <ac:cxnSpMk id="682" creationId="{10D6DB07-7601-5557-6A71-39B2BB89BCB8}"/>
           </ac:cxnSpMkLst>
         </pc:cxnChg>
         <pc:cxnChg chg="add mod">
-          <ac:chgData name="Fatima Pillosu" userId="a6295d4dc9e22643" providerId="LiveId" clId="{C7909C26-7110-4B46-8F1C-97658D5207FA}" dt="2025-06-03T15:38:23.307" v="1137" actId="1036"/>
-          <ac:cxnSpMkLst>
-            <pc:docMk/>
-            <pc:sldMk cId="3354384854" sldId="256"/>
-            <ac:cxnSpMk id="635" creationId="{4F6CC630-74F7-00CC-B311-8D4D17E7A697}"/>
+          <ac:chgData name="Fatima Pillosu" userId="a6295d4dc9e22643" providerId="LiveId" clId="{C7909C26-7110-4B46-8F1C-97658D5207FA}" dt="2025-06-05T08:58:05.880" v="1236"/>
+          <ac:cxnSpMkLst>
+            <pc:docMk/>
+            <pc:sldMk cId="3354384854" sldId="256"/>
+            <ac:cxnSpMk id="693" creationId="{4F6CC630-74F7-00CC-B311-8D4D17E7A697}"/>
           </ac:cxnSpMkLst>
         </pc:cxnChg>
         <pc:cxnChg chg="add mod">
-          <ac:chgData name="Fatima Pillosu" userId="a6295d4dc9e22643" providerId="LiveId" clId="{C7909C26-7110-4B46-8F1C-97658D5207FA}" dt="2025-06-03T15:38:23.307" v="1137" actId="1036"/>
-          <ac:cxnSpMkLst>
-            <pc:docMk/>
-            <pc:sldMk cId="3354384854" sldId="256"/>
-            <ac:cxnSpMk id="636" creationId="{54AC9DFC-A95D-FF43-9DA7-3F77067B5B1F}"/>
+          <ac:chgData name="Fatima Pillosu" userId="a6295d4dc9e22643" providerId="LiveId" clId="{C7909C26-7110-4B46-8F1C-97658D5207FA}" dt="2025-06-05T08:58:05.880" v="1236"/>
+          <ac:cxnSpMkLst>
+            <pc:docMk/>
+            <pc:sldMk cId="3354384854" sldId="256"/>
+            <ac:cxnSpMk id="694" creationId="{54AC9DFC-A95D-FF43-9DA7-3F77067B5B1F}"/>
           </ac:cxnSpMkLst>
         </pc:cxnChg>
         <pc:cxnChg chg="add mod">
-          <ac:chgData name="Fatima Pillosu" userId="a6295d4dc9e22643" providerId="LiveId" clId="{C7909C26-7110-4B46-8F1C-97658D5207FA}" dt="2025-06-03T15:38:23.307" v="1137" actId="1036"/>
-          <ac:cxnSpMkLst>
-            <pc:docMk/>
-            <pc:sldMk cId="3354384854" sldId="256"/>
-            <ac:cxnSpMk id="637" creationId="{536B190C-D802-668A-3A2F-EADAA9B117FB}"/>
+          <ac:chgData name="Fatima Pillosu" userId="a6295d4dc9e22643" providerId="LiveId" clId="{C7909C26-7110-4B46-8F1C-97658D5207FA}" dt="2025-06-05T08:58:05.880" v="1236"/>
+          <ac:cxnSpMkLst>
+            <pc:docMk/>
+            <pc:sldMk cId="3354384854" sldId="256"/>
+            <ac:cxnSpMk id="695" creationId="{536B190C-D802-668A-3A2F-EADAA9B117FB}"/>
           </ac:cxnSpMkLst>
         </pc:cxnChg>
         <pc:cxnChg chg="add mod">
-          <ac:chgData name="Fatima Pillosu" userId="a6295d4dc9e22643" providerId="LiveId" clId="{C7909C26-7110-4B46-8F1C-97658D5207FA}" dt="2025-06-03T15:38:23.307" v="1137" actId="1036"/>
-          <ac:cxnSpMkLst>
-            <pc:docMk/>
-            <pc:sldMk cId="3354384854" sldId="256"/>
-            <ac:cxnSpMk id="638" creationId="{8C6DC7EB-ACC3-93EE-3F85-2D4F9582590D}"/>
+          <ac:chgData name="Fatima Pillosu" userId="a6295d4dc9e22643" providerId="LiveId" clId="{C7909C26-7110-4B46-8F1C-97658D5207FA}" dt="2025-06-05T08:58:05.880" v="1236"/>
+          <ac:cxnSpMkLst>
+            <pc:docMk/>
+            <pc:sldMk cId="3354384854" sldId="256"/>
+            <ac:cxnSpMk id="696" creationId="{8C6DC7EB-ACC3-93EE-3F85-2D4F9582590D}"/>
           </ac:cxnSpMkLst>
         </pc:cxnChg>
         <pc:cxnChg chg="add mod">
-          <ac:chgData name="Fatima Pillosu" userId="a6295d4dc9e22643" providerId="LiveId" clId="{C7909C26-7110-4B46-8F1C-97658D5207FA}" dt="2025-06-03T15:38:23.307" v="1137" actId="1036"/>
-          <ac:cxnSpMkLst>
-            <pc:docMk/>
-            <pc:sldMk cId="3354384854" sldId="256"/>
-            <ac:cxnSpMk id="639" creationId="{EDAD99B5-F84C-EE59-7063-69CAD2F7AF29}"/>
+          <ac:chgData name="Fatima Pillosu" userId="a6295d4dc9e22643" providerId="LiveId" clId="{C7909C26-7110-4B46-8F1C-97658D5207FA}" dt="2025-06-05T08:58:05.880" v="1236"/>
+          <ac:cxnSpMkLst>
+            <pc:docMk/>
+            <pc:sldMk cId="3354384854" sldId="256"/>
+            <ac:cxnSpMk id="697" creationId="{EDAD99B5-F84C-EE59-7063-69CAD2F7AF29}"/>
           </ac:cxnSpMkLst>
         </pc:cxnChg>
         <pc:cxnChg chg="add mod">
-          <ac:chgData name="Fatima Pillosu" userId="a6295d4dc9e22643" providerId="LiveId" clId="{C7909C26-7110-4B46-8F1C-97658D5207FA}" dt="2025-06-03T15:38:23.307" v="1137" actId="1036"/>
-          <ac:cxnSpMkLst>
-            <pc:docMk/>
-            <pc:sldMk cId="3354384854" sldId="256"/>
-            <ac:cxnSpMk id="640" creationId="{A58CBC7E-E89D-229A-405A-16571F42DD04}"/>
+          <ac:chgData name="Fatima Pillosu" userId="a6295d4dc9e22643" providerId="LiveId" clId="{C7909C26-7110-4B46-8F1C-97658D5207FA}" dt="2025-06-05T08:58:05.880" v="1236"/>
+          <ac:cxnSpMkLst>
+            <pc:docMk/>
+            <pc:sldMk cId="3354384854" sldId="256"/>
+            <ac:cxnSpMk id="698" creationId="{A58CBC7E-E89D-229A-405A-16571F42DD04}"/>
+          </ac:cxnSpMkLst>
+        </pc:cxnChg>
+        <pc:cxnChg chg="add mod">
+          <ac:chgData name="Fatima Pillosu" userId="a6295d4dc9e22643" providerId="LiveId" clId="{C7909C26-7110-4B46-8F1C-97658D5207FA}" dt="2025-06-05T08:58:05.880" v="1236"/>
+          <ac:cxnSpMkLst>
+            <pc:docMk/>
+            <pc:sldMk cId="3354384854" sldId="256"/>
+            <ac:cxnSpMk id="699" creationId="{C3617998-F352-C21B-76BA-7CE607336375}"/>
+          </ac:cxnSpMkLst>
+        </pc:cxnChg>
+        <pc:cxnChg chg="add mod">
+          <ac:chgData name="Fatima Pillosu" userId="a6295d4dc9e22643" providerId="LiveId" clId="{C7909C26-7110-4B46-8F1C-97658D5207FA}" dt="2025-06-05T08:58:05.880" v="1236"/>
+          <ac:cxnSpMkLst>
+            <pc:docMk/>
+            <pc:sldMk cId="3354384854" sldId="256"/>
+            <ac:cxnSpMk id="700" creationId="{019FE13D-B077-2A14-975A-4A5BD5828F54}"/>
           </ac:cxnSpMkLst>
         </pc:cxnChg>
       </pc:sldChg>
@@ -3186,8 +4170,8 @@
         </p:nvSpPr>
         <p:spPr>
           <a:xfrm>
-            <a:off x="310515" y="907243"/>
-            <a:ext cx="3519170" cy="1929977"/>
+            <a:off x="310515" y="930886"/>
+            <a:ext cx="3519170" cy="1980271"/>
           </a:xfrm>
         </p:spPr>
         <p:txBody>
@@ -3218,8 +4202,8 @@
         </p:nvSpPr>
         <p:spPr>
           <a:xfrm>
-            <a:off x="517525" y="2911647"/>
-            <a:ext cx="3105150" cy="1338408"/>
+            <a:off x="517525" y="2987524"/>
+            <a:ext cx="3105150" cy="1373286"/>
           </a:xfrm>
         </p:spPr>
         <p:txBody>
@@ -3288,7 +4272,7 @@
           <a:p>
             <a:fld id="{65FD29B4-2B6C-4062-B7CA-98FF0FA901DD}" type="datetimeFigureOut">
               <a:rPr lang="en-GB" smtClean="0"/>
-              <a:t>03/06/2025</a:t>
+              <a:t>05/06/2025</a:t>
             </a:fld>
             <a:endParaRPr lang="en-GB"/>
           </a:p>
@@ -3339,7 +4323,7 @@
     </p:spTree>
     <p:extLst>
       <p:ext uri="{BB962C8B-B14F-4D97-AF65-F5344CB8AC3E}">
-        <p14:creationId xmlns:p14="http://schemas.microsoft.com/office/powerpoint/2010/main" val="1861653133"/>
+        <p14:creationId xmlns:p14="http://schemas.microsoft.com/office/powerpoint/2010/main" val="2181092418"/>
       </p:ext>
     </p:extLst>
   </p:cSld>
@@ -3458,7 +4442,7 @@
           <a:p>
             <a:fld id="{65FD29B4-2B6C-4062-B7CA-98FF0FA901DD}" type="datetimeFigureOut">
               <a:rPr lang="en-GB" smtClean="0"/>
-              <a:t>03/06/2025</a:t>
+              <a:t>05/06/2025</a:t>
             </a:fld>
             <a:endParaRPr lang="en-GB"/>
           </a:p>
@@ -3509,7 +4493,7 @@
     </p:spTree>
     <p:extLst>
       <p:ext uri="{BB962C8B-B14F-4D97-AF65-F5344CB8AC3E}">
-        <p14:creationId xmlns:p14="http://schemas.microsoft.com/office/powerpoint/2010/main" val="3245546245"/>
+        <p14:creationId xmlns:p14="http://schemas.microsoft.com/office/powerpoint/2010/main" val="2676167983"/>
       </p:ext>
     </p:extLst>
   </p:cSld>
@@ -3548,8 +4532,8 @@
         </p:nvSpPr>
         <p:spPr>
           <a:xfrm>
-            <a:off x="2962831" y="295143"/>
-            <a:ext cx="892731" cy="4697902"/>
+            <a:off x="2962831" y="302834"/>
+            <a:ext cx="892731" cy="4820328"/>
           </a:xfrm>
         </p:spPr>
         <p:txBody>
@@ -3576,8 +4560,8 @@
         </p:nvSpPr>
         <p:spPr>
           <a:xfrm>
-            <a:off x="284639" y="295143"/>
-            <a:ext cx="2626439" cy="4697902"/>
+            <a:off x="284639" y="302834"/>
+            <a:ext cx="2626439" cy="4820328"/>
           </a:xfrm>
         </p:spPr>
         <p:txBody>
@@ -3638,7 +4622,7 @@
           <a:p>
             <a:fld id="{65FD29B4-2B6C-4062-B7CA-98FF0FA901DD}" type="datetimeFigureOut">
               <a:rPr lang="en-GB" smtClean="0"/>
-              <a:t>03/06/2025</a:t>
+              <a:t>05/06/2025</a:t>
             </a:fld>
             <a:endParaRPr lang="en-GB"/>
           </a:p>
@@ -3689,7 +4673,7 @@
     </p:spTree>
     <p:extLst>
       <p:ext uri="{BB962C8B-B14F-4D97-AF65-F5344CB8AC3E}">
-        <p14:creationId xmlns:p14="http://schemas.microsoft.com/office/powerpoint/2010/main" val="2817462489"/>
+        <p14:creationId xmlns:p14="http://schemas.microsoft.com/office/powerpoint/2010/main" val="3839135953"/>
       </p:ext>
     </p:extLst>
   </p:cSld>
@@ -3808,7 +4792,7 @@
           <a:p>
             <a:fld id="{65FD29B4-2B6C-4062-B7CA-98FF0FA901DD}" type="datetimeFigureOut">
               <a:rPr lang="en-GB" smtClean="0"/>
-              <a:t>03/06/2025</a:t>
+              <a:t>05/06/2025</a:t>
             </a:fld>
             <a:endParaRPr lang="en-GB"/>
           </a:p>
@@ -3859,7 +4843,7 @@
     </p:spTree>
     <p:extLst>
       <p:ext uri="{BB962C8B-B14F-4D97-AF65-F5344CB8AC3E}">
-        <p14:creationId xmlns:p14="http://schemas.microsoft.com/office/powerpoint/2010/main" val="2030317337"/>
+        <p14:creationId xmlns:p14="http://schemas.microsoft.com/office/powerpoint/2010/main" val="3031569793"/>
       </p:ext>
     </p:extLst>
   </p:cSld>
@@ -3898,8 +4882,8 @@
         </p:nvSpPr>
         <p:spPr>
           <a:xfrm>
-            <a:off x="282482" y="1382040"/>
-            <a:ext cx="3570923" cy="2305962"/>
+            <a:off x="282482" y="1418055"/>
+            <a:ext cx="3570923" cy="2366055"/>
           </a:xfrm>
         </p:spPr>
         <p:txBody>
@@ -3930,8 +4914,8 @@
         </p:nvSpPr>
         <p:spPr>
           <a:xfrm>
-            <a:off x="282482" y="3709817"/>
-            <a:ext cx="3570923" cy="1212651"/>
+            <a:off x="282482" y="3806494"/>
+            <a:ext cx="3570923" cy="1244252"/>
           </a:xfrm>
         </p:spPr>
         <p:txBody>
@@ -4054,7 +5038,7 @@
           <a:p>
             <a:fld id="{65FD29B4-2B6C-4062-B7CA-98FF0FA901DD}" type="datetimeFigureOut">
               <a:rPr lang="en-GB" smtClean="0"/>
-              <a:t>03/06/2025</a:t>
+              <a:t>05/06/2025</a:t>
             </a:fld>
             <a:endParaRPr lang="en-GB"/>
           </a:p>
@@ -4105,7 +5089,7 @@
     </p:spTree>
     <p:extLst>
       <p:ext uri="{BB962C8B-B14F-4D97-AF65-F5344CB8AC3E}">
-        <p14:creationId xmlns:p14="http://schemas.microsoft.com/office/powerpoint/2010/main" val="3721691472"/>
+        <p14:creationId xmlns:p14="http://schemas.microsoft.com/office/powerpoint/2010/main" val="4005084060"/>
       </p:ext>
     </p:extLst>
   </p:cSld>
@@ -4167,8 +5151,8 @@
         </p:nvSpPr>
         <p:spPr>
           <a:xfrm>
-            <a:off x="284639" y="1475713"/>
-            <a:ext cx="1759585" cy="3517332"/>
+            <a:off x="284639" y="1514170"/>
+            <a:ext cx="1759585" cy="3608992"/>
           </a:xfrm>
         </p:spPr>
         <p:txBody>
@@ -4224,8 +5208,8 @@
         </p:nvSpPr>
         <p:spPr>
           <a:xfrm>
-            <a:off x="2095976" y="1475713"/>
-            <a:ext cx="1759585" cy="3517332"/>
+            <a:off x="2095976" y="1514170"/>
+            <a:ext cx="1759585" cy="3608992"/>
           </a:xfrm>
         </p:spPr>
         <p:txBody>
@@ -4286,7 +5270,7 @@
           <a:p>
             <a:fld id="{65FD29B4-2B6C-4062-B7CA-98FF0FA901DD}" type="datetimeFigureOut">
               <a:rPr lang="en-GB" smtClean="0"/>
-              <a:t>03/06/2025</a:t>
+              <a:t>05/06/2025</a:t>
             </a:fld>
             <a:endParaRPr lang="en-GB"/>
           </a:p>
@@ -4337,7 +5321,7 @@
     </p:spTree>
     <p:extLst>
       <p:ext uri="{BB962C8B-B14F-4D97-AF65-F5344CB8AC3E}">
-        <p14:creationId xmlns:p14="http://schemas.microsoft.com/office/powerpoint/2010/main" val="3869975293"/>
+        <p14:creationId xmlns:p14="http://schemas.microsoft.com/office/powerpoint/2010/main" val="2945790187"/>
       </p:ext>
     </p:extLst>
   </p:cSld>
@@ -4376,8 +5360,8 @@
         </p:nvSpPr>
         <p:spPr>
           <a:xfrm>
-            <a:off x="285178" y="295144"/>
-            <a:ext cx="3570923" cy="1071497"/>
+            <a:off x="285178" y="302835"/>
+            <a:ext cx="3570923" cy="1099420"/>
           </a:xfrm>
         </p:spPr>
         <p:txBody>
@@ -4404,8 +5388,8 @@
         </p:nvSpPr>
         <p:spPr>
           <a:xfrm>
-            <a:off x="285179" y="1358940"/>
-            <a:ext cx="1751498" cy="665996"/>
+            <a:off x="285179" y="1394354"/>
+            <a:ext cx="1751498" cy="683351"/>
           </a:xfrm>
         </p:spPr>
         <p:txBody>
@@ -4469,8 +5453,8 @@
         </p:nvSpPr>
         <p:spPr>
           <a:xfrm>
-            <a:off x="285179" y="2024936"/>
-            <a:ext cx="1751498" cy="2978375"/>
+            <a:off x="285179" y="2077705"/>
+            <a:ext cx="1751498" cy="3055991"/>
           </a:xfrm>
         </p:spPr>
         <p:txBody>
@@ -4526,8 +5510,8 @@
         </p:nvSpPr>
         <p:spPr>
           <a:xfrm>
-            <a:off x="2095977" y="1358940"/>
-            <a:ext cx="1760124" cy="665996"/>
+            <a:off x="2095977" y="1394354"/>
+            <a:ext cx="1760124" cy="683351"/>
           </a:xfrm>
         </p:spPr>
         <p:txBody>
@@ -4591,8 +5575,8 @@
         </p:nvSpPr>
         <p:spPr>
           <a:xfrm>
-            <a:off x="2095977" y="2024936"/>
-            <a:ext cx="1760124" cy="2978375"/>
+            <a:off x="2095977" y="2077705"/>
+            <a:ext cx="1760124" cy="3055991"/>
           </a:xfrm>
         </p:spPr>
         <p:txBody>
@@ -4653,7 +5637,7 @@
           <a:p>
             <a:fld id="{65FD29B4-2B6C-4062-B7CA-98FF0FA901DD}" type="datetimeFigureOut">
               <a:rPr lang="en-GB" smtClean="0"/>
-              <a:t>03/06/2025</a:t>
+              <a:t>05/06/2025</a:t>
             </a:fld>
             <a:endParaRPr lang="en-GB"/>
           </a:p>
@@ -4704,7 +5688,7 @@
     </p:spTree>
     <p:extLst>
       <p:ext uri="{BB962C8B-B14F-4D97-AF65-F5344CB8AC3E}">
-        <p14:creationId xmlns:p14="http://schemas.microsoft.com/office/powerpoint/2010/main" val="2918133001"/>
+        <p14:creationId xmlns:p14="http://schemas.microsoft.com/office/powerpoint/2010/main" val="2988563218"/>
       </p:ext>
     </p:extLst>
   </p:cSld>
@@ -4771,7 +5755,7 @@
           <a:p>
             <a:fld id="{65FD29B4-2B6C-4062-B7CA-98FF0FA901DD}" type="datetimeFigureOut">
               <a:rPr lang="en-GB" smtClean="0"/>
-              <a:t>03/06/2025</a:t>
+              <a:t>05/06/2025</a:t>
             </a:fld>
             <a:endParaRPr lang="en-GB"/>
           </a:p>
@@ -4822,7 +5806,7 @@
     </p:spTree>
     <p:extLst>
       <p:ext uri="{BB962C8B-B14F-4D97-AF65-F5344CB8AC3E}">
-        <p14:creationId xmlns:p14="http://schemas.microsoft.com/office/powerpoint/2010/main" val="1951797050"/>
+        <p14:creationId xmlns:p14="http://schemas.microsoft.com/office/powerpoint/2010/main" val="2139898763"/>
       </p:ext>
     </p:extLst>
   </p:cSld>
@@ -4866,7 +5850,7 @@
           <a:p>
             <a:fld id="{65FD29B4-2B6C-4062-B7CA-98FF0FA901DD}" type="datetimeFigureOut">
               <a:rPr lang="en-GB" smtClean="0"/>
-              <a:t>03/06/2025</a:t>
+              <a:t>05/06/2025</a:t>
             </a:fld>
             <a:endParaRPr lang="en-GB"/>
           </a:p>
@@ -4917,7 +5901,7 @@
     </p:spTree>
     <p:extLst>
       <p:ext uri="{BB962C8B-B14F-4D97-AF65-F5344CB8AC3E}">
-        <p14:creationId xmlns:p14="http://schemas.microsoft.com/office/powerpoint/2010/main" val="2755008762"/>
+        <p14:creationId xmlns:p14="http://schemas.microsoft.com/office/powerpoint/2010/main" val="1213764198"/>
       </p:ext>
     </p:extLst>
   </p:cSld>
@@ -4956,8 +5940,8 @@
         </p:nvSpPr>
         <p:spPr>
           <a:xfrm>
-            <a:off x="285178" y="369570"/>
-            <a:ext cx="1335322" cy="1293495"/>
+            <a:off x="285178" y="379201"/>
+            <a:ext cx="1335322" cy="1327203"/>
           </a:xfrm>
         </p:spPr>
         <p:txBody>
@@ -4988,8 +5972,8 @@
         </p:nvSpPr>
         <p:spPr>
           <a:xfrm>
-            <a:off x="1760124" y="798170"/>
-            <a:ext cx="2095976" cy="3939514"/>
+            <a:off x="1760124" y="818970"/>
+            <a:ext cx="2095976" cy="4042176"/>
           </a:xfrm>
         </p:spPr>
         <p:txBody>
@@ -5073,8 +6057,8 @@
         </p:nvSpPr>
         <p:spPr>
           <a:xfrm>
-            <a:off x="285178" y="1663065"/>
-            <a:ext cx="1335322" cy="3081034"/>
+            <a:off x="285178" y="1706404"/>
+            <a:ext cx="1335322" cy="3161324"/>
           </a:xfrm>
         </p:spPr>
         <p:txBody>
@@ -5143,7 +6127,7 @@
           <a:p>
             <a:fld id="{65FD29B4-2B6C-4062-B7CA-98FF0FA901DD}" type="datetimeFigureOut">
               <a:rPr lang="en-GB" smtClean="0"/>
-              <a:t>03/06/2025</a:t>
+              <a:t>05/06/2025</a:t>
             </a:fld>
             <a:endParaRPr lang="en-GB"/>
           </a:p>
@@ -5194,7 +6178,7 @@
     </p:spTree>
     <p:extLst>
       <p:ext uri="{BB962C8B-B14F-4D97-AF65-F5344CB8AC3E}">
-        <p14:creationId xmlns:p14="http://schemas.microsoft.com/office/powerpoint/2010/main" val="302650240"/>
+        <p14:creationId xmlns:p14="http://schemas.microsoft.com/office/powerpoint/2010/main" val="1748995108"/>
       </p:ext>
     </p:extLst>
   </p:cSld>
@@ -5233,8 +6217,8 @@
         </p:nvSpPr>
         <p:spPr>
           <a:xfrm>
-            <a:off x="285178" y="369570"/>
-            <a:ext cx="1335322" cy="1293495"/>
+            <a:off x="285178" y="379201"/>
+            <a:ext cx="1335322" cy="1327203"/>
           </a:xfrm>
         </p:spPr>
         <p:txBody>
@@ -5265,8 +6249,8 @@
         </p:nvSpPr>
         <p:spPr>
           <a:xfrm>
-            <a:off x="1760124" y="798170"/>
-            <a:ext cx="2095976" cy="3939514"/>
+            <a:off x="1760124" y="818970"/>
+            <a:ext cx="2095976" cy="4042176"/>
           </a:xfrm>
         </p:spPr>
         <p:txBody>
@@ -5330,8 +6314,8 @@
         </p:nvSpPr>
         <p:spPr>
           <a:xfrm>
-            <a:off x="285178" y="1663065"/>
-            <a:ext cx="1335322" cy="3081034"/>
+            <a:off x="285178" y="1706404"/>
+            <a:ext cx="1335322" cy="3161324"/>
           </a:xfrm>
         </p:spPr>
         <p:txBody>
@@ -5400,7 +6384,7 @@
           <a:p>
             <a:fld id="{65FD29B4-2B6C-4062-B7CA-98FF0FA901DD}" type="datetimeFigureOut">
               <a:rPr lang="en-GB" smtClean="0"/>
-              <a:t>03/06/2025</a:t>
+              <a:t>05/06/2025</a:t>
             </a:fld>
             <a:endParaRPr lang="en-GB"/>
           </a:p>
@@ -5451,7 +6435,7 @@
     </p:spTree>
     <p:extLst>
       <p:ext uri="{BB962C8B-B14F-4D97-AF65-F5344CB8AC3E}">
-        <p14:creationId xmlns:p14="http://schemas.microsoft.com/office/powerpoint/2010/main" val="2123936200"/>
+        <p14:creationId xmlns:p14="http://schemas.microsoft.com/office/powerpoint/2010/main" val="969133520"/>
       </p:ext>
     </p:extLst>
   </p:cSld>
@@ -5495,8 +6479,8 @@
         </p:nvSpPr>
         <p:spPr>
           <a:xfrm>
-            <a:off x="284639" y="295144"/>
-            <a:ext cx="3570923" cy="1071497"/>
+            <a:off x="284639" y="302835"/>
+            <a:ext cx="3570923" cy="1099420"/>
           </a:xfrm>
           <a:prstGeom prst="rect">
             <a:avLst/>
@@ -5528,8 +6512,8 @@
         </p:nvSpPr>
         <p:spPr>
           <a:xfrm>
-            <a:off x="284639" y="1475713"/>
-            <a:ext cx="3570923" cy="3517332"/>
+            <a:off x="284639" y="1514170"/>
+            <a:ext cx="3570923" cy="3608992"/>
           </a:xfrm>
           <a:prstGeom prst="rect">
             <a:avLst/>
@@ -5590,8 +6574,8 @@
         </p:nvSpPr>
         <p:spPr>
           <a:xfrm>
-            <a:off x="284639" y="5138051"/>
-            <a:ext cx="931545" cy="295143"/>
+            <a:off x="284639" y="5271947"/>
+            <a:ext cx="931545" cy="302834"/>
           </a:xfrm>
           <a:prstGeom prst="rect">
             <a:avLst/>
@@ -5613,7 +6597,7 @@
           <a:p>
             <a:fld id="{65FD29B4-2B6C-4062-B7CA-98FF0FA901DD}" type="datetimeFigureOut">
               <a:rPr lang="en-GB" smtClean="0"/>
-              <a:t>03/06/2025</a:t>
+              <a:t>05/06/2025</a:t>
             </a:fld>
             <a:endParaRPr lang="en-GB"/>
           </a:p>
@@ -5631,8 +6615,8 @@
         </p:nvSpPr>
         <p:spPr>
           <a:xfrm>
-            <a:off x="1371441" y="5138051"/>
-            <a:ext cx="1397318" cy="295143"/>
+            <a:off x="1371441" y="5271947"/>
+            <a:ext cx="1397318" cy="302834"/>
           </a:xfrm>
           <a:prstGeom prst="rect">
             <a:avLst/>
@@ -5668,8 +6652,8 @@
         </p:nvSpPr>
         <p:spPr>
           <a:xfrm>
-            <a:off x="2924016" y="5138051"/>
-            <a:ext cx="931545" cy="295143"/>
+            <a:off x="2924016" y="5271947"/>
+            <a:ext cx="931545" cy="302834"/>
           </a:xfrm>
           <a:prstGeom prst="rect">
             <a:avLst/>
@@ -5700,23 +6684,23 @@
     </p:spTree>
     <p:extLst>
       <p:ext uri="{BB962C8B-B14F-4D97-AF65-F5344CB8AC3E}">
-        <p14:creationId xmlns:p14="http://schemas.microsoft.com/office/powerpoint/2010/main" val="961179316"/>
+        <p14:creationId xmlns:p14="http://schemas.microsoft.com/office/powerpoint/2010/main" val="1200884330"/>
       </p:ext>
     </p:extLst>
   </p:cSld>
   <p:clrMap bg1="lt1" tx1="dk1" bg2="lt2" tx2="dk2" accent1="accent1" accent2="accent2" accent3="accent3" accent4="accent4" accent5="accent5" accent6="accent6" hlink="hlink" folHlink="folHlink"/>
   <p:sldLayoutIdLst>
-    <p:sldLayoutId id="2147483805" r:id="rId1"/>
-    <p:sldLayoutId id="2147483806" r:id="rId2"/>
-    <p:sldLayoutId id="2147483807" r:id="rId3"/>
-    <p:sldLayoutId id="2147483808" r:id="rId4"/>
-    <p:sldLayoutId id="2147483809" r:id="rId5"/>
-    <p:sldLayoutId id="2147483810" r:id="rId6"/>
-    <p:sldLayoutId id="2147483811" r:id="rId7"/>
-    <p:sldLayoutId id="2147483812" r:id="rId8"/>
-    <p:sldLayoutId id="2147483813" r:id="rId9"/>
-    <p:sldLayoutId id="2147483814" r:id="rId10"/>
-    <p:sldLayoutId id="2147483815" r:id="rId11"/>
+    <p:sldLayoutId id="2147483829" r:id="rId1"/>
+    <p:sldLayoutId id="2147483830" r:id="rId2"/>
+    <p:sldLayoutId id="2147483831" r:id="rId3"/>
+    <p:sldLayoutId id="2147483832" r:id="rId4"/>
+    <p:sldLayoutId id="2147483833" r:id="rId5"/>
+    <p:sldLayoutId id="2147483834" r:id="rId6"/>
+    <p:sldLayoutId id="2147483835" r:id="rId7"/>
+    <p:sldLayoutId id="2147483836" r:id="rId8"/>
+    <p:sldLayoutId id="2147483837" r:id="rId9"/>
+    <p:sldLayoutId id="2147483838" r:id="rId10"/>
+    <p:sldLayoutId id="2147483839" r:id="rId11"/>
   </p:sldLayoutIdLst>
   <p:txStyles>
     <p:titleStyle>
@@ -6020,7 +7004,7 @@
       </p:grpSpPr>
       <p:sp>
         <p:nvSpPr>
-          <p:cNvPr id="581" name="TextBox 580">
+          <p:cNvPr id="621" name="TextBox 620">
             <a:extLst>
               <a:ext uri="{FF2B5EF4-FFF2-40B4-BE49-F238E27FC236}">
                 <a16:creationId xmlns:a16="http://schemas.microsoft.com/office/drawing/2014/main" id="{3509C7A6-19BB-0D05-A5A4-F3A89DE28DD3}"/>
@@ -6081,7 +7065,7 @@
       </p:sp>
       <p:sp>
         <p:nvSpPr>
-          <p:cNvPr id="582" name="TextBox 581">
+          <p:cNvPr id="641" name="TextBox 640">
             <a:extLst>
               <a:ext uri="{FF2B5EF4-FFF2-40B4-BE49-F238E27FC236}">
                 <a16:creationId xmlns:a16="http://schemas.microsoft.com/office/drawing/2014/main" id="{5913F005-4A98-D3BE-F4F2-E95D954B1D06}"/>
@@ -6142,7 +7126,7 @@
       </p:sp>
       <p:sp>
         <p:nvSpPr>
-          <p:cNvPr id="583" name="TextBox 582">
+          <p:cNvPr id="642" name="TextBox 641">
             <a:extLst>
               <a:ext uri="{FF2B5EF4-FFF2-40B4-BE49-F238E27FC236}">
                 <a16:creationId xmlns:a16="http://schemas.microsoft.com/office/drawing/2014/main" id="{16DF997E-4CBC-E352-4297-C2765FF9BADA}"/>
@@ -6187,7 +7171,7 @@
       </p:sp>
       <p:sp>
         <p:nvSpPr>
-          <p:cNvPr id="584" name="TextBox 583">
+          <p:cNvPr id="643" name="TextBox 642">
             <a:extLst>
               <a:ext uri="{FF2B5EF4-FFF2-40B4-BE49-F238E27FC236}">
                 <a16:creationId xmlns:a16="http://schemas.microsoft.com/office/drawing/2014/main" id="{A16AC61C-9655-BE59-0E1D-62859D87AEA1}"/>
@@ -6232,7 +7216,7 @@
       </p:sp>
       <p:sp>
         <p:nvSpPr>
-          <p:cNvPr id="585" name="TextBox 584">
+          <p:cNvPr id="644" name="TextBox 643">
             <a:extLst>
               <a:ext uri="{FF2B5EF4-FFF2-40B4-BE49-F238E27FC236}">
                 <a16:creationId xmlns:a16="http://schemas.microsoft.com/office/drawing/2014/main" id="{8CC79328-8D0D-D627-FD71-57CFC2D2B5DC}"/>
@@ -6245,7 +7229,7 @@
         <p:spPr>
           <a:xfrm>
             <a:off x="287102" y="2925004"/>
-            <a:ext cx="1256843" cy="707886"/>
+            <a:ext cx="1256843" cy="861774"/>
           </a:xfrm>
           <a:prstGeom prst="rect">
             <a:avLst/>
@@ -6293,11 +7277,24 @@
               <a:t>verification of global NWP rainfall forecasts</a:t>
             </a:r>
           </a:p>
+          <a:p>
+            <a:pPr algn="ctr"/>
+            <a:r>
+              <a:rPr lang="en-GB" sz="1000" b="1" dirty="0">
+                <a:solidFill>
+                  <a:srgbClr val="FF595E"/>
+                </a:solidFill>
+                <a:latin typeface="Calibri" panose="020F0502020204030204" pitchFamily="34" charset="0"/>
+                <a:cs typeface="Calibri" panose="020F0502020204030204" pitchFamily="34" charset="0"/>
+              </a:rPr>
+              <a:t>(RQ1)</a:t>
+            </a:r>
+          </a:p>
         </p:txBody>
       </p:sp>
       <p:sp>
         <p:nvSpPr>
-          <p:cNvPr id="586" name="TextBox 585">
+          <p:cNvPr id="645" name="TextBox 644">
             <a:extLst>
               <a:ext uri="{FF2B5EF4-FFF2-40B4-BE49-F238E27FC236}">
                 <a16:creationId xmlns:a16="http://schemas.microsoft.com/office/drawing/2014/main" id="{6C355D5C-47D8-7C59-C1B8-4FF2037F961E}"/>
@@ -6310,7 +7307,7 @@
         <p:spPr>
           <a:xfrm>
             <a:off x="1603714" y="2926547"/>
-            <a:ext cx="1207591" cy="707886"/>
+            <a:ext cx="1207591" cy="861774"/>
           </a:xfrm>
           <a:prstGeom prst="rect">
             <a:avLst/>
@@ -6361,11 +7358,24 @@
               <a:t>predictions of areas at risk of flash flood</a:t>
             </a:r>
           </a:p>
+          <a:p>
+            <a:pPr algn="ctr"/>
+            <a:r>
+              <a:rPr lang="en-GB" sz="1000" b="1" dirty="0">
+                <a:solidFill>
+                  <a:srgbClr val="E68301"/>
+                </a:solidFill>
+                <a:latin typeface="Calibri" panose="020F0502020204030204" pitchFamily="34" charset="0"/>
+                <a:cs typeface="Calibri" panose="020F0502020204030204" pitchFamily="34" charset="0"/>
+              </a:rPr>
+              <a:t>(RQ2)</a:t>
+            </a:r>
+          </a:p>
         </p:txBody>
       </p:sp>
       <p:sp>
         <p:nvSpPr>
-          <p:cNvPr id="587" name="TextBox 586">
+          <p:cNvPr id="646" name="TextBox 645">
             <a:extLst>
               <a:ext uri="{FF2B5EF4-FFF2-40B4-BE49-F238E27FC236}">
                 <a16:creationId xmlns:a16="http://schemas.microsoft.com/office/drawing/2014/main" id="{FBD9599A-5CAC-D1AB-7D3E-713DF5A5C020}"/>
@@ -6378,7 +7388,7 @@
         <p:spPr>
           <a:xfrm>
             <a:off x="2858523" y="2926277"/>
-            <a:ext cx="1271974" cy="707886"/>
+            <a:ext cx="1271974" cy="861774"/>
           </a:xfrm>
           <a:prstGeom prst="rect">
             <a:avLst/>
@@ -6429,11 +7439,24 @@
               <a:t>predictions of areas at risk of flash floods</a:t>
             </a:r>
           </a:p>
+          <a:p>
+            <a:pPr algn="ctr"/>
+            <a:r>
+              <a:rPr lang="en-GB" sz="1000" b="1" dirty="0">
+                <a:solidFill>
+                  <a:srgbClr val="3F37C9"/>
+                </a:solidFill>
+                <a:latin typeface="Calibri" panose="020F0502020204030204" pitchFamily="34" charset="0"/>
+                <a:cs typeface="Calibri" panose="020F0502020204030204" pitchFamily="34" charset="0"/>
+              </a:rPr>
+              <a:t>(RQ3)</a:t>
+            </a:r>
+          </a:p>
         </p:txBody>
       </p:sp>
       <p:sp>
         <p:nvSpPr>
-          <p:cNvPr id="588" name="TextBox 587">
+          <p:cNvPr id="647" name="TextBox 646">
             <a:extLst>
               <a:ext uri="{FF2B5EF4-FFF2-40B4-BE49-F238E27FC236}">
                 <a16:creationId xmlns:a16="http://schemas.microsoft.com/office/drawing/2014/main" id="{BBB0BE85-86B1-0751-AF3F-838269DDC230}"/>
@@ -6445,7 +7468,7 @@
         </p:nvSpPr>
         <p:spPr>
           <a:xfrm>
-            <a:off x="1826329" y="4466933"/>
+            <a:off x="1826329" y="4581237"/>
             <a:ext cx="776175" cy="400110"/>
           </a:xfrm>
           <a:prstGeom prst="rect">
@@ -6494,7 +7517,7 @@
       </p:sp>
       <p:sp>
         <p:nvSpPr>
-          <p:cNvPr id="589" name="TextBox 588">
+          <p:cNvPr id="648" name="TextBox 647">
             <a:extLst>
               <a:ext uri="{FF2B5EF4-FFF2-40B4-BE49-F238E27FC236}">
                 <a16:creationId xmlns:a16="http://schemas.microsoft.com/office/drawing/2014/main" id="{99B61BA9-5A6C-532C-7917-89D64FACAECA}"/>
@@ -6506,7 +7529,7 @@
         </p:nvSpPr>
         <p:spPr>
           <a:xfrm>
-            <a:off x="1813505" y="5104205"/>
+            <a:off x="1813505" y="5218509"/>
             <a:ext cx="801823" cy="400110"/>
           </a:xfrm>
           <a:prstGeom prst="rect">
@@ -6555,7 +7578,7 @@
       </p:sp>
       <p:sp>
         <p:nvSpPr>
-          <p:cNvPr id="590" name="Rectangle 589">
+          <p:cNvPr id="649" name="Rectangle 648">
             <a:extLst>
               <a:ext uri="{FF2B5EF4-FFF2-40B4-BE49-F238E27FC236}">
                 <a16:creationId xmlns:a16="http://schemas.microsoft.com/office/drawing/2014/main" id="{CAE0B206-AF54-54F2-0C06-284B40BCBB6F}"/>
@@ -6619,7 +7642,7 @@
       </p:sp>
       <p:sp>
         <p:nvSpPr>
-          <p:cNvPr id="591" name="Rectangle 590">
+          <p:cNvPr id="650" name="Rectangle 649">
             <a:extLst>
               <a:ext uri="{FF2B5EF4-FFF2-40B4-BE49-F238E27FC236}">
                 <a16:creationId xmlns:a16="http://schemas.microsoft.com/office/drawing/2014/main" id="{8AAEA69B-D0DC-C7F0-7B11-C6A20FF94F80}"/>
@@ -6683,7 +7706,7 @@
       </p:sp>
       <p:sp>
         <p:nvSpPr>
-          <p:cNvPr id="592" name="Rectangle 591">
+          <p:cNvPr id="651" name="Rectangle 650">
             <a:extLst>
               <a:ext uri="{FF2B5EF4-FFF2-40B4-BE49-F238E27FC236}">
                 <a16:creationId xmlns:a16="http://schemas.microsoft.com/office/drawing/2014/main" id="{2699F84C-B158-D9B1-8BAF-E590BCED4FB6}"/>
@@ -6747,7 +7770,7 @@
       </p:sp>
       <p:sp>
         <p:nvSpPr>
-          <p:cNvPr id="593" name="Rectangle 592">
+          <p:cNvPr id="652" name="Rectangle 651">
             <a:extLst>
               <a:ext uri="{FF2B5EF4-FFF2-40B4-BE49-F238E27FC236}">
                 <a16:creationId xmlns:a16="http://schemas.microsoft.com/office/drawing/2014/main" id="{8A2E91B1-BBB4-1F54-4FCE-C1F6724BE292}"/>
@@ -6811,7 +7834,7 @@
       </p:sp>
       <p:sp>
         <p:nvSpPr>
-          <p:cNvPr id="594" name="Rectangle 593">
+          <p:cNvPr id="653" name="Rectangle 652">
             <a:extLst>
               <a:ext uri="{FF2B5EF4-FFF2-40B4-BE49-F238E27FC236}">
                 <a16:creationId xmlns:a16="http://schemas.microsoft.com/office/drawing/2014/main" id="{E60B5C00-F1F7-FD1D-ABEF-8F5EF5D717FE}"/>
@@ -6823,7 +7846,7 @@
         </p:nvSpPr>
         <p:spPr>
           <a:xfrm>
-            <a:off x="1698089" y="4450988"/>
+            <a:off x="1698089" y="4565292"/>
             <a:ext cx="1032654" cy="432000"/>
           </a:xfrm>
           <a:prstGeom prst="rect">
@@ -6875,7 +7898,7 @@
       </p:sp>
       <p:sp>
         <p:nvSpPr>
-          <p:cNvPr id="595" name="Rectangle 594">
+          <p:cNvPr id="654" name="Rectangle 653">
             <a:extLst>
               <a:ext uri="{FF2B5EF4-FFF2-40B4-BE49-F238E27FC236}">
                 <a16:creationId xmlns:a16="http://schemas.microsoft.com/office/drawing/2014/main" id="{19EA9AC9-6E95-FB84-F5C5-ADD045519CA4}"/>
@@ -6887,7 +7910,7 @@
         </p:nvSpPr>
         <p:spPr>
           <a:xfrm>
-            <a:off x="1698089" y="5088260"/>
+            <a:off x="1698089" y="5202564"/>
             <a:ext cx="1032654" cy="432000"/>
           </a:xfrm>
           <a:prstGeom prst="rect">
@@ -6939,7 +7962,7 @@
       </p:sp>
       <p:sp>
         <p:nvSpPr>
-          <p:cNvPr id="596" name="Rectangle 595">
+          <p:cNvPr id="655" name="Rectangle 654">
             <a:extLst>
               <a:ext uri="{FF2B5EF4-FFF2-40B4-BE49-F238E27FC236}">
                 <a16:creationId xmlns:a16="http://schemas.microsoft.com/office/drawing/2014/main" id="{71BBF894-591D-8866-B2B1-0C8C1F6E802C}"/>
@@ -6952,7 +7975,7 @@
         <p:spPr>
           <a:xfrm>
             <a:off x="1595509" y="2915649"/>
-            <a:ext cx="1224000" cy="729683"/>
+            <a:ext cx="1224000" cy="872671"/>
           </a:xfrm>
           <a:prstGeom prst="rect">
             <a:avLst/>
@@ -7001,7 +8024,7 @@
       </p:sp>
       <p:sp>
         <p:nvSpPr>
-          <p:cNvPr id="597" name="Rectangle 596">
+          <p:cNvPr id="656" name="Rectangle 655">
             <a:extLst>
               <a:ext uri="{FF2B5EF4-FFF2-40B4-BE49-F238E27FC236}">
                 <a16:creationId xmlns:a16="http://schemas.microsoft.com/office/drawing/2014/main" id="{A9A7A549-413C-B305-70B8-0753E06B399D}"/>
@@ -7013,8 +8036,8 @@
         </p:nvSpPr>
         <p:spPr>
           <a:xfrm>
-            <a:off x="2882510" y="2915379"/>
-            <a:ext cx="1224000" cy="729682"/>
+            <a:off x="2882510" y="2915378"/>
+            <a:ext cx="1224000" cy="872669"/>
           </a:xfrm>
           <a:prstGeom prst="rect">
             <a:avLst/>
@@ -7063,7 +8086,7 @@
       </p:sp>
       <p:sp>
         <p:nvSpPr>
-          <p:cNvPr id="598" name="Rectangle 597">
+          <p:cNvPr id="657" name="Rectangle 656">
             <a:extLst>
               <a:ext uri="{FF2B5EF4-FFF2-40B4-BE49-F238E27FC236}">
                 <a16:creationId xmlns:a16="http://schemas.microsoft.com/office/drawing/2014/main" id="{6BE65441-4EEE-E468-5441-5FEB4D450CFE}"/>
@@ -7076,7 +8099,7 @@
         <p:spPr>
           <a:xfrm>
             <a:off x="303523" y="2914105"/>
-            <a:ext cx="1224000" cy="729685"/>
+            <a:ext cx="1224000" cy="872673"/>
           </a:xfrm>
           <a:prstGeom prst="rect">
             <a:avLst/>
@@ -7125,7 +8148,7 @@
       </p:sp>
       <p:cxnSp>
         <p:nvCxnSpPr>
-          <p:cNvPr id="599" name="Straight Connector 598">
+          <p:cNvPr id="658" name="Straight Connector 657">
             <a:extLst>
               <a:ext uri="{FF2B5EF4-FFF2-40B4-BE49-F238E27FC236}">
                 <a16:creationId xmlns:a16="http://schemas.microsoft.com/office/drawing/2014/main" id="{EE599EA5-4C3D-A45B-7B1E-B025BE9128AC}"/>
@@ -7140,7 +8163,7 @@
         <p:spPr>
           <a:xfrm>
             <a:off x="189987" y="2504494"/>
-            <a:ext cx="0" cy="1536686"/>
+            <a:ext cx="0" cy="1658697"/>
           </a:xfrm>
           <a:prstGeom prst="line">
             <a:avLst/>
@@ -7171,7 +8194,7 @@
       </p:cxnSp>
       <p:sp>
         <p:nvSpPr>
-          <p:cNvPr id="600" name="TextBox 599">
+          <p:cNvPr id="659" name="TextBox 658">
             <a:extLst>
               <a:ext uri="{FF2B5EF4-FFF2-40B4-BE49-F238E27FC236}">
                 <a16:creationId xmlns:a16="http://schemas.microsoft.com/office/drawing/2014/main" id="{1146D79A-EC07-3CEF-454B-CD796D474073}"/>
@@ -7183,8 +8206,8 @@
         </p:nvSpPr>
         <p:spPr>
           <a:xfrm>
-            <a:off x="-77315" y="2603895"/>
-            <a:ext cx="338554" cy="1326645"/>
+            <a:off x="-77315" y="2504324"/>
+            <a:ext cx="338554" cy="1656111"/>
           </a:xfrm>
           <a:prstGeom prst="rect">
             <a:avLst/>
@@ -7192,7 +8215,7 @@
           <a:noFill/>
         </p:spPr>
         <p:txBody>
-          <a:bodyPr vert="vert270" wrap="none" rtlCol="0">
+          <a:bodyPr vert="vert270" wrap="square" rtlCol="0">
             <a:spAutoFit/>
           </a:bodyPr>
           <a:lstStyle/>
@@ -7241,7 +8264,7 @@
       </p:sp>
       <p:cxnSp>
         <p:nvCxnSpPr>
-          <p:cNvPr id="601" name="Straight Connector 600">
+          <p:cNvPr id="660" name="Straight Connector 659">
             <a:extLst>
               <a:ext uri="{FF2B5EF4-FFF2-40B4-BE49-F238E27FC236}">
                 <a16:creationId xmlns:a16="http://schemas.microsoft.com/office/drawing/2014/main" id="{00B4791E-555E-547F-8448-A1D6882390C9}"/>
@@ -7287,7 +8310,7 @@
       </p:cxnSp>
       <p:sp>
         <p:nvSpPr>
-          <p:cNvPr id="602" name="TextBox 601">
+          <p:cNvPr id="661" name="TextBox 660">
             <a:extLst>
               <a:ext uri="{FF2B5EF4-FFF2-40B4-BE49-F238E27FC236}">
                 <a16:creationId xmlns:a16="http://schemas.microsoft.com/office/drawing/2014/main" id="{AD491ADF-E96D-E422-C79F-9D802C0D8C5C}"/>
@@ -7357,7 +8380,7 @@
       </p:sp>
       <p:cxnSp>
         <p:nvCxnSpPr>
-          <p:cNvPr id="603" name="Straight Connector 602">
+          <p:cNvPr id="662" name="Straight Connector 661">
             <a:extLst>
               <a:ext uri="{FF2B5EF4-FFF2-40B4-BE49-F238E27FC236}">
                 <a16:creationId xmlns:a16="http://schemas.microsoft.com/office/drawing/2014/main" id="{A5E89D36-496B-BC6E-6451-DB68F154953E}"/>
@@ -7371,8 +8394,8 @@
         </p:nvCxnSpPr>
         <p:spPr>
           <a:xfrm>
-            <a:off x="189987" y="4450988"/>
-            <a:ext cx="0" cy="1069272"/>
+            <a:off x="189987" y="4511488"/>
+            <a:ext cx="0" cy="1154763"/>
           </a:xfrm>
           <a:prstGeom prst="line">
             <a:avLst/>
@@ -7403,7 +8426,7 @@
       </p:cxnSp>
       <p:sp>
         <p:nvSpPr>
-          <p:cNvPr id="604" name="TextBox 603">
+          <p:cNvPr id="663" name="TextBox 662">
             <a:extLst>
               <a:ext uri="{FF2B5EF4-FFF2-40B4-BE49-F238E27FC236}">
                 <a16:creationId xmlns:a16="http://schemas.microsoft.com/office/drawing/2014/main" id="{B5AD376D-9072-BDE5-112F-1804EA806BB6}"/>
@@ -7415,8 +8438,8 @@
         </p:nvSpPr>
         <p:spPr>
           <a:xfrm>
-            <a:off x="-74517" y="4450988"/>
-            <a:ext cx="338554" cy="1149710"/>
+            <a:off x="-74517" y="4508733"/>
+            <a:ext cx="338554" cy="1157517"/>
           </a:xfrm>
           <a:prstGeom prst="rect">
             <a:avLst/>
@@ -7473,7 +8496,7 @@
       </p:sp>
       <p:cxnSp>
         <p:nvCxnSpPr>
-          <p:cNvPr id="605" name="Straight Connector 604">
+          <p:cNvPr id="664" name="Straight Connector 663">
             <a:extLst>
               <a:ext uri="{FF2B5EF4-FFF2-40B4-BE49-F238E27FC236}">
                 <a16:creationId xmlns:a16="http://schemas.microsoft.com/office/drawing/2014/main" id="{55935181-890B-720D-C664-35CB54240F4E}"/>
@@ -7487,7 +8510,7 @@
         </p:nvCxnSpPr>
         <p:spPr>
           <a:xfrm>
-            <a:off x="1154165" y="3715557"/>
+            <a:off x="1154165" y="3829861"/>
             <a:ext cx="0" cy="244094"/>
           </a:xfrm>
           <a:prstGeom prst="line">
@@ -7496,8 +8519,8 @@
           <a:ln w="9525">
             <a:solidFill>
               <a:schemeClr val="tx1">
-                <a:lumMod val="75000"/>
-                <a:lumOff val="25000"/>
+                <a:lumMod val="50000"/>
+                <a:lumOff val="50000"/>
               </a:schemeClr>
             </a:solidFill>
             <a:prstDash val="dash"/>
@@ -7520,7 +8543,7 @@
       </p:cxnSp>
       <p:cxnSp>
         <p:nvCxnSpPr>
-          <p:cNvPr id="606" name="Straight Connector 605">
+          <p:cNvPr id="665" name="Straight Connector 664">
             <a:extLst>
               <a:ext uri="{FF2B5EF4-FFF2-40B4-BE49-F238E27FC236}">
                 <a16:creationId xmlns:a16="http://schemas.microsoft.com/office/drawing/2014/main" id="{EF30C496-2771-0778-6824-2EB6BE7CEFF0}"/>
@@ -7534,7 +8557,7 @@
         </p:nvCxnSpPr>
         <p:spPr>
           <a:xfrm>
-            <a:off x="1154165" y="3959651"/>
+            <a:off x="1154165" y="4073955"/>
             <a:ext cx="853515" cy="0"/>
           </a:xfrm>
           <a:prstGeom prst="line">
@@ -7543,8 +8566,8 @@
           <a:ln w="9525">
             <a:solidFill>
               <a:schemeClr val="tx1">
-                <a:lumMod val="75000"/>
-                <a:lumOff val="25000"/>
+                <a:lumMod val="50000"/>
+                <a:lumOff val="50000"/>
               </a:schemeClr>
             </a:solidFill>
             <a:prstDash val="dash"/>
@@ -7567,7 +8590,7 @@
       </p:cxnSp>
       <p:cxnSp>
         <p:nvCxnSpPr>
-          <p:cNvPr id="607" name="Straight Connector 606">
+          <p:cNvPr id="666" name="Straight Connector 665">
             <a:extLst>
               <a:ext uri="{FF2B5EF4-FFF2-40B4-BE49-F238E27FC236}">
                 <a16:creationId xmlns:a16="http://schemas.microsoft.com/office/drawing/2014/main" id="{C96442FF-908A-84F2-7E54-6AB7485662E5}"/>
@@ -7581,7 +8604,7 @@
         </p:nvCxnSpPr>
         <p:spPr>
           <a:xfrm>
-            <a:off x="2009528" y="3715557"/>
+            <a:off x="2009528" y="3829861"/>
             <a:ext cx="0" cy="233642"/>
           </a:xfrm>
           <a:prstGeom prst="line">
@@ -7590,8 +8613,8 @@
           <a:ln w="9525">
             <a:solidFill>
               <a:schemeClr val="tx1">
-                <a:lumMod val="75000"/>
-                <a:lumOff val="25000"/>
+                <a:lumMod val="50000"/>
+                <a:lumOff val="50000"/>
               </a:schemeClr>
             </a:solidFill>
             <a:prstDash val="dash"/>
@@ -7616,7 +8639,7 @@
       </p:cxnSp>
       <p:cxnSp>
         <p:nvCxnSpPr>
-          <p:cNvPr id="608" name="Straight Arrow Connector 607">
+          <p:cNvPr id="667" name="Straight Arrow Connector 666">
             <a:extLst>
               <a:ext uri="{FF2B5EF4-FFF2-40B4-BE49-F238E27FC236}">
                 <a16:creationId xmlns:a16="http://schemas.microsoft.com/office/drawing/2014/main" id="{68C79158-7AC0-2089-1EB1-659E9CE9B879}"/>
@@ -7663,7 +8686,7 @@
       </p:cxnSp>
       <p:cxnSp>
         <p:nvCxnSpPr>
-          <p:cNvPr id="609" name="Straight Arrow Connector 608">
+          <p:cNvPr id="668" name="Straight Arrow Connector 667">
             <a:extLst>
               <a:ext uri="{FF2B5EF4-FFF2-40B4-BE49-F238E27FC236}">
                 <a16:creationId xmlns:a16="http://schemas.microsoft.com/office/drawing/2014/main" id="{4EC70538-F86D-F7C9-DDDD-DA52C78765E3}"/>
@@ -7710,7 +8733,7 @@
       </p:cxnSp>
       <p:cxnSp>
         <p:nvCxnSpPr>
-          <p:cNvPr id="610" name="Straight Arrow Connector 609">
+          <p:cNvPr id="669" name="Straight Arrow Connector 668">
             <a:extLst>
               <a:ext uri="{FF2B5EF4-FFF2-40B4-BE49-F238E27FC236}">
                 <a16:creationId xmlns:a16="http://schemas.microsoft.com/office/drawing/2014/main" id="{9F7D2FEC-C785-93BC-449F-1A0CC0B4888A}"/>
@@ -7757,7 +8780,7 @@
       </p:cxnSp>
       <p:cxnSp>
         <p:nvCxnSpPr>
-          <p:cNvPr id="611" name="Straight Arrow Connector 610">
+          <p:cNvPr id="670" name="Straight Arrow Connector 669">
             <a:extLst>
               <a:ext uri="{FF2B5EF4-FFF2-40B4-BE49-F238E27FC236}">
                 <a16:creationId xmlns:a16="http://schemas.microsoft.com/office/drawing/2014/main" id="{9778960E-B8BB-13B7-75CF-504745A15D25}"/>
@@ -7804,7 +8827,7 @@
       </p:cxnSp>
       <p:cxnSp>
         <p:nvCxnSpPr>
-          <p:cNvPr id="612" name="Straight Arrow Connector 611">
+          <p:cNvPr id="671" name="Straight Arrow Connector 670">
             <a:extLst>
               <a:ext uri="{FF2B5EF4-FFF2-40B4-BE49-F238E27FC236}">
                 <a16:creationId xmlns:a16="http://schemas.microsoft.com/office/drawing/2014/main" id="{FC730EE6-A865-F984-6BF9-922C3B75E9CB}"/>
@@ -7851,7 +8874,7 @@
       </p:cxnSp>
       <p:cxnSp>
         <p:nvCxnSpPr>
-          <p:cNvPr id="613" name="Straight Arrow Connector 612">
+          <p:cNvPr id="672" name="Straight Arrow Connector 671">
             <a:extLst>
               <a:ext uri="{FF2B5EF4-FFF2-40B4-BE49-F238E27FC236}">
                 <a16:creationId xmlns:a16="http://schemas.microsoft.com/office/drawing/2014/main" id="{EACCC1CE-FD33-0835-95CD-4A0BE2013F80}"/>
@@ -7898,7 +8921,7 @@
       </p:cxnSp>
       <p:cxnSp>
         <p:nvCxnSpPr>
-          <p:cNvPr id="614" name="Straight Arrow Connector 613">
+          <p:cNvPr id="673" name="Straight Arrow Connector 672">
             <a:extLst>
               <a:ext uri="{FF2B5EF4-FFF2-40B4-BE49-F238E27FC236}">
                 <a16:creationId xmlns:a16="http://schemas.microsoft.com/office/drawing/2014/main" id="{7EF61BF4-0D6D-5F88-43D7-D8C8E3B0885C}"/>
@@ -7912,7 +8935,7 @@
         </p:nvCxnSpPr>
         <p:spPr>
           <a:xfrm>
-            <a:off x="2214416" y="4255616"/>
+            <a:off x="2214416" y="4369920"/>
             <a:ext cx="0" cy="190361"/>
           </a:xfrm>
           <a:prstGeom prst="straightConnector1">
@@ -7945,7 +8968,7 @@
       </p:cxnSp>
       <p:cxnSp>
         <p:nvCxnSpPr>
-          <p:cNvPr id="615" name="Straight Arrow Connector 614">
+          <p:cNvPr id="674" name="Straight Arrow Connector 673">
             <a:extLst>
               <a:ext uri="{FF2B5EF4-FFF2-40B4-BE49-F238E27FC236}">
                 <a16:creationId xmlns:a16="http://schemas.microsoft.com/office/drawing/2014/main" id="{FFAE2ACE-ABDC-A2F2-DCB7-F5057E21A66D}"/>
@@ -7959,7 +8982,7 @@
         </p:nvCxnSpPr>
         <p:spPr>
           <a:xfrm>
-            <a:off x="2214416" y="4899329"/>
+            <a:off x="2214416" y="5013633"/>
             <a:ext cx="0" cy="190361"/>
           </a:xfrm>
           <a:prstGeom prst="straightConnector1">
@@ -7992,7 +9015,7 @@
       </p:cxnSp>
       <p:cxnSp>
         <p:nvCxnSpPr>
-          <p:cNvPr id="616" name="Straight Connector 615">
+          <p:cNvPr id="675" name="Straight Connector 674">
             <a:extLst>
               <a:ext uri="{FF2B5EF4-FFF2-40B4-BE49-F238E27FC236}">
                 <a16:creationId xmlns:a16="http://schemas.microsoft.com/office/drawing/2014/main" id="{5F6D91F5-3338-557F-0CB3-E7DC04EB077C}"/>
@@ -8004,7 +9027,7 @@
         </p:nvCxnSpPr>
         <p:spPr>
           <a:xfrm>
-            <a:off x="256053" y="4078648"/>
+            <a:off x="256053" y="4192952"/>
             <a:ext cx="0" cy="177139"/>
           </a:xfrm>
           <a:prstGeom prst="line">
@@ -8036,7 +9059,7 @@
       </p:cxnSp>
       <p:cxnSp>
         <p:nvCxnSpPr>
-          <p:cNvPr id="617" name="Straight Connector 616">
+          <p:cNvPr id="676" name="Straight Connector 675">
             <a:extLst>
               <a:ext uri="{FF2B5EF4-FFF2-40B4-BE49-F238E27FC236}">
                 <a16:creationId xmlns:a16="http://schemas.microsoft.com/office/drawing/2014/main" id="{EC6CF449-A72A-A019-7618-C21BAA994F09}"/>
@@ -8050,7 +9073,7 @@
         </p:nvCxnSpPr>
         <p:spPr>
           <a:xfrm>
-            <a:off x="256053" y="4255616"/>
+            <a:off x="256053" y="4369920"/>
             <a:ext cx="3867079" cy="0"/>
           </a:xfrm>
           <a:prstGeom prst="line">
@@ -8082,7 +9105,7 @@
       </p:cxnSp>
       <p:cxnSp>
         <p:nvCxnSpPr>
-          <p:cNvPr id="618" name="Straight Connector 617">
+          <p:cNvPr id="677" name="Straight Connector 676">
             <a:extLst>
               <a:ext uri="{FF2B5EF4-FFF2-40B4-BE49-F238E27FC236}">
                 <a16:creationId xmlns:a16="http://schemas.microsoft.com/office/drawing/2014/main" id="{CB73C3F9-D34E-5387-D738-F027F9F21D82}"/>
@@ -8096,7 +9119,7 @@
         </p:nvCxnSpPr>
         <p:spPr>
           <a:xfrm>
-            <a:off x="4123132" y="4078648"/>
+            <a:off x="4123132" y="4192952"/>
             <a:ext cx="0" cy="177139"/>
           </a:xfrm>
           <a:prstGeom prst="line">
@@ -8128,7 +9151,7 @@
       </p:cxnSp>
       <p:cxnSp>
         <p:nvCxnSpPr>
-          <p:cNvPr id="619" name="Straight Connector 618">
+          <p:cNvPr id="678" name="Straight Connector 677">
             <a:extLst>
               <a:ext uri="{FF2B5EF4-FFF2-40B4-BE49-F238E27FC236}">
                 <a16:creationId xmlns:a16="http://schemas.microsoft.com/office/drawing/2014/main" id="{FB0CCEB5-3FCE-544B-3DA3-C04064EA44E6}"/>
@@ -8174,7 +9197,7 @@
       </p:cxnSp>
       <p:cxnSp>
         <p:nvCxnSpPr>
-          <p:cNvPr id="620" name="Straight Arrow Connector 619">
+          <p:cNvPr id="679" name="Straight Arrow Connector 678">
             <a:extLst>
               <a:ext uri="{FF2B5EF4-FFF2-40B4-BE49-F238E27FC236}">
                 <a16:creationId xmlns:a16="http://schemas.microsoft.com/office/drawing/2014/main" id="{BF7F9AE8-B09C-0594-6E08-D8E9EDCA7F9C}"/>
@@ -8222,7 +9245,7 @@
       </p:cxnSp>
       <p:cxnSp>
         <p:nvCxnSpPr>
-          <p:cNvPr id="622" name="Straight Arrow Connector 621">
+          <p:cNvPr id="680" name="Straight Arrow Connector 679">
             <a:extLst>
               <a:ext uri="{FF2B5EF4-FFF2-40B4-BE49-F238E27FC236}">
                 <a16:creationId xmlns:a16="http://schemas.microsoft.com/office/drawing/2014/main" id="{8296C103-D665-8AB6-3B09-566D3BB7F3F9}"/>
@@ -8269,7 +9292,7 @@
       </p:cxnSp>
       <p:sp>
         <p:nvSpPr>
-          <p:cNvPr id="623" name="TextBox 622">
+          <p:cNvPr id="681" name="TextBox 680">
             <a:extLst>
               <a:ext uri="{FF2B5EF4-FFF2-40B4-BE49-F238E27FC236}">
                 <a16:creationId xmlns:a16="http://schemas.microsoft.com/office/drawing/2014/main" id="{B1334220-28E2-C9A1-20DB-0960856A01C1}"/>
@@ -8338,7 +9361,7 @@
       </p:sp>
       <p:cxnSp>
         <p:nvCxnSpPr>
-          <p:cNvPr id="624" name="Straight Connector 623">
+          <p:cNvPr id="682" name="Straight Connector 681">
             <a:extLst>
               <a:ext uri="{FF2B5EF4-FFF2-40B4-BE49-F238E27FC236}">
                 <a16:creationId xmlns:a16="http://schemas.microsoft.com/office/drawing/2014/main" id="{10D6DB07-7601-5557-6A71-39B2BB89BCB8}"/>
@@ -8361,8 +9384,8 @@
           <a:ln w="19050">
             <a:solidFill>
               <a:schemeClr val="tx1">
-                <a:lumMod val="75000"/>
-                <a:lumOff val="25000"/>
+                <a:lumMod val="50000"/>
+                <a:lumOff val="50000"/>
               </a:schemeClr>
             </a:solidFill>
             <a:prstDash val="dash"/>
@@ -8387,7 +9410,7 @@
       </p:cxnSp>
       <p:sp>
         <p:nvSpPr>
-          <p:cNvPr id="625" name="TextBox 624">
+          <p:cNvPr id="683" name="TextBox 682">
             <a:extLst>
               <a:ext uri="{FF2B5EF4-FFF2-40B4-BE49-F238E27FC236}">
                 <a16:creationId xmlns:a16="http://schemas.microsoft.com/office/drawing/2014/main" id="{163F56E9-414E-9452-9860-C8D28A72FBE6}"/>
@@ -8456,7 +9479,7 @@
       </p:sp>
       <p:sp>
         <p:nvSpPr>
-          <p:cNvPr id="626" name="TextBox 625">
+          <p:cNvPr id="684" name="TextBox 683">
             <a:extLst>
               <a:ext uri="{FF2B5EF4-FFF2-40B4-BE49-F238E27FC236}">
                 <a16:creationId xmlns:a16="http://schemas.microsoft.com/office/drawing/2014/main" id="{45A669CA-93F7-26B4-4327-1BF3D3C31A5A}"/>
@@ -8514,7 +9537,7 @@
       </p:sp>
       <p:sp>
         <p:nvSpPr>
-          <p:cNvPr id="627" name="TextBox 626">
+          <p:cNvPr id="685" name="TextBox 684">
             <a:extLst>
               <a:ext uri="{FF2B5EF4-FFF2-40B4-BE49-F238E27FC236}">
                 <a16:creationId xmlns:a16="http://schemas.microsoft.com/office/drawing/2014/main" id="{F7316CE7-8C2E-BB48-C6B9-2CA089A07966}"/>
@@ -8572,7 +9595,7 @@
       </p:sp>
       <p:sp>
         <p:nvSpPr>
-          <p:cNvPr id="628" name="TextBox 627">
+          <p:cNvPr id="686" name="TextBox 685">
             <a:extLst>
               <a:ext uri="{FF2B5EF4-FFF2-40B4-BE49-F238E27FC236}">
                 <a16:creationId xmlns:a16="http://schemas.microsoft.com/office/drawing/2014/main" id="{2574031C-A47A-178A-A062-EA116F8846DD}"/>
@@ -8630,7 +9653,7 @@
       </p:sp>
       <p:sp>
         <p:nvSpPr>
-          <p:cNvPr id="629" name="TextBox 628">
+          <p:cNvPr id="687" name="TextBox 686">
             <a:extLst>
               <a:ext uri="{FF2B5EF4-FFF2-40B4-BE49-F238E27FC236}">
                 <a16:creationId xmlns:a16="http://schemas.microsoft.com/office/drawing/2014/main" id="{A113BE4A-E9EA-9093-C6C1-3A906173B618}"/>
@@ -8688,7 +9711,7 @@
       </p:sp>
       <p:sp>
         <p:nvSpPr>
-          <p:cNvPr id="630" name="TextBox 629">
+          <p:cNvPr id="688" name="TextBox 687">
             <a:extLst>
               <a:ext uri="{FF2B5EF4-FFF2-40B4-BE49-F238E27FC236}">
                 <a16:creationId xmlns:a16="http://schemas.microsoft.com/office/drawing/2014/main" id="{8AF39566-0332-086B-0C44-7819D8974EBD}"/>
@@ -8746,7 +9769,7 @@
       </p:sp>
       <p:sp>
         <p:nvSpPr>
-          <p:cNvPr id="631" name="TextBox 630">
+          <p:cNvPr id="689" name="TextBox 688">
             <a:extLst>
               <a:ext uri="{FF2B5EF4-FFF2-40B4-BE49-F238E27FC236}">
                 <a16:creationId xmlns:a16="http://schemas.microsoft.com/office/drawing/2014/main" id="{FAC45779-73B6-302A-19A8-FAE3737E50E7}"/>
@@ -8804,7 +9827,7 @@
       </p:sp>
       <p:sp>
         <p:nvSpPr>
-          <p:cNvPr id="632" name="TextBox 631">
+          <p:cNvPr id="690" name="TextBox 689">
             <a:extLst>
               <a:ext uri="{FF2B5EF4-FFF2-40B4-BE49-F238E27FC236}">
                 <a16:creationId xmlns:a16="http://schemas.microsoft.com/office/drawing/2014/main" id="{0FF3C3A6-BA87-1DE0-8CFA-1EB270D68A54}"/>
@@ -8862,7 +9885,7 @@
       </p:sp>
       <p:sp>
         <p:nvSpPr>
-          <p:cNvPr id="633" name="TextBox 632">
+          <p:cNvPr id="691" name="TextBox 690">
             <a:extLst>
               <a:ext uri="{FF2B5EF4-FFF2-40B4-BE49-F238E27FC236}">
                 <a16:creationId xmlns:a16="http://schemas.microsoft.com/office/drawing/2014/main" id="{9DA24193-322E-D46A-6095-515BAD183A85}"/>
@@ -8874,7 +9897,7 @@
         </p:nvSpPr>
         <p:spPr>
           <a:xfrm>
-            <a:off x="1041343" y="4543878"/>
+            <a:off x="1041343" y="4658182"/>
             <a:ext cx="694422" cy="246221"/>
           </a:xfrm>
           <a:prstGeom prst="rect">
@@ -8920,7 +9943,7 @@
       </p:sp>
       <p:sp>
         <p:nvSpPr>
-          <p:cNvPr id="634" name="TextBox 633">
+          <p:cNvPr id="692" name="TextBox 691">
             <a:extLst>
               <a:ext uri="{FF2B5EF4-FFF2-40B4-BE49-F238E27FC236}">
                 <a16:creationId xmlns:a16="http://schemas.microsoft.com/office/drawing/2014/main" id="{166EA424-2B97-DBF1-1D22-87CF3A64C146}"/>
@@ -8932,7 +9955,7 @@
         </p:nvSpPr>
         <p:spPr>
           <a:xfrm>
-            <a:off x="1041343" y="5181150"/>
+            <a:off x="1041343" y="5295454"/>
             <a:ext cx="694422" cy="246221"/>
           </a:xfrm>
           <a:prstGeom prst="rect">
@@ -8978,7 +10001,7 @@
       </p:sp>
       <p:cxnSp>
         <p:nvCxnSpPr>
-          <p:cNvPr id="635" name="Straight Connector 634">
+          <p:cNvPr id="693" name="Straight Connector 692">
             <a:extLst>
               <a:ext uri="{FF2B5EF4-FFF2-40B4-BE49-F238E27FC236}">
                 <a16:creationId xmlns:a16="http://schemas.microsoft.com/office/drawing/2014/main" id="{4F6CC630-74F7-00CC-B311-8D4D17E7A697}"/>
@@ -8992,7 +10015,7 @@
         </p:nvCxnSpPr>
         <p:spPr>
           <a:xfrm>
-            <a:off x="691194" y="3715557"/>
+            <a:off x="691194" y="3829861"/>
             <a:ext cx="0" cy="333330"/>
           </a:xfrm>
           <a:prstGeom prst="line">
@@ -9001,8 +10024,8 @@
           <a:ln w="9525">
             <a:solidFill>
               <a:schemeClr val="tx1">
-                <a:lumMod val="75000"/>
-                <a:lumOff val="25000"/>
+                <a:lumMod val="50000"/>
+                <a:lumOff val="50000"/>
               </a:schemeClr>
             </a:solidFill>
             <a:prstDash val="dash"/>
@@ -9025,7 +10048,7 @@
       </p:cxnSp>
       <p:cxnSp>
         <p:nvCxnSpPr>
-          <p:cNvPr id="636" name="Straight Connector 635">
+          <p:cNvPr id="694" name="Straight Connector 693">
             <a:extLst>
               <a:ext uri="{FF2B5EF4-FFF2-40B4-BE49-F238E27FC236}">
                 <a16:creationId xmlns:a16="http://schemas.microsoft.com/office/drawing/2014/main" id="{54AC9DFC-A95D-FF43-9DA7-3F77067B5B1F}"/>
@@ -9039,7 +10062,7 @@
         </p:nvCxnSpPr>
         <p:spPr>
           <a:xfrm>
-            <a:off x="691194" y="4048887"/>
+            <a:off x="691194" y="4163191"/>
             <a:ext cx="3067430" cy="0"/>
           </a:xfrm>
           <a:prstGeom prst="line">
@@ -9048,8 +10071,8 @@
           <a:ln w="9525">
             <a:solidFill>
               <a:schemeClr val="tx1">
-                <a:lumMod val="75000"/>
-                <a:lumOff val="25000"/>
+                <a:lumMod val="50000"/>
+                <a:lumOff val="50000"/>
               </a:schemeClr>
             </a:solidFill>
             <a:prstDash val="dash"/>
@@ -9072,7 +10095,7 @@
       </p:cxnSp>
       <p:cxnSp>
         <p:nvCxnSpPr>
-          <p:cNvPr id="637" name="Straight Connector 636">
+          <p:cNvPr id="695" name="Straight Connector 694">
             <a:extLst>
               <a:ext uri="{FF2B5EF4-FFF2-40B4-BE49-F238E27FC236}">
                 <a16:creationId xmlns:a16="http://schemas.microsoft.com/office/drawing/2014/main" id="{536B190C-D802-668A-3A2F-EADAA9B117FB}"/>
@@ -9086,7 +10109,7 @@
         </p:nvCxnSpPr>
         <p:spPr>
           <a:xfrm flipH="1">
-            <a:off x="3758624" y="3715557"/>
+            <a:off x="3758624" y="3829861"/>
             <a:ext cx="1104" cy="333330"/>
           </a:xfrm>
           <a:prstGeom prst="line">
@@ -9095,8 +10118,8 @@
           <a:ln w="9525">
             <a:solidFill>
               <a:schemeClr val="tx1">
-                <a:lumMod val="75000"/>
-                <a:lumOff val="25000"/>
+                <a:lumMod val="50000"/>
+                <a:lumOff val="50000"/>
               </a:schemeClr>
             </a:solidFill>
             <a:prstDash val="dash"/>
@@ -9121,7 +10144,7 @@
       </p:cxnSp>
       <p:cxnSp>
         <p:nvCxnSpPr>
-          <p:cNvPr id="638" name="Straight Connector 637">
+          <p:cNvPr id="696" name="Straight Connector 695">
             <a:extLst>
               <a:ext uri="{FF2B5EF4-FFF2-40B4-BE49-F238E27FC236}">
                 <a16:creationId xmlns:a16="http://schemas.microsoft.com/office/drawing/2014/main" id="{8C6DC7EB-ACC3-93EE-3F85-2D4F9582590D}"/>
@@ -9135,7 +10158,7 @@
         </p:nvCxnSpPr>
         <p:spPr>
           <a:xfrm>
-            <a:off x="2460871" y="3715557"/>
+            <a:off x="2460871" y="3829861"/>
             <a:ext cx="0" cy="244094"/>
           </a:xfrm>
           <a:prstGeom prst="line">
@@ -9144,8 +10167,8 @@
           <a:ln w="9525">
             <a:solidFill>
               <a:schemeClr val="tx1">
-                <a:lumMod val="75000"/>
-                <a:lumOff val="25000"/>
+                <a:lumMod val="50000"/>
+                <a:lumOff val="50000"/>
               </a:schemeClr>
             </a:solidFill>
             <a:prstDash val="dash"/>
@@ -9168,7 +10191,7 @@
       </p:cxnSp>
       <p:cxnSp>
         <p:nvCxnSpPr>
-          <p:cNvPr id="639" name="Straight Connector 638">
+          <p:cNvPr id="697" name="Straight Connector 696">
             <a:extLst>
               <a:ext uri="{FF2B5EF4-FFF2-40B4-BE49-F238E27FC236}">
                 <a16:creationId xmlns:a16="http://schemas.microsoft.com/office/drawing/2014/main" id="{EDAD99B5-F84C-EE59-7063-69CAD2F7AF29}"/>
@@ -9182,7 +10205,7 @@
         </p:nvCxnSpPr>
         <p:spPr>
           <a:xfrm>
-            <a:off x="2461886" y="3959651"/>
+            <a:off x="2461886" y="4073955"/>
             <a:ext cx="840291" cy="0"/>
           </a:xfrm>
           <a:prstGeom prst="line">
@@ -9191,8 +10214,8 @@
           <a:ln w="9525">
             <a:solidFill>
               <a:schemeClr val="tx1">
-                <a:lumMod val="75000"/>
-                <a:lumOff val="25000"/>
+                <a:lumMod val="50000"/>
+                <a:lumOff val="50000"/>
               </a:schemeClr>
             </a:solidFill>
             <a:prstDash val="dash"/>
@@ -9215,7 +10238,7 @@
       </p:cxnSp>
       <p:cxnSp>
         <p:nvCxnSpPr>
-          <p:cNvPr id="640" name="Straight Connector 639">
+          <p:cNvPr id="698" name="Straight Connector 697">
             <a:extLst>
               <a:ext uri="{FF2B5EF4-FFF2-40B4-BE49-F238E27FC236}">
                 <a16:creationId xmlns:a16="http://schemas.microsoft.com/office/drawing/2014/main" id="{A58CBC7E-E89D-229A-405A-16571F42DD04}"/>
@@ -9229,7 +10252,7 @@
         </p:nvCxnSpPr>
         <p:spPr>
           <a:xfrm>
-            <a:off x="3302177" y="3715557"/>
+            <a:off x="3302177" y="3829861"/>
             <a:ext cx="1294" cy="254277"/>
           </a:xfrm>
           <a:prstGeom prst="line">
@@ -9238,8 +10261,8 @@
           <a:ln w="9525">
             <a:solidFill>
               <a:schemeClr val="tx1">
-                <a:lumMod val="75000"/>
-                <a:lumOff val="25000"/>
+                <a:lumMod val="50000"/>
+                <a:lumOff val="50000"/>
               </a:schemeClr>
             </a:solidFill>
             <a:prstDash val="dash"/>
@@ -9264,7 +10287,7 @@
       </p:cxnSp>
       <p:cxnSp>
         <p:nvCxnSpPr>
-          <p:cNvPr id="2" name="Straight Arrow Connector 1">
+          <p:cNvPr id="699" name="Straight Arrow Connector 698">
             <a:extLst>
               <a:ext uri="{FF2B5EF4-FFF2-40B4-BE49-F238E27FC236}">
                 <a16:creationId xmlns:a16="http://schemas.microsoft.com/office/drawing/2014/main" id="{C3617998-F352-C21B-76BA-7CE607336375}"/>
@@ -9312,7 +10335,7 @@
       </p:cxnSp>
       <p:cxnSp>
         <p:nvCxnSpPr>
-          <p:cNvPr id="4" name="Straight Arrow Connector 3">
+          <p:cNvPr id="700" name="Straight Arrow Connector 699">
             <a:extLst>
               <a:ext uri="{FF2B5EF4-FFF2-40B4-BE49-F238E27FC236}">
                 <a16:creationId xmlns:a16="http://schemas.microsoft.com/office/drawing/2014/main" id="{019FE13D-B077-2A14-975A-4A5BD5828F54}"/>

</xml_diff>

<commit_message>
Corrected name of chapter 3.
</commit_message>
<xml_diff>
--- a/chapter_01/figures/thesis_roadmap.pptx
+++ b/chapter_01/figures/thesis_roadmap.pptx
@@ -128,12 +128,12 @@
   <pc:docChgLst>
     <pc:chgData name="Fatima Pillosu" userId="a6295d4dc9e22643" providerId="LiveId" clId="{A2BAD573-0810-4F62-955B-09910E5A090C}"/>
     <pc:docChg chg="undo redo custSel modSld">
-      <pc:chgData name="Fatima Pillosu" userId="a6295d4dc9e22643" providerId="LiveId" clId="{A2BAD573-0810-4F62-955B-09910E5A090C}" dt="2025-06-24T14:48:29.916" v="3267"/>
+      <pc:chgData name="Fatima Pillosu" userId="a6295d4dc9e22643" providerId="LiveId" clId="{A2BAD573-0810-4F62-955B-09910E5A090C}" dt="2025-06-24T14:54:17.463" v="3271" actId="20577"/>
       <pc:docMkLst>
         <pc:docMk/>
       </pc:docMkLst>
       <pc:sldChg chg="addSp delSp modSp mod">
-        <pc:chgData name="Fatima Pillosu" userId="a6295d4dc9e22643" providerId="LiveId" clId="{A2BAD573-0810-4F62-955B-09910E5A090C}" dt="2025-06-24T14:48:29.916" v="3267"/>
+        <pc:chgData name="Fatima Pillosu" userId="a6295d4dc9e22643" providerId="LiveId" clId="{A2BAD573-0810-4F62-955B-09910E5A090C}" dt="2025-06-24T14:54:17.463" v="3271" actId="20577"/>
         <pc:sldMkLst>
           <pc:docMk/>
           <pc:sldMk cId="3354384854" sldId="256"/>
@@ -155,7 +155,7 @@
           </ac:spMkLst>
         </pc:spChg>
         <pc:spChg chg="add mod">
-          <ac:chgData name="Fatima Pillosu" userId="a6295d4dc9e22643" providerId="LiveId" clId="{A2BAD573-0810-4F62-955B-09910E5A090C}" dt="2025-06-24T14:07:39.249" v="2281" actId="1038"/>
+          <ac:chgData name="Fatima Pillosu" userId="a6295d4dc9e22643" providerId="LiveId" clId="{A2BAD573-0810-4F62-955B-09910E5A090C}" dt="2025-06-24T14:54:17.463" v="3271" actId="20577"/>
           <ac:spMkLst>
             <pc:docMk/>
             <pc:sldMk cId="3354384854" sldId="256"/>
@@ -8871,6 +8871,19 @@
           <a:p>
             <a:pPr algn="ctr"/>
             <a:r>
+              <a:rPr lang="en-GB" sz="1000">
+                <a:solidFill>
+                  <a:schemeClr val="tx1">
+                    <a:lumMod val="75000"/>
+                    <a:lumOff val="25000"/>
+                  </a:schemeClr>
+                </a:solidFill>
+                <a:latin typeface="Calibri Light" panose="020F0302020204030204" pitchFamily="34" charset="0"/>
+                <a:cs typeface="Calibri Light" panose="020F0302020204030204" pitchFamily="34" charset="0"/>
+              </a:rPr>
+              <a:t>Integrated Experimental </a:t>
+            </a:r>
+            <a:r>
               <a:rPr lang="en-GB" sz="1000" dirty="0">
                 <a:solidFill>
                   <a:schemeClr val="tx1">
@@ -8881,8 +8894,31 @@
                 <a:latin typeface="Calibri Light" panose="020F0302020204030204" pitchFamily="34" charset="0"/>
                 <a:cs typeface="Calibri Light" panose="020F0302020204030204" pitchFamily="34" charset="0"/>
               </a:rPr>
-              <a:t>Integrated experimental strategy</a:t>
+              <a:t>S</a:t>
             </a:r>
+            <a:r>
+              <a:rPr lang="en-GB" sz="1000">
+                <a:solidFill>
+                  <a:schemeClr val="tx1">
+                    <a:lumMod val="75000"/>
+                    <a:lumOff val="25000"/>
+                  </a:schemeClr>
+                </a:solidFill>
+                <a:latin typeface="Calibri Light" panose="020F0302020204030204" pitchFamily="34" charset="0"/>
+                <a:cs typeface="Calibri Light" panose="020F0302020204030204" pitchFamily="34" charset="0"/>
+              </a:rPr>
+              <a:t>trategy</a:t>
+            </a:r>
+            <a:endParaRPr lang="en-GB" sz="1000" dirty="0">
+              <a:solidFill>
+                <a:schemeClr val="tx1">
+                  <a:lumMod val="75000"/>
+                  <a:lumOff val="25000"/>
+                </a:schemeClr>
+              </a:solidFill>
+              <a:latin typeface="Calibri Light" panose="020F0302020204030204" pitchFamily="34" charset="0"/>
+              <a:cs typeface="Calibri Light" panose="020F0302020204030204" pitchFamily="34" charset="0"/>
+            </a:endParaRPr>
           </a:p>
         </p:txBody>
       </p:sp>

</xml_diff>

<commit_message>
Improved thesis road map
</commit_message>
<xml_diff>
--- a/chapter_01/figures/thesis_roadmap.pptx
+++ b/chapter_01/figures/thesis_roadmap.pptx
@@ -118,7 +118,7 @@
 <file path=ppt/revisionInfo.xml><?xml version="1.0" encoding="utf-8"?>
 <p1510:revInfo xmlns:a="http://schemas.openxmlformats.org/drawingml/2006/main" xmlns:r="http://schemas.openxmlformats.org/officeDocument/2006/relationships" xmlns:p1510="http://schemas.microsoft.com/office/powerpoint/2015/10/main">
   <p1510:revLst>
-    <p1510:client id="{A2BAD573-0810-4F62-955B-09910E5A090C}" v="24" dt="2025-06-24T14:37:14.387"/>
+    <p1510:client id="{A2BAD573-0810-4F62-955B-09910E5A090C}" v="26" dt="2025-06-24T15:21:54.445"/>
   </p1510:revLst>
 </p1510:revInfo>
 </file>
@@ -128,12 +128,12 @@
   <pc:docChgLst>
     <pc:chgData name="Fatima Pillosu" userId="a6295d4dc9e22643" providerId="LiveId" clId="{A2BAD573-0810-4F62-955B-09910E5A090C}"/>
     <pc:docChg chg="undo redo custSel modSld">
-      <pc:chgData name="Fatima Pillosu" userId="a6295d4dc9e22643" providerId="LiveId" clId="{A2BAD573-0810-4F62-955B-09910E5A090C}" dt="2025-06-24T14:54:17.463" v="3271" actId="20577"/>
+      <pc:chgData name="Fatima Pillosu" userId="a6295d4dc9e22643" providerId="LiveId" clId="{A2BAD573-0810-4F62-955B-09910E5A090C}" dt="2025-06-24T15:23:35.602" v="3303" actId="1037"/>
       <pc:docMkLst>
         <pc:docMk/>
       </pc:docMkLst>
       <pc:sldChg chg="addSp delSp modSp mod">
-        <pc:chgData name="Fatima Pillosu" userId="a6295d4dc9e22643" providerId="LiveId" clId="{A2BAD573-0810-4F62-955B-09910E5A090C}" dt="2025-06-24T14:54:17.463" v="3271" actId="20577"/>
+        <pc:chgData name="Fatima Pillosu" userId="a6295d4dc9e22643" providerId="LiveId" clId="{A2BAD573-0810-4F62-955B-09910E5A090C}" dt="2025-06-24T15:23:35.602" v="3303" actId="1037"/>
         <pc:sldMkLst>
           <pc:docMk/>
           <pc:sldMk cId="3354384854" sldId="256"/>
@@ -171,7 +171,7 @@
           </ac:spMkLst>
         </pc:spChg>
         <pc:spChg chg="add mod">
-          <ac:chgData name="Fatima Pillosu" userId="a6295d4dc9e22643" providerId="LiveId" clId="{A2BAD573-0810-4F62-955B-09910E5A090C}" dt="2025-06-24T14:06:10.920" v="2270" actId="1037"/>
+          <ac:chgData name="Fatima Pillosu" userId="a6295d4dc9e22643" providerId="LiveId" clId="{A2BAD573-0810-4F62-955B-09910E5A090C}" dt="2025-06-24T15:22:39.137" v="3284" actId="1038"/>
           <ac:spMkLst>
             <pc:docMk/>
             <pc:sldMk cId="3354384854" sldId="256"/>
@@ -179,7 +179,7 @@
           </ac:spMkLst>
         </pc:spChg>
         <pc:spChg chg="add mod">
-          <ac:chgData name="Fatima Pillosu" userId="a6295d4dc9e22643" providerId="LiveId" clId="{A2BAD573-0810-4F62-955B-09910E5A090C}" dt="2025-06-24T14:05:37.358" v="2254" actId="1037"/>
+          <ac:chgData name="Fatima Pillosu" userId="a6295d4dc9e22643" providerId="LiveId" clId="{A2BAD573-0810-4F62-955B-09910E5A090C}" dt="2025-06-24T15:22:28.510" v="3282" actId="1038"/>
           <ac:spMkLst>
             <pc:docMk/>
             <pc:sldMk cId="3354384854" sldId="256"/>
@@ -259,7 +259,7 @@
           </ac:spMkLst>
         </pc:spChg>
         <pc:spChg chg="add mod">
-          <ac:chgData name="Fatima Pillosu" userId="a6295d4dc9e22643" providerId="LiveId" clId="{A2BAD573-0810-4F62-955B-09910E5A090C}" dt="2025-06-24T14:11:51.637" v="2376" actId="552"/>
+          <ac:chgData name="Fatima Pillosu" userId="a6295d4dc9e22643" providerId="LiveId" clId="{A2BAD573-0810-4F62-955B-09910E5A090C}" dt="2025-06-24T15:23:06.599" v="3293" actId="552"/>
           <ac:spMkLst>
             <pc:docMk/>
             <pc:sldMk cId="3354384854" sldId="256"/>
@@ -267,7 +267,7 @@
           </ac:spMkLst>
         </pc:spChg>
         <pc:spChg chg="add mod">
-          <ac:chgData name="Fatima Pillosu" userId="a6295d4dc9e22643" providerId="LiveId" clId="{A2BAD573-0810-4F62-955B-09910E5A090C}" dt="2025-06-24T14:13:43.687" v="2392" actId="553"/>
+          <ac:chgData name="Fatima Pillosu" userId="a6295d4dc9e22643" providerId="LiveId" clId="{A2BAD573-0810-4F62-955B-09910E5A090C}" dt="2025-06-24T15:22:59.300" v="3286" actId="552"/>
           <ac:spMkLst>
             <pc:docMk/>
             <pc:sldMk cId="3354384854" sldId="256"/>
@@ -275,11 +275,19 @@
           </ac:spMkLst>
         </pc:spChg>
         <pc:spChg chg="add mod">
-          <ac:chgData name="Fatima Pillosu" userId="a6295d4dc9e22643" providerId="LiveId" clId="{A2BAD573-0810-4F62-955B-09910E5A090C}" dt="2025-06-24T14:06:10.920" v="2270" actId="1037"/>
+          <ac:chgData name="Fatima Pillosu" userId="a6295d4dc9e22643" providerId="LiveId" clId="{A2BAD573-0810-4F62-955B-09910E5A090C}" dt="2025-06-24T15:22:39.137" v="3284" actId="1038"/>
           <ac:spMkLst>
             <pc:docMk/>
             <pc:sldMk cId="3354384854" sldId="256"/>
             <ac:spMk id="19" creationId="{6BE65441-4EEE-E468-5441-5FEB4D450CFE}"/>
+          </ac:spMkLst>
+        </pc:spChg>
+        <pc:spChg chg="add mod">
+          <ac:chgData name="Fatima Pillosu" userId="a6295d4dc9e22643" providerId="LiveId" clId="{A2BAD573-0810-4F62-955B-09910E5A090C}" dt="2025-06-24T15:22:39.137" v="3284" actId="1038"/>
+          <ac:spMkLst>
+            <pc:docMk/>
+            <pc:sldMk cId="3354384854" sldId="256"/>
+            <ac:spMk id="21" creationId="{1146D79A-EC07-3CEF-454B-CD796D474073}"/>
           </ac:spMkLst>
         </pc:spChg>
         <pc:spChg chg="add mod">
@@ -287,14 +295,6 @@
           <ac:spMkLst>
             <pc:docMk/>
             <pc:sldMk cId="3354384854" sldId="256"/>
-            <ac:spMk id="21" creationId="{1146D79A-EC07-3CEF-454B-CD796D474073}"/>
-          </ac:spMkLst>
-        </pc:spChg>
-        <pc:spChg chg="add mod">
-          <ac:chgData name="Fatima Pillosu" userId="a6295d4dc9e22643" providerId="LiveId" clId="{A2BAD573-0810-4F62-955B-09910E5A090C}" dt="2025-06-24T14:06:36.678" v="2274" actId="552"/>
-          <ac:spMkLst>
-            <pc:docMk/>
-            <pc:sldMk cId="3354384854" sldId="256"/>
             <ac:spMk id="23" creationId="{AD491ADF-E96D-E422-C79F-9D802C0D8C5C}"/>
           </ac:spMkLst>
         </pc:spChg>
@@ -355,7 +355,7 @@
           </ac:spMkLst>
         </pc:spChg>
         <pc:spChg chg="add mod">
-          <ac:chgData name="Fatima Pillosu" userId="a6295d4dc9e22643" providerId="LiveId" clId="{A2BAD573-0810-4F62-955B-09910E5A090C}" dt="2025-06-24T14:06:10.920" v="2270" actId="1037"/>
+          <ac:chgData name="Fatima Pillosu" userId="a6295d4dc9e22643" providerId="LiveId" clId="{A2BAD573-0810-4F62-955B-09910E5A090C}" dt="2025-06-24T15:22:39.137" v="3284" actId="1038"/>
           <ac:spMkLst>
             <pc:docMk/>
             <pc:sldMk cId="3354384854" sldId="256"/>
@@ -363,7 +363,7 @@
           </ac:spMkLst>
         </pc:spChg>
         <pc:spChg chg="add mod">
-          <ac:chgData name="Fatima Pillosu" userId="a6295d4dc9e22643" providerId="LiveId" clId="{A2BAD573-0810-4F62-955B-09910E5A090C}" dt="2025-06-24T14:05:37.358" v="2254" actId="1037"/>
+          <ac:chgData name="Fatima Pillosu" userId="a6295d4dc9e22643" providerId="LiveId" clId="{A2BAD573-0810-4F62-955B-09910E5A090C}" dt="2025-06-24T15:22:28.510" v="3282" actId="1038"/>
           <ac:spMkLst>
             <pc:docMk/>
             <pc:sldMk cId="3354384854" sldId="256"/>
@@ -395,6 +395,14 @@
           </ac:spMkLst>
         </pc:spChg>
         <pc:spChg chg="add mod">
+          <ac:chgData name="Fatima Pillosu" userId="a6295d4dc9e22643" providerId="LiveId" clId="{A2BAD573-0810-4F62-955B-09910E5A090C}" dt="2025-06-24T15:21:54.444" v="3279" actId="571"/>
+          <ac:spMkLst>
+            <pc:docMk/>
+            <pc:sldMk cId="3354384854" sldId="256"/>
+            <ac:spMk id="62" creationId="{09DF45E3-0314-00F9-8BAD-2FFCC8BC1173}"/>
+          </ac:spMkLst>
+        </pc:spChg>
+        <pc:spChg chg="add mod">
           <ac:chgData name="Fatima Pillosu" userId="a6295d4dc9e22643" providerId="LiveId" clId="{A2BAD573-0810-4F62-955B-09910E5A090C}" dt="2025-06-24T13:21:14.136" v="259" actId="115"/>
           <ac:spMkLst>
             <pc:docMk/>
@@ -451,7 +459,7 @@
           </ac:spMkLst>
         </pc:spChg>
         <pc:spChg chg="add mod">
-          <ac:chgData name="Fatima Pillosu" userId="a6295d4dc9e22643" providerId="LiveId" clId="{A2BAD573-0810-4F62-955B-09910E5A090C}" dt="2025-06-24T14:31:52.715" v="2905" actId="1038"/>
+          <ac:chgData name="Fatima Pillosu" userId="a6295d4dc9e22643" providerId="LiveId" clId="{A2BAD573-0810-4F62-955B-09910E5A090C}" dt="2025-06-24T15:22:39.137" v="3284" actId="1038"/>
           <ac:spMkLst>
             <pc:docMk/>
             <pc:sldMk cId="3354384854" sldId="256"/>
@@ -475,7 +483,7 @@
           </ac:spMkLst>
         </pc:spChg>
         <pc:spChg chg="add mod">
-          <ac:chgData name="Fatima Pillosu" userId="a6295d4dc9e22643" providerId="LiveId" clId="{A2BAD573-0810-4F62-955B-09910E5A090C}" dt="2025-06-24T14:13:05.778" v="2388" actId="555"/>
+          <ac:chgData name="Fatima Pillosu" userId="a6295d4dc9e22643" providerId="LiveId" clId="{A2BAD573-0810-4F62-955B-09910E5A090C}" dt="2025-06-24T15:22:39.137" v="3284" actId="1038"/>
           <ac:spMkLst>
             <pc:docMk/>
             <pc:sldMk cId="3354384854" sldId="256"/>
@@ -483,7 +491,7 @@
           </ac:spMkLst>
         </pc:spChg>
         <pc:spChg chg="add mod">
-          <ac:chgData name="Fatima Pillosu" userId="a6295d4dc9e22643" providerId="LiveId" clId="{A2BAD573-0810-4F62-955B-09910E5A090C}" dt="2025-06-24T14:12:06.959" v="2379" actId="555"/>
+          <ac:chgData name="Fatima Pillosu" userId="a6295d4dc9e22643" providerId="LiveId" clId="{A2BAD573-0810-4F62-955B-09910E5A090C}" dt="2025-06-24T15:22:39.137" v="3284" actId="1038"/>
           <ac:spMkLst>
             <pc:docMk/>
             <pc:sldMk cId="3354384854" sldId="256"/>
@@ -491,7 +499,7 @@
           </ac:spMkLst>
         </pc:spChg>
         <pc:spChg chg="add mod">
-          <ac:chgData name="Fatima Pillosu" userId="a6295d4dc9e22643" providerId="LiveId" clId="{A2BAD573-0810-4F62-955B-09910E5A090C}" dt="2025-06-24T14:48:18.154" v="3261" actId="20577"/>
+          <ac:chgData name="Fatima Pillosu" userId="a6295d4dc9e22643" providerId="LiveId" clId="{A2BAD573-0810-4F62-955B-09910E5A090C}" dt="2025-06-24T15:22:39.137" v="3284" actId="1038"/>
           <ac:spMkLst>
             <pc:docMk/>
             <pc:sldMk cId="3354384854" sldId="256"/>
@@ -499,7 +507,7 @@
           </ac:spMkLst>
         </pc:spChg>
         <pc:spChg chg="add mod">
-          <ac:chgData name="Fatima Pillosu" userId="a6295d4dc9e22643" providerId="LiveId" clId="{A2BAD573-0810-4F62-955B-09910E5A090C}" dt="2025-06-24T14:12:43.645" v="2384" actId="554"/>
+          <ac:chgData name="Fatima Pillosu" userId="a6295d4dc9e22643" providerId="LiveId" clId="{A2BAD573-0810-4F62-955B-09910E5A090C}" dt="2025-06-24T15:22:39.137" v="3284" actId="1038"/>
           <ac:spMkLst>
             <pc:docMk/>
             <pc:sldMk cId="3354384854" sldId="256"/>
@@ -507,7 +515,7 @@
           </ac:spMkLst>
         </pc:spChg>
         <pc:spChg chg="add mod">
-          <ac:chgData name="Fatima Pillosu" userId="a6295d4dc9e22643" providerId="LiveId" clId="{A2BAD573-0810-4F62-955B-09910E5A090C}" dt="2025-06-24T14:34:16.692" v="2962" actId="20577"/>
+          <ac:chgData name="Fatima Pillosu" userId="a6295d4dc9e22643" providerId="LiveId" clId="{A2BAD573-0810-4F62-955B-09910E5A090C}" dt="2025-06-24T15:22:39.137" v="3284" actId="1038"/>
           <ac:spMkLst>
             <pc:docMk/>
             <pc:sldMk cId="3354384854" sldId="256"/>
@@ -539,7 +547,7 @@
           </ac:spMkLst>
         </pc:spChg>
         <pc:spChg chg="add mod">
-          <ac:chgData name="Fatima Pillosu" userId="a6295d4dc9e22643" providerId="LiveId" clId="{A2BAD573-0810-4F62-955B-09910E5A090C}" dt="2025-06-24T14:14:45.926" v="2401" actId="552"/>
+          <ac:chgData name="Fatima Pillosu" userId="a6295d4dc9e22643" providerId="LiveId" clId="{A2BAD573-0810-4F62-955B-09910E5A090C}" dt="2025-06-24T15:22:39.137" v="3284" actId="1038"/>
           <ac:spMkLst>
             <pc:docMk/>
             <pc:sldMk cId="3354384854" sldId="256"/>
@@ -547,7 +555,7 @@
           </ac:spMkLst>
         </pc:spChg>
         <pc:spChg chg="add mod">
-          <ac:chgData name="Fatima Pillosu" userId="a6295d4dc9e22643" providerId="LiveId" clId="{A2BAD573-0810-4F62-955B-09910E5A090C}" dt="2025-06-24T14:14:45.926" v="2401" actId="552"/>
+          <ac:chgData name="Fatima Pillosu" userId="a6295d4dc9e22643" providerId="LiveId" clId="{A2BAD573-0810-4F62-955B-09910E5A090C}" dt="2025-06-24T15:22:28.510" v="3282" actId="1038"/>
           <ac:spMkLst>
             <pc:docMk/>
             <pc:sldMk cId="3354384854" sldId="256"/>
@@ -563,7 +571,7 @@
           </ac:spMkLst>
         </pc:spChg>
         <pc:spChg chg="add mod">
-          <ac:chgData name="Fatima Pillosu" userId="a6295d4dc9e22643" providerId="LiveId" clId="{A2BAD573-0810-4F62-955B-09910E5A090C}" dt="2025-06-24T14:48:24.689" v="3266" actId="20577"/>
+          <ac:chgData name="Fatima Pillosu" userId="a6295d4dc9e22643" providerId="LiveId" clId="{A2BAD573-0810-4F62-955B-09910E5A090C}" dt="2025-06-24T15:22:39.137" v="3284" actId="1038"/>
           <ac:spMkLst>
             <pc:docMk/>
             <pc:sldMk cId="3354384854" sldId="256"/>
@@ -571,7 +579,7 @@
           </ac:spMkLst>
         </pc:spChg>
         <pc:spChg chg="add mod">
-          <ac:chgData name="Fatima Pillosu" userId="a6295d4dc9e22643" providerId="LiveId" clId="{A2BAD573-0810-4F62-955B-09910E5A090C}" dt="2025-06-24T14:14:45.926" v="2401" actId="552"/>
+          <ac:chgData name="Fatima Pillosu" userId="a6295d4dc9e22643" providerId="LiveId" clId="{A2BAD573-0810-4F62-955B-09910E5A090C}" dt="2025-06-24T15:23:19.291" v="3297" actId="1038"/>
           <ac:spMkLst>
             <pc:docMk/>
             <pc:sldMk cId="3354384854" sldId="256"/>
@@ -579,7 +587,7 @@
           </ac:spMkLst>
         </pc:spChg>
         <pc:spChg chg="add mod">
-          <ac:chgData name="Fatima Pillosu" userId="a6295d4dc9e22643" providerId="LiveId" clId="{A2BAD573-0810-4F62-955B-09910E5A090C}" dt="2025-06-24T14:20:04.331" v="2668" actId="1076"/>
+          <ac:chgData name="Fatima Pillosu" userId="a6295d4dc9e22643" providerId="LiveId" clId="{A2BAD573-0810-4F62-955B-09910E5A090C}" dt="2025-06-24T15:22:28.510" v="3282" actId="1038"/>
           <ac:spMkLst>
             <pc:docMk/>
             <pc:sldMk cId="3354384854" sldId="256"/>
@@ -587,7 +595,7 @@
           </ac:spMkLst>
         </pc:spChg>
         <pc:spChg chg="add mod">
-          <ac:chgData name="Fatima Pillosu" userId="a6295d4dc9e22643" providerId="LiveId" clId="{A2BAD573-0810-4F62-955B-09910E5A090C}" dt="2025-06-24T14:18:42.867" v="2530" actId="1035"/>
+          <ac:chgData name="Fatima Pillosu" userId="a6295d4dc9e22643" providerId="LiveId" clId="{A2BAD573-0810-4F62-955B-09910E5A090C}" dt="2025-06-24T15:22:28.510" v="3282" actId="1038"/>
           <ac:spMkLst>
             <pc:docMk/>
             <pc:sldMk cId="3354384854" sldId="256"/>
@@ -595,7 +603,7 @@
           </ac:spMkLst>
         </pc:spChg>
         <pc:spChg chg="add mod">
-          <ac:chgData name="Fatima Pillosu" userId="a6295d4dc9e22643" providerId="LiveId" clId="{A2BAD573-0810-4F62-955B-09910E5A090C}" dt="2025-06-24T14:15:16.270" v="2407" actId="20577"/>
+          <ac:chgData name="Fatima Pillosu" userId="a6295d4dc9e22643" providerId="LiveId" clId="{A2BAD573-0810-4F62-955B-09910E5A090C}" dt="2025-06-24T15:22:28.510" v="3282" actId="1038"/>
           <ac:spMkLst>
             <pc:docMk/>
             <pc:sldMk cId="3354384854" sldId="256"/>
@@ -611,7 +619,7 @@
           </ac:spMkLst>
         </pc:spChg>
         <pc:spChg chg="add mod">
-          <ac:chgData name="Fatima Pillosu" userId="a6295d4dc9e22643" providerId="LiveId" clId="{A2BAD573-0810-4F62-955B-09910E5A090C}" dt="2025-06-24T14:48:29.916" v="3267"/>
+          <ac:chgData name="Fatima Pillosu" userId="a6295d4dc9e22643" providerId="LiveId" clId="{A2BAD573-0810-4F62-955B-09910E5A090C}" dt="2025-06-24T15:22:28.510" v="3282" actId="1038"/>
           <ac:spMkLst>
             <pc:docMk/>
             <pc:sldMk cId="3354384854" sldId="256"/>
@@ -891,7 +899,7 @@
           </ac:spMkLst>
         </pc:spChg>
         <pc:cxnChg chg="add mod">
-          <ac:chgData name="Fatima Pillosu" userId="a6295d4dc9e22643" providerId="LiveId" clId="{A2BAD573-0810-4F62-955B-09910E5A090C}" dt="2025-06-24T14:06:22.680" v="2271" actId="552"/>
+          <ac:chgData name="Fatima Pillosu" userId="a6295d4dc9e22643" providerId="LiveId" clId="{A2BAD573-0810-4F62-955B-09910E5A090C}" dt="2025-06-24T15:22:50.361" v="3285" actId="552"/>
           <ac:cxnSpMkLst>
             <pc:docMk/>
             <pc:sldMk cId="3354384854" sldId="256"/>
@@ -899,7 +907,7 @@
           </ac:cxnSpMkLst>
         </pc:cxnChg>
         <pc:cxnChg chg="add mod">
-          <ac:chgData name="Fatima Pillosu" userId="a6295d4dc9e22643" providerId="LiveId" clId="{A2BAD573-0810-4F62-955B-09910E5A090C}" dt="2025-06-24T14:05:09.547" v="2248" actId="553"/>
+          <ac:chgData name="Fatima Pillosu" userId="a6295d4dc9e22643" providerId="LiveId" clId="{A2BAD573-0810-4F62-955B-09910E5A090C}" dt="2025-06-24T15:22:50.361" v="3285" actId="552"/>
           <ac:cxnSpMkLst>
             <pc:docMk/>
             <pc:sldMk cId="3354384854" sldId="256"/>
@@ -915,11 +923,75 @@
           </ac:cxnSpMkLst>
         </pc:cxnChg>
         <pc:cxnChg chg="add mod">
-          <ac:chgData name="Fatima Pillosu" userId="a6295d4dc9e22643" providerId="LiveId" clId="{A2BAD573-0810-4F62-955B-09910E5A090C}" dt="2025-06-24T14:43:14.082" v="3228" actId="1035"/>
+          <ac:chgData name="Fatima Pillosu" userId="a6295d4dc9e22643" providerId="LiveId" clId="{A2BAD573-0810-4F62-955B-09910E5A090C}" dt="2025-06-24T15:23:15.987" v="3295" actId="1037"/>
           <ac:cxnSpMkLst>
             <pc:docMk/>
             <pc:sldMk cId="3354384854" sldId="256"/>
             <ac:cxnSpMk id="26" creationId="{55935181-890B-720D-C664-35CB54240F4E}"/>
+          </ac:cxnSpMkLst>
+        </pc:cxnChg>
+        <pc:cxnChg chg="add mod">
+          <ac:chgData name="Fatima Pillosu" userId="a6295d4dc9e22643" providerId="LiveId" clId="{A2BAD573-0810-4F62-955B-09910E5A090C}" dt="2025-06-24T15:22:28.510" v="3282" actId="1038"/>
+          <ac:cxnSpMkLst>
+            <pc:docMk/>
+            <pc:sldMk cId="3354384854" sldId="256"/>
+            <ac:cxnSpMk id="27" creationId="{EF30C496-2771-0778-6824-2EB6BE7CEFF0}"/>
+          </ac:cxnSpMkLst>
+        </pc:cxnChg>
+        <pc:cxnChg chg="add mod">
+          <ac:chgData name="Fatima Pillosu" userId="a6295d4dc9e22643" providerId="LiveId" clId="{A2BAD573-0810-4F62-955B-09910E5A090C}" dt="2025-06-24T15:22:28.510" v="3282" actId="1038"/>
+          <ac:cxnSpMkLst>
+            <pc:docMk/>
+            <pc:sldMk cId="3354384854" sldId="256"/>
+            <ac:cxnSpMk id="28" creationId="{C96442FF-908A-84F2-7E54-6AB7485662E5}"/>
+          </ac:cxnSpMkLst>
+        </pc:cxnChg>
+        <pc:cxnChg chg="add mod">
+          <ac:chgData name="Fatima Pillosu" userId="a6295d4dc9e22643" providerId="LiveId" clId="{A2BAD573-0810-4F62-955B-09910E5A090C}" dt="2025-06-24T14:07:39.249" v="2281" actId="1038"/>
+          <ac:cxnSpMkLst>
+            <pc:docMk/>
+            <pc:sldMk cId="3354384854" sldId="256"/>
+            <ac:cxnSpMk id="29" creationId="{68C79158-7AC0-2089-1EB1-659E9CE9B879}"/>
+          </ac:cxnSpMkLst>
+        </pc:cxnChg>
+        <pc:cxnChg chg="add mod">
+          <ac:chgData name="Fatima Pillosu" userId="a6295d4dc9e22643" providerId="LiveId" clId="{A2BAD573-0810-4F62-955B-09910E5A090C}" dt="2025-06-24T14:07:39.249" v="2281" actId="1038"/>
+          <ac:cxnSpMkLst>
+            <pc:docMk/>
+            <pc:sldMk cId="3354384854" sldId="256"/>
+            <ac:cxnSpMk id="30" creationId="{4EC70538-F86D-F7C9-DDDD-DA52C78765E3}"/>
+          </ac:cxnSpMkLst>
+        </pc:cxnChg>
+        <pc:cxnChg chg="add mod">
+          <ac:chgData name="Fatima Pillosu" userId="a6295d4dc9e22643" providerId="LiveId" clId="{A2BAD573-0810-4F62-955B-09910E5A090C}" dt="2025-06-24T14:07:39.249" v="2281" actId="1038"/>
+          <ac:cxnSpMkLst>
+            <pc:docMk/>
+            <pc:sldMk cId="3354384854" sldId="256"/>
+            <ac:cxnSpMk id="31" creationId="{9F7D2FEC-C785-93BC-449F-1A0CC0B4888A}"/>
+          </ac:cxnSpMkLst>
+        </pc:cxnChg>
+        <pc:cxnChg chg="add mod">
+          <ac:chgData name="Fatima Pillosu" userId="a6295d4dc9e22643" providerId="LiveId" clId="{A2BAD573-0810-4F62-955B-09910E5A090C}" dt="2025-06-24T15:23:30.799" v="3300" actId="1037"/>
+          <ac:cxnSpMkLst>
+            <pc:docMk/>
+            <pc:sldMk cId="3354384854" sldId="256"/>
+            <ac:cxnSpMk id="32" creationId="{9778960E-B8BB-13B7-75CF-504745A15D25}"/>
+          </ac:cxnSpMkLst>
+        </pc:cxnChg>
+        <pc:cxnChg chg="add mod">
+          <ac:chgData name="Fatima Pillosu" userId="a6295d4dc9e22643" providerId="LiveId" clId="{A2BAD573-0810-4F62-955B-09910E5A090C}" dt="2025-06-24T15:23:35.602" v="3303" actId="1037"/>
+          <ac:cxnSpMkLst>
+            <pc:docMk/>
+            <pc:sldMk cId="3354384854" sldId="256"/>
+            <ac:cxnSpMk id="33" creationId="{FC730EE6-A865-F984-6BF9-922C3B75E9CB}"/>
+          </ac:cxnSpMkLst>
+        </pc:cxnChg>
+        <pc:cxnChg chg="add mod">
+          <ac:chgData name="Fatima Pillosu" userId="a6295d4dc9e22643" providerId="LiveId" clId="{A2BAD573-0810-4F62-955B-09910E5A090C}" dt="2025-06-24T13:42:40.229" v="1342" actId="1037"/>
+          <ac:cxnSpMkLst>
+            <pc:docMk/>
+            <pc:sldMk cId="3354384854" sldId="256"/>
+            <ac:cxnSpMk id="34" creationId="{EACCC1CE-FD33-0835-95CD-4A0BE2013F80}"/>
           </ac:cxnSpMkLst>
         </pc:cxnChg>
         <pc:cxnChg chg="add mod">
@@ -927,7 +999,7 @@
           <ac:cxnSpMkLst>
             <pc:docMk/>
             <pc:sldMk cId="3354384854" sldId="256"/>
-            <ac:cxnSpMk id="27" creationId="{EF30C496-2771-0778-6824-2EB6BE7CEFF0}"/>
+            <ac:cxnSpMk id="35" creationId="{7EF61BF4-0D6D-5F88-43D7-D8C8E3B0885C}"/>
           </ac:cxnSpMkLst>
         </pc:cxnChg>
         <pc:cxnChg chg="add mod">
@@ -935,7 +1007,39 @@
           <ac:cxnSpMkLst>
             <pc:docMk/>
             <pc:sldMk cId="3354384854" sldId="256"/>
-            <ac:cxnSpMk id="28" creationId="{C96442FF-908A-84F2-7E54-6AB7485662E5}"/>
+            <ac:cxnSpMk id="36" creationId="{FFAE2ACE-ABDC-A2F2-DCB7-F5057E21A66D}"/>
+          </ac:cxnSpMkLst>
+        </pc:cxnChg>
+        <pc:cxnChg chg="add mod">
+          <ac:chgData name="Fatima Pillosu" userId="a6295d4dc9e22643" providerId="LiveId" clId="{A2BAD573-0810-4F62-955B-09910E5A090C}" dt="2025-06-24T15:22:50.361" v="3285" actId="552"/>
+          <ac:cxnSpMkLst>
+            <pc:docMk/>
+            <pc:sldMk cId="3354384854" sldId="256"/>
+            <ac:cxnSpMk id="37" creationId="{5F6D91F5-3338-557F-0CB3-E7DC04EB077C}"/>
+          </ac:cxnSpMkLst>
+        </pc:cxnChg>
+        <pc:cxnChg chg="add mod">
+          <ac:chgData name="Fatima Pillosu" userId="a6295d4dc9e22643" providerId="LiveId" clId="{A2BAD573-0810-4F62-955B-09910E5A090C}" dt="2025-06-24T14:43:14.082" v="3228" actId="1035"/>
+          <ac:cxnSpMkLst>
+            <pc:docMk/>
+            <pc:sldMk cId="3354384854" sldId="256"/>
+            <ac:cxnSpMk id="38" creationId="{EC6CF449-A72A-A019-7618-C21BAA994F09}"/>
+          </ac:cxnSpMkLst>
+        </pc:cxnChg>
+        <pc:cxnChg chg="add mod">
+          <ac:chgData name="Fatima Pillosu" userId="a6295d4dc9e22643" providerId="LiveId" clId="{A2BAD573-0810-4F62-955B-09910E5A090C}" dt="2025-06-24T14:43:14.082" v="3228" actId="1035"/>
+          <ac:cxnSpMkLst>
+            <pc:docMk/>
+            <pc:sldMk cId="3354384854" sldId="256"/>
+            <ac:cxnSpMk id="39" creationId="{CB73C3F9-D34E-5387-D738-F027F9F21D82}"/>
+          </ac:cxnSpMkLst>
+        </pc:cxnChg>
+        <pc:cxnChg chg="add mod">
+          <ac:chgData name="Fatima Pillosu" userId="a6295d4dc9e22643" providerId="LiveId" clId="{A2BAD573-0810-4F62-955B-09910E5A090C}" dt="2025-06-24T14:07:56.878" v="2284" actId="14100"/>
+          <ac:cxnSpMkLst>
+            <pc:docMk/>
+            <pc:sldMk cId="3354384854" sldId="256"/>
+            <ac:cxnSpMk id="40" creationId="{FB0CCEB5-3FCE-544B-3DA3-C04064EA44E6}"/>
           </ac:cxnSpMkLst>
         </pc:cxnChg>
         <pc:cxnChg chg="add mod">
@@ -943,47 +1047,23 @@
           <ac:cxnSpMkLst>
             <pc:docMk/>
             <pc:sldMk cId="3354384854" sldId="256"/>
-            <ac:cxnSpMk id="29" creationId="{68C79158-7AC0-2089-1EB1-659E9CE9B879}"/>
+            <ac:cxnSpMk id="41" creationId="{BF7F9AE8-B09C-0594-6E08-D8E9EDCA7F9C}"/>
           </ac:cxnSpMkLst>
         </pc:cxnChg>
         <pc:cxnChg chg="add mod">
-          <ac:chgData name="Fatima Pillosu" userId="a6295d4dc9e22643" providerId="LiveId" clId="{A2BAD573-0810-4F62-955B-09910E5A090C}" dt="2025-06-24T14:07:39.249" v="2281" actId="1038"/>
-          <ac:cxnSpMkLst>
-            <pc:docMk/>
-            <pc:sldMk cId="3354384854" sldId="256"/>
-            <ac:cxnSpMk id="30" creationId="{4EC70538-F86D-F7C9-DDDD-DA52C78765E3}"/>
+          <ac:chgData name="Fatima Pillosu" userId="a6295d4dc9e22643" providerId="LiveId" clId="{A2BAD573-0810-4F62-955B-09910E5A090C}" dt="2025-06-24T13:48:39.957" v="1503" actId="1076"/>
+          <ac:cxnSpMkLst>
+            <pc:docMk/>
+            <pc:sldMk cId="3354384854" sldId="256"/>
+            <ac:cxnSpMk id="42" creationId="{8296C103-D665-8AB6-3B09-566D3BB7F3F9}"/>
           </ac:cxnSpMkLst>
         </pc:cxnChg>
         <pc:cxnChg chg="add mod">
-          <ac:chgData name="Fatima Pillosu" userId="a6295d4dc9e22643" providerId="LiveId" clId="{A2BAD573-0810-4F62-955B-09910E5A090C}" dt="2025-06-24T14:07:39.249" v="2281" actId="1038"/>
-          <ac:cxnSpMkLst>
-            <pc:docMk/>
-            <pc:sldMk cId="3354384854" sldId="256"/>
-            <ac:cxnSpMk id="31" creationId="{9F7D2FEC-C785-93BC-449F-1A0CC0B4888A}"/>
-          </ac:cxnSpMkLst>
-        </pc:cxnChg>
-        <pc:cxnChg chg="add mod">
-          <ac:chgData name="Fatima Pillosu" userId="a6295d4dc9e22643" providerId="LiveId" clId="{A2BAD573-0810-4F62-955B-09910E5A090C}" dt="2025-06-24T14:05:48.536" v="2265" actId="1038"/>
-          <ac:cxnSpMkLst>
-            <pc:docMk/>
-            <pc:sldMk cId="3354384854" sldId="256"/>
-            <ac:cxnSpMk id="32" creationId="{9778960E-B8BB-13B7-75CF-504745A15D25}"/>
-          </ac:cxnSpMkLst>
-        </pc:cxnChg>
-        <pc:cxnChg chg="add mod">
-          <ac:chgData name="Fatima Pillosu" userId="a6295d4dc9e22643" providerId="LiveId" clId="{A2BAD573-0810-4F62-955B-09910E5A090C}" dt="2025-06-24T14:07:39.249" v="2281" actId="1038"/>
-          <ac:cxnSpMkLst>
-            <pc:docMk/>
-            <pc:sldMk cId="3354384854" sldId="256"/>
-            <ac:cxnSpMk id="33" creationId="{FC730EE6-A865-F984-6BF9-922C3B75E9CB}"/>
-          </ac:cxnSpMkLst>
-        </pc:cxnChg>
-        <pc:cxnChg chg="add mod">
-          <ac:chgData name="Fatima Pillosu" userId="a6295d4dc9e22643" providerId="LiveId" clId="{A2BAD573-0810-4F62-955B-09910E5A090C}" dt="2025-06-24T13:42:40.229" v="1342" actId="1037"/>
-          <ac:cxnSpMkLst>
-            <pc:docMk/>
-            <pc:sldMk cId="3354384854" sldId="256"/>
-            <ac:cxnSpMk id="34" creationId="{EACCC1CE-FD33-0835-95CD-4A0BE2013F80}"/>
+          <ac:chgData name="Fatima Pillosu" userId="a6295d4dc9e22643" providerId="LiveId" clId="{A2BAD573-0810-4F62-955B-09910E5A090C}" dt="2025-06-24T13:48:39.957" v="1503" actId="1076"/>
+          <ac:cxnSpMkLst>
+            <pc:docMk/>
+            <pc:sldMk cId="3354384854" sldId="256"/>
+            <ac:cxnSpMk id="44" creationId="{10D6DB07-7601-5557-6A71-39B2BB89BCB8}"/>
           </ac:cxnSpMkLst>
         </pc:cxnChg>
         <pc:cxnChg chg="add mod">
@@ -991,7 +1071,15 @@
           <ac:cxnSpMkLst>
             <pc:docMk/>
             <pc:sldMk cId="3354384854" sldId="256"/>
-            <ac:cxnSpMk id="35" creationId="{7EF61BF4-0D6D-5F88-43D7-D8C8E3B0885C}"/>
+            <ac:cxnSpMk id="55" creationId="{4F6CC630-74F7-00CC-B311-8D4D17E7A697}"/>
+          </ac:cxnSpMkLst>
+        </pc:cxnChg>
+        <pc:cxnChg chg="add mod">
+          <ac:chgData name="Fatima Pillosu" userId="a6295d4dc9e22643" providerId="LiveId" clId="{A2BAD573-0810-4F62-955B-09910E5A090C}" dt="2025-06-24T14:43:23.640" v="3230" actId="1076"/>
+          <ac:cxnSpMkLst>
+            <pc:docMk/>
+            <pc:sldMk cId="3354384854" sldId="256"/>
+            <ac:cxnSpMk id="56" creationId="{54AC9DFC-A95D-FF43-9DA7-3F77067B5B1F}"/>
           </ac:cxnSpMkLst>
         </pc:cxnChg>
         <pc:cxnChg chg="add mod">
@@ -999,7 +1087,15 @@
           <ac:cxnSpMkLst>
             <pc:docMk/>
             <pc:sldMk cId="3354384854" sldId="256"/>
-            <ac:cxnSpMk id="36" creationId="{FFAE2ACE-ABDC-A2F2-DCB7-F5057E21A66D}"/>
+            <ac:cxnSpMk id="57" creationId="{536B190C-D802-668A-3A2F-EADAA9B117FB}"/>
+          </ac:cxnSpMkLst>
+        </pc:cxnChg>
+        <pc:cxnChg chg="add mod">
+          <ac:chgData name="Fatima Pillosu" userId="a6295d4dc9e22643" providerId="LiveId" clId="{A2BAD573-0810-4F62-955B-09910E5A090C}" dt="2025-06-24T15:23:26.691" v="3299" actId="1037"/>
+          <ac:cxnSpMkLst>
+            <pc:docMk/>
+            <pc:sldMk cId="3354384854" sldId="256"/>
+            <ac:cxnSpMk id="58" creationId="{8C6DC7EB-ACC3-93EE-3F85-2D4F9582590D}"/>
           </ac:cxnSpMkLst>
         </pc:cxnChg>
         <pc:cxnChg chg="add mod">
@@ -1007,7 +1103,7 @@
           <ac:cxnSpMkLst>
             <pc:docMk/>
             <pc:sldMk cId="3354384854" sldId="256"/>
-            <ac:cxnSpMk id="37" creationId="{5F6D91F5-3338-557F-0CB3-E7DC04EB077C}"/>
+            <ac:cxnSpMk id="59" creationId="{EDAD99B5-F84C-EE59-7063-69CAD2F7AF29}"/>
           </ac:cxnSpMkLst>
         </pc:cxnChg>
         <pc:cxnChg chg="add mod">
@@ -1015,95 +1111,15 @@
           <ac:cxnSpMkLst>
             <pc:docMk/>
             <pc:sldMk cId="3354384854" sldId="256"/>
-            <ac:cxnSpMk id="38" creationId="{EC6CF449-A72A-A019-7618-C21BAA994F09}"/>
+            <ac:cxnSpMk id="60" creationId="{A58CBC7E-E89D-229A-405A-16571F42DD04}"/>
           </ac:cxnSpMkLst>
         </pc:cxnChg>
         <pc:cxnChg chg="add mod">
-          <ac:chgData name="Fatima Pillosu" userId="a6295d4dc9e22643" providerId="LiveId" clId="{A2BAD573-0810-4F62-955B-09910E5A090C}" dt="2025-06-24T14:43:14.082" v="3228" actId="1035"/>
-          <ac:cxnSpMkLst>
-            <pc:docMk/>
-            <pc:sldMk cId="3354384854" sldId="256"/>
-            <ac:cxnSpMk id="39" creationId="{CB73C3F9-D34E-5387-D738-F027F9F21D82}"/>
-          </ac:cxnSpMkLst>
-        </pc:cxnChg>
-        <pc:cxnChg chg="add mod">
-          <ac:chgData name="Fatima Pillosu" userId="a6295d4dc9e22643" providerId="LiveId" clId="{A2BAD573-0810-4F62-955B-09910E5A090C}" dt="2025-06-24T14:07:56.878" v="2284" actId="14100"/>
-          <ac:cxnSpMkLst>
-            <pc:docMk/>
-            <pc:sldMk cId="3354384854" sldId="256"/>
-            <ac:cxnSpMk id="40" creationId="{FB0CCEB5-3FCE-544B-3DA3-C04064EA44E6}"/>
-          </ac:cxnSpMkLst>
-        </pc:cxnChg>
-        <pc:cxnChg chg="add mod">
-          <ac:chgData name="Fatima Pillosu" userId="a6295d4dc9e22643" providerId="LiveId" clId="{A2BAD573-0810-4F62-955B-09910E5A090C}" dt="2025-06-24T14:07:39.249" v="2281" actId="1038"/>
-          <ac:cxnSpMkLst>
-            <pc:docMk/>
-            <pc:sldMk cId="3354384854" sldId="256"/>
-            <ac:cxnSpMk id="41" creationId="{BF7F9AE8-B09C-0594-6E08-D8E9EDCA7F9C}"/>
-          </ac:cxnSpMkLst>
-        </pc:cxnChg>
-        <pc:cxnChg chg="add mod">
-          <ac:chgData name="Fatima Pillosu" userId="a6295d4dc9e22643" providerId="LiveId" clId="{A2BAD573-0810-4F62-955B-09910E5A090C}" dt="2025-06-24T13:48:39.957" v="1503" actId="1076"/>
-          <ac:cxnSpMkLst>
-            <pc:docMk/>
-            <pc:sldMk cId="3354384854" sldId="256"/>
-            <ac:cxnSpMk id="42" creationId="{8296C103-D665-8AB6-3B09-566D3BB7F3F9}"/>
-          </ac:cxnSpMkLst>
-        </pc:cxnChg>
-        <pc:cxnChg chg="add mod">
-          <ac:chgData name="Fatima Pillosu" userId="a6295d4dc9e22643" providerId="LiveId" clId="{A2BAD573-0810-4F62-955B-09910E5A090C}" dt="2025-06-24T13:48:39.957" v="1503" actId="1076"/>
-          <ac:cxnSpMkLst>
-            <pc:docMk/>
-            <pc:sldMk cId="3354384854" sldId="256"/>
-            <ac:cxnSpMk id="44" creationId="{10D6DB07-7601-5557-6A71-39B2BB89BCB8}"/>
-          </ac:cxnSpMkLst>
-        </pc:cxnChg>
-        <pc:cxnChg chg="add mod">
-          <ac:chgData name="Fatima Pillosu" userId="a6295d4dc9e22643" providerId="LiveId" clId="{A2BAD573-0810-4F62-955B-09910E5A090C}" dt="2025-06-24T14:43:14.082" v="3228" actId="1035"/>
-          <ac:cxnSpMkLst>
-            <pc:docMk/>
-            <pc:sldMk cId="3354384854" sldId="256"/>
-            <ac:cxnSpMk id="55" creationId="{4F6CC630-74F7-00CC-B311-8D4D17E7A697}"/>
-          </ac:cxnSpMkLst>
-        </pc:cxnChg>
-        <pc:cxnChg chg="add mod">
-          <ac:chgData name="Fatima Pillosu" userId="a6295d4dc9e22643" providerId="LiveId" clId="{A2BAD573-0810-4F62-955B-09910E5A090C}" dt="2025-06-24T14:43:23.640" v="3230" actId="1076"/>
-          <ac:cxnSpMkLst>
-            <pc:docMk/>
-            <pc:sldMk cId="3354384854" sldId="256"/>
-            <ac:cxnSpMk id="56" creationId="{54AC9DFC-A95D-FF43-9DA7-3F77067B5B1F}"/>
-          </ac:cxnSpMkLst>
-        </pc:cxnChg>
-        <pc:cxnChg chg="add mod">
-          <ac:chgData name="Fatima Pillosu" userId="a6295d4dc9e22643" providerId="LiveId" clId="{A2BAD573-0810-4F62-955B-09910E5A090C}" dt="2025-06-24T14:43:14.082" v="3228" actId="1035"/>
-          <ac:cxnSpMkLst>
-            <pc:docMk/>
-            <pc:sldMk cId="3354384854" sldId="256"/>
-            <ac:cxnSpMk id="57" creationId="{536B190C-D802-668A-3A2F-EADAA9B117FB}"/>
-          </ac:cxnSpMkLst>
-        </pc:cxnChg>
-        <pc:cxnChg chg="add mod">
-          <ac:chgData name="Fatima Pillosu" userId="a6295d4dc9e22643" providerId="LiveId" clId="{A2BAD573-0810-4F62-955B-09910E5A090C}" dt="2025-06-24T14:43:14.082" v="3228" actId="1035"/>
-          <ac:cxnSpMkLst>
-            <pc:docMk/>
-            <pc:sldMk cId="3354384854" sldId="256"/>
-            <ac:cxnSpMk id="58" creationId="{8C6DC7EB-ACC3-93EE-3F85-2D4F9582590D}"/>
-          </ac:cxnSpMkLst>
-        </pc:cxnChg>
-        <pc:cxnChg chg="add mod">
-          <ac:chgData name="Fatima Pillosu" userId="a6295d4dc9e22643" providerId="LiveId" clId="{A2BAD573-0810-4F62-955B-09910E5A090C}" dt="2025-06-24T14:43:14.082" v="3228" actId="1035"/>
-          <ac:cxnSpMkLst>
-            <pc:docMk/>
-            <pc:sldMk cId="3354384854" sldId="256"/>
-            <ac:cxnSpMk id="59" creationId="{EDAD99B5-F84C-EE59-7063-69CAD2F7AF29}"/>
-          </ac:cxnSpMkLst>
-        </pc:cxnChg>
-        <pc:cxnChg chg="add mod">
-          <ac:chgData name="Fatima Pillosu" userId="a6295d4dc9e22643" providerId="LiveId" clId="{A2BAD573-0810-4F62-955B-09910E5A090C}" dt="2025-06-24T14:43:14.082" v="3228" actId="1035"/>
-          <ac:cxnSpMkLst>
-            <pc:docMk/>
-            <pc:sldMk cId="3354384854" sldId="256"/>
-            <ac:cxnSpMk id="60" creationId="{A58CBC7E-E89D-229A-405A-16571F42DD04}"/>
+          <ac:chgData name="Fatima Pillosu" userId="a6295d4dc9e22643" providerId="LiveId" clId="{A2BAD573-0810-4F62-955B-09910E5A090C}" dt="2025-06-24T15:21:54.444" v="3279" actId="571"/>
+          <ac:cxnSpMkLst>
+            <pc:docMk/>
+            <pc:sldMk cId="3354384854" sldId="256"/>
+            <ac:cxnSpMk id="61" creationId="{859AD269-046F-673F-0365-A12F2894528E}"/>
           </ac:cxnSpMkLst>
         </pc:cxnChg>
         <pc:cxnChg chg="add del mod">
@@ -1147,7 +1163,7 @@
           </ac:cxnSpMkLst>
         </pc:cxnChg>
         <pc:cxnChg chg="add mod">
-          <ac:chgData name="Fatima Pillosu" userId="a6295d4dc9e22643" providerId="LiveId" clId="{A2BAD573-0810-4F62-955B-09910E5A090C}" dt="2025-06-24T14:06:10.920" v="2270" actId="1037"/>
+          <ac:chgData name="Fatima Pillosu" userId="a6295d4dc9e22643" providerId="LiveId" clId="{A2BAD573-0810-4F62-955B-09910E5A090C}" dt="2025-06-24T15:22:39.137" v="3284" actId="1038"/>
           <ac:cxnSpMkLst>
             <pc:docMk/>
             <pc:sldMk cId="3354384854" sldId="256"/>
@@ -1187,7 +1203,7 @@
           </ac:cxnSpMkLst>
         </pc:cxnChg>
         <pc:cxnChg chg="add mod">
-          <ac:chgData name="Fatima Pillosu" userId="a6295d4dc9e22643" providerId="LiveId" clId="{A2BAD573-0810-4F62-955B-09910E5A090C}" dt="2025-06-24T14:14:27.106" v="2399" actId="1038"/>
+          <ac:chgData name="Fatima Pillosu" userId="a6295d4dc9e22643" providerId="LiveId" clId="{A2BAD573-0810-4F62-955B-09910E5A090C}" dt="2025-06-24T15:23:06.599" v="3293" actId="552"/>
           <ac:cxnSpMkLst>
             <pc:docMk/>
             <pc:sldMk cId="3354384854" sldId="256"/>
@@ -1195,7 +1211,7 @@
           </ac:cxnSpMkLst>
         </pc:cxnChg>
         <pc:cxnChg chg="add mod">
-          <ac:chgData name="Fatima Pillosu" userId="a6295d4dc9e22643" providerId="LiveId" clId="{A2BAD573-0810-4F62-955B-09910E5A090C}" dt="2025-06-24T14:15:01.714" v="2404" actId="552"/>
+          <ac:chgData name="Fatima Pillosu" userId="a6295d4dc9e22643" providerId="LiveId" clId="{A2BAD573-0810-4F62-955B-09910E5A090C}" dt="2025-06-24T15:22:59.300" v="3286" actId="552"/>
           <ac:cxnSpMkLst>
             <pc:docMk/>
             <pc:sldMk cId="3354384854" sldId="256"/>
@@ -8981,7 +8997,7 @@
         </p:nvSpPr>
         <p:spPr>
           <a:xfrm>
-            <a:off x="324103" y="2421540"/>
+            <a:off x="307627" y="2421540"/>
             <a:ext cx="1317993" cy="584775"/>
           </a:xfrm>
           <a:prstGeom prst="rect">
@@ -9030,7 +9046,7 @@
         </p:nvSpPr>
         <p:spPr>
           <a:xfrm>
-            <a:off x="1593427" y="2423083"/>
+            <a:off x="1585189" y="2423083"/>
             <a:ext cx="1311683" cy="584775"/>
           </a:xfrm>
           <a:prstGeom prst="rect">
@@ -9602,7 +9618,7 @@
         </p:nvSpPr>
         <p:spPr>
           <a:xfrm>
-            <a:off x="1628794" y="2355470"/>
+            <a:off x="1620556" y="2355470"/>
             <a:ext cx="1224000" cy="720000"/>
           </a:xfrm>
           <a:prstGeom prst="rect">
@@ -9726,7 +9742,7 @@
         </p:nvSpPr>
         <p:spPr>
           <a:xfrm>
-            <a:off x="369427" y="2353927"/>
+            <a:off x="352951" y="2353927"/>
             <a:ext cx="1224000" cy="720000"/>
           </a:xfrm>
           <a:prstGeom prst="rect">
@@ -9834,7 +9850,7 @@
         </p:nvSpPr>
         <p:spPr>
           <a:xfrm>
-            <a:off x="-107469" y="2026526"/>
+            <a:off x="-99231" y="2026526"/>
             <a:ext cx="492443" cy="3203693"/>
           </a:xfrm>
           <a:prstGeom prst="rect">
@@ -10144,7 +10160,7 @@
         </p:nvCxnSpPr>
         <p:spPr>
           <a:xfrm>
-            <a:off x="1154165" y="5222062"/>
+            <a:off x="1170641" y="5222062"/>
             <a:ext cx="0" cy="144000"/>
           </a:xfrm>
           <a:prstGeom prst="line">
@@ -10191,7 +10207,7 @@
         </p:nvCxnSpPr>
         <p:spPr>
           <a:xfrm>
-            <a:off x="1154165" y="5367300"/>
+            <a:off x="1170641" y="5367300"/>
             <a:ext cx="853515" cy="0"/>
           </a:xfrm>
           <a:prstGeom prst="line">
@@ -10238,7 +10254,7 @@
         </p:nvCxnSpPr>
         <p:spPr>
           <a:xfrm>
-            <a:off x="2009528" y="5222062"/>
+            <a:off x="2026004" y="5222062"/>
             <a:ext cx="0" cy="144000"/>
           </a:xfrm>
           <a:prstGeom prst="line">
@@ -11363,7 +11379,7 @@
         </p:nvSpPr>
         <p:spPr>
           <a:xfrm>
-            <a:off x="368514" y="2136943"/>
+            <a:off x="352038" y="2136943"/>
             <a:ext cx="1227247" cy="246221"/>
           </a:xfrm>
           <a:prstGeom prst="rect">
@@ -11415,7 +11431,7 @@
         </p:nvSpPr>
         <p:spPr>
           <a:xfrm>
-            <a:off x="1605204" y="2136943"/>
+            <a:off x="1596966" y="2136943"/>
             <a:ext cx="1222225" cy="246221"/>
           </a:xfrm>
           <a:prstGeom prst="rect">
@@ -12100,7 +12116,7 @@
         </p:nvSpPr>
         <p:spPr>
           <a:xfrm>
-            <a:off x="527335" y="3177081"/>
+            <a:off x="510859" y="3177081"/>
             <a:ext cx="1106260" cy="830997"/>
           </a:xfrm>
           <a:prstGeom prst="rect">
@@ -12142,7 +12158,7 @@
         </p:nvSpPr>
         <p:spPr>
           <a:xfrm>
-            <a:off x="360276" y="3075470"/>
+            <a:off x="343800" y="3075470"/>
             <a:ext cx="225929" cy="1075908"/>
           </a:xfrm>
           <a:prstGeom prst="rect">
@@ -12206,7 +12222,7 @@
         </p:nvSpPr>
         <p:spPr>
           <a:xfrm>
-            <a:off x="369427" y="3074059"/>
+            <a:off x="352951" y="3074059"/>
             <a:ext cx="1224000" cy="1071000"/>
           </a:xfrm>
           <a:prstGeom prst="rect">
@@ -12268,7 +12284,7 @@
         </p:nvSpPr>
         <p:spPr>
           <a:xfrm>
-            <a:off x="360276" y="4141574"/>
+            <a:off x="343800" y="4141574"/>
             <a:ext cx="225929" cy="1075908"/>
           </a:xfrm>
           <a:prstGeom prst="rect">
@@ -12332,7 +12348,7 @@
         </p:nvSpPr>
         <p:spPr>
           <a:xfrm>
-            <a:off x="369427" y="4140163"/>
+            <a:off x="352951" y="4140163"/>
             <a:ext cx="1224000" cy="1071000"/>
           </a:xfrm>
           <a:prstGeom prst="rect">
@@ -12394,7 +12410,7 @@
         </p:nvSpPr>
         <p:spPr>
           <a:xfrm>
-            <a:off x="503197" y="4139501"/>
+            <a:off x="486721" y="4139501"/>
             <a:ext cx="1157044" cy="1077218"/>
           </a:xfrm>
           <a:prstGeom prst="rect">
@@ -12436,7 +12452,7 @@
         </p:nvCxnSpPr>
         <p:spPr>
           <a:xfrm flipH="1">
-            <a:off x="352038" y="4140163"/>
+            <a:off x="335562" y="4140163"/>
             <a:ext cx="225929" cy="0"/>
           </a:xfrm>
           <a:prstGeom prst="line">
@@ -12477,7 +12493,7 @@
         </p:nvSpPr>
         <p:spPr>
           <a:xfrm>
-            <a:off x="1628794" y="3075470"/>
+            <a:off x="1637032" y="3075470"/>
             <a:ext cx="225929" cy="1075908"/>
           </a:xfrm>
           <a:prstGeom prst="rect">
@@ -12541,7 +12557,7 @@
         </p:nvSpPr>
         <p:spPr>
           <a:xfrm>
-            <a:off x="1628794" y="3074059"/>
+            <a:off x="1620556" y="3074059"/>
             <a:ext cx="1224000" cy="1071000"/>
           </a:xfrm>
           <a:prstGeom prst="rect">
@@ -12603,7 +12619,7 @@
         </p:nvSpPr>
         <p:spPr>
           <a:xfrm>
-            <a:off x="1628794" y="4141574"/>
+            <a:off x="1637032" y="4141574"/>
             <a:ext cx="225929" cy="1075908"/>
           </a:xfrm>
           <a:prstGeom prst="rect">
@@ -12667,7 +12683,7 @@
         </p:nvSpPr>
         <p:spPr>
           <a:xfrm>
-            <a:off x="1628794" y="4140163"/>
+            <a:off x="1620556" y="4140163"/>
             <a:ext cx="1224000" cy="1071000"/>
           </a:xfrm>
           <a:prstGeom prst="rect">
@@ -12729,7 +12745,7 @@
         </p:nvSpPr>
         <p:spPr>
           <a:xfrm>
-            <a:off x="1756301" y="4195680"/>
+            <a:off x="1748063" y="4195680"/>
             <a:ext cx="1164773" cy="954107"/>
           </a:xfrm>
           <a:prstGeom prst="rect">
@@ -12766,12 +12782,14 @@
               </a:ext>
             </a:extLst>
           </p:cNvPr>
-          <p:cNvCxnSpPr/>
+          <p:cNvCxnSpPr>
+            <a:cxnSpLocks/>
+          </p:cNvCxnSpPr>
           <p:nvPr/>
         </p:nvCxnSpPr>
         <p:spPr>
           <a:xfrm flipH="1">
-            <a:off x="1623305" y="4134606"/>
+            <a:off x="1620556" y="4134606"/>
             <a:ext cx="225929" cy="0"/>
           </a:xfrm>
           <a:prstGeom prst="line">
@@ -12812,7 +12830,7 @@
         </p:nvSpPr>
         <p:spPr>
           <a:xfrm>
-            <a:off x="1802208" y="3075654"/>
+            <a:off x="1793970" y="3075654"/>
             <a:ext cx="1072961" cy="1077218"/>
           </a:xfrm>
           <a:prstGeom prst="rect">
@@ -12861,7 +12879,7 @@
         </p:nvSpPr>
         <p:spPr>
           <a:xfrm>
-            <a:off x="2888160" y="3080043"/>
+            <a:off x="2904636" y="3080043"/>
             <a:ext cx="225929" cy="1075908"/>
           </a:xfrm>
           <a:prstGeom prst="rect">
@@ -12987,7 +13005,7 @@
         </p:nvSpPr>
         <p:spPr>
           <a:xfrm>
-            <a:off x="2888160" y="4146147"/>
+            <a:off x="2904636" y="4146147"/>
             <a:ext cx="225929" cy="1075908"/>
           </a:xfrm>
           <a:prstGeom prst="rect">

</xml_diff>

<commit_message>
Improved the thesis roadmap
</commit_message>
<xml_diff>
--- a/chapter_01/figures/thesis_roadmap.pptx
+++ b/chapter_01/figures/thesis_roadmap.pptx
@@ -128,18 +128,18 @@
   <pc:docChgLst>
     <pc:chgData name="Fatima Pillosu" userId="a6295d4dc9e22643" providerId="LiveId" clId="{A2BAD573-0810-4F62-955B-09910E5A090C}"/>
     <pc:docChg chg="undo redo custSel modSld">
-      <pc:chgData name="Fatima Pillosu" userId="a6295d4dc9e22643" providerId="LiveId" clId="{A2BAD573-0810-4F62-955B-09910E5A090C}" dt="2025-06-24T15:23:35.602" v="3303" actId="1037"/>
+      <pc:chgData name="Fatima Pillosu" userId="a6295d4dc9e22643" providerId="LiveId" clId="{A2BAD573-0810-4F62-955B-09910E5A090C}" dt="2025-06-24T15:28:23.900" v="3324" actId="1038"/>
       <pc:docMkLst>
         <pc:docMk/>
       </pc:docMkLst>
       <pc:sldChg chg="addSp delSp modSp mod">
-        <pc:chgData name="Fatima Pillosu" userId="a6295d4dc9e22643" providerId="LiveId" clId="{A2BAD573-0810-4F62-955B-09910E5A090C}" dt="2025-06-24T15:23:35.602" v="3303" actId="1037"/>
+        <pc:chgData name="Fatima Pillosu" userId="a6295d4dc9e22643" providerId="LiveId" clId="{A2BAD573-0810-4F62-955B-09910E5A090C}" dt="2025-06-24T15:28:23.900" v="3324" actId="1038"/>
         <pc:sldMkLst>
           <pc:docMk/>
           <pc:sldMk cId="3354384854" sldId="256"/>
         </pc:sldMkLst>
         <pc:spChg chg="add mod">
-          <ac:chgData name="Fatima Pillosu" userId="a6295d4dc9e22643" providerId="LiveId" clId="{A2BAD573-0810-4F62-955B-09910E5A090C}" dt="2025-06-24T14:07:39.249" v="2281" actId="1038"/>
+          <ac:chgData name="Fatima Pillosu" userId="a6295d4dc9e22643" providerId="LiveId" clId="{A2BAD573-0810-4F62-955B-09910E5A090C}" dt="2025-06-24T15:28:23.900" v="3324" actId="1038"/>
           <ac:spMkLst>
             <pc:docMk/>
             <pc:sldMk cId="3354384854" sldId="256"/>
@@ -147,7 +147,7 @@
           </ac:spMkLst>
         </pc:spChg>
         <pc:spChg chg="add mod">
-          <ac:chgData name="Fatima Pillosu" userId="a6295d4dc9e22643" providerId="LiveId" clId="{A2BAD573-0810-4F62-955B-09910E5A090C}" dt="2025-06-24T14:07:39.249" v="2281" actId="1038"/>
+          <ac:chgData name="Fatima Pillosu" userId="a6295d4dc9e22643" providerId="LiveId" clId="{A2BAD573-0810-4F62-955B-09910E5A090C}" dt="2025-06-24T15:28:23.900" v="3324" actId="1038"/>
           <ac:spMkLst>
             <pc:docMk/>
             <pc:sldMk cId="3354384854" sldId="256"/>
@@ -155,7 +155,7 @@
           </ac:spMkLst>
         </pc:spChg>
         <pc:spChg chg="add mod">
-          <ac:chgData name="Fatima Pillosu" userId="a6295d4dc9e22643" providerId="LiveId" clId="{A2BAD573-0810-4F62-955B-09910E5A090C}" dt="2025-06-24T14:54:17.463" v="3271" actId="20577"/>
+          <ac:chgData name="Fatima Pillosu" userId="a6295d4dc9e22643" providerId="LiveId" clId="{A2BAD573-0810-4F62-955B-09910E5A090C}" dt="2025-06-24T15:28:23.900" v="3324" actId="1038"/>
           <ac:spMkLst>
             <pc:docMk/>
             <pc:sldMk cId="3354384854" sldId="256"/>
@@ -163,11 +163,123 @@
           </ac:spMkLst>
         </pc:spChg>
         <pc:spChg chg="add mod">
-          <ac:chgData name="Fatima Pillosu" userId="a6295d4dc9e22643" providerId="LiveId" clId="{A2BAD573-0810-4F62-955B-09910E5A090C}" dt="2025-06-24T14:07:39.249" v="2281" actId="1038"/>
+          <ac:chgData name="Fatima Pillosu" userId="a6295d4dc9e22643" providerId="LiveId" clId="{A2BAD573-0810-4F62-955B-09910E5A090C}" dt="2025-06-24T15:28:23.900" v="3324" actId="1038"/>
           <ac:spMkLst>
             <pc:docMk/>
             <pc:sldMk cId="3354384854" sldId="256"/>
             <ac:spMk id="5" creationId="{A16AC61C-9655-BE59-0E1D-62859D87AEA1}"/>
+          </ac:spMkLst>
+        </pc:spChg>
+        <pc:spChg chg="add mod">
+          <ac:chgData name="Fatima Pillosu" userId="a6295d4dc9e22643" providerId="LiveId" clId="{A2BAD573-0810-4F62-955B-09910E5A090C}" dt="2025-06-24T15:26:52.106" v="3310" actId="1037"/>
+          <ac:spMkLst>
+            <pc:docMk/>
+            <pc:sldMk cId="3354384854" sldId="256"/>
+            <ac:spMk id="6" creationId="{8CC79328-8D0D-D627-FD71-57CFC2D2B5DC}"/>
+          </ac:spMkLst>
+        </pc:spChg>
+        <pc:spChg chg="add mod">
+          <ac:chgData name="Fatima Pillosu" userId="a6295d4dc9e22643" providerId="LiveId" clId="{A2BAD573-0810-4F62-955B-09910E5A090C}" dt="2025-06-24T15:27:07.200" v="3311" actId="1037"/>
+          <ac:spMkLst>
+            <pc:docMk/>
+            <pc:sldMk cId="3354384854" sldId="256"/>
+            <ac:spMk id="7" creationId="{6C355D5C-47D8-7C59-C1B8-4FF2037F961E}"/>
+          </ac:spMkLst>
+        </pc:spChg>
+        <pc:spChg chg="add mod">
+          <ac:chgData name="Fatima Pillosu" userId="a6295d4dc9e22643" providerId="LiveId" clId="{A2BAD573-0810-4F62-955B-09910E5A090C}" dt="2025-06-24T13:52:45.532" v="1611" actId="12789"/>
+          <ac:spMkLst>
+            <pc:docMk/>
+            <pc:sldMk cId="3354384854" sldId="256"/>
+            <ac:spMk id="8" creationId="{FBD9599A-5CAC-D1AB-7D3E-713DF5A5C020}"/>
+          </ac:spMkLst>
+        </pc:spChg>
+        <pc:spChg chg="add mod">
+          <ac:chgData name="Fatima Pillosu" userId="a6295d4dc9e22643" providerId="LiveId" clId="{A2BAD573-0810-4F62-955B-09910E5A090C}" dt="2025-06-24T15:28:23.900" v="3324" actId="1038"/>
+          <ac:spMkLst>
+            <pc:docMk/>
+            <pc:sldMk cId="3354384854" sldId="256"/>
+            <ac:spMk id="9" creationId="{BBB0BE85-86B1-0751-AF3F-838269DDC230}"/>
+          </ac:spMkLst>
+        </pc:spChg>
+        <pc:spChg chg="add mod">
+          <ac:chgData name="Fatima Pillosu" userId="a6295d4dc9e22643" providerId="LiveId" clId="{A2BAD573-0810-4F62-955B-09910E5A090C}" dt="2025-06-24T15:28:23.900" v="3324" actId="1038"/>
+          <ac:spMkLst>
+            <pc:docMk/>
+            <pc:sldMk cId="3354384854" sldId="256"/>
+            <ac:spMk id="10" creationId="{99B61BA9-5A6C-532C-7917-89D64FACAECA}"/>
+          </ac:spMkLst>
+        </pc:spChg>
+        <pc:spChg chg="add mod">
+          <ac:chgData name="Fatima Pillosu" userId="a6295d4dc9e22643" providerId="LiveId" clId="{A2BAD573-0810-4F62-955B-09910E5A090C}" dt="2025-06-24T15:28:23.900" v="3324" actId="1038"/>
+          <ac:spMkLst>
+            <pc:docMk/>
+            <pc:sldMk cId="3354384854" sldId="256"/>
+            <ac:spMk id="11" creationId="{CAE0B206-AF54-54F2-0C06-284B40BCBB6F}"/>
+          </ac:spMkLst>
+        </pc:spChg>
+        <pc:spChg chg="add mod">
+          <ac:chgData name="Fatima Pillosu" userId="a6295d4dc9e22643" providerId="LiveId" clId="{A2BAD573-0810-4F62-955B-09910E5A090C}" dt="2025-06-24T15:28:23.900" v="3324" actId="1038"/>
+          <ac:spMkLst>
+            <pc:docMk/>
+            <pc:sldMk cId="3354384854" sldId="256"/>
+            <ac:spMk id="12" creationId="{8AAEA69B-D0DC-C7F0-7B11-C6A20FF94F80}"/>
+          </ac:spMkLst>
+        </pc:spChg>
+        <pc:spChg chg="add mod">
+          <ac:chgData name="Fatima Pillosu" userId="a6295d4dc9e22643" providerId="LiveId" clId="{A2BAD573-0810-4F62-955B-09910E5A090C}" dt="2025-06-24T15:28:23.900" v="3324" actId="1038"/>
+          <ac:spMkLst>
+            <pc:docMk/>
+            <pc:sldMk cId="3354384854" sldId="256"/>
+            <ac:spMk id="13" creationId="{2699F84C-B158-D9B1-8BAF-E590BCED4FB6}"/>
+          </ac:spMkLst>
+        </pc:spChg>
+        <pc:spChg chg="add mod">
+          <ac:chgData name="Fatima Pillosu" userId="a6295d4dc9e22643" providerId="LiveId" clId="{A2BAD573-0810-4F62-955B-09910E5A090C}" dt="2025-06-24T15:28:23.900" v="3324" actId="1038"/>
+          <ac:spMkLst>
+            <pc:docMk/>
+            <pc:sldMk cId="3354384854" sldId="256"/>
+            <ac:spMk id="14" creationId="{8A2E91B1-BBB4-1F54-4FCE-C1F6724BE292}"/>
+          </ac:spMkLst>
+        </pc:spChg>
+        <pc:spChg chg="add mod">
+          <ac:chgData name="Fatima Pillosu" userId="a6295d4dc9e22643" providerId="LiveId" clId="{A2BAD573-0810-4F62-955B-09910E5A090C}" dt="2025-06-24T15:28:23.900" v="3324" actId="1038"/>
+          <ac:spMkLst>
+            <pc:docMk/>
+            <pc:sldMk cId="3354384854" sldId="256"/>
+            <ac:spMk id="15" creationId="{E60B5C00-F1F7-FD1D-ABEF-8F5EF5D717FE}"/>
+          </ac:spMkLst>
+        </pc:spChg>
+        <pc:spChg chg="add mod">
+          <ac:chgData name="Fatima Pillosu" userId="a6295d4dc9e22643" providerId="LiveId" clId="{A2BAD573-0810-4F62-955B-09910E5A090C}" dt="2025-06-24T15:28:23.900" v="3324" actId="1038"/>
+          <ac:spMkLst>
+            <pc:docMk/>
+            <pc:sldMk cId="3354384854" sldId="256"/>
+            <ac:spMk id="16" creationId="{19EA9AC9-6E95-FB84-F5C5-ADD045519CA4}"/>
+          </ac:spMkLst>
+        </pc:spChg>
+        <pc:spChg chg="add mod">
+          <ac:chgData name="Fatima Pillosu" userId="a6295d4dc9e22643" providerId="LiveId" clId="{A2BAD573-0810-4F62-955B-09910E5A090C}" dt="2025-06-24T15:27:18.970" v="3312" actId="552"/>
+          <ac:spMkLst>
+            <pc:docMk/>
+            <pc:sldMk cId="3354384854" sldId="256"/>
+            <ac:spMk id="17" creationId="{71BBF894-591D-8866-B2B1-0C8C1F6E802C}"/>
+          </ac:spMkLst>
+        </pc:spChg>
+        <pc:spChg chg="add mod ord">
+          <ac:chgData name="Fatima Pillosu" userId="a6295d4dc9e22643" providerId="LiveId" clId="{A2BAD573-0810-4F62-955B-09910E5A090C}" dt="2025-06-24T15:26:22.190" v="3305" actId="552"/>
+          <ac:spMkLst>
+            <pc:docMk/>
+            <pc:sldMk cId="3354384854" sldId="256"/>
+            <ac:spMk id="18" creationId="{A9A7A549-413C-B305-70B8-0753E06B399D}"/>
+          </ac:spMkLst>
+        </pc:spChg>
+        <pc:spChg chg="add mod">
+          <ac:chgData name="Fatima Pillosu" userId="a6295d4dc9e22643" providerId="LiveId" clId="{A2BAD573-0810-4F62-955B-09910E5A090C}" dt="2025-06-24T15:27:48.869" v="3316" actId="552"/>
+          <ac:spMkLst>
+            <pc:docMk/>
+            <pc:sldMk cId="3354384854" sldId="256"/>
+            <ac:spMk id="19" creationId="{6BE65441-4EEE-E468-5441-5FEB4D450CFE}"/>
           </ac:spMkLst>
         </pc:spChg>
         <pc:spChg chg="add mod">
@@ -175,23 +287,15 @@
           <ac:spMkLst>
             <pc:docMk/>
             <pc:sldMk cId="3354384854" sldId="256"/>
-            <ac:spMk id="6" creationId="{8CC79328-8D0D-D627-FD71-57CFC2D2B5DC}"/>
+            <ac:spMk id="21" creationId="{1146D79A-EC07-3CEF-454B-CD796D474073}"/>
           </ac:spMkLst>
         </pc:spChg>
         <pc:spChg chg="add mod">
-          <ac:chgData name="Fatima Pillosu" userId="a6295d4dc9e22643" providerId="LiveId" clId="{A2BAD573-0810-4F62-955B-09910E5A090C}" dt="2025-06-24T15:22:28.510" v="3282" actId="1038"/>
-          <ac:spMkLst>
-            <pc:docMk/>
-            <pc:sldMk cId="3354384854" sldId="256"/>
-            <ac:spMk id="7" creationId="{6C355D5C-47D8-7C59-C1B8-4FF2037F961E}"/>
-          </ac:spMkLst>
-        </pc:spChg>
-        <pc:spChg chg="add mod">
-          <ac:chgData name="Fatima Pillosu" userId="a6295d4dc9e22643" providerId="LiveId" clId="{A2BAD573-0810-4F62-955B-09910E5A090C}" dt="2025-06-24T13:52:45.532" v="1611" actId="12789"/>
-          <ac:spMkLst>
-            <pc:docMk/>
-            <pc:sldMk cId="3354384854" sldId="256"/>
-            <ac:spMk id="8" creationId="{FBD9599A-5CAC-D1AB-7D3E-713DF5A5C020}"/>
+          <ac:chgData name="Fatima Pillosu" userId="a6295d4dc9e22643" providerId="LiveId" clId="{A2BAD573-0810-4F62-955B-09910E5A090C}" dt="2025-06-24T14:06:36.678" v="2274" actId="552"/>
+          <ac:spMkLst>
+            <pc:docMk/>
+            <pc:sldMk cId="3354384854" sldId="256"/>
+            <ac:spMk id="23" creationId="{AD491ADF-E96D-E422-C79F-9D802C0D8C5C}"/>
           </ac:spMkLst>
         </pc:spChg>
         <pc:spChg chg="add mod">
@@ -199,110 +303,6 @@
           <ac:spMkLst>
             <pc:docMk/>
             <pc:sldMk cId="3354384854" sldId="256"/>
-            <ac:spMk id="9" creationId="{BBB0BE85-86B1-0751-AF3F-838269DDC230}"/>
-          </ac:spMkLst>
-        </pc:spChg>
-        <pc:spChg chg="add mod">
-          <ac:chgData name="Fatima Pillosu" userId="a6295d4dc9e22643" providerId="LiveId" clId="{A2BAD573-0810-4F62-955B-09910E5A090C}" dt="2025-06-24T14:43:14.082" v="3228" actId="1035"/>
-          <ac:spMkLst>
-            <pc:docMk/>
-            <pc:sldMk cId="3354384854" sldId="256"/>
-            <ac:spMk id="10" creationId="{99B61BA9-5A6C-532C-7917-89D64FACAECA}"/>
-          </ac:spMkLst>
-        </pc:spChg>
-        <pc:spChg chg="add mod">
-          <ac:chgData name="Fatima Pillosu" userId="a6295d4dc9e22643" providerId="LiveId" clId="{A2BAD573-0810-4F62-955B-09910E5A090C}" dt="2025-06-24T14:07:39.249" v="2281" actId="1038"/>
-          <ac:spMkLst>
-            <pc:docMk/>
-            <pc:sldMk cId="3354384854" sldId="256"/>
-            <ac:spMk id="11" creationId="{CAE0B206-AF54-54F2-0C06-284B40BCBB6F}"/>
-          </ac:spMkLst>
-        </pc:spChg>
-        <pc:spChg chg="add mod">
-          <ac:chgData name="Fatima Pillosu" userId="a6295d4dc9e22643" providerId="LiveId" clId="{A2BAD573-0810-4F62-955B-09910E5A090C}" dt="2025-06-24T14:07:39.249" v="2281" actId="1038"/>
-          <ac:spMkLst>
-            <pc:docMk/>
-            <pc:sldMk cId="3354384854" sldId="256"/>
-            <ac:spMk id="12" creationId="{8AAEA69B-D0DC-C7F0-7B11-C6A20FF94F80}"/>
-          </ac:spMkLst>
-        </pc:spChg>
-        <pc:spChg chg="add mod">
-          <ac:chgData name="Fatima Pillosu" userId="a6295d4dc9e22643" providerId="LiveId" clId="{A2BAD573-0810-4F62-955B-09910E5A090C}" dt="2025-06-24T14:07:39.249" v="2281" actId="1038"/>
-          <ac:spMkLst>
-            <pc:docMk/>
-            <pc:sldMk cId="3354384854" sldId="256"/>
-            <ac:spMk id="13" creationId="{2699F84C-B158-D9B1-8BAF-E590BCED4FB6}"/>
-          </ac:spMkLst>
-        </pc:spChg>
-        <pc:spChg chg="add mod">
-          <ac:chgData name="Fatima Pillosu" userId="a6295d4dc9e22643" providerId="LiveId" clId="{A2BAD573-0810-4F62-955B-09910E5A090C}" dt="2025-06-24T14:07:39.249" v="2281" actId="1038"/>
-          <ac:spMkLst>
-            <pc:docMk/>
-            <pc:sldMk cId="3354384854" sldId="256"/>
-            <ac:spMk id="14" creationId="{8A2E91B1-BBB4-1F54-4FCE-C1F6724BE292}"/>
-          </ac:spMkLst>
-        </pc:spChg>
-        <pc:spChg chg="add mod">
-          <ac:chgData name="Fatima Pillosu" userId="a6295d4dc9e22643" providerId="LiveId" clId="{A2BAD573-0810-4F62-955B-09910E5A090C}" dt="2025-06-24T14:43:14.082" v="3228" actId="1035"/>
-          <ac:spMkLst>
-            <pc:docMk/>
-            <pc:sldMk cId="3354384854" sldId="256"/>
-            <ac:spMk id="15" creationId="{E60B5C00-F1F7-FD1D-ABEF-8F5EF5D717FE}"/>
-          </ac:spMkLst>
-        </pc:spChg>
-        <pc:spChg chg="add mod">
-          <ac:chgData name="Fatima Pillosu" userId="a6295d4dc9e22643" providerId="LiveId" clId="{A2BAD573-0810-4F62-955B-09910E5A090C}" dt="2025-06-24T14:43:14.082" v="3228" actId="1035"/>
-          <ac:spMkLst>
-            <pc:docMk/>
-            <pc:sldMk cId="3354384854" sldId="256"/>
-            <ac:spMk id="16" creationId="{19EA9AC9-6E95-FB84-F5C5-ADD045519CA4}"/>
-          </ac:spMkLst>
-        </pc:spChg>
-        <pc:spChg chg="add mod">
-          <ac:chgData name="Fatima Pillosu" userId="a6295d4dc9e22643" providerId="LiveId" clId="{A2BAD573-0810-4F62-955B-09910E5A090C}" dt="2025-06-24T15:23:06.599" v="3293" actId="552"/>
-          <ac:spMkLst>
-            <pc:docMk/>
-            <pc:sldMk cId="3354384854" sldId="256"/>
-            <ac:spMk id="17" creationId="{71BBF894-591D-8866-B2B1-0C8C1F6E802C}"/>
-          </ac:spMkLst>
-        </pc:spChg>
-        <pc:spChg chg="add mod">
-          <ac:chgData name="Fatima Pillosu" userId="a6295d4dc9e22643" providerId="LiveId" clId="{A2BAD573-0810-4F62-955B-09910E5A090C}" dt="2025-06-24T15:22:59.300" v="3286" actId="552"/>
-          <ac:spMkLst>
-            <pc:docMk/>
-            <pc:sldMk cId="3354384854" sldId="256"/>
-            <ac:spMk id="18" creationId="{A9A7A549-413C-B305-70B8-0753E06B399D}"/>
-          </ac:spMkLst>
-        </pc:spChg>
-        <pc:spChg chg="add mod">
-          <ac:chgData name="Fatima Pillosu" userId="a6295d4dc9e22643" providerId="LiveId" clId="{A2BAD573-0810-4F62-955B-09910E5A090C}" dt="2025-06-24T15:22:39.137" v="3284" actId="1038"/>
-          <ac:spMkLst>
-            <pc:docMk/>
-            <pc:sldMk cId="3354384854" sldId="256"/>
-            <ac:spMk id="19" creationId="{6BE65441-4EEE-E468-5441-5FEB4D450CFE}"/>
-          </ac:spMkLst>
-        </pc:spChg>
-        <pc:spChg chg="add mod">
-          <ac:chgData name="Fatima Pillosu" userId="a6295d4dc9e22643" providerId="LiveId" clId="{A2BAD573-0810-4F62-955B-09910E5A090C}" dt="2025-06-24T15:22:39.137" v="3284" actId="1038"/>
-          <ac:spMkLst>
-            <pc:docMk/>
-            <pc:sldMk cId="3354384854" sldId="256"/>
-            <ac:spMk id="21" creationId="{1146D79A-EC07-3CEF-454B-CD796D474073}"/>
-          </ac:spMkLst>
-        </pc:spChg>
-        <pc:spChg chg="add mod">
-          <ac:chgData name="Fatima Pillosu" userId="a6295d4dc9e22643" providerId="LiveId" clId="{A2BAD573-0810-4F62-955B-09910E5A090C}" dt="2025-06-24T14:06:36.678" v="2274" actId="552"/>
-          <ac:spMkLst>
-            <pc:docMk/>
-            <pc:sldMk cId="3354384854" sldId="256"/>
-            <ac:spMk id="23" creationId="{AD491ADF-E96D-E422-C79F-9D802C0D8C5C}"/>
-          </ac:spMkLst>
-        </pc:spChg>
-        <pc:spChg chg="add mod">
-          <ac:chgData name="Fatima Pillosu" userId="a6295d4dc9e22643" providerId="LiveId" clId="{A2BAD573-0810-4F62-955B-09910E5A090C}" dt="2025-06-24T14:43:14.082" v="3228" actId="1035"/>
-          <ac:spMkLst>
-            <pc:docMk/>
-            <pc:sldMk cId="3354384854" sldId="256"/>
             <ac:spMk id="25" creationId="{B5AD376D-9072-BDE5-112F-1804EA806BB6}"/>
           </ac:spMkLst>
         </pc:spChg>
@@ -323,7 +323,7 @@
           </ac:spMkLst>
         </pc:spChg>
         <pc:spChg chg="add mod">
-          <ac:chgData name="Fatima Pillosu" userId="a6295d4dc9e22643" providerId="LiveId" clId="{A2BAD573-0810-4F62-955B-09910E5A090C}" dt="2025-06-24T13:44:06.162" v="1397" actId="1038"/>
+          <ac:chgData name="Fatima Pillosu" userId="a6295d4dc9e22643" providerId="LiveId" clId="{A2BAD573-0810-4F62-955B-09910E5A090C}" dt="2025-06-24T15:28:23.900" v="3324" actId="1038"/>
           <ac:spMkLst>
             <pc:docMk/>
             <pc:sldMk cId="3354384854" sldId="256"/>
@@ -331,7 +331,7 @@
           </ac:spMkLst>
         </pc:spChg>
         <pc:spChg chg="add mod">
-          <ac:chgData name="Fatima Pillosu" userId="a6295d4dc9e22643" providerId="LiveId" clId="{A2BAD573-0810-4F62-955B-09910E5A090C}" dt="2025-06-24T14:07:39.249" v="2281" actId="1038"/>
+          <ac:chgData name="Fatima Pillosu" userId="a6295d4dc9e22643" providerId="LiveId" clId="{A2BAD573-0810-4F62-955B-09910E5A090C}" dt="2025-06-24T15:28:23.900" v="3324" actId="1038"/>
           <ac:spMkLst>
             <pc:docMk/>
             <pc:sldMk cId="3354384854" sldId="256"/>
@@ -339,7 +339,7 @@
           </ac:spMkLst>
         </pc:spChg>
         <pc:spChg chg="add mod">
-          <ac:chgData name="Fatima Pillosu" userId="a6295d4dc9e22643" providerId="LiveId" clId="{A2BAD573-0810-4F62-955B-09910E5A090C}" dt="2025-06-24T14:07:39.249" v="2281" actId="1038"/>
+          <ac:chgData name="Fatima Pillosu" userId="a6295d4dc9e22643" providerId="LiveId" clId="{A2BAD573-0810-4F62-955B-09910E5A090C}" dt="2025-06-24T15:28:23.900" v="3324" actId="1038"/>
           <ac:spMkLst>
             <pc:docMk/>
             <pc:sldMk cId="3354384854" sldId="256"/>
@@ -347,7 +347,7 @@
           </ac:spMkLst>
         </pc:spChg>
         <pc:spChg chg="add mod">
-          <ac:chgData name="Fatima Pillosu" userId="a6295d4dc9e22643" providerId="LiveId" clId="{A2BAD573-0810-4F62-955B-09910E5A090C}" dt="2025-06-24T14:07:39.249" v="2281" actId="1038"/>
+          <ac:chgData name="Fatima Pillosu" userId="a6295d4dc9e22643" providerId="LiveId" clId="{A2BAD573-0810-4F62-955B-09910E5A090C}" dt="2025-06-24T15:28:23.900" v="3324" actId="1038"/>
           <ac:spMkLst>
             <pc:docMk/>
             <pc:sldMk cId="3354384854" sldId="256"/>
@@ -355,7 +355,7 @@
           </ac:spMkLst>
         </pc:spChg>
         <pc:spChg chg="add mod">
-          <ac:chgData name="Fatima Pillosu" userId="a6295d4dc9e22643" providerId="LiveId" clId="{A2BAD573-0810-4F62-955B-09910E5A090C}" dt="2025-06-24T15:22:39.137" v="3284" actId="1038"/>
+          <ac:chgData name="Fatima Pillosu" userId="a6295d4dc9e22643" providerId="LiveId" clId="{A2BAD573-0810-4F62-955B-09910E5A090C}" dt="2025-06-24T15:26:52.106" v="3310" actId="1037"/>
           <ac:spMkLst>
             <pc:docMk/>
             <pc:sldMk cId="3354384854" sldId="256"/>
@@ -363,7 +363,7 @@
           </ac:spMkLst>
         </pc:spChg>
         <pc:spChg chg="add mod">
-          <ac:chgData name="Fatima Pillosu" userId="a6295d4dc9e22643" providerId="LiveId" clId="{A2BAD573-0810-4F62-955B-09910E5A090C}" dt="2025-06-24T15:22:28.510" v="3282" actId="1038"/>
+          <ac:chgData name="Fatima Pillosu" userId="a6295d4dc9e22643" providerId="LiveId" clId="{A2BAD573-0810-4F62-955B-09910E5A090C}" dt="2025-06-24T15:27:07.200" v="3311" actId="1037"/>
           <ac:spMkLst>
             <pc:docMk/>
             <pc:sldMk cId="3354384854" sldId="256"/>
@@ -379,7 +379,7 @@
           </ac:spMkLst>
         </pc:spChg>
         <pc:spChg chg="add mod">
-          <ac:chgData name="Fatima Pillosu" userId="a6295d4dc9e22643" providerId="LiveId" clId="{A2BAD573-0810-4F62-955B-09910E5A090C}" dt="2025-06-24T14:43:14.082" v="3228" actId="1035"/>
+          <ac:chgData name="Fatima Pillosu" userId="a6295d4dc9e22643" providerId="LiveId" clId="{A2BAD573-0810-4F62-955B-09910E5A090C}" dt="2025-06-24T15:28:23.900" v="3324" actId="1038"/>
           <ac:spMkLst>
             <pc:docMk/>
             <pc:sldMk cId="3354384854" sldId="256"/>
@@ -387,7 +387,7 @@
           </ac:spMkLst>
         </pc:spChg>
         <pc:spChg chg="add mod">
-          <ac:chgData name="Fatima Pillosu" userId="a6295d4dc9e22643" providerId="LiveId" clId="{A2BAD573-0810-4F62-955B-09910E5A090C}" dt="2025-06-24T14:43:14.082" v="3228" actId="1035"/>
+          <ac:chgData name="Fatima Pillosu" userId="a6295d4dc9e22643" providerId="LiveId" clId="{A2BAD573-0810-4F62-955B-09910E5A090C}" dt="2025-06-24T15:28:23.900" v="3324" actId="1038"/>
           <ac:spMkLst>
             <pc:docMk/>
             <pc:sldMk cId="3354384854" sldId="256"/>
@@ -459,7 +459,7 @@
           </ac:spMkLst>
         </pc:spChg>
         <pc:spChg chg="add mod">
-          <ac:chgData name="Fatima Pillosu" userId="a6295d4dc9e22643" providerId="LiveId" clId="{A2BAD573-0810-4F62-955B-09910E5A090C}" dt="2025-06-24T15:22:39.137" v="3284" actId="1038"/>
+          <ac:chgData name="Fatima Pillosu" userId="a6295d4dc9e22643" providerId="LiveId" clId="{A2BAD573-0810-4F62-955B-09910E5A090C}" dt="2025-06-24T15:26:52.106" v="3310" actId="1037"/>
           <ac:spMkLst>
             <pc:docMk/>
             <pc:sldMk cId="3354384854" sldId="256"/>
@@ -483,7 +483,7 @@
           </ac:spMkLst>
         </pc:spChg>
         <pc:spChg chg="add mod">
-          <ac:chgData name="Fatima Pillosu" userId="a6295d4dc9e22643" providerId="LiveId" clId="{A2BAD573-0810-4F62-955B-09910E5A090C}" dt="2025-06-24T15:22:39.137" v="3284" actId="1038"/>
+          <ac:chgData name="Fatima Pillosu" userId="a6295d4dc9e22643" providerId="LiveId" clId="{A2BAD573-0810-4F62-955B-09910E5A090C}" dt="2025-06-24T15:27:48.869" v="3316" actId="552"/>
           <ac:spMkLst>
             <pc:docMk/>
             <pc:sldMk cId="3354384854" sldId="256"/>
@@ -491,7 +491,7 @@
           </ac:spMkLst>
         </pc:spChg>
         <pc:spChg chg="add mod">
-          <ac:chgData name="Fatima Pillosu" userId="a6295d4dc9e22643" providerId="LiveId" clId="{A2BAD573-0810-4F62-955B-09910E5A090C}" dt="2025-06-24T15:22:39.137" v="3284" actId="1038"/>
+          <ac:chgData name="Fatima Pillosu" userId="a6295d4dc9e22643" providerId="LiveId" clId="{A2BAD573-0810-4F62-955B-09910E5A090C}" dt="2025-06-24T15:26:52.106" v="3310" actId="1037"/>
           <ac:spMkLst>
             <pc:docMk/>
             <pc:sldMk cId="3354384854" sldId="256"/>
@@ -499,7 +499,7 @@
           </ac:spMkLst>
         </pc:spChg>
         <pc:spChg chg="add mod">
-          <ac:chgData name="Fatima Pillosu" userId="a6295d4dc9e22643" providerId="LiveId" clId="{A2BAD573-0810-4F62-955B-09910E5A090C}" dt="2025-06-24T15:22:39.137" v="3284" actId="1038"/>
+          <ac:chgData name="Fatima Pillosu" userId="a6295d4dc9e22643" providerId="LiveId" clId="{A2BAD573-0810-4F62-955B-09910E5A090C}" dt="2025-06-24T15:27:48.869" v="3316" actId="552"/>
           <ac:spMkLst>
             <pc:docMk/>
             <pc:sldMk cId="3354384854" sldId="256"/>
@@ -507,7 +507,7 @@
           </ac:spMkLst>
         </pc:spChg>
         <pc:spChg chg="add mod">
-          <ac:chgData name="Fatima Pillosu" userId="a6295d4dc9e22643" providerId="LiveId" clId="{A2BAD573-0810-4F62-955B-09910E5A090C}" dt="2025-06-24T15:22:39.137" v="3284" actId="1038"/>
+          <ac:chgData name="Fatima Pillosu" userId="a6295d4dc9e22643" providerId="LiveId" clId="{A2BAD573-0810-4F62-955B-09910E5A090C}" dt="2025-06-24T15:26:52.106" v="3310" actId="1037"/>
           <ac:spMkLst>
             <pc:docMk/>
             <pc:sldMk cId="3354384854" sldId="256"/>
@@ -515,7 +515,7 @@
           </ac:spMkLst>
         </pc:spChg>
         <pc:spChg chg="add mod">
-          <ac:chgData name="Fatima Pillosu" userId="a6295d4dc9e22643" providerId="LiveId" clId="{A2BAD573-0810-4F62-955B-09910E5A090C}" dt="2025-06-24T15:22:39.137" v="3284" actId="1038"/>
+          <ac:chgData name="Fatima Pillosu" userId="a6295d4dc9e22643" providerId="LiveId" clId="{A2BAD573-0810-4F62-955B-09910E5A090C}" dt="2025-06-24T15:26:52.106" v="3310" actId="1037"/>
           <ac:spMkLst>
             <pc:docMk/>
             <pc:sldMk cId="3354384854" sldId="256"/>
@@ -547,7 +547,7 @@
           </ac:spMkLst>
         </pc:spChg>
         <pc:spChg chg="add mod">
-          <ac:chgData name="Fatima Pillosu" userId="a6295d4dc9e22643" providerId="LiveId" clId="{A2BAD573-0810-4F62-955B-09910E5A090C}" dt="2025-06-24T15:22:39.137" v="3284" actId="1038"/>
+          <ac:chgData name="Fatima Pillosu" userId="a6295d4dc9e22643" providerId="LiveId" clId="{A2BAD573-0810-4F62-955B-09910E5A090C}" dt="2025-06-24T15:27:18.970" v="3312" actId="552"/>
           <ac:spMkLst>
             <pc:docMk/>
             <pc:sldMk cId="3354384854" sldId="256"/>
@@ -555,7 +555,7 @@
           </ac:spMkLst>
         </pc:spChg>
         <pc:spChg chg="add mod">
-          <ac:chgData name="Fatima Pillosu" userId="a6295d4dc9e22643" providerId="LiveId" clId="{A2BAD573-0810-4F62-955B-09910E5A090C}" dt="2025-06-24T15:22:28.510" v="3282" actId="1038"/>
+          <ac:chgData name="Fatima Pillosu" userId="a6295d4dc9e22643" providerId="LiveId" clId="{A2BAD573-0810-4F62-955B-09910E5A090C}" dt="2025-06-24T15:27:07.200" v="3311" actId="1037"/>
           <ac:spMkLst>
             <pc:docMk/>
             <pc:sldMk cId="3354384854" sldId="256"/>
@@ -571,7 +571,7 @@
           </ac:spMkLst>
         </pc:spChg>
         <pc:spChg chg="add mod">
-          <ac:chgData name="Fatima Pillosu" userId="a6295d4dc9e22643" providerId="LiveId" clId="{A2BAD573-0810-4F62-955B-09910E5A090C}" dt="2025-06-24T15:22:39.137" v="3284" actId="1038"/>
+          <ac:chgData name="Fatima Pillosu" userId="a6295d4dc9e22643" providerId="LiveId" clId="{A2BAD573-0810-4F62-955B-09910E5A090C}" dt="2025-06-24T15:27:18.970" v="3312" actId="552"/>
           <ac:spMkLst>
             <pc:docMk/>
             <pc:sldMk cId="3354384854" sldId="256"/>
@@ -579,7 +579,7 @@
           </ac:spMkLst>
         </pc:spChg>
         <pc:spChg chg="add mod">
-          <ac:chgData name="Fatima Pillosu" userId="a6295d4dc9e22643" providerId="LiveId" clId="{A2BAD573-0810-4F62-955B-09910E5A090C}" dt="2025-06-24T15:23:19.291" v="3297" actId="1038"/>
+          <ac:chgData name="Fatima Pillosu" userId="a6295d4dc9e22643" providerId="LiveId" clId="{A2BAD573-0810-4F62-955B-09910E5A090C}" dt="2025-06-24T15:27:07.200" v="3311" actId="1037"/>
           <ac:spMkLst>
             <pc:docMk/>
             <pc:sldMk cId="3354384854" sldId="256"/>
@@ -587,7 +587,7 @@
           </ac:spMkLst>
         </pc:spChg>
         <pc:spChg chg="add mod">
-          <ac:chgData name="Fatima Pillosu" userId="a6295d4dc9e22643" providerId="LiveId" clId="{A2BAD573-0810-4F62-955B-09910E5A090C}" dt="2025-06-24T15:22:28.510" v="3282" actId="1038"/>
+          <ac:chgData name="Fatima Pillosu" userId="a6295d4dc9e22643" providerId="LiveId" clId="{A2BAD573-0810-4F62-955B-09910E5A090C}" dt="2025-06-24T15:27:07.200" v="3311" actId="1037"/>
           <ac:spMkLst>
             <pc:docMk/>
             <pc:sldMk cId="3354384854" sldId="256"/>
@@ -595,15 +595,15 @@
           </ac:spMkLst>
         </pc:spChg>
         <pc:spChg chg="add mod">
-          <ac:chgData name="Fatima Pillosu" userId="a6295d4dc9e22643" providerId="LiveId" clId="{A2BAD573-0810-4F62-955B-09910E5A090C}" dt="2025-06-24T15:22:28.510" v="3282" actId="1038"/>
+          <ac:chgData name="Fatima Pillosu" userId="a6295d4dc9e22643" providerId="LiveId" clId="{A2BAD573-0810-4F62-955B-09910E5A090C}" dt="2025-06-24T15:27:07.200" v="3311" actId="1037"/>
           <ac:spMkLst>
             <pc:docMk/>
             <pc:sldMk cId="3354384854" sldId="256"/>
             <ac:spMk id="626" creationId="{B7393800-097F-873C-C52B-0AC6B676D9F3}"/>
           </ac:spMkLst>
         </pc:spChg>
-        <pc:spChg chg="add mod">
-          <ac:chgData name="Fatima Pillosu" userId="a6295d4dc9e22643" providerId="LiveId" clId="{A2BAD573-0810-4F62-955B-09910E5A090C}" dt="2025-06-24T15:22:28.510" v="3282" actId="1038"/>
+        <pc:spChg chg="add mod ord">
+          <ac:chgData name="Fatima Pillosu" userId="a6295d4dc9e22643" providerId="LiveId" clId="{A2BAD573-0810-4F62-955B-09910E5A090C}" dt="2025-06-24T15:26:22.190" v="3305" actId="552"/>
           <ac:spMkLst>
             <pc:docMk/>
             <pc:sldMk cId="3354384854" sldId="256"/>
@@ -618,8 +618,8 @@
             <ac:spMk id="628" creationId="{3FD6CF6F-69B9-F672-2E42-C82F089DB74B}"/>
           </ac:spMkLst>
         </pc:spChg>
-        <pc:spChg chg="add mod">
-          <ac:chgData name="Fatima Pillosu" userId="a6295d4dc9e22643" providerId="LiveId" clId="{A2BAD573-0810-4F62-955B-09910E5A090C}" dt="2025-06-24T15:22:28.510" v="3282" actId="1038"/>
+        <pc:spChg chg="add mod ord">
+          <ac:chgData name="Fatima Pillosu" userId="a6295d4dc9e22643" providerId="LiveId" clId="{A2BAD573-0810-4F62-955B-09910E5A090C}" dt="2025-06-24T15:26:22.190" v="3305" actId="552"/>
           <ac:spMkLst>
             <pc:docMk/>
             <pc:sldMk cId="3354384854" sldId="256"/>
@@ -939,7 +939,7 @@
           </ac:cxnSpMkLst>
         </pc:cxnChg>
         <pc:cxnChg chg="add mod">
-          <ac:chgData name="Fatima Pillosu" userId="a6295d4dc9e22643" providerId="LiveId" clId="{A2BAD573-0810-4F62-955B-09910E5A090C}" dt="2025-06-24T15:22:28.510" v="3282" actId="1038"/>
+          <ac:chgData name="Fatima Pillosu" userId="a6295d4dc9e22643" providerId="LiveId" clId="{A2BAD573-0810-4F62-955B-09910E5A090C}" dt="2025-06-24T15:27:07.200" v="3311" actId="1037"/>
           <ac:cxnSpMkLst>
             <pc:docMk/>
             <pc:sldMk cId="3354384854" sldId="256"/>
@@ -947,7 +947,7 @@
           </ac:cxnSpMkLst>
         </pc:cxnChg>
         <pc:cxnChg chg="add mod">
-          <ac:chgData name="Fatima Pillosu" userId="a6295d4dc9e22643" providerId="LiveId" clId="{A2BAD573-0810-4F62-955B-09910E5A090C}" dt="2025-06-24T14:07:39.249" v="2281" actId="1038"/>
+          <ac:chgData name="Fatima Pillosu" userId="a6295d4dc9e22643" providerId="LiveId" clId="{A2BAD573-0810-4F62-955B-09910E5A090C}" dt="2025-06-24T15:28:23.900" v="3324" actId="1038"/>
           <ac:cxnSpMkLst>
             <pc:docMk/>
             <pc:sldMk cId="3354384854" sldId="256"/>
@@ -955,7 +955,7 @@
           </ac:cxnSpMkLst>
         </pc:cxnChg>
         <pc:cxnChg chg="add mod">
-          <ac:chgData name="Fatima Pillosu" userId="a6295d4dc9e22643" providerId="LiveId" clId="{A2BAD573-0810-4F62-955B-09910E5A090C}" dt="2025-06-24T14:07:39.249" v="2281" actId="1038"/>
+          <ac:chgData name="Fatima Pillosu" userId="a6295d4dc9e22643" providerId="LiveId" clId="{A2BAD573-0810-4F62-955B-09910E5A090C}" dt="2025-06-24T15:28:23.900" v="3324" actId="1038"/>
           <ac:cxnSpMkLst>
             <pc:docMk/>
             <pc:sldMk cId="3354384854" sldId="256"/>
@@ -963,7 +963,7 @@
           </ac:cxnSpMkLst>
         </pc:cxnChg>
         <pc:cxnChg chg="add mod">
-          <ac:chgData name="Fatima Pillosu" userId="a6295d4dc9e22643" providerId="LiveId" clId="{A2BAD573-0810-4F62-955B-09910E5A090C}" dt="2025-06-24T14:07:39.249" v="2281" actId="1038"/>
+          <ac:chgData name="Fatima Pillosu" userId="a6295d4dc9e22643" providerId="LiveId" clId="{A2BAD573-0810-4F62-955B-09910E5A090C}" dt="2025-06-24T15:28:23.900" v="3324" actId="1038"/>
           <ac:cxnSpMkLst>
             <pc:docMk/>
             <pc:sldMk cId="3354384854" sldId="256"/>
@@ -971,7 +971,7 @@
           </ac:cxnSpMkLst>
         </pc:cxnChg>
         <pc:cxnChg chg="add mod">
-          <ac:chgData name="Fatima Pillosu" userId="a6295d4dc9e22643" providerId="LiveId" clId="{A2BAD573-0810-4F62-955B-09910E5A090C}" dt="2025-06-24T15:23:30.799" v="3300" actId="1037"/>
+          <ac:chgData name="Fatima Pillosu" userId="a6295d4dc9e22643" providerId="LiveId" clId="{A2BAD573-0810-4F62-955B-09910E5A090C}" dt="2025-06-24T15:27:57.797" v="3321" actId="1037"/>
           <ac:cxnSpMkLst>
             <pc:docMk/>
             <pc:sldMk cId="3354384854" sldId="256"/>
@@ -979,7 +979,7 @@
           </ac:cxnSpMkLst>
         </pc:cxnChg>
         <pc:cxnChg chg="add mod">
-          <ac:chgData name="Fatima Pillosu" userId="a6295d4dc9e22643" providerId="LiveId" clId="{A2BAD573-0810-4F62-955B-09910E5A090C}" dt="2025-06-24T15:23:35.602" v="3303" actId="1037"/>
+          <ac:chgData name="Fatima Pillosu" userId="a6295d4dc9e22643" providerId="LiveId" clId="{A2BAD573-0810-4F62-955B-09910E5A090C}" dt="2025-06-24T15:27:07.200" v="3311" actId="1037"/>
           <ac:cxnSpMkLst>
             <pc:docMk/>
             <pc:sldMk cId="3354384854" sldId="256"/>
@@ -995,11 +995,27 @@
           </ac:cxnSpMkLst>
         </pc:cxnChg>
         <pc:cxnChg chg="add mod">
-          <ac:chgData name="Fatima Pillosu" userId="a6295d4dc9e22643" providerId="LiveId" clId="{A2BAD573-0810-4F62-955B-09910E5A090C}" dt="2025-06-24T14:43:14.082" v="3228" actId="1035"/>
+          <ac:chgData name="Fatima Pillosu" userId="a6295d4dc9e22643" providerId="LiveId" clId="{A2BAD573-0810-4F62-955B-09910E5A090C}" dt="2025-06-24T15:28:23.900" v="3324" actId="1038"/>
           <ac:cxnSpMkLst>
             <pc:docMk/>
             <pc:sldMk cId="3354384854" sldId="256"/>
             <ac:cxnSpMk id="35" creationId="{7EF61BF4-0D6D-5F88-43D7-D8C8E3B0885C}"/>
+          </ac:cxnSpMkLst>
+        </pc:cxnChg>
+        <pc:cxnChg chg="add mod">
+          <ac:chgData name="Fatima Pillosu" userId="a6295d4dc9e22643" providerId="LiveId" clId="{A2BAD573-0810-4F62-955B-09910E5A090C}" dt="2025-06-24T15:28:23.900" v="3324" actId="1038"/>
+          <ac:cxnSpMkLst>
+            <pc:docMk/>
+            <pc:sldMk cId="3354384854" sldId="256"/>
+            <ac:cxnSpMk id="36" creationId="{FFAE2ACE-ABDC-A2F2-DCB7-F5057E21A66D}"/>
+          </ac:cxnSpMkLst>
+        </pc:cxnChg>
+        <pc:cxnChg chg="add mod">
+          <ac:chgData name="Fatima Pillosu" userId="a6295d4dc9e22643" providerId="LiveId" clId="{A2BAD573-0810-4F62-955B-09910E5A090C}" dt="2025-06-24T15:22:50.361" v="3285" actId="552"/>
+          <ac:cxnSpMkLst>
+            <pc:docMk/>
+            <pc:sldMk cId="3354384854" sldId="256"/>
+            <ac:cxnSpMk id="37" creationId="{5F6D91F5-3338-557F-0CB3-E7DC04EB077C}"/>
           </ac:cxnSpMkLst>
         </pc:cxnChg>
         <pc:cxnChg chg="add mod">
@@ -1007,15 +1023,7 @@
           <ac:cxnSpMkLst>
             <pc:docMk/>
             <pc:sldMk cId="3354384854" sldId="256"/>
-            <ac:cxnSpMk id="36" creationId="{FFAE2ACE-ABDC-A2F2-DCB7-F5057E21A66D}"/>
-          </ac:cxnSpMkLst>
-        </pc:cxnChg>
-        <pc:cxnChg chg="add mod">
-          <ac:chgData name="Fatima Pillosu" userId="a6295d4dc9e22643" providerId="LiveId" clId="{A2BAD573-0810-4F62-955B-09910E5A090C}" dt="2025-06-24T15:22:50.361" v="3285" actId="552"/>
-          <ac:cxnSpMkLst>
-            <pc:docMk/>
-            <pc:sldMk cId="3354384854" sldId="256"/>
-            <ac:cxnSpMk id="37" creationId="{5F6D91F5-3338-557F-0CB3-E7DC04EB077C}"/>
+            <ac:cxnSpMk id="38" creationId="{EC6CF449-A72A-A019-7618-C21BAA994F09}"/>
           </ac:cxnSpMkLst>
         </pc:cxnChg>
         <pc:cxnChg chg="add mod">
@@ -1023,7 +1031,39 @@
           <ac:cxnSpMkLst>
             <pc:docMk/>
             <pc:sldMk cId="3354384854" sldId="256"/>
-            <ac:cxnSpMk id="38" creationId="{EC6CF449-A72A-A019-7618-C21BAA994F09}"/>
+            <ac:cxnSpMk id="39" creationId="{CB73C3F9-D34E-5387-D738-F027F9F21D82}"/>
+          </ac:cxnSpMkLst>
+        </pc:cxnChg>
+        <pc:cxnChg chg="add mod">
+          <ac:chgData name="Fatima Pillosu" userId="a6295d4dc9e22643" providerId="LiveId" clId="{A2BAD573-0810-4F62-955B-09910E5A090C}" dt="2025-06-24T14:07:56.878" v="2284" actId="14100"/>
+          <ac:cxnSpMkLst>
+            <pc:docMk/>
+            <pc:sldMk cId="3354384854" sldId="256"/>
+            <ac:cxnSpMk id="40" creationId="{FB0CCEB5-3FCE-544B-3DA3-C04064EA44E6}"/>
+          </ac:cxnSpMkLst>
+        </pc:cxnChg>
+        <pc:cxnChg chg="add mod">
+          <ac:chgData name="Fatima Pillosu" userId="a6295d4dc9e22643" providerId="LiveId" clId="{A2BAD573-0810-4F62-955B-09910E5A090C}" dt="2025-06-24T15:28:23.900" v="3324" actId="1038"/>
+          <ac:cxnSpMkLst>
+            <pc:docMk/>
+            <pc:sldMk cId="3354384854" sldId="256"/>
+            <ac:cxnSpMk id="41" creationId="{BF7F9AE8-B09C-0594-6E08-D8E9EDCA7F9C}"/>
+          </ac:cxnSpMkLst>
+        </pc:cxnChg>
+        <pc:cxnChg chg="add mod">
+          <ac:chgData name="Fatima Pillosu" userId="a6295d4dc9e22643" providerId="LiveId" clId="{A2BAD573-0810-4F62-955B-09910E5A090C}" dt="2025-06-24T13:48:39.957" v="1503" actId="1076"/>
+          <ac:cxnSpMkLst>
+            <pc:docMk/>
+            <pc:sldMk cId="3354384854" sldId="256"/>
+            <ac:cxnSpMk id="42" creationId="{8296C103-D665-8AB6-3B09-566D3BB7F3F9}"/>
+          </ac:cxnSpMkLst>
+        </pc:cxnChg>
+        <pc:cxnChg chg="add mod">
+          <ac:chgData name="Fatima Pillosu" userId="a6295d4dc9e22643" providerId="LiveId" clId="{A2BAD573-0810-4F62-955B-09910E5A090C}" dt="2025-06-24T13:48:39.957" v="1503" actId="1076"/>
+          <ac:cxnSpMkLst>
+            <pc:docMk/>
+            <pc:sldMk cId="3354384854" sldId="256"/>
+            <ac:cxnSpMk id="44" creationId="{10D6DB07-7601-5557-6A71-39B2BB89BCB8}"/>
           </ac:cxnSpMkLst>
         </pc:cxnChg>
         <pc:cxnChg chg="add mod">
@@ -1031,39 +1071,15 @@
           <ac:cxnSpMkLst>
             <pc:docMk/>
             <pc:sldMk cId="3354384854" sldId="256"/>
-            <ac:cxnSpMk id="39" creationId="{CB73C3F9-D34E-5387-D738-F027F9F21D82}"/>
+            <ac:cxnSpMk id="55" creationId="{4F6CC630-74F7-00CC-B311-8D4D17E7A697}"/>
           </ac:cxnSpMkLst>
         </pc:cxnChg>
         <pc:cxnChg chg="add mod">
-          <ac:chgData name="Fatima Pillosu" userId="a6295d4dc9e22643" providerId="LiveId" clId="{A2BAD573-0810-4F62-955B-09910E5A090C}" dt="2025-06-24T14:07:56.878" v="2284" actId="14100"/>
-          <ac:cxnSpMkLst>
-            <pc:docMk/>
-            <pc:sldMk cId="3354384854" sldId="256"/>
-            <ac:cxnSpMk id="40" creationId="{FB0CCEB5-3FCE-544B-3DA3-C04064EA44E6}"/>
-          </ac:cxnSpMkLst>
-        </pc:cxnChg>
-        <pc:cxnChg chg="add mod">
-          <ac:chgData name="Fatima Pillosu" userId="a6295d4dc9e22643" providerId="LiveId" clId="{A2BAD573-0810-4F62-955B-09910E5A090C}" dt="2025-06-24T14:07:39.249" v="2281" actId="1038"/>
-          <ac:cxnSpMkLst>
-            <pc:docMk/>
-            <pc:sldMk cId="3354384854" sldId="256"/>
-            <ac:cxnSpMk id="41" creationId="{BF7F9AE8-B09C-0594-6E08-D8E9EDCA7F9C}"/>
-          </ac:cxnSpMkLst>
-        </pc:cxnChg>
-        <pc:cxnChg chg="add mod">
-          <ac:chgData name="Fatima Pillosu" userId="a6295d4dc9e22643" providerId="LiveId" clId="{A2BAD573-0810-4F62-955B-09910E5A090C}" dt="2025-06-24T13:48:39.957" v="1503" actId="1076"/>
-          <ac:cxnSpMkLst>
-            <pc:docMk/>
-            <pc:sldMk cId="3354384854" sldId="256"/>
-            <ac:cxnSpMk id="42" creationId="{8296C103-D665-8AB6-3B09-566D3BB7F3F9}"/>
-          </ac:cxnSpMkLst>
-        </pc:cxnChg>
-        <pc:cxnChg chg="add mod">
-          <ac:chgData name="Fatima Pillosu" userId="a6295d4dc9e22643" providerId="LiveId" clId="{A2BAD573-0810-4F62-955B-09910E5A090C}" dt="2025-06-24T13:48:39.957" v="1503" actId="1076"/>
-          <ac:cxnSpMkLst>
-            <pc:docMk/>
-            <pc:sldMk cId="3354384854" sldId="256"/>
-            <ac:cxnSpMk id="44" creationId="{10D6DB07-7601-5557-6A71-39B2BB89BCB8}"/>
+          <ac:chgData name="Fatima Pillosu" userId="a6295d4dc9e22643" providerId="LiveId" clId="{A2BAD573-0810-4F62-955B-09910E5A090C}" dt="2025-06-24T14:43:23.640" v="3230" actId="1076"/>
+          <ac:cxnSpMkLst>
+            <pc:docMk/>
+            <pc:sldMk cId="3354384854" sldId="256"/>
+            <ac:cxnSpMk id="56" creationId="{54AC9DFC-A95D-FF43-9DA7-3F77067B5B1F}"/>
           </ac:cxnSpMkLst>
         </pc:cxnChg>
         <pc:cxnChg chg="add mod">
@@ -1071,43 +1087,27 @@
           <ac:cxnSpMkLst>
             <pc:docMk/>
             <pc:sldMk cId="3354384854" sldId="256"/>
-            <ac:cxnSpMk id="55" creationId="{4F6CC630-74F7-00CC-B311-8D4D17E7A697}"/>
+            <ac:cxnSpMk id="57" creationId="{536B190C-D802-668A-3A2F-EADAA9B117FB}"/>
           </ac:cxnSpMkLst>
         </pc:cxnChg>
         <pc:cxnChg chg="add mod">
-          <ac:chgData name="Fatima Pillosu" userId="a6295d4dc9e22643" providerId="LiveId" clId="{A2BAD573-0810-4F62-955B-09910E5A090C}" dt="2025-06-24T14:43:23.640" v="3230" actId="1076"/>
-          <ac:cxnSpMkLst>
-            <pc:docMk/>
-            <pc:sldMk cId="3354384854" sldId="256"/>
-            <ac:cxnSpMk id="56" creationId="{54AC9DFC-A95D-FF43-9DA7-3F77067B5B1F}"/>
+          <ac:chgData name="Fatima Pillosu" userId="a6295d4dc9e22643" providerId="LiveId" clId="{A2BAD573-0810-4F62-955B-09910E5A090C}" dt="2025-06-24T15:27:07.200" v="3311" actId="1037"/>
+          <ac:cxnSpMkLst>
+            <pc:docMk/>
+            <pc:sldMk cId="3354384854" sldId="256"/>
+            <ac:cxnSpMk id="58" creationId="{8C6DC7EB-ACC3-93EE-3F85-2D4F9582590D}"/>
           </ac:cxnSpMkLst>
         </pc:cxnChg>
         <pc:cxnChg chg="add mod">
-          <ac:chgData name="Fatima Pillosu" userId="a6295d4dc9e22643" providerId="LiveId" clId="{A2BAD573-0810-4F62-955B-09910E5A090C}" dt="2025-06-24T14:43:14.082" v="3228" actId="1035"/>
-          <ac:cxnSpMkLst>
-            <pc:docMk/>
-            <pc:sldMk cId="3354384854" sldId="256"/>
-            <ac:cxnSpMk id="57" creationId="{536B190C-D802-668A-3A2F-EADAA9B117FB}"/>
+          <ac:chgData name="Fatima Pillosu" userId="a6295d4dc9e22643" providerId="LiveId" clId="{A2BAD573-0810-4F62-955B-09910E5A090C}" dt="2025-06-24T15:27:07.200" v="3311" actId="1037"/>
+          <ac:cxnSpMkLst>
+            <pc:docMk/>
+            <pc:sldMk cId="3354384854" sldId="256"/>
+            <ac:cxnSpMk id="59" creationId="{EDAD99B5-F84C-EE59-7063-69CAD2F7AF29}"/>
           </ac:cxnSpMkLst>
         </pc:cxnChg>
         <pc:cxnChg chg="add mod">
-          <ac:chgData name="Fatima Pillosu" userId="a6295d4dc9e22643" providerId="LiveId" clId="{A2BAD573-0810-4F62-955B-09910E5A090C}" dt="2025-06-24T15:23:26.691" v="3299" actId="1037"/>
-          <ac:cxnSpMkLst>
-            <pc:docMk/>
-            <pc:sldMk cId="3354384854" sldId="256"/>
-            <ac:cxnSpMk id="58" creationId="{8C6DC7EB-ACC3-93EE-3F85-2D4F9582590D}"/>
-          </ac:cxnSpMkLst>
-        </pc:cxnChg>
-        <pc:cxnChg chg="add mod">
-          <ac:chgData name="Fatima Pillosu" userId="a6295d4dc9e22643" providerId="LiveId" clId="{A2BAD573-0810-4F62-955B-09910E5A090C}" dt="2025-06-24T14:43:14.082" v="3228" actId="1035"/>
-          <ac:cxnSpMkLst>
-            <pc:docMk/>
-            <pc:sldMk cId="3354384854" sldId="256"/>
-            <ac:cxnSpMk id="59" creationId="{EDAD99B5-F84C-EE59-7063-69CAD2F7AF29}"/>
-          </ac:cxnSpMkLst>
-        </pc:cxnChg>
-        <pc:cxnChg chg="add mod">
-          <ac:chgData name="Fatima Pillosu" userId="a6295d4dc9e22643" providerId="LiveId" clId="{A2BAD573-0810-4F62-955B-09910E5A090C}" dt="2025-06-24T14:43:14.082" v="3228" actId="1035"/>
+          <ac:chgData name="Fatima Pillosu" userId="a6295d4dc9e22643" providerId="LiveId" clId="{A2BAD573-0810-4F62-955B-09910E5A090C}" dt="2025-06-24T15:27:07.200" v="3311" actId="1037"/>
           <ac:cxnSpMkLst>
             <pc:docMk/>
             <pc:sldMk cId="3354384854" sldId="256"/>
@@ -1163,7 +1163,7 @@
           </ac:cxnSpMkLst>
         </pc:cxnChg>
         <pc:cxnChg chg="add mod">
-          <ac:chgData name="Fatima Pillosu" userId="a6295d4dc9e22643" providerId="LiveId" clId="{A2BAD573-0810-4F62-955B-09910E5A090C}" dt="2025-06-24T15:22:39.137" v="3284" actId="1038"/>
+          <ac:chgData name="Fatima Pillosu" userId="a6295d4dc9e22643" providerId="LiveId" clId="{A2BAD573-0810-4F62-955B-09910E5A090C}" dt="2025-06-24T15:26:52.106" v="3310" actId="1037"/>
           <ac:cxnSpMkLst>
             <pc:docMk/>
             <pc:sldMk cId="3354384854" sldId="256"/>
@@ -1203,7 +1203,7 @@
           </ac:cxnSpMkLst>
         </pc:cxnChg>
         <pc:cxnChg chg="add mod">
-          <ac:chgData name="Fatima Pillosu" userId="a6295d4dc9e22643" providerId="LiveId" clId="{A2BAD573-0810-4F62-955B-09910E5A090C}" dt="2025-06-24T15:23:06.599" v="3293" actId="552"/>
+          <ac:chgData name="Fatima Pillosu" userId="a6295d4dc9e22643" providerId="LiveId" clId="{A2BAD573-0810-4F62-955B-09910E5A090C}" dt="2025-06-24T15:27:07.200" v="3311" actId="1037"/>
           <ac:cxnSpMkLst>
             <pc:docMk/>
             <pc:sldMk cId="3354384854" sldId="256"/>
@@ -1211,7 +1211,7 @@
           </ac:cxnSpMkLst>
         </pc:cxnChg>
         <pc:cxnChg chg="add mod">
-          <ac:chgData name="Fatima Pillosu" userId="a6295d4dc9e22643" providerId="LiveId" clId="{A2BAD573-0810-4F62-955B-09910E5A090C}" dt="2025-06-24T15:22:59.300" v="3286" actId="552"/>
+          <ac:chgData name="Fatima Pillosu" userId="a6295d4dc9e22643" providerId="LiveId" clId="{A2BAD573-0810-4F62-955B-09910E5A090C}" dt="2025-06-24T15:27:07.200" v="3311" actId="1037"/>
           <ac:cxnSpMkLst>
             <pc:docMk/>
             <pc:sldMk cId="3354384854" sldId="256"/>
@@ -8781,7 +8781,7 @@
         </p:nvSpPr>
         <p:spPr>
           <a:xfrm>
-            <a:off x="1264564" y="460073"/>
+            <a:off x="1256326" y="460073"/>
             <a:ext cx="1908000" cy="252000"/>
           </a:xfrm>
           <a:prstGeom prst="rect">
@@ -8826,7 +8826,7 @@
         </p:nvSpPr>
         <p:spPr>
           <a:xfrm>
-            <a:off x="1264564" y="855018"/>
+            <a:off x="1256326" y="855018"/>
             <a:ext cx="1908000" cy="252000"/>
           </a:xfrm>
           <a:prstGeom prst="rect">
@@ -8871,7 +8871,7 @@
         </p:nvSpPr>
         <p:spPr>
           <a:xfrm>
-            <a:off x="1264564" y="1244298"/>
+            <a:off x="1256326" y="1244298"/>
             <a:ext cx="1908000" cy="252000"/>
           </a:xfrm>
           <a:prstGeom prst="rect">
@@ -8952,7 +8952,7 @@
         </p:nvSpPr>
         <p:spPr>
           <a:xfrm>
-            <a:off x="1264564" y="1636413"/>
+            <a:off x="1256326" y="1636413"/>
             <a:ext cx="1908000" cy="252000"/>
           </a:xfrm>
           <a:prstGeom prst="rect">
@@ -8997,7 +8997,7 @@
         </p:nvSpPr>
         <p:spPr>
           <a:xfrm>
-            <a:off x="307627" y="2421540"/>
+            <a:off x="291151" y="2421540"/>
             <a:ext cx="1317993" cy="584775"/>
           </a:xfrm>
           <a:prstGeom prst="rect">
@@ -9046,7 +9046,7 @@
         </p:nvSpPr>
         <p:spPr>
           <a:xfrm>
-            <a:off x="1585189" y="2423083"/>
+            <a:off x="1576951" y="2423083"/>
             <a:ext cx="1311683" cy="584775"/>
           </a:xfrm>
           <a:prstGeom prst="rect">
@@ -9144,7 +9144,7 @@
         </p:nvSpPr>
         <p:spPr>
           <a:xfrm>
-            <a:off x="1264564" y="5807455"/>
+            <a:off x="1256326" y="5807455"/>
             <a:ext cx="1908000" cy="252000"/>
           </a:xfrm>
           <a:prstGeom prst="rect">
@@ -9189,7 +9189,7 @@
         </p:nvSpPr>
         <p:spPr>
           <a:xfrm>
-            <a:off x="1264564" y="6205825"/>
+            <a:off x="1256326" y="6205825"/>
             <a:ext cx="1908000" cy="252000"/>
           </a:xfrm>
           <a:prstGeom prst="rect">
@@ -9234,7 +9234,7 @@
         </p:nvSpPr>
         <p:spPr>
           <a:xfrm>
-            <a:off x="1318564" y="1636413"/>
+            <a:off x="1310326" y="1636413"/>
             <a:ext cx="1800000" cy="252000"/>
           </a:xfrm>
           <a:prstGeom prst="rect">
@@ -9298,7 +9298,7 @@
         </p:nvSpPr>
         <p:spPr>
           <a:xfrm>
-            <a:off x="1318564" y="1244298"/>
+            <a:off x="1310326" y="1244298"/>
             <a:ext cx="1800000" cy="252000"/>
           </a:xfrm>
           <a:prstGeom prst="rect">
@@ -9362,7 +9362,7 @@
         </p:nvSpPr>
         <p:spPr>
           <a:xfrm>
-            <a:off x="1318564" y="855018"/>
+            <a:off x="1310326" y="855018"/>
             <a:ext cx="1800000" cy="252000"/>
           </a:xfrm>
           <a:prstGeom prst="rect">
@@ -9426,7 +9426,7 @@
         </p:nvSpPr>
         <p:spPr>
           <a:xfrm>
-            <a:off x="1318564" y="460073"/>
+            <a:off x="1310326" y="460073"/>
             <a:ext cx="1800000" cy="252000"/>
           </a:xfrm>
           <a:prstGeom prst="rect">
@@ -9490,7 +9490,7 @@
         </p:nvSpPr>
         <p:spPr>
           <a:xfrm>
-            <a:off x="1318564" y="5807455"/>
+            <a:off x="1310326" y="5807455"/>
             <a:ext cx="1800000" cy="252000"/>
           </a:xfrm>
           <a:prstGeom prst="rect">
@@ -9554,7 +9554,7 @@
         </p:nvSpPr>
         <p:spPr>
           <a:xfrm>
-            <a:off x="1318564" y="6205825"/>
+            <a:off x="1310326" y="6205825"/>
             <a:ext cx="1800000" cy="252000"/>
           </a:xfrm>
           <a:prstGeom prst="rect">
@@ -9618,7 +9618,7 @@
         </p:nvSpPr>
         <p:spPr>
           <a:xfrm>
-            <a:off x="1620556" y="2355470"/>
+            <a:off x="1612318" y="2355470"/>
             <a:ext cx="1224000" cy="720000"/>
           </a:xfrm>
           <a:prstGeom prst="rect">
@@ -9668,68 +9668,6 @@
       </p:sp>
       <p:sp>
         <p:nvSpPr>
-          <p:cNvPr id="18" name="Rectangle 17">
-            <a:extLst>
-              <a:ext uri="{FF2B5EF4-FFF2-40B4-BE49-F238E27FC236}">
-                <a16:creationId xmlns:a16="http://schemas.microsoft.com/office/drawing/2014/main" id="{A9A7A549-413C-B305-70B8-0753E06B399D}"/>
-              </a:ext>
-            </a:extLst>
-          </p:cNvPr>
-          <p:cNvSpPr/>
-          <p:nvPr/>
-        </p:nvSpPr>
-        <p:spPr>
-          <a:xfrm>
-            <a:off x="2888160" y="2355200"/>
-            <a:ext cx="1224000" cy="720000"/>
-          </a:xfrm>
-          <a:prstGeom prst="rect">
-            <a:avLst/>
-          </a:prstGeom>
-          <a:noFill/>
-          <a:ln w="28575">
-            <a:solidFill>
-              <a:srgbClr val="3F37C9"/>
-            </a:solidFill>
-            <a:prstDash val="solid"/>
-          </a:ln>
-        </p:spPr>
-        <p:style>
-          <a:lnRef idx="2">
-            <a:schemeClr val="accent1">
-              <a:shade val="15000"/>
-            </a:schemeClr>
-          </a:lnRef>
-          <a:fillRef idx="1">
-            <a:schemeClr val="accent1"/>
-          </a:fillRef>
-          <a:effectRef idx="0">
-            <a:schemeClr val="accent1"/>
-          </a:effectRef>
-          <a:fontRef idx="minor">
-            <a:schemeClr val="lt1"/>
-          </a:fontRef>
-        </p:style>
-        <p:txBody>
-          <a:bodyPr rtlCol="0" anchor="ctr"/>
-          <a:lstStyle/>
-          <a:p>
-            <a:pPr algn="ctr"/>
-            <a:endParaRPr lang="en-GB" sz="1000">
-              <a:solidFill>
-                <a:schemeClr val="tx1">
-                  <a:lumMod val="75000"/>
-                  <a:lumOff val="25000"/>
-                </a:schemeClr>
-              </a:solidFill>
-              <a:latin typeface="Calibri Light" panose="020F0302020204030204" pitchFamily="34" charset="0"/>
-              <a:cs typeface="Calibri Light" panose="020F0302020204030204" pitchFamily="34" charset="0"/>
-            </a:endParaRPr>
-          </a:p>
-        </p:txBody>
-      </p:sp>
-      <p:sp>
-        <p:nvSpPr>
           <p:cNvPr id="19" name="Rectangle 18">
             <a:extLst>
               <a:ext uri="{FF2B5EF4-FFF2-40B4-BE49-F238E27FC236}">
@@ -9742,7 +9680,7 @@
         </p:nvSpPr>
         <p:spPr>
           <a:xfrm>
-            <a:off x="352951" y="2353927"/>
+            <a:off x="336475" y="2353927"/>
             <a:ext cx="1224000" cy="720000"/>
           </a:xfrm>
           <a:prstGeom prst="rect">
@@ -10254,7 +10192,7 @@
         </p:nvCxnSpPr>
         <p:spPr>
           <a:xfrm>
-            <a:off x="2026004" y="5222062"/>
+            <a:off x="2017766" y="5222062"/>
             <a:ext cx="0" cy="144000"/>
           </a:xfrm>
           <a:prstGeom prst="line">
@@ -10303,7 +10241,7 @@
         </p:nvCxnSpPr>
         <p:spPr>
           <a:xfrm>
-            <a:off x="2218564" y="719095"/>
+            <a:off x="2210326" y="719095"/>
             <a:ext cx="0" cy="144000"/>
           </a:xfrm>
           <a:prstGeom prst="straightConnector1">
@@ -10350,7 +10288,7 @@
         </p:nvCxnSpPr>
         <p:spPr>
           <a:xfrm>
-            <a:off x="2218564" y="1106484"/>
+            <a:off x="2210326" y="1106484"/>
             <a:ext cx="0" cy="144000"/>
           </a:xfrm>
           <a:prstGeom prst="straightConnector1">
@@ -10397,7 +10335,7 @@
         </p:nvCxnSpPr>
         <p:spPr>
           <a:xfrm>
-            <a:off x="2218564" y="1491735"/>
+            <a:off x="2210326" y="1491735"/>
             <a:ext cx="0" cy="144000"/>
           </a:xfrm>
           <a:prstGeom prst="straightConnector1">
@@ -10444,7 +10382,7 @@
         </p:nvCxnSpPr>
         <p:spPr>
           <a:xfrm>
-            <a:off x="985346" y="2035674"/>
+            <a:off x="944156" y="2035674"/>
             <a:ext cx="0" cy="144000"/>
           </a:xfrm>
           <a:prstGeom prst="straightConnector1">
@@ -10491,7 +10429,7 @@
         </p:nvCxnSpPr>
         <p:spPr>
           <a:xfrm>
-            <a:off x="2216316" y="2035674"/>
+            <a:off x="2208078" y="2035674"/>
             <a:ext cx="0" cy="144000"/>
           </a:xfrm>
           <a:prstGeom prst="straightConnector1">
@@ -10585,7 +10523,7 @@
         </p:nvCxnSpPr>
         <p:spPr>
           <a:xfrm>
-            <a:off x="2218564" y="5671503"/>
+            <a:off x="2202088" y="5671503"/>
             <a:ext cx="0" cy="144000"/>
           </a:xfrm>
           <a:prstGeom prst="straightConnector1">
@@ -10632,7 +10570,7 @@
         </p:nvCxnSpPr>
         <p:spPr>
           <a:xfrm>
-            <a:off x="2218564" y="6059838"/>
+            <a:off x="2210326" y="6059838"/>
             <a:ext cx="0" cy="144000"/>
           </a:xfrm>
           <a:prstGeom prst="straightConnector1">
@@ -10863,7 +10801,7 @@
         </p:nvCxnSpPr>
         <p:spPr>
           <a:xfrm>
-            <a:off x="2218564" y="1886961"/>
+            <a:off x="2210326" y="1886961"/>
             <a:ext cx="0" cy="144000"/>
           </a:xfrm>
           <a:prstGeom prst="straightConnector1">
@@ -11147,7 +11085,7 @@
         </p:nvSpPr>
         <p:spPr>
           <a:xfrm>
-            <a:off x="624426" y="462963"/>
+            <a:off x="616188" y="462963"/>
             <a:ext cx="694422" cy="246221"/>
           </a:xfrm>
           <a:prstGeom prst="rect">
@@ -11205,7 +11143,7 @@
         </p:nvSpPr>
         <p:spPr>
           <a:xfrm>
-            <a:off x="657378" y="857908"/>
+            <a:off x="649140" y="857908"/>
             <a:ext cx="694422" cy="246221"/>
           </a:xfrm>
           <a:prstGeom prst="rect">
@@ -11263,7 +11201,7 @@
         </p:nvSpPr>
         <p:spPr>
           <a:xfrm>
-            <a:off x="657378" y="1265188"/>
+            <a:off x="649140" y="1265188"/>
             <a:ext cx="694422" cy="246221"/>
           </a:xfrm>
           <a:prstGeom prst="rect">
@@ -11321,7 +11259,7 @@
         </p:nvSpPr>
         <p:spPr>
           <a:xfrm>
-            <a:off x="657378" y="1639303"/>
+            <a:off x="649140" y="1639303"/>
             <a:ext cx="694422" cy="246221"/>
           </a:xfrm>
           <a:prstGeom prst="rect">
@@ -11379,7 +11317,7 @@
         </p:nvSpPr>
         <p:spPr>
           <a:xfrm>
-            <a:off x="352038" y="2136943"/>
+            <a:off x="335562" y="2136943"/>
             <a:ext cx="1227247" cy="246221"/>
           </a:xfrm>
           <a:prstGeom prst="rect">
@@ -11431,7 +11369,7 @@
         </p:nvSpPr>
         <p:spPr>
           <a:xfrm>
-            <a:off x="1596966" y="2136943"/>
+            <a:off x="1588728" y="2136943"/>
             <a:ext cx="1222225" cy="246221"/>
           </a:xfrm>
           <a:prstGeom prst="rect">
@@ -11535,7 +11473,7 @@
         </p:nvSpPr>
         <p:spPr>
           <a:xfrm>
-            <a:off x="657378" y="5810345"/>
+            <a:off x="649140" y="5810345"/>
             <a:ext cx="694422" cy="246221"/>
           </a:xfrm>
           <a:prstGeom prst="rect">
@@ -11593,7 +11531,7 @@
         </p:nvSpPr>
         <p:spPr>
           <a:xfrm>
-            <a:off x="657378" y="6208715"/>
+            <a:off x="649140" y="6208715"/>
             <a:ext cx="694422" cy="246221"/>
           </a:xfrm>
           <a:prstGeom prst="rect">
@@ -11796,7 +11734,7 @@
         </p:nvCxnSpPr>
         <p:spPr>
           <a:xfrm>
-            <a:off x="2460871" y="5222062"/>
+            <a:off x="2452633" y="5222062"/>
             <a:ext cx="0" cy="144000"/>
           </a:xfrm>
           <a:prstGeom prst="line">
@@ -11843,7 +11781,7 @@
         </p:nvCxnSpPr>
         <p:spPr>
           <a:xfrm>
-            <a:off x="2461886" y="5367300"/>
+            <a:off x="2453648" y="5367300"/>
             <a:ext cx="840291" cy="0"/>
           </a:xfrm>
           <a:prstGeom prst="line">
@@ -11890,7 +11828,7 @@
         </p:nvCxnSpPr>
         <p:spPr>
           <a:xfrm>
-            <a:off x="3302177" y="5222062"/>
+            <a:off x="3293939" y="5222062"/>
             <a:ext cx="1294" cy="144000"/>
           </a:xfrm>
           <a:prstGeom prst="line">
@@ -12116,7 +12054,7 @@
         </p:nvSpPr>
         <p:spPr>
           <a:xfrm>
-            <a:off x="510859" y="3177081"/>
+            <a:off x="494383" y="3177081"/>
             <a:ext cx="1106260" cy="830997"/>
           </a:xfrm>
           <a:prstGeom prst="rect">
@@ -12158,7 +12096,7 @@
         </p:nvSpPr>
         <p:spPr>
           <a:xfrm>
-            <a:off x="343800" y="3075470"/>
+            <a:off x="336475" y="3075470"/>
             <a:ext cx="225929" cy="1075908"/>
           </a:xfrm>
           <a:prstGeom prst="rect">
@@ -12222,7 +12160,7 @@
         </p:nvSpPr>
         <p:spPr>
           <a:xfrm>
-            <a:off x="352951" y="3074059"/>
+            <a:off x="336475" y="3074059"/>
             <a:ext cx="1224000" cy="1071000"/>
           </a:xfrm>
           <a:prstGeom prst="rect">
@@ -12284,7 +12222,7 @@
         </p:nvSpPr>
         <p:spPr>
           <a:xfrm>
-            <a:off x="343800" y="4141574"/>
+            <a:off x="336475" y="4141574"/>
             <a:ext cx="225929" cy="1075908"/>
           </a:xfrm>
           <a:prstGeom prst="rect">
@@ -12348,7 +12286,7 @@
         </p:nvSpPr>
         <p:spPr>
           <a:xfrm>
-            <a:off x="352951" y="4140163"/>
+            <a:off x="336475" y="4140163"/>
             <a:ext cx="1224000" cy="1071000"/>
           </a:xfrm>
           <a:prstGeom prst="rect">
@@ -12410,7 +12348,7 @@
         </p:nvSpPr>
         <p:spPr>
           <a:xfrm>
-            <a:off x="486721" y="4139501"/>
+            <a:off x="470245" y="4139501"/>
             <a:ext cx="1157044" cy="1077218"/>
           </a:xfrm>
           <a:prstGeom prst="rect">
@@ -12452,7 +12390,7 @@
         </p:nvCxnSpPr>
         <p:spPr>
           <a:xfrm flipH="1">
-            <a:off x="335562" y="4140163"/>
+            <a:off x="319086" y="4140163"/>
             <a:ext cx="225929" cy="0"/>
           </a:xfrm>
           <a:prstGeom prst="line">
@@ -12493,7 +12431,7 @@
         </p:nvSpPr>
         <p:spPr>
           <a:xfrm>
-            <a:off x="1637032" y="3075470"/>
+            <a:off x="1612318" y="3075470"/>
             <a:ext cx="225929" cy="1075908"/>
           </a:xfrm>
           <a:prstGeom prst="rect">
@@ -12557,7 +12495,7 @@
         </p:nvSpPr>
         <p:spPr>
           <a:xfrm>
-            <a:off x="1620556" y="3074059"/>
+            <a:off x="1612318" y="3074059"/>
             <a:ext cx="1224000" cy="1071000"/>
           </a:xfrm>
           <a:prstGeom prst="rect">
@@ -12619,7 +12557,7 @@
         </p:nvSpPr>
         <p:spPr>
           <a:xfrm>
-            <a:off x="1637032" y="4141574"/>
+            <a:off x="1612318" y="4141574"/>
             <a:ext cx="225929" cy="1075908"/>
           </a:xfrm>
           <a:prstGeom prst="rect">
@@ -12683,7 +12621,7 @@
         </p:nvSpPr>
         <p:spPr>
           <a:xfrm>
-            <a:off x="1620556" y="4140163"/>
+            <a:off x="1612318" y="4140163"/>
             <a:ext cx="1224000" cy="1071000"/>
           </a:xfrm>
           <a:prstGeom prst="rect">
@@ -12745,7 +12683,7 @@
         </p:nvSpPr>
         <p:spPr>
           <a:xfrm>
-            <a:off x="1748063" y="4195680"/>
+            <a:off x="1739825" y="4195680"/>
             <a:ext cx="1164773" cy="954107"/>
           </a:xfrm>
           <a:prstGeom prst="rect">
@@ -12789,7 +12727,7 @@
         </p:nvCxnSpPr>
         <p:spPr>
           <a:xfrm flipH="1">
-            <a:off x="1620556" y="4134606"/>
+            <a:off x="1612318" y="4134606"/>
             <a:ext cx="225929" cy="0"/>
           </a:xfrm>
           <a:prstGeom prst="line">
@@ -12830,7 +12768,7 @@
         </p:nvSpPr>
         <p:spPr>
           <a:xfrm>
-            <a:off x="1793970" y="3075654"/>
+            <a:off x="1785732" y="3075654"/>
             <a:ext cx="1072961" cy="1077218"/>
           </a:xfrm>
           <a:prstGeom prst="rect">
@@ -12861,70 +12799,6 @@
               </a:solidFill>
               <a:latin typeface="Calibri" panose="020F0502020204030204" pitchFamily="34" charset="0"/>
               <a:cs typeface="Calibri" panose="020F0502020204030204" pitchFamily="34" charset="0"/>
-            </a:endParaRPr>
-          </a:p>
-        </p:txBody>
-      </p:sp>
-      <p:sp>
-        <p:nvSpPr>
-          <p:cNvPr id="627" name="Rectangle 626">
-            <a:extLst>
-              <a:ext uri="{FF2B5EF4-FFF2-40B4-BE49-F238E27FC236}">
-                <a16:creationId xmlns:a16="http://schemas.microsoft.com/office/drawing/2014/main" id="{6F51EFC4-FF03-9F6D-6FB5-B45F8D8988D0}"/>
-              </a:ext>
-            </a:extLst>
-          </p:cNvPr>
-          <p:cNvSpPr/>
-          <p:nvPr/>
-        </p:nvSpPr>
-        <p:spPr>
-          <a:xfrm>
-            <a:off x="2904636" y="3080043"/>
-            <a:ext cx="225929" cy="1075908"/>
-          </a:xfrm>
-          <a:prstGeom prst="rect">
-            <a:avLst/>
-          </a:prstGeom>
-          <a:solidFill>
-            <a:srgbClr val="3F37C9"/>
-          </a:solidFill>
-          <a:ln>
-            <a:noFill/>
-          </a:ln>
-        </p:spPr>
-        <p:style>
-          <a:lnRef idx="2">
-            <a:schemeClr val="accent1">
-              <a:shade val="15000"/>
-            </a:schemeClr>
-          </a:lnRef>
-          <a:fillRef idx="1">
-            <a:schemeClr val="accent1"/>
-          </a:fillRef>
-          <a:effectRef idx="0">
-            <a:schemeClr val="accent1"/>
-          </a:effectRef>
-          <a:fontRef idx="minor">
-            <a:schemeClr val="lt1"/>
-          </a:fontRef>
-        </p:style>
-        <p:txBody>
-          <a:bodyPr vert="vert270" rtlCol="0" anchor="ctr"/>
-          <a:lstStyle/>
-          <a:p>
-            <a:pPr algn="ctr"/>
-            <a:r>
-              <a:rPr lang="en-US" sz="800" dirty="0">
-                <a:solidFill>
-                  <a:schemeClr val="bg1"/>
-                </a:solidFill>
-              </a:rPr>
-              <a:t>Research Question 3</a:t>
-            </a:r>
-            <a:endParaRPr lang="en-GB" sz="800" dirty="0">
-              <a:solidFill>
-                <a:schemeClr val="bg1"/>
-              </a:solidFill>
             </a:endParaRPr>
           </a:p>
         </p:txBody>
@@ -12993,70 +12867,6 @@
       </p:sp>
       <p:sp>
         <p:nvSpPr>
-          <p:cNvPr id="629" name="Rectangle 628">
-            <a:extLst>
-              <a:ext uri="{FF2B5EF4-FFF2-40B4-BE49-F238E27FC236}">
-                <a16:creationId xmlns:a16="http://schemas.microsoft.com/office/drawing/2014/main" id="{664DEE3E-A67E-9A1D-8BBC-143BFF6A908D}"/>
-              </a:ext>
-            </a:extLst>
-          </p:cNvPr>
-          <p:cNvSpPr/>
-          <p:nvPr/>
-        </p:nvSpPr>
-        <p:spPr>
-          <a:xfrm>
-            <a:off x="2904636" y="4146147"/>
-            <a:ext cx="225929" cy="1075908"/>
-          </a:xfrm>
-          <a:prstGeom prst="rect">
-            <a:avLst/>
-          </a:prstGeom>
-          <a:solidFill>
-            <a:srgbClr val="3F37C9"/>
-          </a:solidFill>
-          <a:ln>
-            <a:noFill/>
-          </a:ln>
-        </p:spPr>
-        <p:style>
-          <a:lnRef idx="2">
-            <a:schemeClr val="accent1">
-              <a:shade val="15000"/>
-            </a:schemeClr>
-          </a:lnRef>
-          <a:fillRef idx="1">
-            <a:schemeClr val="accent1"/>
-          </a:fillRef>
-          <a:effectRef idx="0">
-            <a:schemeClr val="accent1"/>
-          </a:effectRef>
-          <a:fontRef idx="minor">
-            <a:schemeClr val="lt1"/>
-          </a:fontRef>
-        </p:style>
-        <p:txBody>
-          <a:bodyPr vert="vert270" rtlCol="0" anchor="ctr"/>
-          <a:lstStyle/>
-          <a:p>
-            <a:pPr algn="ctr"/>
-            <a:r>
-              <a:rPr lang="en-US" sz="800" dirty="0">
-                <a:solidFill>
-                  <a:schemeClr val="bg1"/>
-                </a:solidFill>
-              </a:rPr>
-              <a:t>Main output(s)</a:t>
-            </a:r>
-            <a:endParaRPr lang="en-GB" sz="800" dirty="0">
-              <a:solidFill>
-                <a:schemeClr val="bg1"/>
-              </a:solidFill>
-            </a:endParaRPr>
-          </a:p>
-        </p:txBody>
-      </p:sp>
-      <p:sp>
-        <p:nvSpPr>
           <p:cNvPr id="630" name="Rectangle 629">
             <a:extLst>
               <a:ext uri="{FF2B5EF4-FFF2-40B4-BE49-F238E27FC236}">
@@ -13133,7 +12943,7 @@
         </p:nvCxnSpPr>
         <p:spPr>
           <a:xfrm flipH="1">
-            <a:off x="2888160" y="4139179"/>
+            <a:off x="2879922" y="4139179"/>
             <a:ext cx="225929" cy="0"/>
           </a:xfrm>
           <a:prstGeom prst="line">
@@ -13254,6 +13064,196 @@
               </a:solidFill>
               <a:latin typeface="Calibri" panose="020F0502020204030204" pitchFamily="34" charset="0"/>
               <a:cs typeface="Calibri" panose="020F0502020204030204" pitchFamily="34" charset="0"/>
+            </a:endParaRPr>
+          </a:p>
+        </p:txBody>
+      </p:sp>
+      <p:sp>
+        <p:nvSpPr>
+          <p:cNvPr id="18" name="Rectangle 17">
+            <a:extLst>
+              <a:ext uri="{FF2B5EF4-FFF2-40B4-BE49-F238E27FC236}">
+                <a16:creationId xmlns:a16="http://schemas.microsoft.com/office/drawing/2014/main" id="{A9A7A549-413C-B305-70B8-0753E06B399D}"/>
+              </a:ext>
+            </a:extLst>
+          </p:cNvPr>
+          <p:cNvSpPr/>
+          <p:nvPr/>
+        </p:nvSpPr>
+        <p:spPr>
+          <a:xfrm>
+            <a:off x="2888160" y="2355200"/>
+            <a:ext cx="1224000" cy="720000"/>
+          </a:xfrm>
+          <a:prstGeom prst="rect">
+            <a:avLst/>
+          </a:prstGeom>
+          <a:noFill/>
+          <a:ln w="28575">
+            <a:solidFill>
+              <a:srgbClr val="3F37C9"/>
+            </a:solidFill>
+            <a:prstDash val="solid"/>
+          </a:ln>
+        </p:spPr>
+        <p:style>
+          <a:lnRef idx="2">
+            <a:schemeClr val="accent1">
+              <a:shade val="15000"/>
+            </a:schemeClr>
+          </a:lnRef>
+          <a:fillRef idx="1">
+            <a:schemeClr val="accent1"/>
+          </a:fillRef>
+          <a:effectRef idx="0">
+            <a:schemeClr val="accent1"/>
+          </a:effectRef>
+          <a:fontRef idx="minor">
+            <a:schemeClr val="lt1"/>
+          </a:fontRef>
+        </p:style>
+        <p:txBody>
+          <a:bodyPr rtlCol="0" anchor="ctr"/>
+          <a:lstStyle/>
+          <a:p>
+            <a:pPr algn="ctr"/>
+            <a:endParaRPr lang="en-GB" sz="1000">
+              <a:solidFill>
+                <a:schemeClr val="tx1">
+                  <a:lumMod val="75000"/>
+                  <a:lumOff val="25000"/>
+                </a:schemeClr>
+              </a:solidFill>
+              <a:latin typeface="Calibri Light" panose="020F0302020204030204" pitchFamily="34" charset="0"/>
+              <a:cs typeface="Calibri Light" panose="020F0302020204030204" pitchFamily="34" charset="0"/>
+            </a:endParaRPr>
+          </a:p>
+        </p:txBody>
+      </p:sp>
+      <p:sp>
+        <p:nvSpPr>
+          <p:cNvPr id="627" name="Rectangle 626">
+            <a:extLst>
+              <a:ext uri="{FF2B5EF4-FFF2-40B4-BE49-F238E27FC236}">
+                <a16:creationId xmlns:a16="http://schemas.microsoft.com/office/drawing/2014/main" id="{6F51EFC4-FF03-9F6D-6FB5-B45F8D8988D0}"/>
+              </a:ext>
+            </a:extLst>
+          </p:cNvPr>
+          <p:cNvSpPr/>
+          <p:nvPr/>
+        </p:nvSpPr>
+        <p:spPr>
+          <a:xfrm>
+            <a:off x="2888160" y="3080043"/>
+            <a:ext cx="225929" cy="1075908"/>
+          </a:xfrm>
+          <a:prstGeom prst="rect">
+            <a:avLst/>
+          </a:prstGeom>
+          <a:solidFill>
+            <a:srgbClr val="3F37C9"/>
+          </a:solidFill>
+          <a:ln>
+            <a:noFill/>
+          </a:ln>
+        </p:spPr>
+        <p:style>
+          <a:lnRef idx="2">
+            <a:schemeClr val="accent1">
+              <a:shade val="15000"/>
+            </a:schemeClr>
+          </a:lnRef>
+          <a:fillRef idx="1">
+            <a:schemeClr val="accent1"/>
+          </a:fillRef>
+          <a:effectRef idx="0">
+            <a:schemeClr val="accent1"/>
+          </a:effectRef>
+          <a:fontRef idx="minor">
+            <a:schemeClr val="lt1"/>
+          </a:fontRef>
+        </p:style>
+        <p:txBody>
+          <a:bodyPr vert="vert270" rtlCol="0" anchor="ctr"/>
+          <a:lstStyle/>
+          <a:p>
+            <a:pPr algn="ctr"/>
+            <a:r>
+              <a:rPr lang="en-US" sz="800" dirty="0">
+                <a:solidFill>
+                  <a:schemeClr val="bg1"/>
+                </a:solidFill>
+              </a:rPr>
+              <a:t>Research Question 3</a:t>
+            </a:r>
+            <a:endParaRPr lang="en-GB" sz="800" dirty="0">
+              <a:solidFill>
+                <a:schemeClr val="bg1"/>
+              </a:solidFill>
+            </a:endParaRPr>
+          </a:p>
+        </p:txBody>
+      </p:sp>
+      <p:sp>
+        <p:nvSpPr>
+          <p:cNvPr id="629" name="Rectangle 628">
+            <a:extLst>
+              <a:ext uri="{FF2B5EF4-FFF2-40B4-BE49-F238E27FC236}">
+                <a16:creationId xmlns:a16="http://schemas.microsoft.com/office/drawing/2014/main" id="{664DEE3E-A67E-9A1D-8BBC-143BFF6A908D}"/>
+              </a:ext>
+            </a:extLst>
+          </p:cNvPr>
+          <p:cNvSpPr/>
+          <p:nvPr/>
+        </p:nvSpPr>
+        <p:spPr>
+          <a:xfrm>
+            <a:off x="2888160" y="4146147"/>
+            <a:ext cx="225929" cy="1075908"/>
+          </a:xfrm>
+          <a:prstGeom prst="rect">
+            <a:avLst/>
+          </a:prstGeom>
+          <a:solidFill>
+            <a:srgbClr val="3F37C9"/>
+          </a:solidFill>
+          <a:ln>
+            <a:noFill/>
+          </a:ln>
+        </p:spPr>
+        <p:style>
+          <a:lnRef idx="2">
+            <a:schemeClr val="accent1">
+              <a:shade val="15000"/>
+            </a:schemeClr>
+          </a:lnRef>
+          <a:fillRef idx="1">
+            <a:schemeClr val="accent1"/>
+          </a:fillRef>
+          <a:effectRef idx="0">
+            <a:schemeClr val="accent1"/>
+          </a:effectRef>
+          <a:fontRef idx="minor">
+            <a:schemeClr val="lt1"/>
+          </a:fontRef>
+        </p:style>
+        <p:txBody>
+          <a:bodyPr vert="vert270" rtlCol="0" anchor="ctr"/>
+          <a:lstStyle/>
+          <a:p>
+            <a:pPr algn="ctr"/>
+            <a:r>
+              <a:rPr lang="en-US" sz="800" dirty="0">
+                <a:solidFill>
+                  <a:schemeClr val="bg1"/>
+                </a:solidFill>
+              </a:rPr>
+              <a:t>Main output(s)</a:t>
+            </a:r>
+            <a:endParaRPr lang="en-GB" sz="800" dirty="0">
+              <a:solidFill>
+                <a:schemeClr val="bg1"/>
+              </a:solidFill>
             </a:endParaRPr>
           </a:p>
         </p:txBody>

</xml_diff>

<commit_message>
Improved thesis road map in chapter 1.
</commit_message>
<xml_diff>
--- a/chapter_01/figures/thesis_roadmap.pptx
+++ b/chapter_01/figures/thesis_roadmap.pptx
@@ -118,7 +118,7 @@
 <file path=ppt/revisionInfo.xml><?xml version="1.0" encoding="utf-8"?>
 <p1510:revInfo xmlns:a="http://schemas.openxmlformats.org/drawingml/2006/main" xmlns:r="http://schemas.openxmlformats.org/officeDocument/2006/relationships" xmlns:p1510="http://schemas.microsoft.com/office/powerpoint/2015/10/main">
   <p1510:revLst>
-    <p1510:client id="{A2BAD573-0810-4F62-955B-09910E5A090C}" v="26" dt="2025-06-24T15:21:54.445"/>
+    <p1510:client id="{A2BAD573-0810-4F62-955B-09910E5A090C}" v="35" dt="2025-06-25T09:36:38.693"/>
   </p1510:revLst>
 </p1510:revInfo>
 </file>
@@ -128,12 +128,12 @@
   <pc:docChgLst>
     <pc:chgData name="Fatima Pillosu" userId="a6295d4dc9e22643" providerId="LiveId" clId="{A2BAD573-0810-4F62-955B-09910E5A090C}"/>
     <pc:docChg chg="undo redo custSel modSld">
-      <pc:chgData name="Fatima Pillosu" userId="a6295d4dc9e22643" providerId="LiveId" clId="{A2BAD573-0810-4F62-955B-09910E5A090C}" dt="2025-06-24T15:33:44.268" v="3330" actId="14100"/>
+      <pc:chgData name="Fatima Pillosu" userId="a6295d4dc9e22643" providerId="LiveId" clId="{A2BAD573-0810-4F62-955B-09910E5A090C}" dt="2025-06-25T09:37:08.419" v="4268" actId="1037"/>
       <pc:docMkLst>
         <pc:docMk/>
       </pc:docMkLst>
       <pc:sldChg chg="addSp delSp modSp mod">
-        <pc:chgData name="Fatima Pillosu" userId="a6295d4dc9e22643" providerId="LiveId" clId="{A2BAD573-0810-4F62-955B-09910E5A090C}" dt="2025-06-24T15:33:44.268" v="3330" actId="14100"/>
+        <pc:chgData name="Fatima Pillosu" userId="a6295d4dc9e22643" providerId="LiveId" clId="{A2BAD573-0810-4F62-955B-09910E5A090C}" dt="2025-06-25T09:37:08.419" v="4268" actId="1037"/>
         <pc:sldMkLst>
           <pc:docMk/>
           <pc:sldMk cId="3354384854" sldId="256"/>
@@ -171,11 +171,195 @@
           </ac:spMkLst>
         </pc:spChg>
         <pc:spChg chg="add mod">
+          <ac:chgData name="Fatima Pillosu" userId="a6295d4dc9e22643" providerId="LiveId" clId="{A2BAD573-0810-4F62-955B-09910E5A090C}" dt="2025-06-25T08:37:17.177" v="3370" actId="12789"/>
+          <ac:spMkLst>
+            <pc:docMk/>
+            <pc:sldMk cId="3354384854" sldId="256"/>
+            <ac:spMk id="6" creationId="{8CC79328-8D0D-D627-FD71-57CFC2D2B5DC}"/>
+          </ac:spMkLst>
+        </pc:spChg>
+        <pc:spChg chg="add mod">
+          <ac:chgData name="Fatima Pillosu" userId="a6295d4dc9e22643" providerId="LiveId" clId="{A2BAD573-0810-4F62-955B-09910E5A090C}" dt="2025-06-25T08:37:17.177" v="3370" actId="12789"/>
+          <ac:spMkLst>
+            <pc:docMk/>
+            <pc:sldMk cId="3354384854" sldId="256"/>
+            <ac:spMk id="7" creationId="{6C355D5C-47D8-7C59-C1B8-4FF2037F961E}"/>
+          </ac:spMkLst>
+        </pc:spChg>
+        <pc:spChg chg="add mod">
+          <ac:chgData name="Fatima Pillosu" userId="a6295d4dc9e22643" providerId="LiveId" clId="{A2BAD573-0810-4F62-955B-09910E5A090C}" dt="2025-06-25T08:37:17.177" v="3370" actId="12789"/>
+          <ac:spMkLst>
+            <pc:docMk/>
+            <pc:sldMk cId="3354384854" sldId="256"/>
+            <ac:spMk id="8" creationId="{FBD9599A-5CAC-D1AB-7D3E-713DF5A5C020}"/>
+          </ac:spMkLst>
+        </pc:spChg>
+        <pc:spChg chg="add mod">
+          <ac:chgData name="Fatima Pillosu" userId="a6295d4dc9e22643" providerId="LiveId" clId="{A2BAD573-0810-4F62-955B-09910E5A090C}" dt="2025-06-24T15:28:23.900" v="3324" actId="1038"/>
+          <ac:spMkLst>
+            <pc:docMk/>
+            <pc:sldMk cId="3354384854" sldId="256"/>
+            <ac:spMk id="9" creationId="{BBB0BE85-86B1-0751-AF3F-838269DDC230}"/>
+          </ac:spMkLst>
+        </pc:spChg>
+        <pc:spChg chg="add mod">
+          <ac:chgData name="Fatima Pillosu" userId="a6295d4dc9e22643" providerId="LiveId" clId="{A2BAD573-0810-4F62-955B-09910E5A090C}" dt="2025-06-24T15:28:23.900" v="3324" actId="1038"/>
+          <ac:spMkLst>
+            <pc:docMk/>
+            <pc:sldMk cId="3354384854" sldId="256"/>
+            <ac:spMk id="10" creationId="{99B61BA9-5A6C-532C-7917-89D64FACAECA}"/>
+          </ac:spMkLst>
+        </pc:spChg>
+        <pc:spChg chg="add mod">
+          <ac:chgData name="Fatima Pillosu" userId="a6295d4dc9e22643" providerId="LiveId" clId="{A2BAD573-0810-4F62-955B-09910E5A090C}" dt="2025-06-24T15:28:23.900" v="3324" actId="1038"/>
+          <ac:spMkLst>
+            <pc:docMk/>
+            <pc:sldMk cId="3354384854" sldId="256"/>
+            <ac:spMk id="11" creationId="{CAE0B206-AF54-54F2-0C06-284B40BCBB6F}"/>
+          </ac:spMkLst>
+        </pc:spChg>
+        <pc:spChg chg="add mod">
+          <ac:chgData name="Fatima Pillosu" userId="a6295d4dc9e22643" providerId="LiveId" clId="{A2BAD573-0810-4F62-955B-09910E5A090C}" dt="2025-06-24T15:28:23.900" v="3324" actId="1038"/>
+          <ac:spMkLst>
+            <pc:docMk/>
+            <pc:sldMk cId="3354384854" sldId="256"/>
+            <ac:spMk id="12" creationId="{8AAEA69B-D0DC-C7F0-7B11-C6A20FF94F80}"/>
+          </ac:spMkLst>
+        </pc:spChg>
+        <pc:spChg chg="add mod">
+          <ac:chgData name="Fatima Pillosu" userId="a6295d4dc9e22643" providerId="LiveId" clId="{A2BAD573-0810-4F62-955B-09910E5A090C}" dt="2025-06-24T15:28:23.900" v="3324" actId="1038"/>
+          <ac:spMkLst>
+            <pc:docMk/>
+            <pc:sldMk cId="3354384854" sldId="256"/>
+            <ac:spMk id="13" creationId="{2699F84C-B158-D9B1-8BAF-E590BCED4FB6}"/>
+          </ac:spMkLst>
+        </pc:spChg>
+        <pc:spChg chg="add mod">
+          <ac:chgData name="Fatima Pillosu" userId="a6295d4dc9e22643" providerId="LiveId" clId="{A2BAD573-0810-4F62-955B-09910E5A090C}" dt="2025-06-24T15:28:23.900" v="3324" actId="1038"/>
+          <ac:spMkLst>
+            <pc:docMk/>
+            <pc:sldMk cId="3354384854" sldId="256"/>
+            <ac:spMk id="14" creationId="{8A2E91B1-BBB4-1F54-4FCE-C1F6724BE292}"/>
+          </ac:spMkLst>
+        </pc:spChg>
+        <pc:spChg chg="add mod">
+          <ac:chgData name="Fatima Pillosu" userId="a6295d4dc9e22643" providerId="LiveId" clId="{A2BAD573-0810-4F62-955B-09910E5A090C}" dt="2025-06-24T15:28:23.900" v="3324" actId="1038"/>
+          <ac:spMkLst>
+            <pc:docMk/>
+            <pc:sldMk cId="3354384854" sldId="256"/>
+            <ac:spMk id="15" creationId="{E60B5C00-F1F7-FD1D-ABEF-8F5EF5D717FE}"/>
+          </ac:spMkLst>
+        </pc:spChg>
+        <pc:spChg chg="add mod">
+          <ac:chgData name="Fatima Pillosu" userId="a6295d4dc9e22643" providerId="LiveId" clId="{A2BAD573-0810-4F62-955B-09910E5A090C}" dt="2025-06-24T15:28:23.900" v="3324" actId="1038"/>
+          <ac:spMkLst>
+            <pc:docMk/>
+            <pc:sldMk cId="3354384854" sldId="256"/>
+            <ac:spMk id="16" creationId="{19EA9AC9-6E95-FB84-F5C5-ADD045519CA4}"/>
+          </ac:spMkLst>
+        </pc:spChg>
+        <pc:spChg chg="add mod">
+          <ac:chgData name="Fatima Pillosu" userId="a6295d4dc9e22643" providerId="LiveId" clId="{A2BAD573-0810-4F62-955B-09910E5A090C}" dt="2025-06-25T09:13:20.818" v="3842" actId="553"/>
+          <ac:spMkLst>
+            <pc:docMk/>
+            <pc:sldMk cId="3354384854" sldId="256"/>
+            <ac:spMk id="17" creationId="{71BBF894-591D-8866-B2B1-0C8C1F6E802C}"/>
+          </ac:spMkLst>
+        </pc:spChg>
+        <pc:spChg chg="add mod ord">
+          <ac:chgData name="Fatima Pillosu" userId="a6295d4dc9e22643" providerId="LiveId" clId="{A2BAD573-0810-4F62-955B-09910E5A090C}" dt="2025-06-25T09:12:55.485" v="3839" actId="553"/>
+          <ac:spMkLst>
+            <pc:docMk/>
+            <pc:sldMk cId="3354384854" sldId="256"/>
+            <ac:spMk id="18" creationId="{A9A7A549-413C-B305-70B8-0753E06B399D}"/>
+          </ac:spMkLst>
+        </pc:spChg>
+        <pc:spChg chg="add mod">
+          <ac:chgData name="Fatima Pillosu" userId="a6295d4dc9e22643" providerId="LiveId" clId="{A2BAD573-0810-4F62-955B-09910E5A090C}" dt="2025-06-25T09:13:53.566" v="3845" actId="553"/>
+          <ac:spMkLst>
+            <pc:docMk/>
+            <pc:sldMk cId="3354384854" sldId="256"/>
+            <ac:spMk id="19" creationId="{6BE65441-4EEE-E468-5441-5FEB4D450CFE}"/>
+          </ac:spMkLst>
+        </pc:spChg>
+        <pc:spChg chg="add mod">
+          <ac:chgData name="Fatima Pillosu" userId="a6295d4dc9e22643" providerId="LiveId" clId="{A2BAD573-0810-4F62-955B-09910E5A090C}" dt="2025-06-24T15:33:20.294" v="3329" actId="1037"/>
+          <ac:spMkLst>
+            <pc:docMk/>
+            <pc:sldMk cId="3354384854" sldId="256"/>
+            <ac:spMk id="21" creationId="{1146D79A-EC07-3CEF-454B-CD796D474073}"/>
+          </ac:spMkLst>
+        </pc:spChg>
+        <pc:spChg chg="add mod">
+          <ac:chgData name="Fatima Pillosu" userId="a6295d4dc9e22643" providerId="LiveId" clId="{A2BAD573-0810-4F62-955B-09910E5A090C}" dt="2025-06-24T15:33:20.294" v="3329" actId="1037"/>
+          <ac:spMkLst>
+            <pc:docMk/>
+            <pc:sldMk cId="3354384854" sldId="256"/>
+            <ac:spMk id="23" creationId="{AD491ADF-E96D-E422-C79F-9D802C0D8C5C}"/>
+          </ac:spMkLst>
+        </pc:spChg>
+        <pc:spChg chg="add mod">
+          <ac:chgData name="Fatima Pillosu" userId="a6295d4dc9e22643" providerId="LiveId" clId="{A2BAD573-0810-4F62-955B-09910E5A090C}" dt="2025-06-24T15:33:20.294" v="3329" actId="1037"/>
+          <ac:spMkLst>
+            <pc:docMk/>
+            <pc:sldMk cId="3354384854" sldId="256"/>
+            <ac:spMk id="25" creationId="{B5AD376D-9072-BDE5-112F-1804EA806BB6}"/>
+          </ac:spMkLst>
+        </pc:spChg>
+        <pc:spChg chg="add mod">
+          <ac:chgData name="Fatima Pillosu" userId="a6295d4dc9e22643" providerId="LiveId" clId="{A2BAD573-0810-4F62-955B-09910E5A090C}" dt="2025-06-24T13:48:39.957" v="1503" actId="1076"/>
+          <ac:spMkLst>
+            <pc:docMk/>
+            <pc:sldMk cId="3354384854" sldId="256"/>
+            <ac:spMk id="43" creationId="{B1334220-28E2-C9A1-20DB-0960856A01C1}"/>
+          </ac:spMkLst>
+        </pc:spChg>
+        <pc:spChg chg="add mod">
+          <ac:chgData name="Fatima Pillosu" userId="a6295d4dc9e22643" providerId="LiveId" clId="{A2BAD573-0810-4F62-955B-09910E5A090C}" dt="2025-06-24T13:48:39.957" v="1503" actId="1076"/>
+          <ac:spMkLst>
+            <pc:docMk/>
+            <pc:sldMk cId="3354384854" sldId="256"/>
+            <ac:spMk id="45" creationId="{163F56E9-414E-9452-9860-C8D28A72FBE6}"/>
+          </ac:spMkLst>
+        </pc:spChg>
+        <pc:spChg chg="add mod">
+          <ac:chgData name="Fatima Pillosu" userId="a6295d4dc9e22643" providerId="LiveId" clId="{A2BAD573-0810-4F62-955B-09910E5A090C}" dt="2025-06-24T15:28:23.900" v="3324" actId="1038"/>
+          <ac:spMkLst>
+            <pc:docMk/>
+            <pc:sldMk cId="3354384854" sldId="256"/>
+            <ac:spMk id="46" creationId="{45A669CA-93F7-26B4-4327-1BF3D3C31A5A}"/>
+          </ac:spMkLst>
+        </pc:spChg>
+        <pc:spChg chg="add mod">
+          <ac:chgData name="Fatima Pillosu" userId="a6295d4dc9e22643" providerId="LiveId" clId="{A2BAD573-0810-4F62-955B-09910E5A090C}" dt="2025-06-24T15:28:23.900" v="3324" actId="1038"/>
+          <ac:spMkLst>
+            <pc:docMk/>
+            <pc:sldMk cId="3354384854" sldId="256"/>
+            <ac:spMk id="47" creationId="{F7316CE7-8C2E-BB48-C6B9-2CA089A07966}"/>
+          </ac:spMkLst>
+        </pc:spChg>
+        <pc:spChg chg="add mod">
+          <ac:chgData name="Fatima Pillosu" userId="a6295d4dc9e22643" providerId="LiveId" clId="{A2BAD573-0810-4F62-955B-09910E5A090C}" dt="2025-06-24T15:28:23.900" v="3324" actId="1038"/>
+          <ac:spMkLst>
+            <pc:docMk/>
+            <pc:sldMk cId="3354384854" sldId="256"/>
+            <ac:spMk id="48" creationId="{2574031C-A47A-178A-A062-EA116F8846DD}"/>
+          </ac:spMkLst>
+        </pc:spChg>
+        <pc:spChg chg="add mod">
+          <ac:chgData name="Fatima Pillosu" userId="a6295d4dc9e22643" providerId="LiveId" clId="{A2BAD573-0810-4F62-955B-09910E5A090C}" dt="2025-06-24T15:28:23.900" v="3324" actId="1038"/>
+          <ac:spMkLst>
+            <pc:docMk/>
+            <pc:sldMk cId="3354384854" sldId="256"/>
+            <ac:spMk id="49" creationId="{A113BE4A-E9EA-9093-C6C1-3A906173B618}"/>
+          </ac:spMkLst>
+        </pc:spChg>
+        <pc:spChg chg="add mod">
           <ac:chgData name="Fatima Pillosu" userId="a6295d4dc9e22643" providerId="LiveId" clId="{A2BAD573-0810-4F62-955B-09910E5A090C}" dt="2025-06-24T15:26:52.106" v="3310" actId="1037"/>
           <ac:spMkLst>
             <pc:docMk/>
             <pc:sldMk cId="3354384854" sldId="256"/>
-            <ac:spMk id="6" creationId="{8CC79328-8D0D-D627-FD71-57CFC2D2B5DC}"/>
+            <ac:spMk id="50" creationId="{8AF39566-0332-086B-0C44-7819D8974EBD}"/>
           </ac:spMkLst>
         </pc:spChg>
         <pc:spChg chg="add mod">
@@ -183,15 +367,15 @@
           <ac:spMkLst>
             <pc:docMk/>
             <pc:sldMk cId="3354384854" sldId="256"/>
-            <ac:spMk id="7" creationId="{6C355D5C-47D8-7C59-C1B8-4FF2037F961E}"/>
+            <ac:spMk id="51" creationId="{FAC45779-73B6-302A-19A8-FAE3737E50E7}"/>
           </ac:spMkLst>
         </pc:spChg>
         <pc:spChg chg="add mod">
-          <ac:chgData name="Fatima Pillosu" userId="a6295d4dc9e22643" providerId="LiveId" clId="{A2BAD573-0810-4F62-955B-09910E5A090C}" dt="2025-06-24T13:52:45.532" v="1611" actId="12789"/>
-          <ac:spMkLst>
-            <pc:docMk/>
-            <pc:sldMk cId="3354384854" sldId="256"/>
-            <ac:spMk id="8" creationId="{FBD9599A-5CAC-D1AB-7D3E-713DF5A5C020}"/>
+          <ac:chgData name="Fatima Pillosu" userId="a6295d4dc9e22643" providerId="LiveId" clId="{A2BAD573-0810-4F62-955B-09910E5A090C}" dt="2025-06-24T13:49:00.850" v="1508" actId="207"/>
+          <ac:spMkLst>
+            <pc:docMk/>
+            <pc:sldMk cId="3354384854" sldId="256"/>
+            <ac:spMk id="52" creationId="{0FF3C3A6-BA87-1DE0-8CFA-1EB270D68A54}"/>
           </ac:spMkLst>
         </pc:spChg>
         <pc:spChg chg="add mod">
@@ -199,7 +383,7 @@
           <ac:spMkLst>
             <pc:docMk/>
             <pc:sldMk cId="3354384854" sldId="256"/>
-            <ac:spMk id="9" creationId="{BBB0BE85-86B1-0751-AF3F-838269DDC230}"/>
+            <ac:spMk id="53" creationId="{9DA24193-322E-D46A-6095-515BAD183A85}"/>
           </ac:spMkLst>
         </pc:spChg>
         <pc:spChg chg="add mod">
@@ -207,103 +391,63 @@
           <ac:spMkLst>
             <pc:docMk/>
             <pc:sldMk cId="3354384854" sldId="256"/>
-            <ac:spMk id="10" creationId="{99B61BA9-5A6C-532C-7917-89D64FACAECA}"/>
+            <ac:spMk id="54" creationId="{166EA424-2B97-DBF1-1D22-87CF3A64C146}"/>
           </ac:spMkLst>
         </pc:spChg>
         <pc:spChg chg="add mod">
-          <ac:chgData name="Fatima Pillosu" userId="a6295d4dc9e22643" providerId="LiveId" clId="{A2BAD573-0810-4F62-955B-09910E5A090C}" dt="2025-06-24T15:28:23.900" v="3324" actId="1038"/>
-          <ac:spMkLst>
-            <pc:docMk/>
-            <pc:sldMk cId="3354384854" sldId="256"/>
-            <ac:spMk id="11" creationId="{CAE0B206-AF54-54F2-0C06-284B40BCBB6F}"/>
+          <ac:chgData name="Fatima Pillosu" userId="a6295d4dc9e22643" providerId="LiveId" clId="{A2BAD573-0810-4F62-955B-09910E5A090C}" dt="2025-06-24T15:21:54.444" v="3279" actId="571"/>
+          <ac:spMkLst>
+            <pc:docMk/>
+            <pc:sldMk cId="3354384854" sldId="256"/>
+            <ac:spMk id="62" creationId="{09DF45E3-0314-00F9-8BAD-2FFCC8BC1173}"/>
           </ac:spMkLst>
         </pc:spChg>
         <pc:spChg chg="add mod">
-          <ac:chgData name="Fatima Pillosu" userId="a6295d4dc9e22643" providerId="LiveId" clId="{A2BAD573-0810-4F62-955B-09910E5A090C}" dt="2025-06-24T15:28:23.900" v="3324" actId="1038"/>
-          <ac:spMkLst>
-            <pc:docMk/>
-            <pc:sldMk cId="3354384854" sldId="256"/>
-            <ac:spMk id="12" creationId="{8AAEA69B-D0DC-C7F0-7B11-C6A20FF94F80}"/>
+          <ac:chgData name="Fatima Pillosu" userId="a6295d4dc9e22643" providerId="LiveId" clId="{A2BAD573-0810-4F62-955B-09910E5A090C}" dt="2025-06-24T13:21:14.136" v="259" actId="115"/>
+          <ac:spMkLst>
+            <pc:docMk/>
+            <pc:sldMk cId="3354384854" sldId="256"/>
+            <ac:spMk id="63" creationId="{4547C0E5-B16E-B6C1-19D4-0193461795B4}"/>
+          </ac:spMkLst>
+        </pc:spChg>
+        <pc:spChg chg="add del mod ord">
+          <ac:chgData name="Fatima Pillosu" userId="a6295d4dc9e22643" providerId="LiveId" clId="{A2BAD573-0810-4F62-955B-09910E5A090C}" dt="2025-06-24T13:42:51.111" v="1363" actId="478"/>
+          <ac:spMkLst>
+            <pc:docMk/>
+            <pc:sldMk cId="3354384854" sldId="256"/>
+            <ac:spMk id="577" creationId="{8ADBB20A-BA3C-BBA4-E694-F357302072FA}"/>
           </ac:spMkLst>
         </pc:spChg>
         <pc:spChg chg="add mod">
-          <ac:chgData name="Fatima Pillosu" userId="a6295d4dc9e22643" providerId="LiveId" clId="{A2BAD573-0810-4F62-955B-09910E5A090C}" dt="2025-06-24T15:28:23.900" v="3324" actId="1038"/>
-          <ac:spMkLst>
-            <pc:docMk/>
-            <pc:sldMk cId="3354384854" sldId="256"/>
-            <ac:spMk id="13" creationId="{2699F84C-B158-D9B1-8BAF-E590BCED4FB6}"/>
+          <ac:chgData name="Fatima Pillosu" userId="a6295d4dc9e22643" providerId="LiveId" clId="{A2BAD573-0810-4F62-955B-09910E5A090C}" dt="2025-06-24T13:43:28.396" v="1376" actId="571"/>
+          <ac:spMkLst>
+            <pc:docMk/>
+            <pc:sldMk cId="3354384854" sldId="256"/>
+            <ac:spMk id="578" creationId="{7A514635-0F5F-B844-F9C7-FD9C67601BF7}"/>
           </ac:spMkLst>
         </pc:spChg>
         <pc:spChg chg="add mod">
-          <ac:chgData name="Fatima Pillosu" userId="a6295d4dc9e22643" providerId="LiveId" clId="{A2BAD573-0810-4F62-955B-09910E5A090C}" dt="2025-06-24T15:28:23.900" v="3324" actId="1038"/>
-          <ac:spMkLst>
-            <pc:docMk/>
-            <pc:sldMk cId="3354384854" sldId="256"/>
-            <ac:spMk id="14" creationId="{8A2E91B1-BBB4-1F54-4FCE-C1F6724BE292}"/>
+          <ac:chgData name="Fatima Pillosu" userId="a6295d4dc9e22643" providerId="LiveId" clId="{A2BAD573-0810-4F62-955B-09910E5A090C}" dt="2025-06-24T13:43:28.396" v="1376" actId="571"/>
+          <ac:spMkLst>
+            <pc:docMk/>
+            <pc:sldMk cId="3354384854" sldId="256"/>
+            <ac:spMk id="579" creationId="{5C63282A-B9DC-3DE9-6793-8F1592FD63B4}"/>
           </ac:spMkLst>
         </pc:spChg>
         <pc:spChg chg="add mod">
-          <ac:chgData name="Fatima Pillosu" userId="a6295d4dc9e22643" providerId="LiveId" clId="{A2BAD573-0810-4F62-955B-09910E5A090C}" dt="2025-06-24T15:28:23.900" v="3324" actId="1038"/>
-          <ac:spMkLst>
-            <pc:docMk/>
-            <pc:sldMk cId="3354384854" sldId="256"/>
-            <ac:spMk id="15" creationId="{E60B5C00-F1F7-FD1D-ABEF-8F5EF5D717FE}"/>
+          <ac:chgData name="Fatima Pillosu" userId="a6295d4dc9e22643" providerId="LiveId" clId="{A2BAD573-0810-4F62-955B-09910E5A090C}" dt="2025-06-24T13:43:28.396" v="1376" actId="571"/>
+          <ac:spMkLst>
+            <pc:docMk/>
+            <pc:sldMk cId="3354384854" sldId="256"/>
+            <ac:spMk id="580" creationId="{DE472E5E-DE75-B303-7D5E-2495BACA7AAE}"/>
           </ac:spMkLst>
         </pc:spChg>
         <pc:spChg chg="add mod">
-          <ac:chgData name="Fatima Pillosu" userId="a6295d4dc9e22643" providerId="LiveId" clId="{A2BAD573-0810-4F62-955B-09910E5A090C}" dt="2025-06-24T15:28:23.900" v="3324" actId="1038"/>
-          <ac:spMkLst>
-            <pc:docMk/>
-            <pc:sldMk cId="3354384854" sldId="256"/>
-            <ac:spMk id="16" creationId="{19EA9AC9-6E95-FB84-F5C5-ADD045519CA4}"/>
-          </ac:spMkLst>
-        </pc:spChg>
-        <pc:spChg chg="add mod">
-          <ac:chgData name="Fatima Pillosu" userId="a6295d4dc9e22643" providerId="LiveId" clId="{A2BAD573-0810-4F62-955B-09910E5A090C}" dt="2025-06-24T15:27:18.970" v="3312" actId="552"/>
-          <ac:spMkLst>
-            <pc:docMk/>
-            <pc:sldMk cId="3354384854" sldId="256"/>
-            <ac:spMk id="17" creationId="{71BBF894-591D-8866-B2B1-0C8C1F6E802C}"/>
-          </ac:spMkLst>
-        </pc:spChg>
-        <pc:spChg chg="add mod ord">
-          <ac:chgData name="Fatima Pillosu" userId="a6295d4dc9e22643" providerId="LiveId" clId="{A2BAD573-0810-4F62-955B-09910E5A090C}" dt="2025-06-24T15:26:22.190" v="3305" actId="552"/>
-          <ac:spMkLst>
-            <pc:docMk/>
-            <pc:sldMk cId="3354384854" sldId="256"/>
-            <ac:spMk id="18" creationId="{A9A7A549-413C-B305-70B8-0753E06B399D}"/>
-          </ac:spMkLst>
-        </pc:spChg>
-        <pc:spChg chg="add mod">
-          <ac:chgData name="Fatima Pillosu" userId="a6295d4dc9e22643" providerId="LiveId" clId="{A2BAD573-0810-4F62-955B-09910E5A090C}" dt="2025-06-24T15:27:48.869" v="3316" actId="552"/>
-          <ac:spMkLst>
-            <pc:docMk/>
-            <pc:sldMk cId="3354384854" sldId="256"/>
-            <ac:spMk id="19" creationId="{6BE65441-4EEE-E468-5441-5FEB4D450CFE}"/>
-          </ac:spMkLst>
-        </pc:spChg>
-        <pc:spChg chg="add mod">
-          <ac:chgData name="Fatima Pillosu" userId="a6295d4dc9e22643" providerId="LiveId" clId="{A2BAD573-0810-4F62-955B-09910E5A090C}" dt="2025-06-24T15:33:20.294" v="3329" actId="1037"/>
-          <ac:spMkLst>
-            <pc:docMk/>
-            <pc:sldMk cId="3354384854" sldId="256"/>
-            <ac:spMk id="21" creationId="{1146D79A-EC07-3CEF-454B-CD796D474073}"/>
-          </ac:spMkLst>
-        </pc:spChg>
-        <pc:spChg chg="add mod">
-          <ac:chgData name="Fatima Pillosu" userId="a6295d4dc9e22643" providerId="LiveId" clId="{A2BAD573-0810-4F62-955B-09910E5A090C}" dt="2025-06-24T15:33:20.294" v="3329" actId="1037"/>
-          <ac:spMkLst>
-            <pc:docMk/>
-            <pc:sldMk cId="3354384854" sldId="256"/>
-            <ac:spMk id="23" creationId="{AD491ADF-E96D-E422-C79F-9D802C0D8C5C}"/>
-          </ac:spMkLst>
-        </pc:spChg>
-        <pc:spChg chg="add mod">
-          <ac:chgData name="Fatima Pillosu" userId="a6295d4dc9e22643" providerId="LiveId" clId="{A2BAD573-0810-4F62-955B-09910E5A090C}" dt="2025-06-24T15:33:20.294" v="3329" actId="1037"/>
-          <ac:spMkLst>
-            <pc:docMk/>
-            <pc:sldMk cId="3354384854" sldId="256"/>
-            <ac:spMk id="25" creationId="{B5AD376D-9072-BDE5-112F-1804EA806BB6}"/>
+          <ac:chgData name="Fatima Pillosu" userId="a6295d4dc9e22643" providerId="LiveId" clId="{A2BAD573-0810-4F62-955B-09910E5A090C}" dt="2025-06-24T13:43:28.396" v="1376" actId="571"/>
+          <ac:spMkLst>
+            <pc:docMk/>
+            <pc:sldMk cId="3354384854" sldId="256"/>
+            <ac:spMk id="581" creationId="{54E5B3F1-7B39-EF17-99AA-5E10B338F9CE}"/>
           </ac:spMkLst>
         </pc:spChg>
         <pc:spChg chg="add mod">
@@ -311,215 +455,87 @@
           <ac:spMkLst>
             <pc:docMk/>
             <pc:sldMk cId="3354384854" sldId="256"/>
-            <ac:spMk id="43" creationId="{B1334220-28E2-C9A1-20DB-0960856A01C1}"/>
+            <ac:spMk id="590" creationId="{F1CF47E4-B208-B64D-56AF-1C7AF738A2B6}"/>
           </ac:spMkLst>
         </pc:spChg>
         <pc:spChg chg="add mod">
-          <ac:chgData name="Fatima Pillosu" userId="a6295d4dc9e22643" providerId="LiveId" clId="{A2BAD573-0810-4F62-955B-09910E5A090C}" dt="2025-06-24T13:48:39.957" v="1503" actId="1076"/>
-          <ac:spMkLst>
-            <pc:docMk/>
-            <pc:sldMk cId="3354384854" sldId="256"/>
-            <ac:spMk id="45" creationId="{163F56E9-414E-9452-9860-C8D28A72FBE6}"/>
+          <ac:chgData name="Fatima Pillosu" userId="a6295d4dc9e22643" providerId="LiveId" clId="{A2BAD573-0810-4F62-955B-09910E5A090C}" dt="2025-06-25T09:15:50.052" v="3860" actId="1036"/>
+          <ac:spMkLst>
+            <pc:docMk/>
+            <pc:sldMk cId="3354384854" sldId="256"/>
+            <ac:spMk id="591" creationId="{20E9B5D7-5DD6-CA87-3F51-0D971D6FD279}"/>
+          </ac:spMkLst>
+        </pc:spChg>
+        <pc:spChg chg="add del mod">
+          <ac:chgData name="Fatima Pillosu" userId="a6295d4dc9e22643" providerId="LiveId" clId="{A2BAD573-0810-4F62-955B-09910E5A090C}" dt="2025-06-24T14:15:37.712" v="2409" actId="478"/>
+          <ac:spMkLst>
+            <pc:docMk/>
+            <pc:sldMk cId="3354384854" sldId="256"/>
+            <ac:spMk id="592" creationId="{283CC7F9-E2C7-B7A4-555D-AA87B6F19655}"/>
+          </ac:spMkLst>
+        </pc:spChg>
+        <pc:spChg chg="add del mod">
+          <ac:chgData name="Fatima Pillosu" userId="a6295d4dc9e22643" providerId="LiveId" clId="{A2BAD573-0810-4F62-955B-09910E5A090C}" dt="2025-06-24T14:09:43.039" v="2321" actId="478"/>
+          <ac:spMkLst>
+            <pc:docMk/>
+            <pc:sldMk cId="3354384854" sldId="256"/>
+            <ac:spMk id="593" creationId="{4B282F9B-907A-0369-FCC1-179ACE6988C5}"/>
           </ac:spMkLst>
         </pc:spChg>
         <pc:spChg chg="add mod">
-          <ac:chgData name="Fatima Pillosu" userId="a6295d4dc9e22643" providerId="LiveId" clId="{A2BAD573-0810-4F62-955B-09910E5A090C}" dt="2025-06-24T15:28:23.900" v="3324" actId="1038"/>
-          <ac:spMkLst>
-            <pc:docMk/>
-            <pc:sldMk cId="3354384854" sldId="256"/>
-            <ac:spMk id="46" creationId="{45A669CA-93F7-26B4-4327-1BF3D3C31A5A}"/>
+          <ac:chgData name="Fatima Pillosu" userId="a6295d4dc9e22643" providerId="LiveId" clId="{A2BAD573-0810-4F62-955B-09910E5A090C}" dt="2025-06-25T09:14:07.265" v="3847" actId="552"/>
+          <ac:spMkLst>
+            <pc:docMk/>
+            <pc:sldMk cId="3354384854" sldId="256"/>
+            <ac:spMk id="594" creationId="{FC92244F-C0CA-A13B-1711-60E9E4563AB5}"/>
           </ac:spMkLst>
         </pc:spChg>
         <pc:spChg chg="add mod">
-          <ac:chgData name="Fatima Pillosu" userId="a6295d4dc9e22643" providerId="LiveId" clId="{A2BAD573-0810-4F62-955B-09910E5A090C}" dt="2025-06-24T15:28:23.900" v="3324" actId="1038"/>
-          <ac:spMkLst>
-            <pc:docMk/>
-            <pc:sldMk cId="3354384854" sldId="256"/>
-            <ac:spMk id="47" creationId="{F7316CE7-8C2E-BB48-C6B9-2CA089A07966}"/>
+          <ac:chgData name="Fatima Pillosu" userId="a6295d4dc9e22643" providerId="LiveId" clId="{A2BAD573-0810-4F62-955B-09910E5A090C}" dt="2025-06-25T09:14:07.265" v="3847" actId="552"/>
+          <ac:spMkLst>
+            <pc:docMk/>
+            <pc:sldMk cId="3354384854" sldId="256"/>
+            <ac:spMk id="595" creationId="{E49B4669-52E0-A76A-CD54-D3D35BE416F3}"/>
           </ac:spMkLst>
         </pc:spChg>
         <pc:spChg chg="add mod">
-          <ac:chgData name="Fatima Pillosu" userId="a6295d4dc9e22643" providerId="LiveId" clId="{A2BAD573-0810-4F62-955B-09910E5A090C}" dt="2025-06-24T15:28:23.900" v="3324" actId="1038"/>
-          <ac:spMkLst>
-            <pc:docMk/>
-            <pc:sldMk cId="3354384854" sldId="256"/>
-            <ac:spMk id="48" creationId="{2574031C-A47A-178A-A062-EA116F8846DD}"/>
+          <ac:chgData name="Fatima Pillosu" userId="a6295d4dc9e22643" providerId="LiveId" clId="{A2BAD573-0810-4F62-955B-09910E5A090C}" dt="2025-06-25T09:35:38.106" v="4249" actId="1036"/>
+          <ac:spMkLst>
+            <pc:docMk/>
+            <pc:sldMk cId="3354384854" sldId="256"/>
+            <ac:spMk id="596" creationId="{3B8968B4-727C-3A29-5D90-345C15F92BFC}"/>
           </ac:spMkLst>
         </pc:spChg>
         <pc:spChg chg="add mod">
-          <ac:chgData name="Fatima Pillosu" userId="a6295d4dc9e22643" providerId="LiveId" clId="{A2BAD573-0810-4F62-955B-09910E5A090C}" dt="2025-06-24T15:28:23.900" v="3324" actId="1038"/>
-          <ac:spMkLst>
-            <pc:docMk/>
-            <pc:sldMk cId="3354384854" sldId="256"/>
-            <ac:spMk id="49" creationId="{A113BE4A-E9EA-9093-C6C1-3A906173B618}"/>
+          <ac:chgData name="Fatima Pillosu" userId="a6295d4dc9e22643" providerId="LiveId" clId="{A2BAD573-0810-4F62-955B-09910E5A090C}" dt="2025-06-25T09:16:10.441" v="3863" actId="552"/>
+          <ac:spMkLst>
+            <pc:docMk/>
+            <pc:sldMk cId="3354384854" sldId="256"/>
+            <ac:spMk id="597" creationId="{A0B2660A-B037-AF5C-21D6-090645C9D63B}"/>
           </ac:spMkLst>
         </pc:spChg>
         <pc:spChg chg="add mod">
-          <ac:chgData name="Fatima Pillosu" userId="a6295d4dc9e22643" providerId="LiveId" clId="{A2BAD573-0810-4F62-955B-09910E5A090C}" dt="2025-06-24T15:26:52.106" v="3310" actId="1037"/>
-          <ac:spMkLst>
-            <pc:docMk/>
-            <pc:sldMk cId="3354384854" sldId="256"/>
-            <ac:spMk id="50" creationId="{8AF39566-0332-086B-0C44-7819D8974EBD}"/>
+          <ac:chgData name="Fatima Pillosu" userId="a6295d4dc9e22643" providerId="LiveId" clId="{A2BAD573-0810-4F62-955B-09910E5A090C}" dt="2025-06-25T09:35:02.860" v="4246" actId="12789"/>
+          <ac:spMkLst>
+            <pc:docMk/>
+            <pc:sldMk cId="3354384854" sldId="256"/>
+            <ac:spMk id="598" creationId="{C612D495-4B88-514D-D02D-84A31CFD2C5D}"/>
           </ac:spMkLst>
         </pc:spChg>
         <pc:spChg chg="add mod">
-          <ac:chgData name="Fatima Pillosu" userId="a6295d4dc9e22643" providerId="LiveId" clId="{A2BAD573-0810-4F62-955B-09910E5A090C}" dt="2025-06-24T15:27:07.200" v="3311" actId="1037"/>
-          <ac:spMkLst>
-            <pc:docMk/>
-            <pc:sldMk cId="3354384854" sldId="256"/>
-            <ac:spMk id="51" creationId="{FAC45779-73B6-302A-19A8-FAE3737E50E7}"/>
+          <ac:chgData name="Fatima Pillosu" userId="a6295d4dc9e22643" providerId="LiveId" clId="{A2BAD573-0810-4F62-955B-09910E5A090C}" dt="2025-06-25T09:35:38.106" v="4249" actId="1036"/>
+          <ac:spMkLst>
+            <pc:docMk/>
+            <pc:sldMk cId="3354384854" sldId="256"/>
+            <ac:spMk id="609" creationId="{6DB2AC2D-5A6E-63D5-4BCE-B9DFE6CB36AE}"/>
           </ac:spMkLst>
         </pc:spChg>
         <pc:spChg chg="add mod">
-          <ac:chgData name="Fatima Pillosu" userId="a6295d4dc9e22643" providerId="LiveId" clId="{A2BAD573-0810-4F62-955B-09910E5A090C}" dt="2025-06-24T13:49:00.850" v="1508" actId="207"/>
-          <ac:spMkLst>
-            <pc:docMk/>
-            <pc:sldMk cId="3354384854" sldId="256"/>
-            <ac:spMk id="52" creationId="{0FF3C3A6-BA87-1DE0-8CFA-1EB270D68A54}"/>
-          </ac:spMkLst>
-        </pc:spChg>
-        <pc:spChg chg="add mod">
-          <ac:chgData name="Fatima Pillosu" userId="a6295d4dc9e22643" providerId="LiveId" clId="{A2BAD573-0810-4F62-955B-09910E5A090C}" dt="2025-06-24T15:28:23.900" v="3324" actId="1038"/>
-          <ac:spMkLst>
-            <pc:docMk/>
-            <pc:sldMk cId="3354384854" sldId="256"/>
-            <ac:spMk id="53" creationId="{9DA24193-322E-D46A-6095-515BAD183A85}"/>
-          </ac:spMkLst>
-        </pc:spChg>
-        <pc:spChg chg="add mod">
-          <ac:chgData name="Fatima Pillosu" userId="a6295d4dc9e22643" providerId="LiveId" clId="{A2BAD573-0810-4F62-955B-09910E5A090C}" dt="2025-06-24T15:28:23.900" v="3324" actId="1038"/>
-          <ac:spMkLst>
-            <pc:docMk/>
-            <pc:sldMk cId="3354384854" sldId="256"/>
-            <ac:spMk id="54" creationId="{166EA424-2B97-DBF1-1D22-87CF3A64C146}"/>
-          </ac:spMkLst>
-        </pc:spChg>
-        <pc:spChg chg="add mod">
-          <ac:chgData name="Fatima Pillosu" userId="a6295d4dc9e22643" providerId="LiveId" clId="{A2BAD573-0810-4F62-955B-09910E5A090C}" dt="2025-06-24T15:21:54.444" v="3279" actId="571"/>
-          <ac:spMkLst>
-            <pc:docMk/>
-            <pc:sldMk cId="3354384854" sldId="256"/>
-            <ac:spMk id="62" creationId="{09DF45E3-0314-00F9-8BAD-2FFCC8BC1173}"/>
-          </ac:spMkLst>
-        </pc:spChg>
-        <pc:spChg chg="add mod">
-          <ac:chgData name="Fatima Pillosu" userId="a6295d4dc9e22643" providerId="LiveId" clId="{A2BAD573-0810-4F62-955B-09910E5A090C}" dt="2025-06-24T13:21:14.136" v="259" actId="115"/>
-          <ac:spMkLst>
-            <pc:docMk/>
-            <pc:sldMk cId="3354384854" sldId="256"/>
-            <ac:spMk id="63" creationId="{4547C0E5-B16E-B6C1-19D4-0193461795B4}"/>
-          </ac:spMkLst>
-        </pc:spChg>
-        <pc:spChg chg="add del mod ord">
-          <ac:chgData name="Fatima Pillosu" userId="a6295d4dc9e22643" providerId="LiveId" clId="{A2BAD573-0810-4F62-955B-09910E5A090C}" dt="2025-06-24T13:42:51.111" v="1363" actId="478"/>
-          <ac:spMkLst>
-            <pc:docMk/>
-            <pc:sldMk cId="3354384854" sldId="256"/>
-            <ac:spMk id="577" creationId="{8ADBB20A-BA3C-BBA4-E694-F357302072FA}"/>
-          </ac:spMkLst>
-        </pc:spChg>
-        <pc:spChg chg="add mod">
-          <ac:chgData name="Fatima Pillosu" userId="a6295d4dc9e22643" providerId="LiveId" clId="{A2BAD573-0810-4F62-955B-09910E5A090C}" dt="2025-06-24T13:43:28.396" v="1376" actId="571"/>
-          <ac:spMkLst>
-            <pc:docMk/>
-            <pc:sldMk cId="3354384854" sldId="256"/>
-            <ac:spMk id="578" creationId="{7A514635-0F5F-B844-F9C7-FD9C67601BF7}"/>
-          </ac:spMkLst>
-        </pc:spChg>
-        <pc:spChg chg="add mod">
-          <ac:chgData name="Fatima Pillosu" userId="a6295d4dc9e22643" providerId="LiveId" clId="{A2BAD573-0810-4F62-955B-09910E5A090C}" dt="2025-06-24T13:43:28.396" v="1376" actId="571"/>
-          <ac:spMkLst>
-            <pc:docMk/>
-            <pc:sldMk cId="3354384854" sldId="256"/>
-            <ac:spMk id="579" creationId="{5C63282A-B9DC-3DE9-6793-8F1592FD63B4}"/>
-          </ac:spMkLst>
-        </pc:spChg>
-        <pc:spChg chg="add mod">
-          <ac:chgData name="Fatima Pillosu" userId="a6295d4dc9e22643" providerId="LiveId" clId="{A2BAD573-0810-4F62-955B-09910E5A090C}" dt="2025-06-24T13:43:28.396" v="1376" actId="571"/>
-          <ac:spMkLst>
-            <pc:docMk/>
-            <pc:sldMk cId="3354384854" sldId="256"/>
-            <ac:spMk id="580" creationId="{DE472E5E-DE75-B303-7D5E-2495BACA7AAE}"/>
-          </ac:spMkLst>
-        </pc:spChg>
-        <pc:spChg chg="add mod">
-          <ac:chgData name="Fatima Pillosu" userId="a6295d4dc9e22643" providerId="LiveId" clId="{A2BAD573-0810-4F62-955B-09910E5A090C}" dt="2025-06-24T13:43:28.396" v="1376" actId="571"/>
-          <ac:spMkLst>
-            <pc:docMk/>
-            <pc:sldMk cId="3354384854" sldId="256"/>
-            <ac:spMk id="581" creationId="{54E5B3F1-7B39-EF17-99AA-5E10B338F9CE}"/>
-          </ac:spMkLst>
-        </pc:spChg>
-        <pc:spChg chg="add mod">
-          <ac:chgData name="Fatima Pillosu" userId="a6295d4dc9e22643" providerId="LiveId" clId="{A2BAD573-0810-4F62-955B-09910E5A090C}" dt="2025-06-24T13:48:39.957" v="1503" actId="1076"/>
-          <ac:spMkLst>
-            <pc:docMk/>
-            <pc:sldMk cId="3354384854" sldId="256"/>
-            <ac:spMk id="590" creationId="{F1CF47E4-B208-B64D-56AF-1C7AF738A2B6}"/>
-          </ac:spMkLst>
-        </pc:spChg>
-        <pc:spChg chg="add mod">
-          <ac:chgData name="Fatima Pillosu" userId="a6295d4dc9e22643" providerId="LiveId" clId="{A2BAD573-0810-4F62-955B-09910E5A090C}" dt="2025-06-24T15:26:52.106" v="3310" actId="1037"/>
-          <ac:spMkLst>
-            <pc:docMk/>
-            <pc:sldMk cId="3354384854" sldId="256"/>
-            <ac:spMk id="591" creationId="{20E9B5D7-5DD6-CA87-3F51-0D971D6FD279}"/>
-          </ac:spMkLst>
-        </pc:spChg>
-        <pc:spChg chg="add del mod">
-          <ac:chgData name="Fatima Pillosu" userId="a6295d4dc9e22643" providerId="LiveId" clId="{A2BAD573-0810-4F62-955B-09910E5A090C}" dt="2025-06-24T14:15:37.712" v="2409" actId="478"/>
-          <ac:spMkLst>
-            <pc:docMk/>
-            <pc:sldMk cId="3354384854" sldId="256"/>
-            <ac:spMk id="592" creationId="{283CC7F9-E2C7-B7A4-555D-AA87B6F19655}"/>
-          </ac:spMkLst>
-        </pc:spChg>
-        <pc:spChg chg="add del mod">
-          <ac:chgData name="Fatima Pillosu" userId="a6295d4dc9e22643" providerId="LiveId" clId="{A2BAD573-0810-4F62-955B-09910E5A090C}" dt="2025-06-24T14:09:43.039" v="2321" actId="478"/>
-          <ac:spMkLst>
-            <pc:docMk/>
-            <pc:sldMk cId="3354384854" sldId="256"/>
-            <ac:spMk id="593" creationId="{4B282F9B-907A-0369-FCC1-179ACE6988C5}"/>
-          </ac:spMkLst>
-        </pc:spChg>
-        <pc:spChg chg="add mod">
-          <ac:chgData name="Fatima Pillosu" userId="a6295d4dc9e22643" providerId="LiveId" clId="{A2BAD573-0810-4F62-955B-09910E5A090C}" dt="2025-06-24T15:27:48.869" v="3316" actId="552"/>
-          <ac:spMkLst>
-            <pc:docMk/>
-            <pc:sldMk cId="3354384854" sldId="256"/>
-            <ac:spMk id="594" creationId="{FC92244F-C0CA-A13B-1711-60E9E4563AB5}"/>
-          </ac:spMkLst>
-        </pc:spChg>
-        <pc:spChg chg="add mod">
-          <ac:chgData name="Fatima Pillosu" userId="a6295d4dc9e22643" providerId="LiveId" clId="{A2BAD573-0810-4F62-955B-09910E5A090C}" dt="2025-06-24T15:26:52.106" v="3310" actId="1037"/>
-          <ac:spMkLst>
-            <pc:docMk/>
-            <pc:sldMk cId="3354384854" sldId="256"/>
-            <ac:spMk id="595" creationId="{E49B4669-52E0-A76A-CD54-D3D35BE416F3}"/>
-          </ac:spMkLst>
-        </pc:spChg>
-        <pc:spChg chg="add mod">
-          <ac:chgData name="Fatima Pillosu" userId="a6295d4dc9e22643" providerId="LiveId" clId="{A2BAD573-0810-4F62-955B-09910E5A090C}" dt="2025-06-24T15:27:48.869" v="3316" actId="552"/>
-          <ac:spMkLst>
-            <pc:docMk/>
-            <pc:sldMk cId="3354384854" sldId="256"/>
-            <ac:spMk id="596" creationId="{3B8968B4-727C-3A29-5D90-345C15F92BFC}"/>
-          </ac:spMkLst>
-        </pc:spChg>
-        <pc:spChg chg="add mod">
-          <ac:chgData name="Fatima Pillosu" userId="a6295d4dc9e22643" providerId="LiveId" clId="{A2BAD573-0810-4F62-955B-09910E5A090C}" dt="2025-06-24T15:26:52.106" v="3310" actId="1037"/>
-          <ac:spMkLst>
-            <pc:docMk/>
-            <pc:sldMk cId="3354384854" sldId="256"/>
-            <ac:spMk id="597" creationId="{A0B2660A-B037-AF5C-21D6-090645C9D63B}"/>
-          </ac:spMkLst>
-        </pc:spChg>
-        <pc:spChg chg="add mod">
-          <ac:chgData name="Fatima Pillosu" userId="a6295d4dc9e22643" providerId="LiveId" clId="{A2BAD573-0810-4F62-955B-09910E5A090C}" dt="2025-06-24T15:26:52.106" v="3310" actId="1037"/>
-          <ac:spMkLst>
-            <pc:docMk/>
-            <pc:sldMk cId="3354384854" sldId="256"/>
-            <ac:spMk id="598" creationId="{C612D495-4B88-514D-D02D-84A31CFD2C5D}"/>
+          <ac:chgData name="Fatima Pillosu" userId="a6295d4dc9e22643" providerId="LiveId" clId="{A2BAD573-0810-4F62-955B-09910E5A090C}" dt="2025-06-25T09:35:38.106" v="4249" actId="1036"/>
+          <ac:spMkLst>
+            <pc:docMk/>
+            <pc:sldMk cId="3354384854" sldId="256"/>
+            <ac:spMk id="610" creationId="{F70C3C62-6550-7988-E9AB-1B2DC4AEE250}"/>
           </ac:spMkLst>
         </pc:spChg>
         <pc:spChg chg="add mod">
@@ -547,7 +563,7 @@
           </ac:spMkLst>
         </pc:spChg>
         <pc:spChg chg="add mod">
-          <ac:chgData name="Fatima Pillosu" userId="a6295d4dc9e22643" providerId="LiveId" clId="{A2BAD573-0810-4F62-955B-09910E5A090C}" dt="2025-06-24T15:27:18.970" v="3312" actId="552"/>
+          <ac:chgData name="Fatima Pillosu" userId="a6295d4dc9e22643" providerId="LiveId" clId="{A2BAD573-0810-4F62-955B-09910E5A090C}" dt="2025-06-25T09:13:36.448" v="3844" actId="552"/>
           <ac:spMkLst>
             <pc:docMk/>
             <pc:sldMk cId="3354384854" sldId="256"/>
@@ -555,7 +571,7 @@
           </ac:spMkLst>
         </pc:spChg>
         <pc:spChg chg="add mod">
-          <ac:chgData name="Fatima Pillosu" userId="a6295d4dc9e22643" providerId="LiveId" clId="{A2BAD573-0810-4F62-955B-09910E5A090C}" dt="2025-06-24T15:27:07.200" v="3311" actId="1037"/>
+          <ac:chgData name="Fatima Pillosu" userId="a6295d4dc9e22643" providerId="LiveId" clId="{A2BAD573-0810-4F62-955B-09910E5A090C}" dt="2025-06-25T09:13:36.448" v="3844" actId="552"/>
           <ac:spMkLst>
             <pc:docMk/>
             <pc:sldMk cId="3354384854" sldId="256"/>
@@ -570,80 +586,80 @@
             <ac:spMk id="621" creationId="{3509C7A6-19BB-0D05-A5A4-F3A89DE28DD3}"/>
           </ac:spMkLst>
         </pc:spChg>
+        <pc:spChg chg="add del mod">
+          <ac:chgData name="Fatima Pillosu" userId="a6295d4dc9e22643" providerId="LiveId" clId="{A2BAD573-0810-4F62-955B-09910E5A090C}" dt="2025-06-25T09:22:40.393" v="3967" actId="478"/>
+          <ac:spMkLst>
+            <pc:docMk/>
+            <pc:sldMk cId="3354384854" sldId="256"/>
+            <ac:spMk id="622" creationId="{13B3834E-4847-5F31-F576-AEF55FC855FA}"/>
+          </ac:spMkLst>
+        </pc:spChg>
         <pc:spChg chg="add mod">
-          <ac:chgData name="Fatima Pillosu" userId="a6295d4dc9e22643" providerId="LiveId" clId="{A2BAD573-0810-4F62-955B-09910E5A090C}" dt="2025-06-24T15:27:18.970" v="3312" actId="552"/>
-          <ac:spMkLst>
-            <pc:docMk/>
-            <pc:sldMk cId="3354384854" sldId="256"/>
-            <ac:spMk id="622" creationId="{13B3834E-4847-5F31-F576-AEF55FC855FA}"/>
+          <ac:chgData name="Fatima Pillosu" userId="a6295d4dc9e22643" providerId="LiveId" clId="{A2BAD573-0810-4F62-955B-09910E5A090C}" dt="2025-06-25T09:23:10.897" v="3974" actId="207"/>
+          <ac:spMkLst>
+            <pc:docMk/>
+            <pc:sldMk cId="3354384854" sldId="256"/>
+            <ac:spMk id="623" creationId="{C8DD63C9-0AEC-9FCD-8193-1A88616A7025}"/>
           </ac:spMkLst>
         </pc:spChg>
         <pc:spChg chg="add mod">
-          <ac:chgData name="Fatima Pillosu" userId="a6295d4dc9e22643" providerId="LiveId" clId="{A2BAD573-0810-4F62-955B-09910E5A090C}" dt="2025-06-24T15:27:07.200" v="3311" actId="1037"/>
-          <ac:spMkLst>
-            <pc:docMk/>
-            <pc:sldMk cId="3354384854" sldId="256"/>
-            <ac:spMk id="623" creationId="{C8DD63C9-0AEC-9FCD-8193-1A88616A7025}"/>
+          <ac:chgData name="Fatima Pillosu" userId="a6295d4dc9e22643" providerId="LiveId" clId="{A2BAD573-0810-4F62-955B-09910E5A090C}" dt="2025-06-25T09:35:02.860" v="4246" actId="12789"/>
+          <ac:spMkLst>
+            <pc:docMk/>
+            <pc:sldMk cId="3354384854" sldId="256"/>
+            <ac:spMk id="624" creationId="{3CB0F352-4708-DE34-11E2-90F736AF324E}"/>
           </ac:spMkLst>
         </pc:spChg>
         <pc:spChg chg="add mod">
-          <ac:chgData name="Fatima Pillosu" userId="a6295d4dc9e22643" providerId="LiveId" clId="{A2BAD573-0810-4F62-955B-09910E5A090C}" dt="2025-06-24T15:27:07.200" v="3311" actId="1037"/>
-          <ac:spMkLst>
-            <pc:docMk/>
-            <pc:sldMk cId="3354384854" sldId="256"/>
-            <ac:spMk id="624" creationId="{3CB0F352-4708-DE34-11E2-90F736AF324E}"/>
+          <ac:chgData name="Fatima Pillosu" userId="a6295d4dc9e22643" providerId="LiveId" clId="{A2BAD573-0810-4F62-955B-09910E5A090C}" dt="2025-06-25T09:15:50.052" v="3860" actId="1036"/>
+          <ac:spMkLst>
+            <pc:docMk/>
+            <pc:sldMk cId="3354384854" sldId="256"/>
+            <ac:spMk id="626" creationId="{B7393800-097F-873C-C52B-0AC6B676D9F3}"/>
+          </ac:spMkLst>
+        </pc:spChg>
+        <pc:spChg chg="add mod ord">
+          <ac:chgData name="Fatima Pillosu" userId="a6295d4dc9e22643" providerId="LiveId" clId="{A2BAD573-0810-4F62-955B-09910E5A090C}" dt="2025-06-25T09:13:08.683" v="3841" actId="552"/>
+          <ac:spMkLst>
+            <pc:docMk/>
+            <pc:sldMk cId="3354384854" sldId="256"/>
+            <ac:spMk id="627" creationId="{6F51EFC4-FF03-9F6D-6FB5-B45F8D8988D0}"/>
           </ac:spMkLst>
         </pc:spChg>
         <pc:spChg chg="add mod">
-          <ac:chgData name="Fatima Pillosu" userId="a6295d4dc9e22643" providerId="LiveId" clId="{A2BAD573-0810-4F62-955B-09910E5A090C}" dt="2025-06-24T15:27:07.200" v="3311" actId="1037"/>
-          <ac:spMkLst>
-            <pc:docMk/>
-            <pc:sldMk cId="3354384854" sldId="256"/>
-            <ac:spMk id="626" creationId="{B7393800-097F-873C-C52B-0AC6B676D9F3}"/>
-          </ac:spMkLst>
-        </pc:spChg>
-        <pc:spChg chg="add mod ord">
-          <ac:chgData name="Fatima Pillosu" userId="a6295d4dc9e22643" providerId="LiveId" clId="{A2BAD573-0810-4F62-955B-09910E5A090C}" dt="2025-06-24T15:26:22.190" v="3305" actId="552"/>
-          <ac:spMkLst>
-            <pc:docMk/>
-            <pc:sldMk cId="3354384854" sldId="256"/>
-            <ac:spMk id="627" creationId="{6F51EFC4-FF03-9F6D-6FB5-B45F8D8988D0}"/>
+          <ac:chgData name="Fatima Pillosu" userId="a6295d4dc9e22643" providerId="LiveId" clId="{A2BAD573-0810-4F62-955B-09910E5A090C}" dt="2025-06-25T09:13:08.683" v="3841" actId="552"/>
+          <ac:spMkLst>
+            <pc:docMk/>
+            <pc:sldMk cId="3354384854" sldId="256"/>
+            <ac:spMk id="628" creationId="{3FD6CF6F-69B9-F672-2E42-C82F089DB74B}"/>
+          </ac:spMkLst>
+        </pc:spChg>
+        <pc:spChg chg="add del mod ord">
+          <ac:chgData name="Fatima Pillosu" userId="a6295d4dc9e22643" providerId="LiveId" clId="{A2BAD573-0810-4F62-955B-09910E5A090C}" dt="2025-06-25T09:22:42.284" v="3968" actId="478"/>
+          <ac:spMkLst>
+            <pc:docMk/>
+            <pc:sldMk cId="3354384854" sldId="256"/>
+            <ac:spMk id="629" creationId="{664DEE3E-A67E-9A1D-8BBC-143BFF6A908D}"/>
           </ac:spMkLst>
         </pc:spChg>
         <pc:spChg chg="add mod">
-          <ac:chgData name="Fatima Pillosu" userId="a6295d4dc9e22643" providerId="LiveId" clId="{A2BAD573-0810-4F62-955B-09910E5A090C}" dt="2025-06-24T14:15:23.721" v="2408" actId="208"/>
-          <ac:spMkLst>
-            <pc:docMk/>
-            <pc:sldMk cId="3354384854" sldId="256"/>
-            <ac:spMk id="628" creationId="{3FD6CF6F-69B9-F672-2E42-C82F089DB74B}"/>
-          </ac:spMkLst>
-        </pc:spChg>
-        <pc:spChg chg="add mod ord">
-          <ac:chgData name="Fatima Pillosu" userId="a6295d4dc9e22643" providerId="LiveId" clId="{A2BAD573-0810-4F62-955B-09910E5A090C}" dt="2025-06-24T15:26:22.190" v="3305" actId="552"/>
-          <ac:spMkLst>
-            <pc:docMk/>
-            <pc:sldMk cId="3354384854" sldId="256"/>
-            <ac:spMk id="629" creationId="{664DEE3E-A67E-9A1D-8BBC-143BFF6A908D}"/>
+          <ac:chgData name="Fatima Pillosu" userId="a6295d4dc9e22643" providerId="LiveId" clId="{A2BAD573-0810-4F62-955B-09910E5A090C}" dt="2025-06-25T09:23:47.689" v="3979" actId="552"/>
+          <ac:spMkLst>
+            <pc:docMk/>
+            <pc:sldMk cId="3354384854" sldId="256"/>
+            <ac:spMk id="630" creationId="{E694E000-4160-662F-9852-8C66ED0B30F2}"/>
           </ac:spMkLst>
         </pc:spChg>
         <pc:spChg chg="add mod">
-          <ac:chgData name="Fatima Pillosu" userId="a6295d4dc9e22643" providerId="LiveId" clId="{A2BAD573-0810-4F62-955B-09910E5A090C}" dt="2025-06-24T14:15:23.721" v="2408" actId="208"/>
-          <ac:spMkLst>
-            <pc:docMk/>
-            <pc:sldMk cId="3354384854" sldId="256"/>
-            <ac:spMk id="630" creationId="{E694E000-4160-662F-9852-8C66ED0B30F2}"/>
+          <ac:chgData name="Fatima Pillosu" userId="a6295d4dc9e22643" providerId="LiveId" clId="{A2BAD573-0810-4F62-955B-09910E5A090C}" dt="2025-06-25T09:15:50.052" v="3860" actId="1036"/>
+          <ac:spMkLst>
+            <pc:docMk/>
+            <pc:sldMk cId="3354384854" sldId="256"/>
+            <ac:spMk id="632" creationId="{C1D83393-5AE0-B829-D596-82F862E480AC}"/>
           </ac:spMkLst>
         </pc:spChg>
         <pc:spChg chg="add mod">
-          <ac:chgData name="Fatima Pillosu" userId="a6295d4dc9e22643" providerId="LiveId" clId="{A2BAD573-0810-4F62-955B-09910E5A090C}" dt="2025-06-24T14:42:36.572" v="3201" actId="12788"/>
-          <ac:spMkLst>
-            <pc:docMk/>
-            <pc:sldMk cId="3354384854" sldId="256"/>
-            <ac:spMk id="632" creationId="{C1D83393-5AE0-B829-D596-82F862E480AC}"/>
-          </ac:spMkLst>
-        </pc:spChg>
-        <pc:spChg chg="add mod">
-          <ac:chgData name="Fatima Pillosu" userId="a6295d4dc9e22643" providerId="LiveId" clId="{A2BAD573-0810-4F62-955B-09910E5A090C}" dt="2025-06-24T14:42:36.572" v="3201" actId="12788"/>
+          <ac:chgData name="Fatima Pillosu" userId="a6295d4dc9e22643" providerId="LiveId" clId="{A2BAD573-0810-4F62-955B-09910E5A090C}" dt="2025-06-25T09:35:02.860" v="4246" actId="12789"/>
           <ac:spMkLst>
             <pc:docMk/>
             <pc:sldMk cId="3354384854" sldId="256"/>
@@ -923,7 +939,7 @@
           </ac:cxnSpMkLst>
         </pc:cxnChg>
         <pc:cxnChg chg="add mod">
-          <ac:chgData name="Fatima Pillosu" userId="a6295d4dc9e22643" providerId="LiveId" clId="{A2BAD573-0810-4F62-955B-09910E5A090C}" dt="2025-06-24T15:23:15.987" v="3295" actId="1037"/>
+          <ac:chgData name="Fatima Pillosu" userId="a6295d4dc9e22643" providerId="LiveId" clId="{A2BAD573-0810-4F62-955B-09910E5A090C}" dt="2025-06-25T09:24:31.713" v="3984" actId="1036"/>
           <ac:cxnSpMkLst>
             <pc:docMk/>
             <pc:sldMk cId="3354384854" sldId="256"/>
@@ -931,11 +947,51 @@
           </ac:cxnSpMkLst>
         </pc:cxnChg>
         <pc:cxnChg chg="add mod">
-          <ac:chgData name="Fatima Pillosu" userId="a6295d4dc9e22643" providerId="LiveId" clId="{A2BAD573-0810-4F62-955B-09910E5A090C}" dt="2025-06-24T15:22:28.510" v="3282" actId="1038"/>
+          <ac:chgData name="Fatima Pillosu" userId="a6295d4dc9e22643" providerId="LiveId" clId="{A2BAD573-0810-4F62-955B-09910E5A090C}" dt="2025-06-25T09:24:31.713" v="3984" actId="1036"/>
           <ac:cxnSpMkLst>
             <pc:docMk/>
             <pc:sldMk cId="3354384854" sldId="256"/>
             <ac:cxnSpMk id="27" creationId="{EF30C496-2771-0778-6824-2EB6BE7CEFF0}"/>
+          </ac:cxnSpMkLst>
+        </pc:cxnChg>
+        <pc:cxnChg chg="add mod">
+          <ac:chgData name="Fatima Pillosu" userId="a6295d4dc9e22643" providerId="LiveId" clId="{A2BAD573-0810-4F62-955B-09910E5A090C}" dt="2025-06-25T09:24:19.096" v="3982" actId="1036"/>
+          <ac:cxnSpMkLst>
+            <pc:docMk/>
+            <pc:sldMk cId="3354384854" sldId="256"/>
+            <ac:cxnSpMk id="28" creationId="{C96442FF-908A-84F2-7E54-6AB7485662E5}"/>
+          </ac:cxnSpMkLst>
+        </pc:cxnChg>
+        <pc:cxnChg chg="add mod">
+          <ac:chgData name="Fatima Pillosu" userId="a6295d4dc9e22643" providerId="LiveId" clId="{A2BAD573-0810-4F62-955B-09910E5A090C}" dt="2025-06-24T15:28:23.900" v="3324" actId="1038"/>
+          <ac:cxnSpMkLst>
+            <pc:docMk/>
+            <pc:sldMk cId="3354384854" sldId="256"/>
+            <ac:cxnSpMk id="29" creationId="{68C79158-7AC0-2089-1EB1-659E9CE9B879}"/>
+          </ac:cxnSpMkLst>
+        </pc:cxnChg>
+        <pc:cxnChg chg="add mod">
+          <ac:chgData name="Fatima Pillosu" userId="a6295d4dc9e22643" providerId="LiveId" clId="{A2BAD573-0810-4F62-955B-09910E5A090C}" dt="2025-06-24T15:28:23.900" v="3324" actId="1038"/>
+          <ac:cxnSpMkLst>
+            <pc:docMk/>
+            <pc:sldMk cId="3354384854" sldId="256"/>
+            <ac:cxnSpMk id="30" creationId="{4EC70538-F86D-F7C9-DDDD-DA52C78765E3}"/>
+          </ac:cxnSpMkLst>
+        </pc:cxnChg>
+        <pc:cxnChg chg="add mod">
+          <ac:chgData name="Fatima Pillosu" userId="a6295d4dc9e22643" providerId="LiveId" clId="{A2BAD573-0810-4F62-955B-09910E5A090C}" dt="2025-06-24T15:28:23.900" v="3324" actId="1038"/>
+          <ac:cxnSpMkLst>
+            <pc:docMk/>
+            <pc:sldMk cId="3354384854" sldId="256"/>
+            <ac:cxnSpMk id="31" creationId="{9F7D2FEC-C785-93BC-449F-1A0CC0B4888A}"/>
+          </ac:cxnSpMkLst>
+        </pc:cxnChg>
+        <pc:cxnChg chg="add mod">
+          <ac:chgData name="Fatima Pillosu" userId="a6295d4dc9e22643" providerId="LiveId" clId="{A2BAD573-0810-4F62-955B-09910E5A090C}" dt="2025-06-24T15:27:57.797" v="3321" actId="1037"/>
+          <ac:cxnSpMkLst>
+            <pc:docMk/>
+            <pc:sldMk cId="3354384854" sldId="256"/>
+            <ac:cxnSpMk id="32" creationId="{9778960E-B8BB-13B7-75CF-504745A15D25}"/>
           </ac:cxnSpMkLst>
         </pc:cxnChg>
         <pc:cxnChg chg="add mod">
@@ -943,7 +999,23 @@
           <ac:cxnSpMkLst>
             <pc:docMk/>
             <pc:sldMk cId="3354384854" sldId="256"/>
-            <ac:cxnSpMk id="28" creationId="{C96442FF-908A-84F2-7E54-6AB7485662E5}"/>
+            <ac:cxnSpMk id="33" creationId="{FC730EE6-A865-F984-6BF9-922C3B75E9CB}"/>
+          </ac:cxnSpMkLst>
+        </pc:cxnChg>
+        <pc:cxnChg chg="add mod">
+          <ac:chgData name="Fatima Pillosu" userId="a6295d4dc9e22643" providerId="LiveId" clId="{A2BAD573-0810-4F62-955B-09910E5A090C}" dt="2025-06-24T13:42:40.229" v="1342" actId="1037"/>
+          <ac:cxnSpMkLst>
+            <pc:docMk/>
+            <pc:sldMk cId="3354384854" sldId="256"/>
+            <ac:cxnSpMk id="34" creationId="{EACCC1CE-FD33-0835-95CD-4A0BE2013F80}"/>
+          </ac:cxnSpMkLst>
+        </pc:cxnChg>
+        <pc:cxnChg chg="add mod">
+          <ac:chgData name="Fatima Pillosu" userId="a6295d4dc9e22643" providerId="LiveId" clId="{A2BAD573-0810-4F62-955B-09910E5A090C}" dt="2025-06-25T09:04:23.291" v="3730" actId="1036"/>
+          <ac:cxnSpMkLst>
+            <pc:docMk/>
+            <pc:sldMk cId="3354384854" sldId="256"/>
+            <ac:cxnSpMk id="35" creationId="{7EF61BF4-0D6D-5F88-43D7-D8C8E3B0885C}"/>
           </ac:cxnSpMkLst>
         </pc:cxnChg>
         <pc:cxnChg chg="add mod">
@@ -951,7 +1023,39 @@
           <ac:cxnSpMkLst>
             <pc:docMk/>
             <pc:sldMk cId="3354384854" sldId="256"/>
-            <ac:cxnSpMk id="29" creationId="{68C79158-7AC0-2089-1EB1-659E9CE9B879}"/>
+            <ac:cxnSpMk id="36" creationId="{FFAE2ACE-ABDC-A2F2-DCB7-F5057E21A66D}"/>
+          </ac:cxnSpMkLst>
+        </pc:cxnChg>
+        <pc:cxnChg chg="add mod">
+          <ac:chgData name="Fatima Pillosu" userId="a6295d4dc9e22643" providerId="LiveId" clId="{A2BAD573-0810-4F62-955B-09910E5A090C}" dt="2025-06-25T09:04:23.291" v="3730" actId="1036"/>
+          <ac:cxnSpMkLst>
+            <pc:docMk/>
+            <pc:sldMk cId="3354384854" sldId="256"/>
+            <ac:cxnSpMk id="37" creationId="{5F6D91F5-3338-557F-0CB3-E7DC04EB077C}"/>
+          </ac:cxnSpMkLst>
+        </pc:cxnChg>
+        <pc:cxnChg chg="add mod">
+          <ac:chgData name="Fatima Pillosu" userId="a6295d4dc9e22643" providerId="LiveId" clId="{A2BAD573-0810-4F62-955B-09910E5A090C}" dt="2025-06-25T09:04:23.291" v="3730" actId="1036"/>
+          <ac:cxnSpMkLst>
+            <pc:docMk/>
+            <pc:sldMk cId="3354384854" sldId="256"/>
+            <ac:cxnSpMk id="38" creationId="{EC6CF449-A72A-A019-7618-C21BAA994F09}"/>
+          </ac:cxnSpMkLst>
+        </pc:cxnChg>
+        <pc:cxnChg chg="add mod">
+          <ac:chgData name="Fatima Pillosu" userId="a6295d4dc9e22643" providerId="LiveId" clId="{A2BAD573-0810-4F62-955B-09910E5A090C}" dt="2025-06-25T09:04:23.291" v="3730" actId="1036"/>
+          <ac:cxnSpMkLst>
+            <pc:docMk/>
+            <pc:sldMk cId="3354384854" sldId="256"/>
+            <ac:cxnSpMk id="39" creationId="{CB73C3F9-D34E-5387-D738-F027F9F21D82}"/>
+          </ac:cxnSpMkLst>
+        </pc:cxnChg>
+        <pc:cxnChg chg="add mod">
+          <ac:chgData name="Fatima Pillosu" userId="a6295d4dc9e22643" providerId="LiveId" clId="{A2BAD573-0810-4F62-955B-09910E5A090C}" dt="2025-06-24T15:33:10.082" v="3326" actId="14100"/>
+          <ac:cxnSpMkLst>
+            <pc:docMk/>
+            <pc:sldMk cId="3354384854" sldId="256"/>
+            <ac:cxnSpMk id="40" creationId="{FB0CCEB5-3FCE-544B-3DA3-C04064EA44E6}"/>
           </ac:cxnSpMkLst>
         </pc:cxnChg>
         <pc:cxnChg chg="add mod">
@@ -959,94 +1063,6 @@
           <ac:cxnSpMkLst>
             <pc:docMk/>
             <pc:sldMk cId="3354384854" sldId="256"/>
-            <ac:cxnSpMk id="30" creationId="{4EC70538-F86D-F7C9-DDDD-DA52C78765E3}"/>
-          </ac:cxnSpMkLst>
-        </pc:cxnChg>
-        <pc:cxnChg chg="add mod">
-          <ac:chgData name="Fatima Pillosu" userId="a6295d4dc9e22643" providerId="LiveId" clId="{A2BAD573-0810-4F62-955B-09910E5A090C}" dt="2025-06-24T15:28:23.900" v="3324" actId="1038"/>
-          <ac:cxnSpMkLst>
-            <pc:docMk/>
-            <pc:sldMk cId="3354384854" sldId="256"/>
-            <ac:cxnSpMk id="31" creationId="{9F7D2FEC-C785-93BC-449F-1A0CC0B4888A}"/>
-          </ac:cxnSpMkLst>
-        </pc:cxnChg>
-        <pc:cxnChg chg="add mod">
-          <ac:chgData name="Fatima Pillosu" userId="a6295d4dc9e22643" providerId="LiveId" clId="{A2BAD573-0810-4F62-955B-09910E5A090C}" dt="2025-06-24T15:27:57.797" v="3321" actId="1037"/>
-          <ac:cxnSpMkLst>
-            <pc:docMk/>
-            <pc:sldMk cId="3354384854" sldId="256"/>
-            <ac:cxnSpMk id="32" creationId="{9778960E-B8BB-13B7-75CF-504745A15D25}"/>
-          </ac:cxnSpMkLst>
-        </pc:cxnChg>
-        <pc:cxnChg chg="add mod">
-          <ac:chgData name="Fatima Pillosu" userId="a6295d4dc9e22643" providerId="LiveId" clId="{A2BAD573-0810-4F62-955B-09910E5A090C}" dt="2025-06-24T15:27:07.200" v="3311" actId="1037"/>
-          <ac:cxnSpMkLst>
-            <pc:docMk/>
-            <pc:sldMk cId="3354384854" sldId="256"/>
-            <ac:cxnSpMk id="33" creationId="{FC730EE6-A865-F984-6BF9-922C3B75E9CB}"/>
-          </ac:cxnSpMkLst>
-        </pc:cxnChg>
-        <pc:cxnChg chg="add mod">
-          <ac:chgData name="Fatima Pillosu" userId="a6295d4dc9e22643" providerId="LiveId" clId="{A2BAD573-0810-4F62-955B-09910E5A090C}" dt="2025-06-24T13:42:40.229" v="1342" actId="1037"/>
-          <ac:cxnSpMkLst>
-            <pc:docMk/>
-            <pc:sldMk cId="3354384854" sldId="256"/>
-            <ac:cxnSpMk id="34" creationId="{EACCC1CE-FD33-0835-95CD-4A0BE2013F80}"/>
-          </ac:cxnSpMkLst>
-        </pc:cxnChg>
-        <pc:cxnChg chg="add mod">
-          <ac:chgData name="Fatima Pillosu" userId="a6295d4dc9e22643" providerId="LiveId" clId="{A2BAD573-0810-4F62-955B-09910E5A090C}" dt="2025-06-24T15:28:23.900" v="3324" actId="1038"/>
-          <ac:cxnSpMkLst>
-            <pc:docMk/>
-            <pc:sldMk cId="3354384854" sldId="256"/>
-            <ac:cxnSpMk id="35" creationId="{7EF61BF4-0D6D-5F88-43D7-D8C8E3B0885C}"/>
-          </ac:cxnSpMkLst>
-        </pc:cxnChg>
-        <pc:cxnChg chg="add mod">
-          <ac:chgData name="Fatima Pillosu" userId="a6295d4dc9e22643" providerId="LiveId" clId="{A2BAD573-0810-4F62-955B-09910E5A090C}" dt="2025-06-24T15:28:23.900" v="3324" actId="1038"/>
-          <ac:cxnSpMkLst>
-            <pc:docMk/>
-            <pc:sldMk cId="3354384854" sldId="256"/>
-            <ac:cxnSpMk id="36" creationId="{FFAE2ACE-ABDC-A2F2-DCB7-F5057E21A66D}"/>
-          </ac:cxnSpMkLst>
-        </pc:cxnChg>
-        <pc:cxnChg chg="add mod">
-          <ac:chgData name="Fatima Pillosu" userId="a6295d4dc9e22643" providerId="LiveId" clId="{A2BAD573-0810-4F62-955B-09910E5A090C}" dt="2025-06-24T15:22:50.361" v="3285" actId="552"/>
-          <ac:cxnSpMkLst>
-            <pc:docMk/>
-            <pc:sldMk cId="3354384854" sldId="256"/>
-            <ac:cxnSpMk id="37" creationId="{5F6D91F5-3338-557F-0CB3-E7DC04EB077C}"/>
-          </ac:cxnSpMkLst>
-        </pc:cxnChg>
-        <pc:cxnChg chg="add mod">
-          <ac:chgData name="Fatima Pillosu" userId="a6295d4dc9e22643" providerId="LiveId" clId="{A2BAD573-0810-4F62-955B-09910E5A090C}" dt="2025-06-24T14:43:14.082" v="3228" actId="1035"/>
-          <ac:cxnSpMkLst>
-            <pc:docMk/>
-            <pc:sldMk cId="3354384854" sldId="256"/>
-            <ac:cxnSpMk id="38" creationId="{EC6CF449-A72A-A019-7618-C21BAA994F09}"/>
-          </ac:cxnSpMkLst>
-        </pc:cxnChg>
-        <pc:cxnChg chg="add mod">
-          <ac:chgData name="Fatima Pillosu" userId="a6295d4dc9e22643" providerId="LiveId" clId="{A2BAD573-0810-4F62-955B-09910E5A090C}" dt="2025-06-24T14:43:14.082" v="3228" actId="1035"/>
-          <ac:cxnSpMkLst>
-            <pc:docMk/>
-            <pc:sldMk cId="3354384854" sldId="256"/>
-            <ac:cxnSpMk id="39" creationId="{CB73C3F9-D34E-5387-D738-F027F9F21D82}"/>
-          </ac:cxnSpMkLst>
-        </pc:cxnChg>
-        <pc:cxnChg chg="add mod">
-          <ac:chgData name="Fatima Pillosu" userId="a6295d4dc9e22643" providerId="LiveId" clId="{A2BAD573-0810-4F62-955B-09910E5A090C}" dt="2025-06-24T15:33:10.082" v="3326" actId="14100"/>
-          <ac:cxnSpMkLst>
-            <pc:docMk/>
-            <pc:sldMk cId="3354384854" sldId="256"/>
-            <ac:cxnSpMk id="40" creationId="{FB0CCEB5-3FCE-544B-3DA3-C04064EA44E6}"/>
-          </ac:cxnSpMkLst>
-        </pc:cxnChg>
-        <pc:cxnChg chg="add mod">
-          <ac:chgData name="Fatima Pillosu" userId="a6295d4dc9e22643" providerId="LiveId" clId="{A2BAD573-0810-4F62-955B-09910E5A090C}" dt="2025-06-24T15:28:23.900" v="3324" actId="1038"/>
-          <ac:cxnSpMkLst>
-            <pc:docMk/>
-            <pc:sldMk cId="3354384854" sldId="256"/>
             <ac:cxnSpMk id="41" creationId="{BF7F9AE8-B09C-0594-6E08-D8E9EDCA7F9C}"/>
           </ac:cxnSpMkLst>
         </pc:cxnChg>
@@ -1067,7 +1083,7 @@
           </ac:cxnSpMkLst>
         </pc:cxnChg>
         <pc:cxnChg chg="add mod">
-          <ac:chgData name="Fatima Pillosu" userId="a6295d4dc9e22643" providerId="LiveId" clId="{A2BAD573-0810-4F62-955B-09910E5A090C}" dt="2025-06-24T14:43:14.082" v="3228" actId="1035"/>
+          <ac:chgData name="Fatima Pillosu" userId="a6295d4dc9e22643" providerId="LiveId" clId="{A2BAD573-0810-4F62-955B-09910E5A090C}" dt="2025-06-25T09:24:31.713" v="3984" actId="1036"/>
           <ac:cxnSpMkLst>
             <pc:docMk/>
             <pc:sldMk cId="3354384854" sldId="256"/>
@@ -1075,7 +1091,7 @@
           </ac:cxnSpMkLst>
         </pc:cxnChg>
         <pc:cxnChg chg="add mod">
-          <ac:chgData name="Fatima Pillosu" userId="a6295d4dc9e22643" providerId="LiveId" clId="{A2BAD573-0810-4F62-955B-09910E5A090C}" dt="2025-06-24T14:43:23.640" v="3230" actId="1076"/>
+          <ac:chgData name="Fatima Pillosu" userId="a6295d4dc9e22643" providerId="LiveId" clId="{A2BAD573-0810-4F62-955B-09910E5A090C}" dt="2025-06-25T09:24:31.713" v="3984" actId="1036"/>
           <ac:cxnSpMkLst>
             <pc:docMk/>
             <pc:sldMk cId="3354384854" sldId="256"/>
@@ -1083,7 +1099,7 @@
           </ac:cxnSpMkLst>
         </pc:cxnChg>
         <pc:cxnChg chg="add mod">
-          <ac:chgData name="Fatima Pillosu" userId="a6295d4dc9e22643" providerId="LiveId" clId="{A2BAD573-0810-4F62-955B-09910E5A090C}" dt="2025-06-24T14:43:14.082" v="3228" actId="1035"/>
+          <ac:chgData name="Fatima Pillosu" userId="a6295d4dc9e22643" providerId="LiveId" clId="{A2BAD573-0810-4F62-955B-09910E5A090C}" dt="2025-06-25T09:24:19.096" v="3982" actId="1036"/>
           <ac:cxnSpMkLst>
             <pc:docMk/>
             <pc:sldMk cId="3354384854" sldId="256"/>
@@ -1091,7 +1107,7 @@
           </ac:cxnSpMkLst>
         </pc:cxnChg>
         <pc:cxnChg chg="add mod">
-          <ac:chgData name="Fatima Pillosu" userId="a6295d4dc9e22643" providerId="LiveId" clId="{A2BAD573-0810-4F62-955B-09910E5A090C}" dt="2025-06-24T15:27:07.200" v="3311" actId="1037"/>
+          <ac:chgData name="Fatima Pillosu" userId="a6295d4dc9e22643" providerId="LiveId" clId="{A2BAD573-0810-4F62-955B-09910E5A090C}" dt="2025-06-25T09:24:31.713" v="3984" actId="1036"/>
           <ac:cxnSpMkLst>
             <pc:docMk/>
             <pc:sldMk cId="3354384854" sldId="256"/>
@@ -1099,7 +1115,7 @@
           </ac:cxnSpMkLst>
         </pc:cxnChg>
         <pc:cxnChg chg="add mod">
-          <ac:chgData name="Fatima Pillosu" userId="a6295d4dc9e22643" providerId="LiveId" clId="{A2BAD573-0810-4F62-955B-09910E5A090C}" dt="2025-06-24T15:27:07.200" v="3311" actId="1037"/>
+          <ac:chgData name="Fatima Pillosu" userId="a6295d4dc9e22643" providerId="LiveId" clId="{A2BAD573-0810-4F62-955B-09910E5A090C}" dt="2025-06-25T09:24:31.713" v="3984" actId="1036"/>
           <ac:cxnSpMkLst>
             <pc:docMk/>
             <pc:sldMk cId="3354384854" sldId="256"/>
@@ -1107,7 +1123,7 @@
           </ac:cxnSpMkLst>
         </pc:cxnChg>
         <pc:cxnChg chg="add mod">
-          <ac:chgData name="Fatima Pillosu" userId="a6295d4dc9e22643" providerId="LiveId" clId="{A2BAD573-0810-4F62-955B-09910E5A090C}" dt="2025-06-24T15:27:07.200" v="3311" actId="1037"/>
+          <ac:chgData name="Fatima Pillosu" userId="a6295d4dc9e22643" providerId="LiveId" clId="{A2BAD573-0810-4F62-955B-09910E5A090C}" dt="2025-06-25T09:24:19.096" v="3982" actId="1036"/>
           <ac:cxnSpMkLst>
             <pc:docMk/>
             <pc:sldMk cId="3354384854" sldId="256"/>
@@ -1162,8 +1178,8 @@
             <ac:cxnSpMk id="589" creationId="{64E0B42D-33CD-9DB7-1A96-EC8F2365DD9B}"/>
           </ac:cxnSpMkLst>
         </pc:cxnChg>
-        <pc:cxnChg chg="add mod">
-          <ac:chgData name="Fatima Pillosu" userId="a6295d4dc9e22643" providerId="LiveId" clId="{A2BAD573-0810-4F62-955B-09910E5A090C}" dt="2025-06-24T15:26:52.106" v="3310" actId="1037"/>
+        <pc:cxnChg chg="add del mod">
+          <ac:chgData name="Fatima Pillosu" userId="a6295d4dc9e22643" providerId="LiveId" clId="{A2BAD573-0810-4F62-955B-09910E5A090C}" dt="2025-06-25T09:22:05.823" v="3963" actId="478"/>
           <ac:cxnSpMkLst>
             <pc:docMk/>
             <pc:sldMk cId="3354384854" sldId="256"/>
@@ -1184,6 +1200,22 @@
             <pc:docMk/>
             <pc:sldMk cId="3354384854" sldId="256"/>
             <ac:cxnSpMk id="606" creationId="{6CB7B81B-5109-0F90-8535-F07B6C5F2959}"/>
+          </ac:cxnSpMkLst>
+        </pc:cxnChg>
+        <pc:cxnChg chg="add del mod">
+          <ac:chgData name="Fatima Pillosu" userId="a6295d4dc9e22643" providerId="LiveId" clId="{A2BAD573-0810-4F62-955B-09910E5A090C}" dt="2025-06-25T09:22:10.127" v="3964" actId="478"/>
+          <ac:cxnSpMkLst>
+            <pc:docMk/>
+            <pc:sldMk cId="3354384854" sldId="256"/>
+            <ac:cxnSpMk id="607" creationId="{B9C8698E-4772-D8E3-F440-8CE6BAEB78CA}"/>
+          </ac:cxnSpMkLst>
+        </pc:cxnChg>
+        <pc:cxnChg chg="add del mod">
+          <ac:chgData name="Fatima Pillosu" userId="a6295d4dc9e22643" providerId="LiveId" clId="{A2BAD573-0810-4F62-955B-09910E5A090C}" dt="2025-06-25T09:22:11.187" v="3965" actId="478"/>
+          <ac:cxnSpMkLst>
+            <pc:docMk/>
+            <pc:sldMk cId="3354384854" sldId="256"/>
+            <ac:cxnSpMk id="608" creationId="{772F8394-F72D-7D2A-4BD8-16DAEE65E091}"/>
           </ac:cxnSpMkLst>
         </pc:cxnChg>
         <pc:cxnChg chg="add mod">
@@ -1195,6 +1227,22 @@
           </ac:cxnSpMkLst>
         </pc:cxnChg>
         <pc:cxnChg chg="add mod">
+          <ac:chgData name="Fatima Pillosu" userId="a6295d4dc9e22643" providerId="LiveId" clId="{A2BAD573-0810-4F62-955B-09910E5A090C}" dt="2025-06-25T09:37:05.539" v="4267" actId="1037"/>
+          <ac:cxnSpMkLst>
+            <pc:docMk/>
+            <pc:sldMk cId="3354384854" sldId="256"/>
+            <ac:cxnSpMk id="612" creationId="{B2B3E56F-554A-5E2F-BD2B-EE97B8BA0A19}"/>
+          </ac:cxnSpMkLst>
+        </pc:cxnChg>
+        <pc:cxnChg chg="add mod">
+          <ac:chgData name="Fatima Pillosu" userId="a6295d4dc9e22643" providerId="LiveId" clId="{A2BAD573-0810-4F62-955B-09910E5A090C}" dt="2025-06-25T09:36:55.410" v="4266" actId="208"/>
+          <ac:cxnSpMkLst>
+            <pc:docMk/>
+            <pc:sldMk cId="3354384854" sldId="256"/>
+            <ac:cxnSpMk id="614" creationId="{53707EF6-4113-8C02-A876-2D1A7D58AF34}"/>
+          </ac:cxnSpMkLst>
+        </pc:cxnChg>
+        <pc:cxnChg chg="add mod">
           <ac:chgData name="Fatima Pillosu" userId="a6295d4dc9e22643" providerId="LiveId" clId="{A2BAD573-0810-4F62-955B-09910E5A090C}" dt="2025-06-24T14:06:44.630" v="2276" actId="571"/>
           <ac:cxnSpMkLst>
             <pc:docMk/>
@@ -1203,15 +1251,23 @@
           </ac:cxnSpMkLst>
         </pc:cxnChg>
         <pc:cxnChg chg="add mod">
-          <ac:chgData name="Fatima Pillosu" userId="a6295d4dc9e22643" providerId="LiveId" clId="{A2BAD573-0810-4F62-955B-09910E5A090C}" dt="2025-06-24T15:27:07.200" v="3311" actId="1037"/>
+          <ac:chgData name="Fatima Pillosu" userId="a6295d4dc9e22643" providerId="LiveId" clId="{A2BAD573-0810-4F62-955B-09910E5A090C}" dt="2025-06-25T09:37:08.419" v="4268" actId="1037"/>
+          <ac:cxnSpMkLst>
+            <pc:docMk/>
+            <pc:sldMk cId="3354384854" sldId="256"/>
+            <ac:cxnSpMk id="615" creationId="{C5F1E0C1-C530-28A6-51F0-44C8AF77781F}"/>
+          </ac:cxnSpMkLst>
+        </pc:cxnChg>
+        <pc:cxnChg chg="add del mod">
+          <ac:chgData name="Fatima Pillosu" userId="a6295d4dc9e22643" providerId="LiveId" clId="{A2BAD573-0810-4F62-955B-09910E5A090C}" dt="2025-06-25T09:16:30.097" v="3868" actId="478"/>
           <ac:cxnSpMkLst>
             <pc:docMk/>
             <pc:sldMk cId="3354384854" sldId="256"/>
             <ac:cxnSpMk id="625" creationId="{8D3ABB54-3578-DB9D-CAFB-16D8E140993B}"/>
           </ac:cxnSpMkLst>
         </pc:cxnChg>
-        <pc:cxnChg chg="add mod ord">
-          <ac:chgData name="Fatima Pillosu" userId="a6295d4dc9e22643" providerId="LiveId" clId="{A2BAD573-0810-4F62-955B-09910E5A090C}" dt="2025-06-24T15:31:36.742" v="3325" actId="166"/>
+        <pc:cxnChg chg="add del mod ord">
+          <ac:chgData name="Fatima Pillosu" userId="a6295d4dc9e22643" providerId="LiveId" clId="{A2BAD573-0810-4F62-955B-09910E5A090C}" dt="2025-06-25T09:16:31.008" v="3869" actId="478"/>
           <ac:cxnSpMkLst>
             <pc:docMk/>
             <pc:sldMk cId="3354384854" sldId="256"/>
@@ -8887,19 +8943,6 @@
           <a:p>
             <a:pPr algn="ctr"/>
             <a:r>
-              <a:rPr lang="en-GB" sz="1000">
-                <a:solidFill>
-                  <a:schemeClr val="tx1">
-                    <a:lumMod val="75000"/>
-                    <a:lumOff val="25000"/>
-                  </a:schemeClr>
-                </a:solidFill>
-                <a:latin typeface="Calibri Light" panose="020F0302020204030204" pitchFamily="34" charset="0"/>
-                <a:cs typeface="Calibri Light" panose="020F0302020204030204" pitchFamily="34" charset="0"/>
-              </a:rPr>
-              <a:t>Integrated Experimental </a:t>
-            </a:r>
-            <a:r>
               <a:rPr lang="en-GB" sz="1000" dirty="0">
                 <a:solidFill>
                   <a:schemeClr val="tx1">
@@ -8910,31 +8953,8 @@
                 <a:latin typeface="Calibri Light" panose="020F0302020204030204" pitchFamily="34" charset="0"/>
                 <a:cs typeface="Calibri Light" panose="020F0302020204030204" pitchFamily="34" charset="0"/>
               </a:rPr>
-              <a:t>S</a:t>
+              <a:t>Integrated Experimental Strategy</a:t>
             </a:r>
-            <a:r>
-              <a:rPr lang="en-GB" sz="1000">
-                <a:solidFill>
-                  <a:schemeClr val="tx1">
-                    <a:lumMod val="75000"/>
-                    <a:lumOff val="25000"/>
-                  </a:schemeClr>
-                </a:solidFill>
-                <a:latin typeface="Calibri Light" panose="020F0302020204030204" pitchFamily="34" charset="0"/>
-                <a:cs typeface="Calibri Light" panose="020F0302020204030204" pitchFamily="34" charset="0"/>
-              </a:rPr>
-              <a:t>trategy</a:t>
-            </a:r>
-            <a:endParaRPr lang="en-GB" sz="1000" dirty="0">
-              <a:solidFill>
-                <a:schemeClr val="tx1">
-                  <a:lumMod val="75000"/>
-                  <a:lumOff val="25000"/>
-                </a:schemeClr>
-              </a:solidFill>
-              <a:latin typeface="Calibri Light" panose="020F0302020204030204" pitchFamily="34" charset="0"/>
-              <a:cs typeface="Calibri Light" panose="020F0302020204030204" pitchFamily="34" charset="0"/>
-            </a:endParaRPr>
           </a:p>
         </p:txBody>
       </p:sp>
@@ -8997,7 +9017,7 @@
         </p:nvSpPr>
         <p:spPr>
           <a:xfrm>
-            <a:off x="291151" y="2421540"/>
+            <a:off x="291151" y="2423543"/>
             <a:ext cx="1317993" cy="584775"/>
           </a:xfrm>
           <a:prstGeom prst="rect">
@@ -9046,8 +9066,8 @@
         </p:nvSpPr>
         <p:spPr>
           <a:xfrm>
-            <a:off x="1576951" y="2423083"/>
-            <a:ext cx="1311683" cy="584775"/>
+            <a:off x="1576951" y="2361987"/>
+            <a:ext cx="1311683" cy="707886"/>
           </a:xfrm>
           <a:prstGeom prst="rect">
             <a:avLst/>
@@ -9069,7 +9089,7 @@
                 <a:latin typeface="Calibri" panose="020F0502020204030204" pitchFamily="34" charset="0"/>
                 <a:cs typeface="Calibri" panose="020F0502020204030204" pitchFamily="34" charset="0"/>
               </a:rPr>
-              <a:t>Data-driven predictions of areas at risk of flash flood: from short- to medium-range lead times</a:t>
+              <a:t>Data-driven hydro-meteorological predictions of areas at risk of flash flood: from short- to medium-range lead times</a:t>
             </a:r>
             <a:endParaRPr lang="en-GB" sz="800" dirty="0">
               <a:solidFill>
@@ -9095,8 +9115,8 @@
         </p:nvSpPr>
         <p:spPr>
           <a:xfrm>
-            <a:off x="2853347" y="2361257"/>
-            <a:ext cx="1293626" cy="707886"/>
+            <a:off x="2853347" y="2423543"/>
+            <a:ext cx="1293626" cy="584775"/>
           </a:xfrm>
           <a:prstGeom prst="rect">
             <a:avLst/>
@@ -9118,7 +9138,7 @@
                 <a:latin typeface="Calibri Light" panose="020F0302020204030204" pitchFamily="34" charset="0"/>
                 <a:cs typeface="Calibri Light" panose="020F0302020204030204" pitchFamily="34" charset="0"/>
               </a:rPr>
-              <a:t>Towards predictions over a continuous global domain: global implementation of the regionally-trained models</a:t>
+              <a:t>Towards predictions over a continuous global domain: global implementation of regionally-trained models</a:t>
             </a:r>
             <a:endParaRPr lang="en-GB" sz="800" b="1" dirty="0">
               <a:solidFill>
@@ -9618,7 +9638,7 @@
         </p:nvSpPr>
         <p:spPr>
           <a:xfrm>
-            <a:off x="1612318" y="2355470"/>
+            <a:off x="1612318" y="2356661"/>
             <a:ext cx="1224000" cy="720000"/>
           </a:xfrm>
           <a:prstGeom prst="rect">
@@ -10098,7 +10118,7 @@
         </p:nvCxnSpPr>
         <p:spPr>
           <a:xfrm>
-            <a:off x="1170641" y="5222062"/>
+            <a:off x="1170641" y="5411845"/>
             <a:ext cx="0" cy="144000"/>
           </a:xfrm>
           <a:prstGeom prst="line">
@@ -10145,7 +10165,7 @@
         </p:nvCxnSpPr>
         <p:spPr>
           <a:xfrm>
-            <a:off x="1170641" y="5367300"/>
+            <a:off x="1170641" y="5557083"/>
             <a:ext cx="853515" cy="0"/>
           </a:xfrm>
           <a:prstGeom prst="line">
@@ -10192,7 +10212,7 @@
         </p:nvCxnSpPr>
         <p:spPr>
           <a:xfrm>
-            <a:off x="2017766" y="5222062"/>
+            <a:off x="2017766" y="5411845"/>
             <a:ext cx="0" cy="144000"/>
           </a:xfrm>
           <a:prstGeom prst="line">
@@ -11591,8 +11611,8 @@
         </p:nvCxnSpPr>
         <p:spPr>
           <a:xfrm>
-            <a:off x="691194" y="5222062"/>
-            <a:ext cx="0" cy="308616"/>
+            <a:off x="691194" y="5411845"/>
+            <a:ext cx="0" cy="199347"/>
           </a:xfrm>
           <a:prstGeom prst="line">
             <a:avLst/>
@@ -11638,7 +11658,7 @@
         </p:nvCxnSpPr>
         <p:spPr>
           <a:xfrm>
-            <a:off x="691194" y="5530678"/>
+            <a:off x="691194" y="5611192"/>
             <a:ext cx="3067430" cy="0"/>
           </a:xfrm>
           <a:prstGeom prst="line">
@@ -11684,9 +11704,9 @@
           <p:nvPr/>
         </p:nvCxnSpPr>
         <p:spPr>
-          <a:xfrm flipH="1">
-            <a:off x="3758434" y="5222062"/>
-            <a:ext cx="1294" cy="302289"/>
+          <a:xfrm>
+            <a:off x="3759728" y="5411845"/>
+            <a:ext cx="0" cy="199347"/>
           </a:xfrm>
           <a:prstGeom prst="line">
             <a:avLst/>
@@ -11734,7 +11754,7 @@
         </p:nvCxnSpPr>
         <p:spPr>
           <a:xfrm>
-            <a:off x="2452633" y="5222062"/>
+            <a:off x="2452633" y="5411845"/>
             <a:ext cx="0" cy="144000"/>
           </a:xfrm>
           <a:prstGeom prst="line">
@@ -11781,7 +11801,7 @@
         </p:nvCxnSpPr>
         <p:spPr>
           <a:xfrm>
-            <a:off x="2453648" y="5367300"/>
+            <a:off x="2442146" y="5557083"/>
             <a:ext cx="840291" cy="0"/>
           </a:xfrm>
           <a:prstGeom prst="line">
@@ -11828,8 +11848,8 @@
         </p:nvCxnSpPr>
         <p:spPr>
           <a:xfrm>
-            <a:off x="3293939" y="5222062"/>
-            <a:ext cx="1294" cy="144000"/>
+            <a:off x="3293940" y="5404927"/>
+            <a:ext cx="0" cy="150918"/>
           </a:xfrm>
           <a:prstGeom prst="line">
             <a:avLst/>
@@ -12054,8 +12074,8 @@
         </p:nvSpPr>
         <p:spPr>
           <a:xfrm>
-            <a:off x="494383" y="3177081"/>
-            <a:ext cx="1106260" cy="830997"/>
+            <a:off x="475931" y="3139936"/>
+            <a:ext cx="1106260" cy="954107"/>
           </a:xfrm>
           <a:prstGeom prst="rect">
             <a:avLst/>
@@ -12077,7 +12097,7 @@
                 <a:latin typeface="Calibri" panose="020F0502020204030204" pitchFamily="34" charset="0"/>
                 <a:cs typeface="Calibri" panose="020F0502020204030204" pitchFamily="34" charset="0"/>
               </a:rPr>
-              <a:t>Can global NWP rainfall forecasts successfully identify areas at risk of flash floods up to medium-range lead times? </a:t>
+              <a:t>Can post-processed global NWP rainfall forecasts successfully identify areas at risk of flash floods up to medium-range lead times? </a:t>
             </a:r>
           </a:p>
         </p:txBody>
@@ -12097,7 +12117,7 @@
         <p:spPr>
           <a:xfrm>
             <a:off x="336475" y="3075470"/>
-            <a:ext cx="225929" cy="1075908"/>
+            <a:ext cx="198000" cy="1075908"/>
           </a:xfrm>
           <a:prstGeom prst="rect">
             <a:avLst/>
@@ -12222,8 +12242,8 @@
         </p:nvSpPr>
         <p:spPr>
           <a:xfrm>
-            <a:off x="336475" y="4141574"/>
-            <a:ext cx="225929" cy="1075908"/>
+            <a:off x="336475" y="4156165"/>
+            <a:ext cx="198000" cy="1251853"/>
           </a:xfrm>
           <a:prstGeom prst="rect">
             <a:avLst/>
@@ -12262,7 +12282,7 @@
                   <a:schemeClr val="bg1"/>
                 </a:solidFill>
               </a:rPr>
-              <a:t>Main output(s)</a:t>
+              <a:t>Contribution to knowledge</a:t>
             </a:r>
             <a:endParaRPr lang="en-GB" sz="800" dirty="0">
               <a:solidFill>
@@ -12286,8 +12306,8 @@
         </p:nvSpPr>
         <p:spPr>
           <a:xfrm>
-            <a:off x="336475" y="4140163"/>
-            <a:ext cx="1224000" cy="1071000"/>
+            <a:off x="336475" y="4145913"/>
+            <a:ext cx="1224000" cy="1253267"/>
           </a:xfrm>
           <a:prstGeom prst="rect">
             <a:avLst/>
@@ -12348,8 +12368,8 @@
         </p:nvSpPr>
         <p:spPr>
           <a:xfrm>
-            <a:off x="470245" y="4139501"/>
-            <a:ext cx="1157044" cy="1077218"/>
+            <a:off x="448192" y="4115279"/>
+            <a:ext cx="1188918" cy="1323439"/>
           </a:xfrm>
           <a:prstGeom prst="rect">
             <a:avLst/>
@@ -12364,59 +12384,38 @@
           <a:p>
             <a:pPr algn="ctr"/>
             <a:r>
-              <a:rPr lang="en-GB" sz="800" dirty="0">
+              <a:rPr lang="en-US" sz="800" dirty="0">
                 <a:solidFill>
                   <a:srgbClr val="FF595E"/>
                 </a:solidFill>
                 <a:latin typeface="Calibri" panose="020F0502020204030204" pitchFamily="34" charset="0"/>
                 <a:cs typeface="Calibri" panose="020F0502020204030204" pitchFamily="34" charset="0"/>
               </a:rPr>
-              <a:t>Development of a flash-flood-focused verification framework to assess predictions of areas at risk of flash floods &amp; performance benchmark of rainfall-based predictions.</a:t>
+              <a:t>Development of a </a:t>
             </a:r>
+          </a:p>
+          <a:p>
+            <a:pPr algn="ctr"/>
+            <a:r>
+              <a:rPr lang="en-US" sz="800" dirty="0">
+                <a:solidFill>
+                  <a:srgbClr val="FF595E"/>
+                </a:solidFill>
+                <a:latin typeface="Calibri" panose="020F0502020204030204" pitchFamily="34" charset="0"/>
+                <a:cs typeface="Calibri" panose="020F0502020204030204" pitchFamily="34" charset="0"/>
+              </a:rPr>
+              <a:t>flash-flood-focused verification framework &amp; benchmark rainfall-based predictions performance for comparative assessment against more sophisticated predictions.</a:t>
+            </a:r>
+            <a:endParaRPr lang="en-GB" sz="800" dirty="0">
+              <a:solidFill>
+                <a:srgbClr val="FF595E"/>
+              </a:solidFill>
+              <a:latin typeface="Calibri" panose="020F0502020204030204" pitchFamily="34" charset="0"/>
+              <a:cs typeface="Calibri" panose="020F0502020204030204" pitchFamily="34" charset="0"/>
+            </a:endParaRPr>
           </a:p>
         </p:txBody>
       </p:sp>
-      <p:cxnSp>
-        <p:nvCxnSpPr>
-          <p:cNvPr id="600" name="Straight Connector 599">
-            <a:extLst>
-              <a:ext uri="{FF2B5EF4-FFF2-40B4-BE49-F238E27FC236}">
-                <a16:creationId xmlns:a16="http://schemas.microsoft.com/office/drawing/2014/main" id="{819F8CCD-C29E-8357-6312-BBEE6D3C0A11}"/>
-              </a:ext>
-            </a:extLst>
-          </p:cNvPr>
-          <p:cNvCxnSpPr/>
-          <p:nvPr/>
-        </p:nvCxnSpPr>
-        <p:spPr>
-          <a:xfrm flipH="1">
-            <a:off x="319086" y="4140163"/>
-            <a:ext cx="225929" cy="0"/>
-          </a:xfrm>
-          <a:prstGeom prst="line">
-            <a:avLst/>
-          </a:prstGeom>
-          <a:ln w="28575">
-            <a:solidFill>
-              <a:schemeClr val="bg1"/>
-            </a:solidFill>
-          </a:ln>
-        </p:spPr>
-        <p:style>
-          <a:lnRef idx="2">
-            <a:schemeClr val="accent1"/>
-          </a:lnRef>
-          <a:fillRef idx="0">
-            <a:schemeClr val="accent1"/>
-          </a:fillRef>
-          <a:effectRef idx="1">
-            <a:schemeClr val="accent1"/>
-          </a:effectRef>
-          <a:fontRef idx="minor">
-            <a:schemeClr val="tx1"/>
-          </a:fontRef>
-        </p:style>
-      </p:cxnSp>
       <p:sp>
         <p:nvSpPr>
           <p:cNvPr id="619" name="Rectangle 618">
@@ -12432,7 +12431,7 @@
         <p:spPr>
           <a:xfrm>
             <a:off x="1612318" y="3075470"/>
-            <a:ext cx="225929" cy="1075908"/>
+            <a:ext cx="198000" cy="1075908"/>
           </a:xfrm>
           <a:prstGeom prst="rect">
             <a:avLst/>
@@ -12545,70 +12544,6 @@
       </p:sp>
       <p:sp>
         <p:nvSpPr>
-          <p:cNvPr id="622" name="Rectangle 621">
-            <a:extLst>
-              <a:ext uri="{FF2B5EF4-FFF2-40B4-BE49-F238E27FC236}">
-                <a16:creationId xmlns:a16="http://schemas.microsoft.com/office/drawing/2014/main" id="{13B3834E-4847-5F31-F576-AEF55FC855FA}"/>
-              </a:ext>
-            </a:extLst>
-          </p:cNvPr>
-          <p:cNvSpPr/>
-          <p:nvPr/>
-        </p:nvSpPr>
-        <p:spPr>
-          <a:xfrm>
-            <a:off x="1612318" y="4141574"/>
-            <a:ext cx="225929" cy="1075908"/>
-          </a:xfrm>
-          <a:prstGeom prst="rect">
-            <a:avLst/>
-          </a:prstGeom>
-          <a:solidFill>
-            <a:srgbClr val="E68301"/>
-          </a:solidFill>
-          <a:ln>
-            <a:noFill/>
-          </a:ln>
-        </p:spPr>
-        <p:style>
-          <a:lnRef idx="2">
-            <a:schemeClr val="accent1">
-              <a:shade val="15000"/>
-            </a:schemeClr>
-          </a:lnRef>
-          <a:fillRef idx="1">
-            <a:schemeClr val="accent1"/>
-          </a:fillRef>
-          <a:effectRef idx="0">
-            <a:schemeClr val="accent1"/>
-          </a:effectRef>
-          <a:fontRef idx="minor">
-            <a:schemeClr val="lt1"/>
-          </a:fontRef>
-        </p:style>
-        <p:txBody>
-          <a:bodyPr vert="vert270" rtlCol="0" anchor="ctr"/>
-          <a:lstStyle/>
-          <a:p>
-            <a:pPr algn="ctr"/>
-            <a:r>
-              <a:rPr lang="en-US" sz="800" dirty="0">
-                <a:solidFill>
-                  <a:schemeClr val="bg1"/>
-                </a:solidFill>
-              </a:rPr>
-              <a:t>Main output(s)</a:t>
-            </a:r>
-            <a:endParaRPr lang="en-GB" sz="800" dirty="0">
-              <a:solidFill>
-                <a:schemeClr val="bg1"/>
-              </a:solidFill>
-            </a:endParaRPr>
-          </a:p>
-        </p:txBody>
-      </p:sp>
-      <p:sp>
-        <p:nvSpPr>
           <p:cNvPr id="623" name="Rectangle 622">
             <a:extLst>
               <a:ext uri="{FF2B5EF4-FFF2-40B4-BE49-F238E27FC236}">
@@ -12621,8 +12556,8 @@
         </p:nvSpPr>
         <p:spPr>
           <a:xfrm>
-            <a:off x="1612318" y="4140163"/>
-            <a:ext cx="1224000" cy="1071000"/>
+            <a:off x="1612318" y="4145913"/>
+            <a:ext cx="1224000" cy="1253524"/>
           </a:xfrm>
           <a:prstGeom prst="rect">
             <a:avLst/>
@@ -12683,8 +12618,8 @@
         </p:nvSpPr>
         <p:spPr>
           <a:xfrm>
-            <a:off x="1739825" y="4195680"/>
-            <a:ext cx="1164773" cy="954107"/>
+            <a:off x="1711318" y="4115279"/>
+            <a:ext cx="1209121" cy="1323439"/>
           </a:xfrm>
           <a:prstGeom prst="rect">
             <a:avLst/>
@@ -12699,61 +12634,25 @@
           <a:p>
             <a:pPr algn="ctr"/>
             <a:r>
-              <a:rPr lang="en-GB" sz="800" dirty="0">
+              <a:rPr lang="en-US" sz="800" dirty="0">
                 <a:solidFill>
                   <a:srgbClr val="E68301"/>
                 </a:solidFill>
                 <a:latin typeface="Calibri" panose="020F0502020204030204" pitchFamily="34" charset="0"/>
                 <a:cs typeface="Calibri" panose="020F0502020204030204" pitchFamily="34" charset="0"/>
               </a:rPr>
-              <a:t>Development of data-driven hydro-meteorological predictions of areas at risk of flash floods up to medium-range lead times (i.e. day 5).</a:t>
+              <a:t>Establishment of feasibility/predictability of medium-range data-driven prediction of areas at risk of flash floods &amp; comparative performance assessment against rainfall-based predictions.</a:t>
             </a:r>
+            <a:endParaRPr lang="en-GB" sz="800" dirty="0">
+              <a:solidFill>
+                <a:srgbClr val="E68301"/>
+              </a:solidFill>
+              <a:latin typeface="Calibri" panose="020F0502020204030204" pitchFamily="34" charset="0"/>
+              <a:cs typeface="Calibri" panose="020F0502020204030204" pitchFamily="34" charset="0"/>
+            </a:endParaRPr>
           </a:p>
         </p:txBody>
       </p:sp>
-      <p:cxnSp>
-        <p:nvCxnSpPr>
-          <p:cNvPr id="625" name="Straight Connector 624">
-            <a:extLst>
-              <a:ext uri="{FF2B5EF4-FFF2-40B4-BE49-F238E27FC236}">
-                <a16:creationId xmlns:a16="http://schemas.microsoft.com/office/drawing/2014/main" id="{8D3ABB54-3578-DB9D-CAFB-16D8E140993B}"/>
-              </a:ext>
-            </a:extLst>
-          </p:cNvPr>
-          <p:cNvCxnSpPr>
-            <a:cxnSpLocks/>
-          </p:cNvCxnSpPr>
-          <p:nvPr/>
-        </p:nvCxnSpPr>
-        <p:spPr>
-          <a:xfrm flipH="1">
-            <a:off x="1612318" y="4134606"/>
-            <a:ext cx="225929" cy="0"/>
-          </a:xfrm>
-          <a:prstGeom prst="line">
-            <a:avLst/>
-          </a:prstGeom>
-          <a:ln w="28575">
-            <a:solidFill>
-              <a:schemeClr val="bg1"/>
-            </a:solidFill>
-          </a:ln>
-        </p:spPr>
-        <p:style>
-          <a:lnRef idx="2">
-            <a:schemeClr val="accent1"/>
-          </a:lnRef>
-          <a:fillRef idx="0">
-            <a:schemeClr val="accent1"/>
-          </a:fillRef>
-          <a:effectRef idx="1">
-            <a:schemeClr val="accent1"/>
-          </a:effectRef>
-          <a:fontRef idx="minor">
-            <a:schemeClr val="tx1"/>
-          </a:fontRef>
-        </p:style>
-      </p:cxnSp>
       <p:sp>
         <p:nvSpPr>
           <p:cNvPr id="626" name="TextBox 625">
@@ -12768,8 +12667,8 @@
         </p:nvSpPr>
         <p:spPr>
           <a:xfrm>
-            <a:off x="1785732" y="3075654"/>
-            <a:ext cx="1072961" cy="1077218"/>
+            <a:off x="1729917" y="3078380"/>
+            <a:ext cx="1164772" cy="1077218"/>
           </a:xfrm>
           <a:prstGeom prst="rect">
             <a:avLst/>
@@ -12791,7 +12690,7 @@
                 <a:latin typeface="Calibri" panose="020F0502020204030204" pitchFamily="34" charset="0"/>
                 <a:cs typeface="Calibri" panose="020F0502020204030204" pitchFamily="34" charset="0"/>
               </a:rPr>
-              <a:t>What is the potential for hydro-meteorological reanalysis to develop medium-range data-driven predictions of areas at risk of flash floods? </a:t>
+              <a:t>Are medium-range data-driven hydro-met predictions of areas at risk of flash floods feasible with global reanalysis, forecasts, and impact flash flood reports?</a:t>
             </a:r>
             <a:endParaRPr lang="en-GB" sz="800" dirty="0">
               <a:solidFill>
@@ -12879,8 +12778,8 @@
         </p:nvSpPr>
         <p:spPr>
           <a:xfrm>
-            <a:off x="2888160" y="4140163"/>
-            <a:ext cx="1224000" cy="1071000"/>
+            <a:off x="2888160" y="4145913"/>
+            <a:ext cx="1224000" cy="1253263"/>
           </a:xfrm>
           <a:prstGeom prst="rect">
             <a:avLst/>
@@ -12941,7 +12840,7 @@
         </p:nvSpPr>
         <p:spPr>
           <a:xfrm>
-            <a:off x="3030825" y="3073659"/>
+            <a:off x="3012288" y="3078380"/>
             <a:ext cx="1153410" cy="1077218"/>
           </a:xfrm>
           <a:prstGeom prst="rect">
@@ -12990,8 +12889,8 @@
         </p:nvSpPr>
         <p:spPr>
           <a:xfrm>
-            <a:off x="3030825" y="4139501"/>
-            <a:ext cx="1153410" cy="1077218"/>
+            <a:off x="3015419" y="4115279"/>
+            <a:ext cx="1153410" cy="1323439"/>
           </a:xfrm>
           <a:prstGeom prst="rect">
             <a:avLst/>
@@ -13013,7 +12912,7 @@
                 <a:latin typeface="Calibri" panose="020F0502020204030204" pitchFamily="34" charset="0"/>
                 <a:cs typeface="Calibri" panose="020F0502020204030204" pitchFamily="34" charset="0"/>
               </a:rPr>
-              <a:t>Systematic empirical evaluation of training data strategies for global predictions of areas at risk of flash floods under varying spatial coverage and data density scenarios.</a:t>
+              <a:t>Systematic empirical sensitivity analysis of training data strategies for global predictions of areas at risk of flash floods under coverage-density trade-off &amp; predictions assessment outside the training domain.</a:t>
             </a:r>
             <a:endParaRPr lang="en-GB" sz="800" dirty="0">
               <a:solidFill>
@@ -13102,7 +13001,7 @@
         <p:spPr>
           <a:xfrm>
             <a:off x="2888160" y="3080043"/>
-            <a:ext cx="225929" cy="1075908"/>
+            <a:ext cx="198000" cy="1075908"/>
           </a:xfrm>
           <a:prstGeom prst="rect">
             <a:avLst/>
@@ -13153,10 +13052,10 @@
       </p:sp>
       <p:sp>
         <p:nvSpPr>
-          <p:cNvPr id="629" name="Rectangle 628">
+          <p:cNvPr id="609" name="Rectangle 608">
             <a:extLst>
               <a:ext uri="{FF2B5EF4-FFF2-40B4-BE49-F238E27FC236}">
-                <a16:creationId xmlns:a16="http://schemas.microsoft.com/office/drawing/2014/main" id="{664DEE3E-A67E-9A1D-8BBC-143BFF6A908D}"/>
+                <a16:creationId xmlns:a16="http://schemas.microsoft.com/office/drawing/2014/main" id="{6DB2AC2D-5A6E-63D5-4BCE-B9DFE6CB36AE}"/>
               </a:ext>
             </a:extLst>
           </p:cNvPr>
@@ -13165,8 +13064,72 @@
         </p:nvSpPr>
         <p:spPr>
           <a:xfrm>
-            <a:off x="2888160" y="4146147"/>
-            <a:ext cx="225929" cy="1075908"/>
+            <a:off x="1612318" y="4160505"/>
+            <a:ext cx="198000" cy="1251853"/>
+          </a:xfrm>
+          <a:prstGeom prst="rect">
+            <a:avLst/>
+          </a:prstGeom>
+          <a:solidFill>
+            <a:srgbClr val="E68301"/>
+          </a:solidFill>
+          <a:ln>
+            <a:noFill/>
+          </a:ln>
+        </p:spPr>
+        <p:style>
+          <a:lnRef idx="2">
+            <a:schemeClr val="accent1">
+              <a:shade val="15000"/>
+            </a:schemeClr>
+          </a:lnRef>
+          <a:fillRef idx="1">
+            <a:schemeClr val="accent1"/>
+          </a:fillRef>
+          <a:effectRef idx="0">
+            <a:schemeClr val="accent1"/>
+          </a:effectRef>
+          <a:fontRef idx="minor">
+            <a:schemeClr val="lt1"/>
+          </a:fontRef>
+        </p:style>
+        <p:txBody>
+          <a:bodyPr vert="vert270" rtlCol="0" anchor="ctr"/>
+          <a:lstStyle/>
+          <a:p>
+            <a:pPr algn="ctr"/>
+            <a:r>
+              <a:rPr lang="en-US" sz="800" dirty="0">
+                <a:solidFill>
+                  <a:schemeClr val="bg1"/>
+                </a:solidFill>
+              </a:rPr>
+              <a:t>Contribution to knowledge</a:t>
+            </a:r>
+            <a:endParaRPr lang="en-GB" sz="800" dirty="0">
+              <a:solidFill>
+                <a:schemeClr val="bg1"/>
+              </a:solidFill>
+            </a:endParaRPr>
+          </a:p>
+        </p:txBody>
+      </p:sp>
+      <p:sp>
+        <p:nvSpPr>
+          <p:cNvPr id="610" name="Rectangle 609">
+            <a:extLst>
+              <a:ext uri="{FF2B5EF4-FFF2-40B4-BE49-F238E27FC236}">
+                <a16:creationId xmlns:a16="http://schemas.microsoft.com/office/drawing/2014/main" id="{F70C3C62-6550-7988-E9AB-1B2DC4AEE250}"/>
+              </a:ext>
+            </a:extLst>
+          </p:cNvPr>
+          <p:cNvSpPr/>
+          <p:nvPr/>
+        </p:nvSpPr>
+        <p:spPr>
+          <a:xfrm>
+            <a:off x="2888160" y="4160505"/>
+            <a:ext cx="198000" cy="1251853"/>
           </a:xfrm>
           <a:prstGeom prst="rect">
             <a:avLst/>
@@ -13205,7 +13168,7 @@
                   <a:schemeClr val="bg1"/>
                 </a:solidFill>
               </a:rPr>
-              <a:t>Main output(s)</a:t>
+              <a:t>Contribution to knowledge</a:t>
             </a:r>
             <a:endParaRPr lang="en-GB" sz="800" dirty="0">
               <a:solidFill>
@@ -13217,10 +13180,10 @@
       </p:sp>
       <p:cxnSp>
         <p:nvCxnSpPr>
-          <p:cNvPr id="631" name="Straight Connector 630">
+          <p:cNvPr id="612" name="Straight Connector 611">
             <a:extLst>
               <a:ext uri="{FF2B5EF4-FFF2-40B4-BE49-F238E27FC236}">
-                <a16:creationId xmlns:a16="http://schemas.microsoft.com/office/drawing/2014/main" id="{67031B66-C5D2-0FD5-901E-0D61CAC8808F}"/>
+                <a16:creationId xmlns:a16="http://schemas.microsoft.com/office/drawing/2014/main" id="{B2B3E56F-554A-5E2F-BD2B-EE97B8BA0A19}"/>
               </a:ext>
             </a:extLst>
           </p:cNvPr>
@@ -13231,8 +13194,94 @@
         </p:nvCxnSpPr>
         <p:spPr>
           <a:xfrm flipH="1">
-            <a:off x="2879922" y="4139179"/>
-            <a:ext cx="225929" cy="0"/>
+            <a:off x="311444" y="4145059"/>
+            <a:ext cx="216000" cy="0"/>
+          </a:xfrm>
+          <a:prstGeom prst="line">
+            <a:avLst/>
+          </a:prstGeom>
+          <a:ln w="28575">
+            <a:solidFill>
+              <a:schemeClr val="bg1"/>
+            </a:solidFill>
+          </a:ln>
+        </p:spPr>
+        <p:style>
+          <a:lnRef idx="2">
+            <a:schemeClr val="accent1"/>
+          </a:lnRef>
+          <a:fillRef idx="0">
+            <a:schemeClr val="accent1"/>
+          </a:fillRef>
+          <a:effectRef idx="1">
+            <a:schemeClr val="accent1"/>
+          </a:effectRef>
+          <a:fontRef idx="minor">
+            <a:schemeClr val="tx1"/>
+          </a:fontRef>
+        </p:style>
+      </p:cxnSp>
+      <p:cxnSp>
+        <p:nvCxnSpPr>
+          <p:cNvPr id="614" name="Straight Connector 613">
+            <a:extLst>
+              <a:ext uri="{FF2B5EF4-FFF2-40B4-BE49-F238E27FC236}">
+                <a16:creationId xmlns:a16="http://schemas.microsoft.com/office/drawing/2014/main" id="{53707EF6-4113-8C02-A876-2D1A7D58AF34}"/>
+              </a:ext>
+            </a:extLst>
+          </p:cNvPr>
+          <p:cNvCxnSpPr>
+            <a:cxnSpLocks/>
+          </p:cNvCxnSpPr>
+          <p:nvPr/>
+        </p:nvCxnSpPr>
+        <p:spPr>
+          <a:xfrm flipH="1">
+            <a:off x="1593590" y="4145059"/>
+            <a:ext cx="216000" cy="0"/>
+          </a:xfrm>
+          <a:prstGeom prst="line">
+            <a:avLst/>
+          </a:prstGeom>
+          <a:ln w="28575">
+            <a:solidFill>
+              <a:schemeClr val="bg1"/>
+            </a:solidFill>
+          </a:ln>
+        </p:spPr>
+        <p:style>
+          <a:lnRef idx="2">
+            <a:schemeClr val="accent1"/>
+          </a:lnRef>
+          <a:fillRef idx="0">
+            <a:schemeClr val="accent1"/>
+          </a:fillRef>
+          <a:effectRef idx="1">
+            <a:schemeClr val="accent1"/>
+          </a:effectRef>
+          <a:fontRef idx="minor">
+            <a:schemeClr val="tx1"/>
+          </a:fontRef>
+        </p:style>
+      </p:cxnSp>
+      <p:cxnSp>
+        <p:nvCxnSpPr>
+          <p:cNvPr id="615" name="Straight Connector 614">
+            <a:extLst>
+              <a:ext uri="{FF2B5EF4-FFF2-40B4-BE49-F238E27FC236}">
+                <a16:creationId xmlns:a16="http://schemas.microsoft.com/office/drawing/2014/main" id="{C5F1E0C1-C530-28A6-51F0-44C8AF77781F}"/>
+              </a:ext>
+            </a:extLst>
+          </p:cNvPr>
+          <p:cNvCxnSpPr>
+            <a:cxnSpLocks/>
+          </p:cNvCxnSpPr>
+          <p:nvPr/>
+        </p:nvCxnSpPr>
+        <p:spPr>
+          <a:xfrm flipH="1">
+            <a:off x="2865645" y="4145059"/>
+            <a:ext cx="216000" cy="0"/>
           </a:xfrm>
           <a:prstGeom prst="line">
             <a:avLst/>

</xml_diff>